<commit_message>
백업 완료: 2023-11-26 05:21:28
Affected files:
노코드 엔지니어링/노코드 최강자 버블.pptx
</commit_message>
<xml_diff>
--- a/노코드 엔지니어링/노코드 최강자 버블.pptx
+++ b/노코드 엔지니어링/노코드 최강자 버블.pptx
@@ -9,8 +9,6 @@
     <p:sldId id="257" r:id="rId3"/>
     <p:sldId id="258" r:id="rId4"/>
     <p:sldId id="259" r:id="rId5"/>
-    <p:sldId id="260" r:id="rId6"/>
-    <p:sldId id="261" r:id="rId7"/>
   </p:sldIdLst>
   <p:sldSz cx="12192000" cy="6858000"/>
   <p:notesSz cx="6858000" cy="9144000"/>
@@ -4040,12 +4038,7 @@
             <p:ph type="title"/>
           </p:nvPr>
         </p:nvSpPr>
-        <p:spPr>
-          <a:xfrm>
-            <a:off x="1454239" y="1756130"/>
-            <a:ext cx="8643154" cy="1887950"/>
-          </a:xfrm>
-        </p:spPr>
+        <p:spPr/>
         <p:txBody>
           <a:bodyPr/>
           <a:lstStyle/>
@@ -4060,36 +4053,14 @@
           </a:p>
         </p:txBody>
       </p:sp>
-    </p:spTree>
-  </p:cSld>
-</p:sld>
-</file>
-
-<file path=ppt/slides/slide3.xml><?xml version="1.0" encoding="utf-8"?>
-<p:sld xmlns:a="http://schemas.openxmlformats.org/drawingml/2006/main" xmlns:r="http://schemas.openxmlformats.org/officeDocument/2006/relationships" xmlns:p="http://schemas.openxmlformats.org/presentationml/2006/main">
-  <p:cSld>
-    <p:spTree>
-      <p:nvGrpSpPr>
-        <p:cNvPr id="1" name=""/>
-        <p:cNvGrpSpPr/>
-        <p:nvPr/>
-      </p:nvGrpSpPr>
-      <p:grpSpPr>
-        <a:xfrm>
-          <a:off x="0" y="0"/>
-          <a:ext cx="0" cy="0"/>
-          <a:chOff x="0" y="0"/>
-          <a:chExt cx="0" cy="0"/>
-        </a:xfrm>
-      </p:grpSpPr>
-      <p:sp>
-        <p:nvSpPr>
-          <p:cNvPr id="2" name="Title 1"/>
-          <p:cNvSpPr>
-            <a:spLocks noGrp="1"/>
-          </p:cNvSpPr>
-          <p:nvPr>
-            <p:ph type="title"/>
+      <p:sp>
+        <p:nvSpPr>
+          <p:cNvPr id="3" name="Content Placeholder 2"/>
+          <p:cNvSpPr>
+            <a:spLocks noGrp="1"/>
+          </p:cNvSpPr>
+          <p:nvPr>
+            <p:ph idx="1"/>
           </p:nvPr>
         </p:nvSpPr>
         <p:spPr/>
@@ -4098,29 +4069,16 @@
           <a:lstStyle/>
           <a:p>
             <a:pPr lvl="0" indent="0" marL="0">
+              <a:spcBef>
+                <a:spcPts val="3000"/>
+              </a:spcBef>
               <a:buNone/>
             </a:pPr>
             <a:r>
-              <a:rPr/>
+              <a:rPr b="1"/>
               <a:t>UI</a:t>
             </a:r>
           </a:p>
-        </p:txBody>
-      </p:sp>
-      <p:sp>
-        <p:nvSpPr>
-          <p:cNvPr id="3" name="Content Placeholder 2"/>
-          <p:cNvSpPr>
-            <a:spLocks noGrp="1"/>
-          </p:cNvSpPr>
-          <p:nvPr>
-            <p:ph idx="1"/>
-          </p:nvPr>
-        </p:nvSpPr>
-        <p:spPr/>
-        <p:txBody>
-          <a:bodyPr/>
-          <a:lstStyle/>
           <a:p>
             <a:pPr lvl="0"/>
             <a:r>
@@ -4140,6 +4098,112 @@
             <a:r>
               <a:rPr/>
               <a:t>리액티브: 데이터 변경에 UI가 반응하여 자동으로 UI를 재구성함.</a:t>
+            </a:r>
+          </a:p>
+          <a:p>
+            <a:pPr lvl="0" indent="0" marL="0">
+              <a:spcBef>
+                <a:spcPts val="3000"/>
+              </a:spcBef>
+              <a:buNone/>
+            </a:pPr>
+            <a:r>
+              <a:rPr b="1"/>
+              <a:t>DB</a:t>
+            </a:r>
+          </a:p>
+          <a:p>
+            <a:pPr lvl="0"/>
+            <a:r>
+              <a:rPr/>
+              <a:t>상용 수준의 2차원 데이터베이스</a:t>
+            </a:r>
+          </a:p>
+          <a:p>
+            <a:pPr lvl="1"/>
+            <a:r>
+              <a:rPr/>
+              <a:t>Thing과 같은 복잡한 형태의 데이터를 다룸</a:t>
+            </a:r>
+          </a:p>
+          <a:p>
+            <a:pPr lvl="0"/>
+            <a:r>
+              <a:rPr/>
+              <a:t>Option Set</a:t>
+            </a:r>
+          </a:p>
+          <a:p>
+            <a:pPr lvl="0"/>
+            <a:r>
+              <a:rPr/>
+              <a:t>User Type</a:t>
+            </a:r>
+          </a:p>
+          <a:p>
+            <a:pPr lvl="1"/>
+            <a:r>
+              <a:rPr/>
+              <a:t>인증, 회원가입, 로그인 등의 절차를 간소화하여 빌트인</a:t>
+            </a:r>
+          </a:p>
+          <a:p>
+            <a:pPr lvl="0" indent="0" marL="0">
+              <a:spcBef>
+                <a:spcPts val="3000"/>
+              </a:spcBef>
+              <a:buNone/>
+            </a:pPr>
+            <a:r>
+              <a:rPr b="1"/>
+              <a:t>로직</a:t>
+            </a:r>
+          </a:p>
+          <a:p>
+            <a:pPr lvl="0"/>
+            <a:r>
+              <a:rPr/>
+              <a:t>절차적으로 수행하는 Workflow</a:t>
+            </a:r>
+          </a:p>
+          <a:p>
+            <a:pPr lvl="0"/>
+            <a:r>
+              <a:rPr/>
+              <a:t>Bubble Expression</a:t>
+            </a:r>
+          </a:p>
+          <a:p>
+            <a:pPr lvl="0"/>
+            <a:r>
+              <a:rPr/>
+              <a:t>Backend Workflow</a:t>
+            </a:r>
+          </a:p>
+          <a:p>
+            <a:pPr lvl="1"/>
+            <a:r>
+              <a:rPr/>
+              <a:t>API Workflow</a:t>
+            </a:r>
+          </a:p>
+          <a:p>
+            <a:pPr lvl="1"/>
+            <a:r>
+              <a:rPr/>
+              <a:t>Data API</a:t>
+            </a:r>
+          </a:p>
+          <a:p>
+            <a:pPr lvl="0" indent="0" marL="0">
+              <a:spcBef>
+                <a:spcPts val="3000"/>
+              </a:spcBef>
+              <a:buNone/>
+            </a:pPr>
+            <a:r>
+              <a:rPr b="1"/>
+              <a:t>높은 자유도와 용이성</a:t>
             </a:r>
           </a:p>
         </p:txBody>
@@ -4182,7 +4246,7 @@
                                         <p:tgtEl>
                                           <p:spTgt spid="3">
                                             <p:txEl>
-                                              <p:pRg st="0" end="0"/>
+                                              <p:pRg st="1" end="1"/>
                                             </p:txEl>
                                           </p:spTgt>
                                         </p:tgtEl>
@@ -4231,7 +4295,7 @@
                                         <p:tgtEl>
                                           <p:spTgt spid="3">
                                             <p:txEl>
-                                              <p:pRg st="1" end="1"/>
+                                              <p:pRg st="2" end="2"/>
                                             </p:txEl>
                                           </p:spTgt>
                                         </p:tgtEl>
@@ -4280,7 +4344,497 @@
                                         <p:tgtEl>
                                           <p:spTgt spid="3">
                                             <p:txEl>
-                                              <p:pRg st="2" end="2"/>
+                                              <p:pRg st="3" end="3"/>
+                                            </p:txEl>
+                                          </p:spTgt>
+                                        </p:tgtEl>
+                                        <p:attrNameLst>
+                                          <p:attrName>style.visibility</p:attrName>
+                                        </p:attrNameLst>
+                                      </p:cBhvr>
+                                      <p:to>
+                                        <p:strVal val="visible"/>
+                                      </p:to>
+                                    </p:set>
+                                  </p:childTnLst>
+                                </p:cTn>
+                              </p:par>
+                            </p:childTnLst>
+                          </p:cTn>
+                        </p:par>
+                      </p:childTnLst>
+                    </p:cTn>
+                  </p:par>
+                  <p:par>
+                    <p:cTn id="15" fill="hold">
+                      <p:stCondLst>
+                        <p:cond delay="indefinite"/>
+                      </p:stCondLst>
+                      <p:childTnLst>
+                        <p:par>
+                          <p:cTn id="16" fill="hold">
+                            <p:stCondLst>
+                              <p:cond delay="0"/>
+                            </p:stCondLst>
+                            <p:childTnLst>
+                              <p:par>
+                                <p:cTn id="17" presetID="1" presetClass="entr" presetSubtype="0" fill="hold" grpId="0" nodeType="clickEffect">
+                                  <p:stCondLst>
+                                    <p:cond delay="0"/>
+                                  </p:stCondLst>
+                                  <p:childTnLst>
+                                    <p:set>
+                                      <p:cBhvr>
+                                        <p:cTn id="18" dur="1" fill="hold">
+                                          <p:stCondLst>
+                                            <p:cond delay="0"/>
+                                          </p:stCondLst>
+                                        </p:cTn>
+                                        <p:tgtEl>
+                                          <p:spTgt spid="3">
+                                            <p:txEl>
+                                              <p:pRg st="5" end="5"/>
+                                            </p:txEl>
+                                          </p:spTgt>
+                                        </p:tgtEl>
+                                        <p:attrNameLst>
+                                          <p:attrName>style.visibility</p:attrName>
+                                        </p:attrNameLst>
+                                      </p:cBhvr>
+                                      <p:to>
+                                        <p:strVal val="visible"/>
+                                      </p:to>
+                                    </p:set>
+                                  </p:childTnLst>
+                                </p:cTn>
+                              </p:par>
+                            </p:childTnLst>
+                          </p:cTn>
+                        </p:par>
+                      </p:childTnLst>
+                    </p:cTn>
+                  </p:par>
+                  <p:par>
+                    <p:cTn id="19" fill="hold">
+                      <p:stCondLst>
+                        <p:cond delay="indefinite"/>
+                      </p:stCondLst>
+                      <p:childTnLst>
+                        <p:par>
+                          <p:cTn id="20" fill="hold">
+                            <p:stCondLst>
+                              <p:cond delay="0"/>
+                            </p:stCondLst>
+                            <p:childTnLst>
+                              <p:par>
+                                <p:cTn id="21" presetID="1" presetClass="entr" presetSubtype="0" fill="hold" grpId="0" nodeType="clickEffect">
+                                  <p:stCondLst>
+                                    <p:cond delay="0"/>
+                                  </p:stCondLst>
+                                  <p:childTnLst>
+                                    <p:set>
+                                      <p:cBhvr>
+                                        <p:cTn id="22" dur="1" fill="hold">
+                                          <p:stCondLst>
+                                            <p:cond delay="0"/>
+                                          </p:stCondLst>
+                                        </p:cTn>
+                                        <p:tgtEl>
+                                          <p:spTgt spid="3">
+                                            <p:txEl>
+                                              <p:pRg st="6" end="6"/>
+                                            </p:txEl>
+                                          </p:spTgt>
+                                        </p:tgtEl>
+                                        <p:attrNameLst>
+                                          <p:attrName>style.visibility</p:attrName>
+                                        </p:attrNameLst>
+                                      </p:cBhvr>
+                                      <p:to>
+                                        <p:strVal val="visible"/>
+                                      </p:to>
+                                    </p:set>
+                                  </p:childTnLst>
+                                </p:cTn>
+                              </p:par>
+                            </p:childTnLst>
+                          </p:cTn>
+                        </p:par>
+                      </p:childTnLst>
+                    </p:cTn>
+                  </p:par>
+                  <p:par>
+                    <p:cTn id="23" fill="hold">
+                      <p:stCondLst>
+                        <p:cond delay="indefinite"/>
+                      </p:stCondLst>
+                      <p:childTnLst>
+                        <p:par>
+                          <p:cTn id="24" fill="hold">
+                            <p:stCondLst>
+                              <p:cond delay="0"/>
+                            </p:stCondLst>
+                            <p:childTnLst>
+                              <p:par>
+                                <p:cTn id="25" presetID="1" presetClass="entr" presetSubtype="0" fill="hold" grpId="0" nodeType="clickEffect">
+                                  <p:stCondLst>
+                                    <p:cond delay="0"/>
+                                  </p:stCondLst>
+                                  <p:childTnLst>
+                                    <p:set>
+                                      <p:cBhvr>
+                                        <p:cTn id="26" dur="1" fill="hold">
+                                          <p:stCondLst>
+                                            <p:cond delay="0"/>
+                                          </p:stCondLst>
+                                        </p:cTn>
+                                        <p:tgtEl>
+                                          <p:spTgt spid="3">
+                                            <p:txEl>
+                                              <p:pRg st="7" end="7"/>
+                                            </p:txEl>
+                                          </p:spTgt>
+                                        </p:tgtEl>
+                                        <p:attrNameLst>
+                                          <p:attrName>style.visibility</p:attrName>
+                                        </p:attrNameLst>
+                                      </p:cBhvr>
+                                      <p:to>
+                                        <p:strVal val="visible"/>
+                                      </p:to>
+                                    </p:set>
+                                  </p:childTnLst>
+                                </p:cTn>
+                              </p:par>
+                            </p:childTnLst>
+                          </p:cTn>
+                        </p:par>
+                      </p:childTnLst>
+                    </p:cTn>
+                  </p:par>
+                  <p:par>
+                    <p:cTn id="27" fill="hold">
+                      <p:stCondLst>
+                        <p:cond delay="indefinite"/>
+                      </p:stCondLst>
+                      <p:childTnLst>
+                        <p:par>
+                          <p:cTn id="28" fill="hold">
+                            <p:stCondLst>
+                              <p:cond delay="0"/>
+                            </p:stCondLst>
+                            <p:childTnLst>
+                              <p:par>
+                                <p:cTn id="29" presetID="1" presetClass="entr" presetSubtype="0" fill="hold" grpId="0" nodeType="clickEffect">
+                                  <p:stCondLst>
+                                    <p:cond delay="0"/>
+                                  </p:stCondLst>
+                                  <p:childTnLst>
+                                    <p:set>
+                                      <p:cBhvr>
+                                        <p:cTn id="30" dur="1" fill="hold">
+                                          <p:stCondLst>
+                                            <p:cond delay="0"/>
+                                          </p:stCondLst>
+                                        </p:cTn>
+                                        <p:tgtEl>
+                                          <p:spTgt spid="3">
+                                            <p:txEl>
+                                              <p:pRg st="8" end="8"/>
+                                            </p:txEl>
+                                          </p:spTgt>
+                                        </p:tgtEl>
+                                        <p:attrNameLst>
+                                          <p:attrName>style.visibility</p:attrName>
+                                        </p:attrNameLst>
+                                      </p:cBhvr>
+                                      <p:to>
+                                        <p:strVal val="visible"/>
+                                      </p:to>
+                                    </p:set>
+                                  </p:childTnLst>
+                                </p:cTn>
+                              </p:par>
+                            </p:childTnLst>
+                          </p:cTn>
+                        </p:par>
+                      </p:childTnLst>
+                    </p:cTn>
+                  </p:par>
+                  <p:par>
+                    <p:cTn id="31" fill="hold">
+                      <p:stCondLst>
+                        <p:cond delay="indefinite"/>
+                      </p:stCondLst>
+                      <p:childTnLst>
+                        <p:par>
+                          <p:cTn id="32" fill="hold">
+                            <p:stCondLst>
+                              <p:cond delay="0"/>
+                            </p:stCondLst>
+                            <p:childTnLst>
+                              <p:par>
+                                <p:cTn id="33" presetID="1" presetClass="entr" presetSubtype="0" fill="hold" grpId="0" nodeType="clickEffect">
+                                  <p:stCondLst>
+                                    <p:cond delay="0"/>
+                                  </p:stCondLst>
+                                  <p:childTnLst>
+                                    <p:set>
+                                      <p:cBhvr>
+                                        <p:cTn id="34" dur="1" fill="hold">
+                                          <p:stCondLst>
+                                            <p:cond delay="0"/>
+                                          </p:stCondLst>
+                                        </p:cTn>
+                                        <p:tgtEl>
+                                          <p:spTgt spid="3">
+                                            <p:txEl>
+                                              <p:pRg st="9" end="9"/>
+                                            </p:txEl>
+                                          </p:spTgt>
+                                        </p:tgtEl>
+                                        <p:attrNameLst>
+                                          <p:attrName>style.visibility</p:attrName>
+                                        </p:attrNameLst>
+                                      </p:cBhvr>
+                                      <p:to>
+                                        <p:strVal val="visible"/>
+                                      </p:to>
+                                    </p:set>
+                                  </p:childTnLst>
+                                </p:cTn>
+                              </p:par>
+                            </p:childTnLst>
+                          </p:cTn>
+                        </p:par>
+                      </p:childTnLst>
+                    </p:cTn>
+                  </p:par>
+                  <p:par>
+                    <p:cTn id="35" fill="hold">
+                      <p:stCondLst>
+                        <p:cond delay="indefinite"/>
+                      </p:stCondLst>
+                      <p:childTnLst>
+                        <p:par>
+                          <p:cTn id="36" fill="hold">
+                            <p:stCondLst>
+                              <p:cond delay="0"/>
+                            </p:stCondLst>
+                            <p:childTnLst>
+                              <p:par>
+                                <p:cTn id="37" presetID="1" presetClass="entr" presetSubtype="0" fill="hold" grpId="0" nodeType="clickEffect">
+                                  <p:stCondLst>
+                                    <p:cond delay="0"/>
+                                  </p:stCondLst>
+                                  <p:childTnLst>
+                                    <p:set>
+                                      <p:cBhvr>
+                                        <p:cTn id="38" dur="1" fill="hold">
+                                          <p:stCondLst>
+                                            <p:cond delay="0"/>
+                                          </p:stCondLst>
+                                        </p:cTn>
+                                        <p:tgtEl>
+                                          <p:spTgt spid="3">
+                                            <p:txEl>
+                                              <p:pRg st="11" end="11"/>
+                                            </p:txEl>
+                                          </p:spTgt>
+                                        </p:tgtEl>
+                                        <p:attrNameLst>
+                                          <p:attrName>style.visibility</p:attrName>
+                                        </p:attrNameLst>
+                                      </p:cBhvr>
+                                      <p:to>
+                                        <p:strVal val="visible"/>
+                                      </p:to>
+                                    </p:set>
+                                  </p:childTnLst>
+                                </p:cTn>
+                              </p:par>
+                            </p:childTnLst>
+                          </p:cTn>
+                        </p:par>
+                      </p:childTnLst>
+                    </p:cTn>
+                  </p:par>
+                  <p:par>
+                    <p:cTn id="39" fill="hold">
+                      <p:stCondLst>
+                        <p:cond delay="indefinite"/>
+                      </p:stCondLst>
+                      <p:childTnLst>
+                        <p:par>
+                          <p:cTn id="40" fill="hold">
+                            <p:stCondLst>
+                              <p:cond delay="0"/>
+                            </p:stCondLst>
+                            <p:childTnLst>
+                              <p:par>
+                                <p:cTn id="41" presetID="1" presetClass="entr" presetSubtype="0" fill="hold" grpId="0" nodeType="clickEffect">
+                                  <p:stCondLst>
+                                    <p:cond delay="0"/>
+                                  </p:stCondLst>
+                                  <p:childTnLst>
+                                    <p:set>
+                                      <p:cBhvr>
+                                        <p:cTn id="42" dur="1" fill="hold">
+                                          <p:stCondLst>
+                                            <p:cond delay="0"/>
+                                          </p:stCondLst>
+                                        </p:cTn>
+                                        <p:tgtEl>
+                                          <p:spTgt spid="3">
+                                            <p:txEl>
+                                              <p:pRg st="12" end="12"/>
+                                            </p:txEl>
+                                          </p:spTgt>
+                                        </p:tgtEl>
+                                        <p:attrNameLst>
+                                          <p:attrName>style.visibility</p:attrName>
+                                        </p:attrNameLst>
+                                      </p:cBhvr>
+                                      <p:to>
+                                        <p:strVal val="visible"/>
+                                      </p:to>
+                                    </p:set>
+                                  </p:childTnLst>
+                                </p:cTn>
+                              </p:par>
+                            </p:childTnLst>
+                          </p:cTn>
+                        </p:par>
+                      </p:childTnLst>
+                    </p:cTn>
+                  </p:par>
+                  <p:par>
+                    <p:cTn id="43" fill="hold">
+                      <p:stCondLst>
+                        <p:cond delay="indefinite"/>
+                      </p:stCondLst>
+                      <p:childTnLst>
+                        <p:par>
+                          <p:cTn id="44" fill="hold">
+                            <p:stCondLst>
+                              <p:cond delay="0"/>
+                            </p:stCondLst>
+                            <p:childTnLst>
+                              <p:par>
+                                <p:cTn id="45" presetID="1" presetClass="entr" presetSubtype="0" fill="hold" grpId="0" nodeType="clickEffect">
+                                  <p:stCondLst>
+                                    <p:cond delay="0"/>
+                                  </p:stCondLst>
+                                  <p:childTnLst>
+                                    <p:set>
+                                      <p:cBhvr>
+                                        <p:cTn id="46" dur="1" fill="hold">
+                                          <p:stCondLst>
+                                            <p:cond delay="0"/>
+                                          </p:stCondLst>
+                                        </p:cTn>
+                                        <p:tgtEl>
+                                          <p:spTgt spid="3">
+                                            <p:txEl>
+                                              <p:pRg st="13" end="13"/>
+                                            </p:txEl>
+                                          </p:spTgt>
+                                        </p:tgtEl>
+                                        <p:attrNameLst>
+                                          <p:attrName>style.visibility</p:attrName>
+                                        </p:attrNameLst>
+                                      </p:cBhvr>
+                                      <p:to>
+                                        <p:strVal val="visible"/>
+                                      </p:to>
+                                    </p:set>
+                                  </p:childTnLst>
+                                </p:cTn>
+                              </p:par>
+                            </p:childTnLst>
+                          </p:cTn>
+                        </p:par>
+                      </p:childTnLst>
+                    </p:cTn>
+                  </p:par>
+                  <p:par>
+                    <p:cTn id="47" fill="hold">
+                      <p:stCondLst>
+                        <p:cond delay="indefinite"/>
+                      </p:stCondLst>
+                      <p:childTnLst>
+                        <p:par>
+                          <p:cTn id="48" fill="hold">
+                            <p:stCondLst>
+                              <p:cond delay="0"/>
+                            </p:stCondLst>
+                            <p:childTnLst>
+                              <p:par>
+                                <p:cTn id="49" presetID="1" presetClass="entr" presetSubtype="0" fill="hold" grpId="0" nodeType="clickEffect">
+                                  <p:stCondLst>
+                                    <p:cond delay="0"/>
+                                  </p:stCondLst>
+                                  <p:childTnLst>
+                                    <p:set>
+                                      <p:cBhvr>
+                                        <p:cTn id="50" dur="1" fill="hold">
+                                          <p:stCondLst>
+                                            <p:cond delay="0"/>
+                                          </p:stCondLst>
+                                        </p:cTn>
+                                        <p:tgtEl>
+                                          <p:spTgt spid="3">
+                                            <p:txEl>
+                                              <p:pRg st="14" end="14"/>
+                                            </p:txEl>
+                                          </p:spTgt>
+                                        </p:tgtEl>
+                                        <p:attrNameLst>
+                                          <p:attrName>style.visibility</p:attrName>
+                                        </p:attrNameLst>
+                                      </p:cBhvr>
+                                      <p:to>
+                                        <p:strVal val="visible"/>
+                                      </p:to>
+                                    </p:set>
+                                  </p:childTnLst>
+                                </p:cTn>
+                              </p:par>
+                            </p:childTnLst>
+                          </p:cTn>
+                        </p:par>
+                      </p:childTnLst>
+                    </p:cTn>
+                  </p:par>
+                  <p:par>
+                    <p:cTn id="51" fill="hold">
+                      <p:stCondLst>
+                        <p:cond delay="indefinite"/>
+                      </p:stCondLst>
+                      <p:childTnLst>
+                        <p:par>
+                          <p:cTn id="52" fill="hold">
+                            <p:stCondLst>
+                              <p:cond delay="0"/>
+                            </p:stCondLst>
+                            <p:childTnLst>
+                              <p:par>
+                                <p:cTn id="53" presetID="1" presetClass="entr" presetSubtype="0" fill="hold" grpId="0" nodeType="clickEffect">
+                                  <p:stCondLst>
+                                    <p:cond delay="0"/>
+                                  </p:stCondLst>
+                                  <p:childTnLst>
+                                    <p:set>
+                                      <p:cBhvr>
+                                        <p:cTn id="54" dur="1" fill="hold">
+                                          <p:stCondLst>
+                                            <p:cond delay="0"/>
+                                          </p:stCondLst>
+                                        </p:cTn>
+                                        <p:tgtEl>
+                                          <p:spTgt spid="3">
+                                            <p:txEl>
+                                              <p:pRg st="15" end="15"/>
                                             </p:txEl>
                                           </p:spTgt>
                                         </p:tgtEl>
@@ -4329,7 +4883,7 @@
 </p:sld>
 </file>
 
-<file path=ppt/slides/slide4.xml><?xml version="1.0" encoding="utf-8"?>
+<file path=ppt/slides/slide3.xml><?xml version="1.0" encoding="utf-8"?>
 <p:sld xmlns:a="http://schemas.openxmlformats.org/drawingml/2006/main" xmlns:r="http://schemas.openxmlformats.org/officeDocument/2006/relationships" xmlns:p="http://schemas.openxmlformats.org/presentationml/2006/main">
   <p:cSld>
     <p:spTree>
@@ -4366,7 +4920,7 @@
             </a:pPr>
             <a:r>
               <a:rPr/>
-              <a:t>DB</a:t>
+              <a:t>버블 튜토리얼</a:t>
             </a:r>
           </a:p>
         </p:txBody>
@@ -4389,35 +4943,28 @@
             <a:pPr lvl="0"/>
             <a:r>
               <a:rPr/>
-              <a:t>상용 수준의 2차원 데이터베이스</a:t>
-            </a:r>
-          </a:p>
-          <a:p>
-            <a:pPr lvl="1"/>
+              <a:t>버블의 코어한 컨셉을 이해하기 좋은 초보자 가이드</a:t>
+            </a:r>
+          </a:p>
+          <a:p>
+            <a:pPr lvl="0"/>
             <a:r>
               <a:rPr/>
-              <a:t>Thing과 같은 복잡한 형태의 데이터를 다룸</a:t>
+              <a:t>데이터 저장하기부터, 회원가입과 로그인, API 커넥터를 사용한 외부 서비스 연결 등 서비스를 제작하는 데에 필요한 최소한의 기능들을 10분 내외의 튜토리얼로 제공</a:t>
             </a:r>
           </a:p>
           <a:p>
             <a:pPr lvl="0"/>
             <a:r>
               <a:rPr/>
-              <a:t>Option Set</a:t>
+              <a:t>실제로 버블 프로덕트 제작에 쓰이는 에디터에 Step by step 가이드를 제공해 따라하는 형태로 되어있기에 별다른 도움 없이 혼자서 수강 가능</a:t>
             </a:r>
           </a:p>
           <a:p>
             <a:pPr lvl="0"/>
             <a:r>
               <a:rPr/>
-              <a:t>User Type</a:t>
-            </a:r>
-          </a:p>
-          <a:p>
-            <a:pPr lvl="1"/>
-            <a:r>
-              <a:rPr/>
-              <a:t>인증, 회원가입, 로그인 등의 절차를 간소화하여 빌트인</a:t>
+              <a:t>가이드를 위한 임시 인스턴스의 형태이기에 DB에 대한 접근이 차단됨</a:t>
             </a:r>
           </a:p>
         </p:txBody>
@@ -4628,55 +5175,6 @@
                       </p:childTnLst>
                     </p:cTn>
                   </p:par>
-                  <p:par>
-                    <p:cTn id="19" fill="hold">
-                      <p:stCondLst>
-                        <p:cond delay="indefinite"/>
-                      </p:stCondLst>
-                      <p:childTnLst>
-                        <p:par>
-                          <p:cTn id="20" fill="hold">
-                            <p:stCondLst>
-                              <p:cond delay="0"/>
-                            </p:stCondLst>
-                            <p:childTnLst>
-                              <p:par>
-                                <p:cTn id="21" presetID="1" presetClass="entr" presetSubtype="0" fill="hold" grpId="0" nodeType="clickEffect">
-                                  <p:stCondLst>
-                                    <p:cond delay="0"/>
-                                  </p:stCondLst>
-                                  <p:childTnLst>
-                                    <p:set>
-                                      <p:cBhvr>
-                                        <p:cTn id="22" dur="1" fill="hold">
-                                          <p:stCondLst>
-                                            <p:cond delay="0"/>
-                                          </p:stCondLst>
-                                        </p:cTn>
-                                        <p:tgtEl>
-                                          <p:spTgt spid="3">
-                                            <p:txEl>
-                                              <p:pRg st="4" end="4"/>
-                                            </p:txEl>
-                                          </p:spTgt>
-                                        </p:tgtEl>
-                                        <p:attrNameLst>
-                                          <p:attrName>style.visibility</p:attrName>
-                                        </p:attrNameLst>
-                                      </p:cBhvr>
-                                      <p:to>
-                                        <p:strVal val="visible"/>
-                                      </p:to>
-                                    </p:set>
-                                  </p:childTnLst>
-                                </p:cTn>
-                              </p:par>
-                            </p:childTnLst>
-                          </p:cTn>
-                        </p:par>
-                      </p:childTnLst>
-                    </p:cTn>
-                  </p:par>
                 </p:childTnLst>
               </p:cTn>
               <p:prevCondLst>
@@ -4705,7 +5203,7 @@
 </p:sld>
 </file>
 
-<file path=ppt/slides/slide5.xml><?xml version="1.0" encoding="utf-8"?>
+<file path=ppt/slides/slide4.xml><?xml version="1.0" encoding="utf-8"?>
 <p:sld xmlns:a="http://schemas.openxmlformats.org/drawingml/2006/main" xmlns:r="http://schemas.openxmlformats.org/officeDocument/2006/relationships" xmlns:p="http://schemas.openxmlformats.org/presentationml/2006/main">
   <p:cSld>
     <p:spTree>
@@ -4742,7 +5240,7 @@
             </a:pPr>
             <a:r>
               <a:rPr/>
-              <a:t>로직</a:t>
+              <a:t>버블 권장 기본 설정</a:t>
             </a:r>
           </a:p>
         </p:txBody>
@@ -4762,38 +5260,71 @@
           <a:bodyPr/>
           <a:lstStyle/>
           <a:p>
+            <a:pPr lvl="0" indent="0" marL="0">
+              <a:spcBef>
+                <a:spcPts val="3000"/>
+              </a:spcBef>
+              <a:buNone/>
+            </a:pPr>
+            <a:r>
+              <a:rPr b="1"/>
+              <a:t>Debug mode</a:t>
+            </a:r>
+          </a:p>
+          <a:p>
             <a:pPr lvl="0"/>
             <a:r>
               <a:rPr/>
-              <a:t>절차적으로 수행하는 Workflow</a:t>
+              <a:t>버블 에디터에서 Preview하면 기본적으로 미리보기가 디버그 모드로 실행됨</a:t>
             </a:r>
           </a:p>
           <a:p>
             <a:pPr lvl="0"/>
             <a:r>
               <a:rPr/>
-              <a:t>Bubble Expression</a:t>
+              <a:t>디버그 모드에서는 하단 디버그 패널이 따라 나타나기 때문에 레이아웃을 확인하기 어려우므로 주소 표시줄의 아래 파라미터를 제거하여 디버그를 떼어 줌</a:t>
+            </a:r>
+          </a:p>
+          <a:p>
+            <a:pPr lvl="1"/>
+            <a:r>
+              <a:rPr>
+                <a:latin typeface="Courier"/>
+              </a:rPr>
+              <a:t>?debug_mode=true</a:t>
+            </a:r>
+          </a:p>
+          <a:p>
+            <a:pPr lvl="1"/>
+            <a:r>
+              <a:rPr/>
+              <a:t>디버그 모드를 해제하면 무료 플랜의 경우 Built on Bubble 뱃지가 붙음</a:t>
+            </a:r>
+          </a:p>
+          <a:p>
+            <a:pPr lvl="0" indent="0" marL="0">
+              <a:spcBef>
+                <a:spcPts val="3000"/>
+              </a:spcBef>
+              <a:buNone/>
+            </a:pPr>
+            <a:r>
+              <a:rPr b="1"/>
+              <a:t>Element Tree</a:t>
             </a:r>
           </a:p>
           <a:p>
             <a:pPr lvl="0"/>
             <a:r>
               <a:rPr/>
-              <a:t>Backend Workflow</a:t>
+              <a:t>엘리먼트 트리에서 Only show hideable을 항상 체크 해제</a:t>
             </a:r>
           </a:p>
           <a:p>
             <a:pPr lvl="1"/>
             <a:r>
               <a:rPr/>
-              <a:t>API Workflow</a:t>
-            </a:r>
-          </a:p>
-          <a:p>
-            <a:pPr lvl="1"/>
-            <a:r>
-              <a:rPr/>
-              <a:t>Data API</a:t>
+              <a:t>피그마나 프레이머에서 쓰던 감각 그대로 쓰기 위해서</a:t>
             </a:r>
           </a:p>
         </p:txBody>
@@ -4836,7 +5367,7 @@
                                         <p:tgtEl>
                                           <p:spTgt spid="3">
                                             <p:txEl>
-                                              <p:pRg st="0" end="0"/>
+                                              <p:pRg st="1" end="1"/>
                                             </p:txEl>
                                           </p:spTgt>
                                         </p:tgtEl>
@@ -4885,7 +5416,7 @@
                                         <p:tgtEl>
                                           <p:spTgt spid="3">
                                             <p:txEl>
-                                              <p:pRg st="1" end="1"/>
+                                              <p:pRg st="2" end="2"/>
                                             </p:txEl>
                                           </p:spTgt>
                                         </p:tgtEl>
@@ -4934,7 +5465,7 @@
                                         <p:tgtEl>
                                           <p:spTgt spid="3">
                                             <p:txEl>
-                                              <p:pRg st="2" end="2"/>
+                                              <p:pRg st="3" end="3"/>
                                             </p:txEl>
                                           </p:spTgt>
                                         </p:tgtEl>
@@ -4983,7 +5514,7 @@
                                         <p:tgtEl>
                                           <p:spTgt spid="3">
                                             <p:txEl>
-                                              <p:pRg st="3" end="3"/>
+                                              <p:pRg st="4" end="4"/>
                                             </p:txEl>
                                           </p:spTgt>
                                         </p:tgtEl>
@@ -5032,7 +5563,56 @@
                                         <p:tgtEl>
                                           <p:spTgt spid="3">
                                             <p:txEl>
-                                              <p:pRg st="4" end="4"/>
+                                              <p:pRg st="6" end="6"/>
+                                            </p:txEl>
+                                          </p:spTgt>
+                                        </p:tgtEl>
+                                        <p:attrNameLst>
+                                          <p:attrName>style.visibility</p:attrName>
+                                        </p:attrNameLst>
+                                      </p:cBhvr>
+                                      <p:to>
+                                        <p:strVal val="visible"/>
+                                      </p:to>
+                                    </p:set>
+                                  </p:childTnLst>
+                                </p:cTn>
+                              </p:par>
+                            </p:childTnLst>
+                          </p:cTn>
+                        </p:par>
+                      </p:childTnLst>
+                    </p:cTn>
+                  </p:par>
+                  <p:par>
+                    <p:cTn id="23" fill="hold">
+                      <p:stCondLst>
+                        <p:cond delay="indefinite"/>
+                      </p:stCondLst>
+                      <p:childTnLst>
+                        <p:par>
+                          <p:cTn id="24" fill="hold">
+                            <p:stCondLst>
+                              <p:cond delay="0"/>
+                            </p:stCondLst>
+                            <p:childTnLst>
+                              <p:par>
+                                <p:cTn id="25" presetID="1" presetClass="entr" presetSubtype="0" fill="hold" grpId="0" nodeType="clickEffect">
+                                  <p:stCondLst>
+                                    <p:cond delay="0"/>
+                                  </p:stCondLst>
+                                  <p:childTnLst>
+                                    <p:set>
+                                      <p:cBhvr>
+                                        <p:cTn id="26" dur="1" fill="hold">
+                                          <p:stCondLst>
+                                            <p:cond delay="0"/>
+                                          </p:stCondLst>
+                                        </p:cTn>
+                                        <p:tgtEl>
+                                          <p:spTgt spid="3">
+                                            <p:txEl>
+                                              <p:pRg st="7" end="7"/>
                                             </p:txEl>
                                           </p:spTgt>
                                         </p:tgtEl>
@@ -5078,53 +5658,6 @@
       <p:bldP spid="3" grpId="0" uiExpand="1" build="p"/>
     </p:bldLst>
   </p:timing>
-</p:sld>
-</file>
-
-<file path=ppt/slides/slide6.xml><?xml version="1.0" encoding="utf-8"?>
-<p:sld xmlns:a="http://schemas.openxmlformats.org/drawingml/2006/main" xmlns:r="http://schemas.openxmlformats.org/officeDocument/2006/relationships" xmlns:p="http://schemas.openxmlformats.org/presentationml/2006/main">
-  <p:cSld>
-    <p:spTree>
-      <p:nvGrpSpPr>
-        <p:cNvPr id="1" name=""/>
-        <p:cNvGrpSpPr/>
-        <p:nvPr/>
-      </p:nvGrpSpPr>
-      <p:grpSpPr>
-        <a:xfrm>
-          <a:off x="0" y="0"/>
-          <a:ext cx="0" cy="0"/>
-          <a:chOff x="0" y="0"/>
-          <a:chExt cx="0" cy="0"/>
-        </a:xfrm>
-      </p:grpSpPr>
-      <p:sp>
-        <p:nvSpPr>
-          <p:cNvPr id="2" name="Title 1"/>
-          <p:cNvSpPr>
-            <a:spLocks noGrp="1"/>
-          </p:cNvSpPr>
-          <p:nvPr>
-            <p:ph type="title"/>
-          </p:nvPr>
-        </p:nvSpPr>
-        <p:spPr/>
-        <p:txBody>
-          <a:bodyPr/>
-          <a:lstStyle/>
-          <a:p>
-            <a:pPr lvl="0" indent="0" marL="0">
-              <a:buNone/>
-            </a:pPr>
-            <a:r>
-              <a:rPr/>
-              <a:t>높은 자유도와 용이성</a:t>
-            </a:r>
-          </a:p>
-        </p:txBody>
-      </p:sp>
-    </p:spTree>
-  </p:cSld>
 </p:sld>
 </file>
 

</xml_diff>

<commit_message>
백업 완료: 2023-11-26 05:35:16
Affected files:
노코드 엔지니어링/노코드 최강자 버블.md
노코드 엔지니어링/노코드 최강자 버블.pptx
</commit_message>
<xml_diff>
--- a/노코드 엔지니어링/노코드 최강자 버블.pptx
+++ b/노코드 엔지니어링/노코드 최강자 버블.pptx
@@ -9,6 +9,8 @@
     <p:sldId id="257" r:id="rId3"/>
     <p:sldId id="258" r:id="rId4"/>
     <p:sldId id="259" r:id="rId5"/>
+    <p:sldId id="260" r:id="rId6"/>
+    <p:sldId id="261" r:id="rId7"/>
   </p:sldIdLst>
   <p:sldSz cx="12192000" cy="6858000"/>
   <p:notesSz cx="6858000" cy="9144000"/>
@@ -4147,65 +4149,6 @@
               <a:t>인증, 회원가입, 로그인 등의 절차를 간소화하여 빌트인</a:t>
             </a:r>
           </a:p>
-          <a:p>
-            <a:pPr lvl="0" indent="0" marL="0">
-              <a:spcBef>
-                <a:spcPts val="3000"/>
-              </a:spcBef>
-              <a:buNone/>
-            </a:pPr>
-            <a:r>
-              <a:rPr b="1"/>
-              <a:t>로직</a:t>
-            </a:r>
-          </a:p>
-          <a:p>
-            <a:pPr lvl="0"/>
-            <a:r>
-              <a:rPr/>
-              <a:t>절차적으로 수행하는 Workflow</a:t>
-            </a:r>
-          </a:p>
-          <a:p>
-            <a:pPr lvl="0"/>
-            <a:r>
-              <a:rPr/>
-              <a:t>Bubble Expression</a:t>
-            </a:r>
-          </a:p>
-          <a:p>
-            <a:pPr lvl="0"/>
-            <a:r>
-              <a:rPr/>
-              <a:t>Backend Workflow</a:t>
-            </a:r>
-          </a:p>
-          <a:p>
-            <a:pPr lvl="1"/>
-            <a:r>
-              <a:rPr/>
-              <a:t>API Workflow</a:t>
-            </a:r>
-          </a:p>
-          <a:p>
-            <a:pPr lvl="1"/>
-            <a:r>
-              <a:rPr/>
-              <a:t>Data API</a:t>
-            </a:r>
-          </a:p>
-          <a:p>
-            <a:pPr lvl="0" indent="0" marL="0">
-              <a:spcBef>
-                <a:spcPts val="3000"/>
-              </a:spcBef>
-              <a:buNone/>
-            </a:pPr>
-            <a:r>
-              <a:rPr b="1"/>
-              <a:t>높은 자유도와 용이성</a:t>
-            </a:r>
-          </a:p>
         </p:txBody>
       </p:sp>
     </p:spTree>
@@ -4610,27 +4553,178 @@
                       </p:childTnLst>
                     </p:cTn>
                   </p:par>
+                </p:childTnLst>
+              </p:cTn>
+              <p:prevCondLst>
+                <p:cond evt="onPrev" delay="0">
+                  <p:tgtEl>
+                    <p:sldTgt/>
+                  </p:tgtEl>
+                </p:cond>
+              </p:prevCondLst>
+              <p:nextCondLst>
+                <p:cond evt="onNext" delay="0">
+                  <p:tgtEl>
+                    <p:sldTgt/>
+                  </p:tgtEl>
+                </p:cond>
+              </p:nextCondLst>
+            </p:seq>
+          </p:childTnLst>
+        </p:cTn>
+      </p:par>
+    </p:tnLst>
+    <p:bldLst>
+      <p:bldP spid="3" grpId="0" uiExpand="1" build="p"/>
+    </p:bldLst>
+  </p:timing>
+</p:sld>
+</file>
+
+<file path=ppt/slides/slide3.xml><?xml version="1.0" encoding="utf-8"?>
+<p:sld xmlns:a="http://schemas.openxmlformats.org/drawingml/2006/main" xmlns:r="http://schemas.openxmlformats.org/officeDocument/2006/relationships" xmlns:p="http://schemas.openxmlformats.org/presentationml/2006/main">
+  <p:cSld>
+    <p:spTree>
+      <p:nvGrpSpPr>
+        <p:cNvPr id="1" name=""/>
+        <p:cNvGrpSpPr/>
+        <p:nvPr/>
+      </p:nvGrpSpPr>
+      <p:grpSpPr>
+        <a:xfrm>
+          <a:off x="0" y="0"/>
+          <a:ext cx="0" cy="0"/>
+          <a:chOff x="0" y="0"/>
+          <a:chExt cx="0" cy="0"/>
+        </a:xfrm>
+      </p:grpSpPr>
+      <p:sp>
+        <p:nvSpPr>
+          <p:cNvPr id="3" name="Content Placeholder 2"/>
+          <p:cNvSpPr>
+            <a:spLocks noGrp="1"/>
+          </p:cNvSpPr>
+          <p:nvPr>
+            <p:ph idx="1"/>
+          </p:nvPr>
+        </p:nvSpPr>
+        <p:spPr/>
+        <p:txBody>
+          <a:bodyPr/>
+          <a:lstStyle/>
+          <a:p>
+            <a:pPr lvl="0" indent="0" marL="0">
+              <a:spcBef>
+                <a:spcPts val="3000"/>
+              </a:spcBef>
+              <a:buNone/>
+            </a:pPr>
+            <a:r>
+              <a:rPr b="1"/>
+              <a:t>로직</a:t>
+            </a:r>
+          </a:p>
+          <a:p>
+            <a:pPr lvl="0"/>
+            <a:r>
+              <a:rPr/>
+              <a:t>Workflow</a:t>
+            </a:r>
+          </a:p>
+          <a:p>
+            <a:pPr lvl="1"/>
+            <a:r>
+              <a:rPr/>
+              <a:t>언어적 표현을 최대한 반영하여 구성되는 절차적 논리 수행</a:t>
+            </a:r>
+          </a:p>
+          <a:p>
+            <a:pPr lvl="0"/>
+            <a:r>
+              <a:rPr/>
+              <a:t>Bubble Expression</a:t>
+            </a:r>
+          </a:p>
+          <a:p>
+            <a:pPr lvl="1"/>
+            <a:r>
+              <a:rPr/>
+              <a:t>엑셀, 구글 시트의 수식과 같은 역할</a:t>
+            </a:r>
+          </a:p>
+          <a:p>
+            <a:pPr lvl="0"/>
+            <a:r>
+              <a:rPr/>
+              <a:t>Backend Workflow</a:t>
+            </a:r>
+          </a:p>
+          <a:p>
+            <a:pPr lvl="1"/>
+            <a:r>
+              <a:rPr/>
+              <a:t>백엔드 전용으로 사용할 수 있을 만큼 복잡도를 가진 백엔드 구축 가능</a:t>
+            </a:r>
+          </a:p>
+          <a:p>
+            <a:pPr lvl="1"/>
+            <a:r>
+              <a:rPr/>
+              <a:t>API Workflow</a:t>
+            </a:r>
+          </a:p>
+          <a:p>
+            <a:pPr lvl="1"/>
+            <a:r>
+              <a:rPr/>
+              <a:t>Data API</a:t>
+            </a:r>
+          </a:p>
+          <a:p>
+            <a:pPr lvl="0" indent="0" marL="0">
+              <a:spcBef>
+                <a:spcPts val="3000"/>
+              </a:spcBef>
+              <a:buNone/>
+            </a:pPr>
+            <a:r>
+              <a:rPr b="1"/>
+              <a:t>높은 자유도와 용이성</a:t>
+            </a:r>
+          </a:p>
+        </p:txBody>
+      </p:sp>
+    </p:spTree>
+  </p:cSld>
+  <p:timing>
+    <p:tnLst>
+      <p:par>
+        <p:cTn id="1" dur="indefinite" restart="never" nodeType="tmRoot">
+          <p:childTnLst>
+            <p:seq concurrent="1" nextAc="seek">
+              <p:cTn id="2" dur="indefinite" nodeType="mainSeq">
+                <p:childTnLst>
                   <p:par>
-                    <p:cTn id="35" fill="hold">
+                    <p:cTn id="3" fill="hold">
                       <p:stCondLst>
                         <p:cond delay="indefinite"/>
                       </p:stCondLst>
                       <p:childTnLst>
                         <p:par>
-                          <p:cTn id="36" fill="hold">
+                          <p:cTn id="4" fill="hold">
                             <p:stCondLst>
                               <p:cond delay="0"/>
                             </p:stCondLst>
                             <p:childTnLst>
                               <p:par>
-                                <p:cTn id="37" presetID="1" presetClass="entr" presetSubtype="0" fill="hold" grpId="0" nodeType="clickEffect">
+                                <p:cTn id="5" presetID="1" presetClass="entr" presetSubtype="0" fill="hold" grpId="0" nodeType="clickEffect">
                                   <p:stCondLst>
                                     <p:cond delay="0"/>
                                   </p:stCondLst>
                                   <p:childTnLst>
                                     <p:set>
                                       <p:cBhvr>
-                                        <p:cTn id="38" dur="1" fill="hold">
+                                        <p:cTn id="6" dur="1" fill="hold">
                                           <p:stCondLst>
                                             <p:cond delay="0"/>
                                           </p:stCondLst>
@@ -4638,7 +4732,7 @@
                                         <p:tgtEl>
                                           <p:spTgt spid="3">
                                             <p:txEl>
-                                              <p:pRg st="11" end="11"/>
+                                              <p:pRg st="1" end="1"/>
                                             </p:txEl>
                                           </p:spTgt>
                                         </p:tgtEl>
@@ -4660,26 +4754,26 @@
                     </p:cTn>
                   </p:par>
                   <p:par>
-                    <p:cTn id="39" fill="hold">
+                    <p:cTn id="7" fill="hold">
                       <p:stCondLst>
                         <p:cond delay="indefinite"/>
                       </p:stCondLst>
                       <p:childTnLst>
                         <p:par>
-                          <p:cTn id="40" fill="hold">
+                          <p:cTn id="8" fill="hold">
                             <p:stCondLst>
                               <p:cond delay="0"/>
                             </p:stCondLst>
                             <p:childTnLst>
                               <p:par>
-                                <p:cTn id="41" presetID="1" presetClass="entr" presetSubtype="0" fill="hold" grpId="0" nodeType="clickEffect">
+                                <p:cTn id="9" presetID="1" presetClass="entr" presetSubtype="0" fill="hold" grpId="0" nodeType="clickEffect">
                                   <p:stCondLst>
                                     <p:cond delay="0"/>
                                   </p:stCondLst>
                                   <p:childTnLst>
                                     <p:set>
                                       <p:cBhvr>
-                                        <p:cTn id="42" dur="1" fill="hold">
+                                        <p:cTn id="10" dur="1" fill="hold">
                                           <p:stCondLst>
                                             <p:cond delay="0"/>
                                           </p:stCondLst>
@@ -4687,7 +4781,7 @@
                                         <p:tgtEl>
                                           <p:spTgt spid="3">
                                             <p:txEl>
-                                              <p:pRg st="12" end="12"/>
+                                              <p:pRg st="2" end="2"/>
                                             </p:txEl>
                                           </p:spTgt>
                                         </p:tgtEl>
@@ -4709,26 +4803,26 @@
                     </p:cTn>
                   </p:par>
                   <p:par>
-                    <p:cTn id="43" fill="hold">
+                    <p:cTn id="11" fill="hold">
                       <p:stCondLst>
                         <p:cond delay="indefinite"/>
                       </p:stCondLst>
                       <p:childTnLst>
                         <p:par>
-                          <p:cTn id="44" fill="hold">
+                          <p:cTn id="12" fill="hold">
                             <p:stCondLst>
                               <p:cond delay="0"/>
                             </p:stCondLst>
                             <p:childTnLst>
                               <p:par>
-                                <p:cTn id="45" presetID="1" presetClass="entr" presetSubtype="0" fill="hold" grpId="0" nodeType="clickEffect">
+                                <p:cTn id="13" presetID="1" presetClass="entr" presetSubtype="0" fill="hold" grpId="0" nodeType="clickEffect">
                                   <p:stCondLst>
                                     <p:cond delay="0"/>
                                   </p:stCondLst>
                                   <p:childTnLst>
                                     <p:set>
                                       <p:cBhvr>
-                                        <p:cTn id="46" dur="1" fill="hold">
+                                        <p:cTn id="14" dur="1" fill="hold">
                                           <p:stCondLst>
                                             <p:cond delay="0"/>
                                           </p:stCondLst>
@@ -4736,7 +4830,7 @@
                                         <p:tgtEl>
                                           <p:spTgt spid="3">
                                             <p:txEl>
-                                              <p:pRg st="13" end="13"/>
+                                              <p:pRg st="3" end="3"/>
                                             </p:txEl>
                                           </p:spTgt>
                                         </p:tgtEl>
@@ -4758,26 +4852,26 @@
                     </p:cTn>
                   </p:par>
                   <p:par>
-                    <p:cTn id="47" fill="hold">
+                    <p:cTn id="15" fill="hold">
                       <p:stCondLst>
                         <p:cond delay="indefinite"/>
                       </p:stCondLst>
                       <p:childTnLst>
                         <p:par>
-                          <p:cTn id="48" fill="hold">
+                          <p:cTn id="16" fill="hold">
                             <p:stCondLst>
                               <p:cond delay="0"/>
                             </p:stCondLst>
                             <p:childTnLst>
                               <p:par>
-                                <p:cTn id="49" presetID="1" presetClass="entr" presetSubtype="0" fill="hold" grpId="0" nodeType="clickEffect">
+                                <p:cTn id="17" presetID="1" presetClass="entr" presetSubtype="0" fill="hold" grpId="0" nodeType="clickEffect">
                                   <p:stCondLst>
                                     <p:cond delay="0"/>
                                   </p:stCondLst>
                                   <p:childTnLst>
                                     <p:set>
                                       <p:cBhvr>
-                                        <p:cTn id="50" dur="1" fill="hold">
+                                        <p:cTn id="18" dur="1" fill="hold">
                                           <p:stCondLst>
                                             <p:cond delay="0"/>
                                           </p:stCondLst>
@@ -4785,7 +4879,7 @@
                                         <p:tgtEl>
                                           <p:spTgt spid="3">
                                             <p:txEl>
-                                              <p:pRg st="14" end="14"/>
+                                              <p:pRg st="4" end="4"/>
                                             </p:txEl>
                                           </p:spTgt>
                                         </p:tgtEl>
@@ -4807,26 +4901,26 @@
                     </p:cTn>
                   </p:par>
                   <p:par>
-                    <p:cTn id="51" fill="hold">
+                    <p:cTn id="19" fill="hold">
                       <p:stCondLst>
                         <p:cond delay="indefinite"/>
                       </p:stCondLst>
                       <p:childTnLst>
                         <p:par>
-                          <p:cTn id="52" fill="hold">
+                          <p:cTn id="20" fill="hold">
                             <p:stCondLst>
                               <p:cond delay="0"/>
                             </p:stCondLst>
                             <p:childTnLst>
                               <p:par>
-                                <p:cTn id="53" presetID="1" presetClass="entr" presetSubtype="0" fill="hold" grpId="0" nodeType="clickEffect">
+                                <p:cTn id="21" presetID="1" presetClass="entr" presetSubtype="0" fill="hold" grpId="0" nodeType="clickEffect">
                                   <p:stCondLst>
                                     <p:cond delay="0"/>
                                   </p:stCondLst>
                                   <p:childTnLst>
                                     <p:set>
                                       <p:cBhvr>
-                                        <p:cTn id="54" dur="1" fill="hold">
+                                        <p:cTn id="22" dur="1" fill="hold">
                                           <p:stCondLst>
                                             <p:cond delay="0"/>
                                           </p:stCondLst>
@@ -4834,7 +4928,154 @@
                                         <p:tgtEl>
                                           <p:spTgt spid="3">
                                             <p:txEl>
-                                              <p:pRg st="15" end="15"/>
+                                              <p:pRg st="5" end="5"/>
+                                            </p:txEl>
+                                          </p:spTgt>
+                                        </p:tgtEl>
+                                        <p:attrNameLst>
+                                          <p:attrName>style.visibility</p:attrName>
+                                        </p:attrNameLst>
+                                      </p:cBhvr>
+                                      <p:to>
+                                        <p:strVal val="visible"/>
+                                      </p:to>
+                                    </p:set>
+                                  </p:childTnLst>
+                                </p:cTn>
+                              </p:par>
+                            </p:childTnLst>
+                          </p:cTn>
+                        </p:par>
+                      </p:childTnLst>
+                    </p:cTn>
+                  </p:par>
+                  <p:par>
+                    <p:cTn id="23" fill="hold">
+                      <p:stCondLst>
+                        <p:cond delay="indefinite"/>
+                      </p:stCondLst>
+                      <p:childTnLst>
+                        <p:par>
+                          <p:cTn id="24" fill="hold">
+                            <p:stCondLst>
+                              <p:cond delay="0"/>
+                            </p:stCondLst>
+                            <p:childTnLst>
+                              <p:par>
+                                <p:cTn id="25" presetID="1" presetClass="entr" presetSubtype="0" fill="hold" grpId="0" nodeType="clickEffect">
+                                  <p:stCondLst>
+                                    <p:cond delay="0"/>
+                                  </p:stCondLst>
+                                  <p:childTnLst>
+                                    <p:set>
+                                      <p:cBhvr>
+                                        <p:cTn id="26" dur="1" fill="hold">
+                                          <p:stCondLst>
+                                            <p:cond delay="0"/>
+                                          </p:stCondLst>
+                                        </p:cTn>
+                                        <p:tgtEl>
+                                          <p:spTgt spid="3">
+                                            <p:txEl>
+                                              <p:pRg st="6" end="6"/>
+                                            </p:txEl>
+                                          </p:spTgt>
+                                        </p:tgtEl>
+                                        <p:attrNameLst>
+                                          <p:attrName>style.visibility</p:attrName>
+                                        </p:attrNameLst>
+                                      </p:cBhvr>
+                                      <p:to>
+                                        <p:strVal val="visible"/>
+                                      </p:to>
+                                    </p:set>
+                                  </p:childTnLst>
+                                </p:cTn>
+                              </p:par>
+                            </p:childTnLst>
+                          </p:cTn>
+                        </p:par>
+                      </p:childTnLst>
+                    </p:cTn>
+                  </p:par>
+                  <p:par>
+                    <p:cTn id="27" fill="hold">
+                      <p:stCondLst>
+                        <p:cond delay="indefinite"/>
+                      </p:stCondLst>
+                      <p:childTnLst>
+                        <p:par>
+                          <p:cTn id="28" fill="hold">
+                            <p:stCondLst>
+                              <p:cond delay="0"/>
+                            </p:stCondLst>
+                            <p:childTnLst>
+                              <p:par>
+                                <p:cTn id="29" presetID="1" presetClass="entr" presetSubtype="0" fill="hold" grpId="0" nodeType="clickEffect">
+                                  <p:stCondLst>
+                                    <p:cond delay="0"/>
+                                  </p:stCondLst>
+                                  <p:childTnLst>
+                                    <p:set>
+                                      <p:cBhvr>
+                                        <p:cTn id="30" dur="1" fill="hold">
+                                          <p:stCondLst>
+                                            <p:cond delay="0"/>
+                                          </p:stCondLst>
+                                        </p:cTn>
+                                        <p:tgtEl>
+                                          <p:spTgt spid="3">
+                                            <p:txEl>
+                                              <p:pRg st="7" end="7"/>
+                                            </p:txEl>
+                                          </p:spTgt>
+                                        </p:tgtEl>
+                                        <p:attrNameLst>
+                                          <p:attrName>style.visibility</p:attrName>
+                                        </p:attrNameLst>
+                                      </p:cBhvr>
+                                      <p:to>
+                                        <p:strVal val="visible"/>
+                                      </p:to>
+                                    </p:set>
+                                  </p:childTnLst>
+                                </p:cTn>
+                              </p:par>
+                            </p:childTnLst>
+                          </p:cTn>
+                        </p:par>
+                      </p:childTnLst>
+                    </p:cTn>
+                  </p:par>
+                  <p:par>
+                    <p:cTn id="31" fill="hold">
+                      <p:stCondLst>
+                        <p:cond delay="indefinite"/>
+                      </p:stCondLst>
+                      <p:childTnLst>
+                        <p:par>
+                          <p:cTn id="32" fill="hold">
+                            <p:stCondLst>
+                              <p:cond delay="0"/>
+                            </p:stCondLst>
+                            <p:childTnLst>
+                              <p:par>
+                                <p:cTn id="33" presetID="1" presetClass="entr" presetSubtype="0" fill="hold" grpId="0" nodeType="clickEffect">
+                                  <p:stCondLst>
+                                    <p:cond delay="0"/>
+                                  </p:stCondLst>
+                                  <p:childTnLst>
+                                    <p:set>
+                                      <p:cBhvr>
+                                        <p:cTn id="34" dur="1" fill="hold">
+                                          <p:stCondLst>
+                                            <p:cond delay="0"/>
+                                          </p:stCondLst>
+                                        </p:cTn>
+                                        <p:tgtEl>
+                                          <p:spTgt spid="3">
+                                            <p:txEl>
+                                              <p:pRg st="8" end="8"/>
                                             </p:txEl>
                                           </p:spTgt>
                                         </p:tgtEl>
@@ -4883,7 +5124,7 @@
 </p:sld>
 </file>
 
-<file path=ppt/slides/slide3.xml><?xml version="1.0" encoding="utf-8"?>
+<file path=ppt/slides/slide4.xml><?xml version="1.0" encoding="utf-8"?>
 <p:sld xmlns:a="http://schemas.openxmlformats.org/drawingml/2006/main" xmlns:r="http://schemas.openxmlformats.org/officeDocument/2006/relationships" xmlns:p="http://schemas.openxmlformats.org/presentationml/2006/main">
   <p:cSld>
     <p:spTree>
@@ -5203,7 +5444,7 @@
 </p:sld>
 </file>
 
-<file path=ppt/slides/slide4.xml><?xml version="1.0" encoding="utf-8"?>
+<file path=ppt/slides/slide5.xml><?xml version="1.0" encoding="utf-8"?>
 <p:sld xmlns:a="http://schemas.openxmlformats.org/drawingml/2006/main" xmlns:r="http://schemas.openxmlformats.org/officeDocument/2006/relationships" xmlns:p="http://schemas.openxmlformats.org/presentationml/2006/main">
   <p:cSld>
     <p:spTree>
@@ -5613,6 +5854,848 @@
                                           <p:spTgt spid="3">
                                             <p:txEl>
                                               <p:pRg st="7" end="7"/>
+                                            </p:txEl>
+                                          </p:spTgt>
+                                        </p:tgtEl>
+                                        <p:attrNameLst>
+                                          <p:attrName>style.visibility</p:attrName>
+                                        </p:attrNameLst>
+                                      </p:cBhvr>
+                                      <p:to>
+                                        <p:strVal val="visible"/>
+                                      </p:to>
+                                    </p:set>
+                                  </p:childTnLst>
+                                </p:cTn>
+                              </p:par>
+                            </p:childTnLst>
+                          </p:cTn>
+                        </p:par>
+                      </p:childTnLst>
+                    </p:cTn>
+                  </p:par>
+                </p:childTnLst>
+              </p:cTn>
+              <p:prevCondLst>
+                <p:cond evt="onPrev" delay="0">
+                  <p:tgtEl>
+                    <p:sldTgt/>
+                  </p:tgtEl>
+                </p:cond>
+              </p:prevCondLst>
+              <p:nextCondLst>
+                <p:cond evt="onNext" delay="0">
+                  <p:tgtEl>
+                    <p:sldTgt/>
+                  </p:tgtEl>
+                </p:cond>
+              </p:nextCondLst>
+            </p:seq>
+          </p:childTnLst>
+        </p:cTn>
+      </p:par>
+    </p:tnLst>
+    <p:bldLst>
+      <p:bldP spid="3" grpId="0" uiExpand="1" build="p"/>
+    </p:bldLst>
+  </p:timing>
+</p:sld>
+</file>
+
+<file path=ppt/slides/slide6.xml><?xml version="1.0" encoding="utf-8"?>
+<p:sld xmlns:a="http://schemas.openxmlformats.org/drawingml/2006/main" xmlns:r="http://schemas.openxmlformats.org/officeDocument/2006/relationships" xmlns:p="http://schemas.openxmlformats.org/presentationml/2006/main">
+  <p:cSld>
+    <p:spTree>
+      <p:nvGrpSpPr>
+        <p:cNvPr id="1" name=""/>
+        <p:cNvGrpSpPr/>
+        <p:nvPr/>
+      </p:nvGrpSpPr>
+      <p:grpSpPr>
+        <a:xfrm>
+          <a:off x="0" y="0"/>
+          <a:ext cx="0" cy="0"/>
+          <a:chOff x="0" y="0"/>
+          <a:chExt cx="0" cy="0"/>
+        </a:xfrm>
+      </p:grpSpPr>
+      <p:sp>
+        <p:nvSpPr>
+          <p:cNvPr id="2" name="Title 1"/>
+          <p:cNvSpPr>
+            <a:spLocks noGrp="1"/>
+          </p:cNvSpPr>
+          <p:nvPr>
+            <p:ph type="title"/>
+          </p:nvPr>
+        </p:nvSpPr>
+        <p:spPr/>
+        <p:txBody>
+          <a:bodyPr/>
+          <a:lstStyle/>
+          <a:p>
+            <a:pPr lvl="0" indent="0" marL="0">
+              <a:buNone/>
+            </a:pPr>
+            <a:r>
+              <a:rPr/>
+              <a:t>워크플로우 (Workflows)</a:t>
+            </a:r>
+          </a:p>
+        </p:txBody>
+      </p:sp>
+      <p:sp>
+        <p:nvSpPr>
+          <p:cNvPr id="3" name="Content Placeholder 2"/>
+          <p:cNvSpPr>
+            <a:spLocks noGrp="1"/>
+          </p:cNvSpPr>
+          <p:nvPr>
+            <p:ph idx="1"/>
+          </p:nvPr>
+        </p:nvSpPr>
+        <p:spPr/>
+        <p:txBody>
+          <a:bodyPr/>
+          <a:lstStyle/>
+          <a:p>
+            <a:pPr lvl="0" indent="0" marL="0">
+              <a:spcBef>
+                <a:spcPts val="3000"/>
+              </a:spcBef>
+              <a:buNone/>
+            </a:pPr>
+            <a:r>
+              <a:rPr b="1"/>
+              <a:t>작업흐름</a:t>
+            </a:r>
+          </a:p>
+          <a:p>
+            <a:pPr lvl="0"/>
+            <a:r>
+              <a:rPr/>
+              <a:t>버블의 로직 영역을 담당하는 논리 작업 도구</a:t>
+            </a:r>
+          </a:p>
+          <a:p>
+            <a:pPr lvl="0"/>
+            <a:r>
+              <a:rPr/>
+              <a:t>언어(영어)적인 사고 방식을 답습하고 있기 때문에, 개발자의 감각보다는 비개발자의 감각을 따르고 있음</a:t>
+            </a:r>
+          </a:p>
+          <a:p>
+            <a:pPr lvl="1"/>
+            <a:r>
+              <a:rPr/>
+              <a:t>따라서 코드를 염두에 두고 접근하면 오히려 당황할 수도</a:t>
+            </a:r>
+          </a:p>
+          <a:p>
+            <a:pPr lvl="0"/>
+            <a:r>
+              <a:rPr/>
+              <a:t>워크플로우는 두 개의 파트로 구성됨</a:t>
+            </a:r>
+          </a:p>
+          <a:p>
+            <a:pPr lvl="1"/>
+            <a:r>
+              <a:rPr/>
+              <a:t>이벤트(Events)</a:t>
+            </a:r>
+          </a:p>
+          <a:p>
+            <a:pPr lvl="2"/>
+            <a:r>
+              <a:rPr/>
+              <a:t>~할 때</a:t>
+            </a:r>
+          </a:p>
+          <a:p>
+            <a:pPr lvl="2"/>
+            <a:r>
+              <a:rPr/>
+              <a:t>소프트웨어 내에서 어떠한 의미를 갖는 변화</a:t>
+            </a:r>
+          </a:p>
+          <a:p>
+            <a:pPr lvl="3"/>
+            <a:r>
+              <a:rPr/>
+              <a:t>유저가 로그인을 할 때</a:t>
+            </a:r>
+          </a:p>
+          <a:p>
+            <a:pPr lvl="3"/>
+            <a:r>
+              <a:rPr/>
+              <a:t>어떤 버튼을 누를 때 등..</a:t>
+            </a:r>
+          </a:p>
+          <a:p>
+            <a:pPr lvl="1"/>
+            <a:r>
+              <a:rPr/>
+              <a:t>액션(Actions)</a:t>
+            </a:r>
+          </a:p>
+          <a:p>
+            <a:pPr lvl="2"/>
+            <a:r>
+              <a:rPr/>
+              <a:t>~를 해라</a:t>
+            </a:r>
+          </a:p>
+          <a:p>
+            <a:pPr lvl="2"/>
+            <a:r>
+              <a:rPr/>
+              <a:t>순차적으로 실행되기에 흐름(Flow)</a:t>
+            </a:r>
+          </a:p>
+          <a:p>
+            <a:pPr lvl="2"/>
+            <a:r>
+              <a:rPr>
+                <a:latin typeface="Courier"/>
+              </a:rPr>
+              <a:t>Only when</a:t>
+            </a:r>
+            <a:r>
+              <a:rPr/>
+              <a:t> 조건식을 통해 예외 흐름을 작성할 수 있음</a:t>
+            </a:r>
+          </a:p>
+        </p:txBody>
+      </p:sp>
+    </p:spTree>
+  </p:cSld>
+  <p:timing>
+    <p:tnLst>
+      <p:par>
+        <p:cTn id="1" dur="indefinite" restart="never" nodeType="tmRoot">
+          <p:childTnLst>
+            <p:seq concurrent="1" nextAc="seek">
+              <p:cTn id="2" dur="indefinite" nodeType="mainSeq">
+                <p:childTnLst>
+                  <p:par>
+                    <p:cTn id="3" fill="hold">
+                      <p:stCondLst>
+                        <p:cond delay="indefinite"/>
+                      </p:stCondLst>
+                      <p:childTnLst>
+                        <p:par>
+                          <p:cTn id="4" fill="hold">
+                            <p:stCondLst>
+                              <p:cond delay="0"/>
+                            </p:stCondLst>
+                            <p:childTnLst>
+                              <p:par>
+                                <p:cTn id="5" presetID="1" presetClass="entr" presetSubtype="0" fill="hold" grpId="0" nodeType="clickEffect">
+                                  <p:stCondLst>
+                                    <p:cond delay="0"/>
+                                  </p:stCondLst>
+                                  <p:childTnLst>
+                                    <p:set>
+                                      <p:cBhvr>
+                                        <p:cTn id="6" dur="1" fill="hold">
+                                          <p:stCondLst>
+                                            <p:cond delay="0"/>
+                                          </p:stCondLst>
+                                        </p:cTn>
+                                        <p:tgtEl>
+                                          <p:spTgt spid="3">
+                                            <p:txEl>
+                                              <p:pRg st="1" end="1"/>
+                                            </p:txEl>
+                                          </p:spTgt>
+                                        </p:tgtEl>
+                                        <p:attrNameLst>
+                                          <p:attrName>style.visibility</p:attrName>
+                                        </p:attrNameLst>
+                                      </p:cBhvr>
+                                      <p:to>
+                                        <p:strVal val="visible"/>
+                                      </p:to>
+                                    </p:set>
+                                  </p:childTnLst>
+                                </p:cTn>
+                              </p:par>
+                            </p:childTnLst>
+                          </p:cTn>
+                        </p:par>
+                      </p:childTnLst>
+                    </p:cTn>
+                  </p:par>
+                  <p:par>
+                    <p:cTn id="7" fill="hold">
+                      <p:stCondLst>
+                        <p:cond delay="indefinite"/>
+                      </p:stCondLst>
+                      <p:childTnLst>
+                        <p:par>
+                          <p:cTn id="8" fill="hold">
+                            <p:stCondLst>
+                              <p:cond delay="0"/>
+                            </p:stCondLst>
+                            <p:childTnLst>
+                              <p:par>
+                                <p:cTn id="9" presetID="1" presetClass="entr" presetSubtype="0" fill="hold" grpId="0" nodeType="clickEffect">
+                                  <p:stCondLst>
+                                    <p:cond delay="0"/>
+                                  </p:stCondLst>
+                                  <p:childTnLst>
+                                    <p:set>
+                                      <p:cBhvr>
+                                        <p:cTn id="10" dur="1" fill="hold">
+                                          <p:stCondLst>
+                                            <p:cond delay="0"/>
+                                          </p:stCondLst>
+                                        </p:cTn>
+                                        <p:tgtEl>
+                                          <p:spTgt spid="3">
+                                            <p:txEl>
+                                              <p:pRg st="2" end="2"/>
+                                            </p:txEl>
+                                          </p:spTgt>
+                                        </p:tgtEl>
+                                        <p:attrNameLst>
+                                          <p:attrName>style.visibility</p:attrName>
+                                        </p:attrNameLst>
+                                      </p:cBhvr>
+                                      <p:to>
+                                        <p:strVal val="visible"/>
+                                      </p:to>
+                                    </p:set>
+                                  </p:childTnLst>
+                                </p:cTn>
+                              </p:par>
+                            </p:childTnLst>
+                          </p:cTn>
+                        </p:par>
+                      </p:childTnLst>
+                    </p:cTn>
+                  </p:par>
+                  <p:par>
+                    <p:cTn id="11" fill="hold">
+                      <p:stCondLst>
+                        <p:cond delay="indefinite"/>
+                      </p:stCondLst>
+                      <p:childTnLst>
+                        <p:par>
+                          <p:cTn id="12" fill="hold">
+                            <p:stCondLst>
+                              <p:cond delay="0"/>
+                            </p:stCondLst>
+                            <p:childTnLst>
+                              <p:par>
+                                <p:cTn id="13" presetID="1" presetClass="entr" presetSubtype="0" fill="hold" grpId="0" nodeType="clickEffect">
+                                  <p:stCondLst>
+                                    <p:cond delay="0"/>
+                                  </p:stCondLst>
+                                  <p:childTnLst>
+                                    <p:set>
+                                      <p:cBhvr>
+                                        <p:cTn id="14" dur="1" fill="hold">
+                                          <p:stCondLst>
+                                            <p:cond delay="0"/>
+                                          </p:stCondLst>
+                                        </p:cTn>
+                                        <p:tgtEl>
+                                          <p:spTgt spid="3">
+                                            <p:txEl>
+                                              <p:pRg st="3" end="3"/>
+                                            </p:txEl>
+                                          </p:spTgt>
+                                        </p:tgtEl>
+                                        <p:attrNameLst>
+                                          <p:attrName>style.visibility</p:attrName>
+                                        </p:attrNameLst>
+                                      </p:cBhvr>
+                                      <p:to>
+                                        <p:strVal val="visible"/>
+                                      </p:to>
+                                    </p:set>
+                                  </p:childTnLst>
+                                </p:cTn>
+                              </p:par>
+                            </p:childTnLst>
+                          </p:cTn>
+                        </p:par>
+                      </p:childTnLst>
+                    </p:cTn>
+                  </p:par>
+                  <p:par>
+                    <p:cTn id="15" fill="hold">
+                      <p:stCondLst>
+                        <p:cond delay="indefinite"/>
+                      </p:stCondLst>
+                      <p:childTnLst>
+                        <p:par>
+                          <p:cTn id="16" fill="hold">
+                            <p:stCondLst>
+                              <p:cond delay="0"/>
+                            </p:stCondLst>
+                            <p:childTnLst>
+                              <p:par>
+                                <p:cTn id="17" presetID="1" presetClass="entr" presetSubtype="0" fill="hold" grpId="0" nodeType="clickEffect">
+                                  <p:stCondLst>
+                                    <p:cond delay="0"/>
+                                  </p:stCondLst>
+                                  <p:childTnLst>
+                                    <p:set>
+                                      <p:cBhvr>
+                                        <p:cTn id="18" dur="1" fill="hold">
+                                          <p:stCondLst>
+                                            <p:cond delay="0"/>
+                                          </p:stCondLst>
+                                        </p:cTn>
+                                        <p:tgtEl>
+                                          <p:spTgt spid="3">
+                                            <p:txEl>
+                                              <p:pRg st="4" end="4"/>
+                                            </p:txEl>
+                                          </p:spTgt>
+                                        </p:tgtEl>
+                                        <p:attrNameLst>
+                                          <p:attrName>style.visibility</p:attrName>
+                                        </p:attrNameLst>
+                                      </p:cBhvr>
+                                      <p:to>
+                                        <p:strVal val="visible"/>
+                                      </p:to>
+                                    </p:set>
+                                  </p:childTnLst>
+                                </p:cTn>
+                              </p:par>
+                            </p:childTnLst>
+                          </p:cTn>
+                        </p:par>
+                      </p:childTnLst>
+                    </p:cTn>
+                  </p:par>
+                  <p:par>
+                    <p:cTn id="19" fill="hold">
+                      <p:stCondLst>
+                        <p:cond delay="indefinite"/>
+                      </p:stCondLst>
+                      <p:childTnLst>
+                        <p:par>
+                          <p:cTn id="20" fill="hold">
+                            <p:stCondLst>
+                              <p:cond delay="0"/>
+                            </p:stCondLst>
+                            <p:childTnLst>
+                              <p:par>
+                                <p:cTn id="21" presetID="1" presetClass="entr" presetSubtype="0" fill="hold" grpId="0" nodeType="clickEffect">
+                                  <p:stCondLst>
+                                    <p:cond delay="0"/>
+                                  </p:stCondLst>
+                                  <p:childTnLst>
+                                    <p:set>
+                                      <p:cBhvr>
+                                        <p:cTn id="22" dur="1" fill="hold">
+                                          <p:stCondLst>
+                                            <p:cond delay="0"/>
+                                          </p:stCondLst>
+                                        </p:cTn>
+                                        <p:tgtEl>
+                                          <p:spTgt spid="3">
+                                            <p:txEl>
+                                              <p:pRg st="5" end="5"/>
+                                            </p:txEl>
+                                          </p:spTgt>
+                                        </p:tgtEl>
+                                        <p:attrNameLst>
+                                          <p:attrName>style.visibility</p:attrName>
+                                        </p:attrNameLst>
+                                      </p:cBhvr>
+                                      <p:to>
+                                        <p:strVal val="visible"/>
+                                      </p:to>
+                                    </p:set>
+                                  </p:childTnLst>
+                                </p:cTn>
+                              </p:par>
+                            </p:childTnLst>
+                          </p:cTn>
+                        </p:par>
+                      </p:childTnLst>
+                    </p:cTn>
+                  </p:par>
+                  <p:par>
+                    <p:cTn id="23" fill="hold">
+                      <p:stCondLst>
+                        <p:cond delay="indefinite"/>
+                      </p:stCondLst>
+                      <p:childTnLst>
+                        <p:par>
+                          <p:cTn id="24" fill="hold">
+                            <p:stCondLst>
+                              <p:cond delay="0"/>
+                            </p:stCondLst>
+                            <p:childTnLst>
+                              <p:par>
+                                <p:cTn id="25" presetID="1" presetClass="entr" presetSubtype="0" fill="hold" grpId="0" nodeType="clickEffect">
+                                  <p:stCondLst>
+                                    <p:cond delay="0"/>
+                                  </p:stCondLst>
+                                  <p:childTnLst>
+                                    <p:set>
+                                      <p:cBhvr>
+                                        <p:cTn id="26" dur="1" fill="hold">
+                                          <p:stCondLst>
+                                            <p:cond delay="0"/>
+                                          </p:stCondLst>
+                                        </p:cTn>
+                                        <p:tgtEl>
+                                          <p:spTgt spid="3">
+                                            <p:txEl>
+                                              <p:pRg st="6" end="6"/>
+                                            </p:txEl>
+                                          </p:spTgt>
+                                        </p:tgtEl>
+                                        <p:attrNameLst>
+                                          <p:attrName>style.visibility</p:attrName>
+                                        </p:attrNameLst>
+                                      </p:cBhvr>
+                                      <p:to>
+                                        <p:strVal val="visible"/>
+                                      </p:to>
+                                    </p:set>
+                                  </p:childTnLst>
+                                </p:cTn>
+                              </p:par>
+                            </p:childTnLst>
+                          </p:cTn>
+                        </p:par>
+                      </p:childTnLst>
+                    </p:cTn>
+                  </p:par>
+                  <p:par>
+                    <p:cTn id="27" fill="hold">
+                      <p:stCondLst>
+                        <p:cond delay="indefinite"/>
+                      </p:stCondLst>
+                      <p:childTnLst>
+                        <p:par>
+                          <p:cTn id="28" fill="hold">
+                            <p:stCondLst>
+                              <p:cond delay="0"/>
+                            </p:stCondLst>
+                            <p:childTnLst>
+                              <p:par>
+                                <p:cTn id="29" presetID="1" presetClass="entr" presetSubtype="0" fill="hold" grpId="0" nodeType="clickEffect">
+                                  <p:stCondLst>
+                                    <p:cond delay="0"/>
+                                  </p:stCondLst>
+                                  <p:childTnLst>
+                                    <p:set>
+                                      <p:cBhvr>
+                                        <p:cTn id="30" dur="1" fill="hold">
+                                          <p:stCondLst>
+                                            <p:cond delay="0"/>
+                                          </p:stCondLst>
+                                        </p:cTn>
+                                        <p:tgtEl>
+                                          <p:spTgt spid="3">
+                                            <p:txEl>
+                                              <p:pRg st="7" end="7"/>
+                                            </p:txEl>
+                                          </p:spTgt>
+                                        </p:tgtEl>
+                                        <p:attrNameLst>
+                                          <p:attrName>style.visibility</p:attrName>
+                                        </p:attrNameLst>
+                                      </p:cBhvr>
+                                      <p:to>
+                                        <p:strVal val="visible"/>
+                                      </p:to>
+                                    </p:set>
+                                  </p:childTnLst>
+                                </p:cTn>
+                              </p:par>
+                            </p:childTnLst>
+                          </p:cTn>
+                        </p:par>
+                      </p:childTnLst>
+                    </p:cTn>
+                  </p:par>
+                  <p:par>
+                    <p:cTn id="31" fill="hold">
+                      <p:stCondLst>
+                        <p:cond delay="indefinite"/>
+                      </p:stCondLst>
+                      <p:childTnLst>
+                        <p:par>
+                          <p:cTn id="32" fill="hold">
+                            <p:stCondLst>
+                              <p:cond delay="0"/>
+                            </p:stCondLst>
+                            <p:childTnLst>
+                              <p:par>
+                                <p:cTn id="33" presetID="1" presetClass="entr" presetSubtype="0" fill="hold" grpId="0" nodeType="clickEffect">
+                                  <p:stCondLst>
+                                    <p:cond delay="0"/>
+                                  </p:stCondLst>
+                                  <p:childTnLst>
+                                    <p:set>
+                                      <p:cBhvr>
+                                        <p:cTn id="34" dur="1" fill="hold">
+                                          <p:stCondLst>
+                                            <p:cond delay="0"/>
+                                          </p:stCondLst>
+                                        </p:cTn>
+                                        <p:tgtEl>
+                                          <p:spTgt spid="3">
+                                            <p:txEl>
+                                              <p:pRg st="8" end="8"/>
+                                            </p:txEl>
+                                          </p:spTgt>
+                                        </p:tgtEl>
+                                        <p:attrNameLst>
+                                          <p:attrName>style.visibility</p:attrName>
+                                        </p:attrNameLst>
+                                      </p:cBhvr>
+                                      <p:to>
+                                        <p:strVal val="visible"/>
+                                      </p:to>
+                                    </p:set>
+                                  </p:childTnLst>
+                                </p:cTn>
+                              </p:par>
+                            </p:childTnLst>
+                          </p:cTn>
+                        </p:par>
+                      </p:childTnLst>
+                    </p:cTn>
+                  </p:par>
+                  <p:par>
+                    <p:cTn id="35" fill="hold">
+                      <p:stCondLst>
+                        <p:cond delay="indefinite"/>
+                      </p:stCondLst>
+                      <p:childTnLst>
+                        <p:par>
+                          <p:cTn id="36" fill="hold">
+                            <p:stCondLst>
+                              <p:cond delay="0"/>
+                            </p:stCondLst>
+                            <p:childTnLst>
+                              <p:par>
+                                <p:cTn id="37" presetID="1" presetClass="entr" presetSubtype="0" fill="hold" grpId="0" nodeType="clickEffect">
+                                  <p:stCondLst>
+                                    <p:cond delay="0"/>
+                                  </p:stCondLst>
+                                  <p:childTnLst>
+                                    <p:set>
+                                      <p:cBhvr>
+                                        <p:cTn id="38" dur="1" fill="hold">
+                                          <p:stCondLst>
+                                            <p:cond delay="0"/>
+                                          </p:stCondLst>
+                                        </p:cTn>
+                                        <p:tgtEl>
+                                          <p:spTgt spid="3">
+                                            <p:txEl>
+                                              <p:pRg st="9" end="9"/>
+                                            </p:txEl>
+                                          </p:spTgt>
+                                        </p:tgtEl>
+                                        <p:attrNameLst>
+                                          <p:attrName>style.visibility</p:attrName>
+                                        </p:attrNameLst>
+                                      </p:cBhvr>
+                                      <p:to>
+                                        <p:strVal val="visible"/>
+                                      </p:to>
+                                    </p:set>
+                                  </p:childTnLst>
+                                </p:cTn>
+                              </p:par>
+                            </p:childTnLst>
+                          </p:cTn>
+                        </p:par>
+                      </p:childTnLst>
+                    </p:cTn>
+                  </p:par>
+                  <p:par>
+                    <p:cTn id="39" fill="hold">
+                      <p:stCondLst>
+                        <p:cond delay="indefinite"/>
+                      </p:stCondLst>
+                      <p:childTnLst>
+                        <p:par>
+                          <p:cTn id="40" fill="hold">
+                            <p:stCondLst>
+                              <p:cond delay="0"/>
+                            </p:stCondLst>
+                            <p:childTnLst>
+                              <p:par>
+                                <p:cTn id="41" presetID="1" presetClass="entr" presetSubtype="0" fill="hold" grpId="0" nodeType="clickEffect">
+                                  <p:stCondLst>
+                                    <p:cond delay="0"/>
+                                  </p:stCondLst>
+                                  <p:childTnLst>
+                                    <p:set>
+                                      <p:cBhvr>
+                                        <p:cTn id="42" dur="1" fill="hold">
+                                          <p:stCondLst>
+                                            <p:cond delay="0"/>
+                                          </p:stCondLst>
+                                        </p:cTn>
+                                        <p:tgtEl>
+                                          <p:spTgt spid="3">
+                                            <p:txEl>
+                                              <p:pRg st="10" end="10"/>
+                                            </p:txEl>
+                                          </p:spTgt>
+                                        </p:tgtEl>
+                                        <p:attrNameLst>
+                                          <p:attrName>style.visibility</p:attrName>
+                                        </p:attrNameLst>
+                                      </p:cBhvr>
+                                      <p:to>
+                                        <p:strVal val="visible"/>
+                                      </p:to>
+                                    </p:set>
+                                  </p:childTnLst>
+                                </p:cTn>
+                              </p:par>
+                            </p:childTnLst>
+                          </p:cTn>
+                        </p:par>
+                      </p:childTnLst>
+                    </p:cTn>
+                  </p:par>
+                  <p:par>
+                    <p:cTn id="43" fill="hold">
+                      <p:stCondLst>
+                        <p:cond delay="indefinite"/>
+                      </p:stCondLst>
+                      <p:childTnLst>
+                        <p:par>
+                          <p:cTn id="44" fill="hold">
+                            <p:stCondLst>
+                              <p:cond delay="0"/>
+                            </p:stCondLst>
+                            <p:childTnLst>
+                              <p:par>
+                                <p:cTn id="45" presetID="1" presetClass="entr" presetSubtype="0" fill="hold" grpId="0" nodeType="clickEffect">
+                                  <p:stCondLst>
+                                    <p:cond delay="0"/>
+                                  </p:stCondLst>
+                                  <p:childTnLst>
+                                    <p:set>
+                                      <p:cBhvr>
+                                        <p:cTn id="46" dur="1" fill="hold">
+                                          <p:stCondLst>
+                                            <p:cond delay="0"/>
+                                          </p:stCondLst>
+                                        </p:cTn>
+                                        <p:tgtEl>
+                                          <p:spTgt spid="3">
+                                            <p:txEl>
+                                              <p:pRg st="11" end="11"/>
+                                            </p:txEl>
+                                          </p:spTgt>
+                                        </p:tgtEl>
+                                        <p:attrNameLst>
+                                          <p:attrName>style.visibility</p:attrName>
+                                        </p:attrNameLst>
+                                      </p:cBhvr>
+                                      <p:to>
+                                        <p:strVal val="visible"/>
+                                      </p:to>
+                                    </p:set>
+                                  </p:childTnLst>
+                                </p:cTn>
+                              </p:par>
+                            </p:childTnLst>
+                          </p:cTn>
+                        </p:par>
+                      </p:childTnLst>
+                    </p:cTn>
+                  </p:par>
+                  <p:par>
+                    <p:cTn id="47" fill="hold">
+                      <p:stCondLst>
+                        <p:cond delay="indefinite"/>
+                      </p:stCondLst>
+                      <p:childTnLst>
+                        <p:par>
+                          <p:cTn id="48" fill="hold">
+                            <p:stCondLst>
+                              <p:cond delay="0"/>
+                            </p:stCondLst>
+                            <p:childTnLst>
+                              <p:par>
+                                <p:cTn id="49" presetID="1" presetClass="entr" presetSubtype="0" fill="hold" grpId="0" nodeType="clickEffect">
+                                  <p:stCondLst>
+                                    <p:cond delay="0"/>
+                                  </p:stCondLst>
+                                  <p:childTnLst>
+                                    <p:set>
+                                      <p:cBhvr>
+                                        <p:cTn id="50" dur="1" fill="hold">
+                                          <p:stCondLst>
+                                            <p:cond delay="0"/>
+                                          </p:stCondLst>
+                                        </p:cTn>
+                                        <p:tgtEl>
+                                          <p:spTgt spid="3">
+                                            <p:txEl>
+                                              <p:pRg st="12" end="12"/>
+                                            </p:txEl>
+                                          </p:spTgt>
+                                        </p:tgtEl>
+                                        <p:attrNameLst>
+                                          <p:attrName>style.visibility</p:attrName>
+                                        </p:attrNameLst>
+                                      </p:cBhvr>
+                                      <p:to>
+                                        <p:strVal val="visible"/>
+                                      </p:to>
+                                    </p:set>
+                                  </p:childTnLst>
+                                </p:cTn>
+                              </p:par>
+                            </p:childTnLst>
+                          </p:cTn>
+                        </p:par>
+                      </p:childTnLst>
+                    </p:cTn>
+                  </p:par>
+                  <p:par>
+                    <p:cTn id="51" fill="hold">
+                      <p:stCondLst>
+                        <p:cond delay="indefinite"/>
+                      </p:stCondLst>
+                      <p:childTnLst>
+                        <p:par>
+                          <p:cTn id="52" fill="hold">
+                            <p:stCondLst>
+                              <p:cond delay="0"/>
+                            </p:stCondLst>
+                            <p:childTnLst>
+                              <p:par>
+                                <p:cTn id="53" presetID="1" presetClass="entr" presetSubtype="0" fill="hold" grpId="0" nodeType="clickEffect">
+                                  <p:stCondLst>
+                                    <p:cond delay="0"/>
+                                  </p:stCondLst>
+                                  <p:childTnLst>
+                                    <p:set>
+                                      <p:cBhvr>
+                                        <p:cTn id="54" dur="1" fill="hold">
+                                          <p:stCondLst>
+                                            <p:cond delay="0"/>
+                                          </p:stCondLst>
+                                        </p:cTn>
+                                        <p:tgtEl>
+                                          <p:spTgt spid="3">
+                                            <p:txEl>
+                                              <p:pRg st="13" end="13"/>
                                             </p:txEl>
                                           </p:spTgt>
                                         </p:tgtEl>

</xml_diff>

<commit_message>
백업 완료: 2023-11-26 06:01:28
Affected files:
노코드 엔지니어링/노코드 최강자 버블.pptx
</commit_message>
<xml_diff>
--- a/노코드 엔지니어링/노코드 최강자 버블.pptx
+++ b/노코드 엔지니어링/노코드 최강자 버블.pptx
@@ -11,6 +11,12 @@
     <p:sldId id="259" r:id="rId5"/>
     <p:sldId id="260" r:id="rId6"/>
     <p:sldId id="261" r:id="rId7"/>
+    <p:sldId id="262" r:id="rId8"/>
+    <p:sldId id="263" r:id="rId9"/>
+    <p:sldId id="264" r:id="rId10"/>
+    <p:sldId id="265" r:id="rId11"/>
+    <p:sldId id="266" r:id="rId12"/>
+    <p:sldId id="267" r:id="rId13"/>
   </p:sldIdLst>
   <p:sldSz cx="12192000" cy="6858000"/>
   <p:notesSz cx="6858000" cy="9144000"/>
@@ -4010,6 +4016,1252 @@
       </p:sp>
     </p:spTree>
   </p:cSld>
+</p:sld>
+</file>
+
+<file path=ppt/slides/slide10.xml><?xml version="1.0" encoding="utf-8"?>
+<p:sld xmlns:a="http://schemas.openxmlformats.org/drawingml/2006/main" xmlns:r="http://schemas.openxmlformats.org/officeDocument/2006/relationships" xmlns:p="http://schemas.openxmlformats.org/presentationml/2006/main">
+  <p:cSld>
+    <p:spTree>
+      <p:nvGrpSpPr>
+        <p:cNvPr id="1" name=""/>
+        <p:cNvGrpSpPr/>
+        <p:nvPr/>
+      </p:nvGrpSpPr>
+      <p:grpSpPr>
+        <a:xfrm>
+          <a:off x="0" y="0"/>
+          <a:ext cx="0" cy="0"/>
+          <a:chOff x="0" y="0"/>
+          <a:chExt cx="0" cy="0"/>
+        </a:xfrm>
+      </p:grpSpPr>
+      <p:sp>
+        <p:nvSpPr>
+          <p:cNvPr id="2" name="Title 1"/>
+          <p:cNvSpPr>
+            <a:spLocks noGrp="1"/>
+          </p:cNvSpPr>
+          <p:nvPr>
+            <p:ph type="title"/>
+          </p:nvPr>
+        </p:nvSpPr>
+        <p:spPr/>
+        <p:txBody>
+          <a:bodyPr/>
+          <a:lstStyle/>
+          <a:p>
+            <a:pPr lvl="0" indent="0" marL="0">
+              <a:buNone/>
+            </a:pPr>
+            <a:r>
+              <a:rPr/>
+              <a:t>정적 데이터와 동적 데이터</a:t>
+            </a:r>
+          </a:p>
+        </p:txBody>
+      </p:sp>
+      <p:sp>
+        <p:nvSpPr>
+          <p:cNvPr id="3" name="Content Placeholder 2"/>
+          <p:cNvSpPr>
+            <a:spLocks noGrp="1"/>
+          </p:cNvSpPr>
+          <p:nvPr>
+            <p:ph idx="1"/>
+          </p:nvPr>
+        </p:nvSpPr>
+        <p:spPr/>
+        <p:txBody>
+          <a:bodyPr/>
+          <a:lstStyle/>
+          <a:p>
+            <a:pPr lvl="0"/>
+            <a:r>
+              <a:rPr/>
+              <a:t>정적(Static)이라 함은, 소프트웨어가 실행되고서 종료될 때까지 바뀌지 않는 값(Values)을 말함.</a:t>
+            </a:r>
+          </a:p>
+          <a:p>
+            <a:pPr lvl="1"/>
+            <a:r>
+              <a:rPr/>
+              <a:t>그의 반대인 동적(Dynamic)이라는 말은 소프트웨어의 실행 중에 유저의 입력, 매개변수 또는 참조 데이터의 변화로 인해 변경된다는 의미를 지님.</a:t>
+            </a:r>
+          </a:p>
+          <a:p>
+            <a:pPr lvl="1"/>
+            <a:r>
+              <a:rPr/>
+              <a:t>쉽게 말해 상황에 따라 바뀌는 것은 동적, 그렇지 않은 것은 정적이라고 보면 된다.</a:t>
+            </a:r>
+          </a:p>
+        </p:txBody>
+      </p:sp>
+    </p:spTree>
+  </p:cSld>
+  <p:timing>
+    <p:tnLst>
+      <p:par>
+        <p:cTn id="1" dur="indefinite" restart="never" nodeType="tmRoot">
+          <p:childTnLst>
+            <p:seq concurrent="1" nextAc="seek">
+              <p:cTn id="2" dur="indefinite" nodeType="mainSeq">
+                <p:childTnLst>
+                  <p:par>
+                    <p:cTn id="3" fill="hold">
+                      <p:stCondLst>
+                        <p:cond delay="indefinite"/>
+                      </p:stCondLst>
+                      <p:childTnLst>
+                        <p:par>
+                          <p:cTn id="4" fill="hold">
+                            <p:stCondLst>
+                              <p:cond delay="0"/>
+                            </p:stCondLst>
+                            <p:childTnLst>
+                              <p:par>
+                                <p:cTn id="5" presetID="1" presetClass="entr" presetSubtype="0" fill="hold" grpId="0" nodeType="clickEffect">
+                                  <p:stCondLst>
+                                    <p:cond delay="0"/>
+                                  </p:stCondLst>
+                                  <p:childTnLst>
+                                    <p:set>
+                                      <p:cBhvr>
+                                        <p:cTn id="6" dur="1" fill="hold">
+                                          <p:stCondLst>
+                                            <p:cond delay="0"/>
+                                          </p:stCondLst>
+                                        </p:cTn>
+                                        <p:tgtEl>
+                                          <p:spTgt spid="3">
+                                            <p:txEl>
+                                              <p:pRg st="0" end="0"/>
+                                            </p:txEl>
+                                          </p:spTgt>
+                                        </p:tgtEl>
+                                        <p:attrNameLst>
+                                          <p:attrName>style.visibility</p:attrName>
+                                        </p:attrNameLst>
+                                      </p:cBhvr>
+                                      <p:to>
+                                        <p:strVal val="visible"/>
+                                      </p:to>
+                                    </p:set>
+                                  </p:childTnLst>
+                                </p:cTn>
+                              </p:par>
+                            </p:childTnLst>
+                          </p:cTn>
+                        </p:par>
+                      </p:childTnLst>
+                    </p:cTn>
+                  </p:par>
+                  <p:par>
+                    <p:cTn id="7" fill="hold">
+                      <p:stCondLst>
+                        <p:cond delay="indefinite"/>
+                      </p:stCondLst>
+                      <p:childTnLst>
+                        <p:par>
+                          <p:cTn id="8" fill="hold">
+                            <p:stCondLst>
+                              <p:cond delay="0"/>
+                            </p:stCondLst>
+                            <p:childTnLst>
+                              <p:par>
+                                <p:cTn id="9" presetID="1" presetClass="entr" presetSubtype="0" fill="hold" grpId="0" nodeType="clickEffect">
+                                  <p:stCondLst>
+                                    <p:cond delay="0"/>
+                                  </p:stCondLst>
+                                  <p:childTnLst>
+                                    <p:set>
+                                      <p:cBhvr>
+                                        <p:cTn id="10" dur="1" fill="hold">
+                                          <p:stCondLst>
+                                            <p:cond delay="0"/>
+                                          </p:stCondLst>
+                                        </p:cTn>
+                                        <p:tgtEl>
+                                          <p:spTgt spid="3">
+                                            <p:txEl>
+                                              <p:pRg st="1" end="1"/>
+                                            </p:txEl>
+                                          </p:spTgt>
+                                        </p:tgtEl>
+                                        <p:attrNameLst>
+                                          <p:attrName>style.visibility</p:attrName>
+                                        </p:attrNameLst>
+                                      </p:cBhvr>
+                                      <p:to>
+                                        <p:strVal val="visible"/>
+                                      </p:to>
+                                    </p:set>
+                                  </p:childTnLst>
+                                </p:cTn>
+                              </p:par>
+                            </p:childTnLst>
+                          </p:cTn>
+                        </p:par>
+                      </p:childTnLst>
+                    </p:cTn>
+                  </p:par>
+                  <p:par>
+                    <p:cTn id="11" fill="hold">
+                      <p:stCondLst>
+                        <p:cond delay="indefinite"/>
+                      </p:stCondLst>
+                      <p:childTnLst>
+                        <p:par>
+                          <p:cTn id="12" fill="hold">
+                            <p:stCondLst>
+                              <p:cond delay="0"/>
+                            </p:stCondLst>
+                            <p:childTnLst>
+                              <p:par>
+                                <p:cTn id="13" presetID="1" presetClass="entr" presetSubtype="0" fill="hold" grpId="0" nodeType="clickEffect">
+                                  <p:stCondLst>
+                                    <p:cond delay="0"/>
+                                  </p:stCondLst>
+                                  <p:childTnLst>
+                                    <p:set>
+                                      <p:cBhvr>
+                                        <p:cTn id="14" dur="1" fill="hold">
+                                          <p:stCondLst>
+                                            <p:cond delay="0"/>
+                                          </p:stCondLst>
+                                        </p:cTn>
+                                        <p:tgtEl>
+                                          <p:spTgt spid="3">
+                                            <p:txEl>
+                                              <p:pRg st="2" end="2"/>
+                                            </p:txEl>
+                                          </p:spTgt>
+                                        </p:tgtEl>
+                                        <p:attrNameLst>
+                                          <p:attrName>style.visibility</p:attrName>
+                                        </p:attrNameLst>
+                                      </p:cBhvr>
+                                      <p:to>
+                                        <p:strVal val="visible"/>
+                                      </p:to>
+                                    </p:set>
+                                  </p:childTnLst>
+                                </p:cTn>
+                              </p:par>
+                            </p:childTnLst>
+                          </p:cTn>
+                        </p:par>
+                      </p:childTnLst>
+                    </p:cTn>
+                  </p:par>
+                </p:childTnLst>
+              </p:cTn>
+              <p:prevCondLst>
+                <p:cond evt="onPrev" delay="0">
+                  <p:tgtEl>
+                    <p:sldTgt/>
+                  </p:tgtEl>
+                </p:cond>
+              </p:prevCondLst>
+              <p:nextCondLst>
+                <p:cond evt="onNext" delay="0">
+                  <p:tgtEl>
+                    <p:sldTgt/>
+                  </p:tgtEl>
+                </p:cond>
+              </p:nextCondLst>
+            </p:seq>
+          </p:childTnLst>
+        </p:cTn>
+      </p:par>
+    </p:tnLst>
+    <p:bldLst>
+      <p:bldP spid="3" grpId="0" uiExpand="1" build="p"/>
+    </p:bldLst>
+  </p:timing>
+</p:sld>
+</file>
+
+<file path=ppt/slides/slide11.xml><?xml version="1.0" encoding="utf-8"?>
+<p:sld xmlns:a="http://schemas.openxmlformats.org/drawingml/2006/main" xmlns:r="http://schemas.openxmlformats.org/officeDocument/2006/relationships" xmlns:p="http://schemas.openxmlformats.org/presentationml/2006/main">
+  <p:cSld>
+    <p:spTree>
+      <p:nvGrpSpPr>
+        <p:cNvPr id="1" name=""/>
+        <p:cNvGrpSpPr/>
+        <p:nvPr/>
+      </p:nvGrpSpPr>
+      <p:grpSpPr>
+        <a:xfrm>
+          <a:off x="0" y="0"/>
+          <a:ext cx="0" cy="0"/>
+          <a:chOff x="0" y="0"/>
+          <a:chExt cx="0" cy="0"/>
+        </a:xfrm>
+      </p:grpSpPr>
+      <p:sp>
+        <p:nvSpPr>
+          <p:cNvPr id="2" name="Title 1"/>
+          <p:cNvSpPr>
+            <a:spLocks noGrp="1"/>
+          </p:cNvSpPr>
+          <p:nvPr>
+            <p:ph type="title"/>
+          </p:nvPr>
+        </p:nvSpPr>
+        <p:spPr/>
+        <p:txBody>
+          <a:bodyPr/>
+          <a:lstStyle/>
+          <a:p>
+            <a:pPr lvl="0" indent="0" marL="0">
+              <a:buNone/>
+            </a:pPr>
+            <a:r>
+              <a:rPr/>
+              <a:t>버블 표현식 (Bubble Expression)</a:t>
+            </a:r>
+          </a:p>
+        </p:txBody>
+      </p:sp>
+      <p:sp>
+        <p:nvSpPr>
+          <p:cNvPr id="3" name="Content Placeholder 2"/>
+          <p:cNvSpPr>
+            <a:spLocks noGrp="1"/>
+          </p:cNvSpPr>
+          <p:nvPr>
+            <p:ph idx="1"/>
+          </p:nvPr>
+        </p:nvSpPr>
+        <p:spPr/>
+        <p:txBody>
+          <a:bodyPr/>
+          <a:lstStyle/>
+          <a:p>
+            <a:pPr lvl="0"/>
+            <a:r>
+              <a:rPr/>
+              <a:t>엑셀, 구글 시트, 노션 등에서 사용하는 수식(Formula)에 해당하는 버블의 독자 문법</a:t>
+            </a:r>
+          </a:p>
+          <a:p>
+            <a:pPr lvl="0"/>
+            <a:r>
+              <a:rPr/>
+              <a:t>최종적으로 하나의 타입을 가진 값으로 </a:t>
+            </a:r>
+            <a:r>
+              <a:rPr b="1"/>
+              <a:t>평가된다.</a:t>
+            </a:r>
+          </a:p>
+          <a:p>
+            <a:pPr lvl="0" indent="0" marL="0">
+              <a:spcBef>
+                <a:spcPts val="3000"/>
+              </a:spcBef>
+              <a:buNone/>
+            </a:pPr>
+            <a:r>
+              <a:rPr b="1"/>
+              <a:t>평가되다(Evaluate)</a:t>
+            </a:r>
+          </a:p>
+          <a:p>
+            <a:pPr lvl="0"/>
+            <a:r>
+              <a:rPr/>
+              <a:t>수식 또는 표현식을 풀이하여 최종적으로 하나의 값으로 도출하는 것.</a:t>
+            </a:r>
+          </a:p>
+          <a:p>
+            <a:pPr lvl="0"/>
+            <a:r>
+              <a:rPr/>
+              <a:t>주로 UI 또는 워크플로우에서 동적인 값을 입력하기 위해 사용</a:t>
+            </a:r>
+          </a:p>
+          <a:p>
+            <a:pPr lvl="0"/>
+            <a:r>
+              <a:rPr/>
+              <a:t>조건식은 </a:t>
+            </a:r>
+            <a:r>
+              <a:rPr>
+                <a:latin typeface="Courier"/>
+              </a:rPr>
+              <a:t>Yes/No</a:t>
+            </a:r>
+            <a:r>
+              <a:rPr/>
+              <a:t> 타입의 값으로 평가됨.</a:t>
+            </a:r>
+          </a:p>
+        </p:txBody>
+      </p:sp>
+    </p:spTree>
+  </p:cSld>
+  <p:timing>
+    <p:tnLst>
+      <p:par>
+        <p:cTn id="1" dur="indefinite" restart="never" nodeType="tmRoot">
+          <p:childTnLst>
+            <p:seq concurrent="1" nextAc="seek">
+              <p:cTn id="2" dur="indefinite" nodeType="mainSeq">
+                <p:childTnLst>
+                  <p:par>
+                    <p:cTn id="3" fill="hold">
+                      <p:stCondLst>
+                        <p:cond delay="indefinite"/>
+                      </p:stCondLst>
+                      <p:childTnLst>
+                        <p:par>
+                          <p:cTn id="4" fill="hold">
+                            <p:stCondLst>
+                              <p:cond delay="0"/>
+                            </p:stCondLst>
+                            <p:childTnLst>
+                              <p:par>
+                                <p:cTn id="5" presetID="1" presetClass="entr" presetSubtype="0" fill="hold" grpId="0" nodeType="clickEffect">
+                                  <p:stCondLst>
+                                    <p:cond delay="0"/>
+                                  </p:stCondLst>
+                                  <p:childTnLst>
+                                    <p:set>
+                                      <p:cBhvr>
+                                        <p:cTn id="6" dur="1" fill="hold">
+                                          <p:stCondLst>
+                                            <p:cond delay="0"/>
+                                          </p:stCondLst>
+                                        </p:cTn>
+                                        <p:tgtEl>
+                                          <p:spTgt spid="3">
+                                            <p:txEl>
+                                              <p:pRg st="0" end="0"/>
+                                            </p:txEl>
+                                          </p:spTgt>
+                                        </p:tgtEl>
+                                        <p:attrNameLst>
+                                          <p:attrName>style.visibility</p:attrName>
+                                        </p:attrNameLst>
+                                      </p:cBhvr>
+                                      <p:to>
+                                        <p:strVal val="visible"/>
+                                      </p:to>
+                                    </p:set>
+                                  </p:childTnLst>
+                                </p:cTn>
+                              </p:par>
+                            </p:childTnLst>
+                          </p:cTn>
+                        </p:par>
+                      </p:childTnLst>
+                    </p:cTn>
+                  </p:par>
+                  <p:par>
+                    <p:cTn id="7" fill="hold">
+                      <p:stCondLst>
+                        <p:cond delay="indefinite"/>
+                      </p:stCondLst>
+                      <p:childTnLst>
+                        <p:par>
+                          <p:cTn id="8" fill="hold">
+                            <p:stCondLst>
+                              <p:cond delay="0"/>
+                            </p:stCondLst>
+                            <p:childTnLst>
+                              <p:par>
+                                <p:cTn id="9" presetID="1" presetClass="entr" presetSubtype="0" fill="hold" grpId="0" nodeType="clickEffect">
+                                  <p:stCondLst>
+                                    <p:cond delay="0"/>
+                                  </p:stCondLst>
+                                  <p:childTnLst>
+                                    <p:set>
+                                      <p:cBhvr>
+                                        <p:cTn id="10" dur="1" fill="hold">
+                                          <p:stCondLst>
+                                            <p:cond delay="0"/>
+                                          </p:stCondLst>
+                                        </p:cTn>
+                                        <p:tgtEl>
+                                          <p:spTgt spid="3">
+                                            <p:txEl>
+                                              <p:pRg st="1" end="1"/>
+                                            </p:txEl>
+                                          </p:spTgt>
+                                        </p:tgtEl>
+                                        <p:attrNameLst>
+                                          <p:attrName>style.visibility</p:attrName>
+                                        </p:attrNameLst>
+                                      </p:cBhvr>
+                                      <p:to>
+                                        <p:strVal val="visible"/>
+                                      </p:to>
+                                    </p:set>
+                                  </p:childTnLst>
+                                </p:cTn>
+                              </p:par>
+                            </p:childTnLst>
+                          </p:cTn>
+                        </p:par>
+                      </p:childTnLst>
+                    </p:cTn>
+                  </p:par>
+                  <p:par>
+                    <p:cTn id="11" fill="hold">
+                      <p:stCondLst>
+                        <p:cond delay="indefinite"/>
+                      </p:stCondLst>
+                      <p:childTnLst>
+                        <p:par>
+                          <p:cTn id="12" fill="hold">
+                            <p:stCondLst>
+                              <p:cond delay="0"/>
+                            </p:stCondLst>
+                            <p:childTnLst>
+                              <p:par>
+                                <p:cTn id="13" presetID="1" presetClass="entr" presetSubtype="0" fill="hold" grpId="0" nodeType="clickEffect">
+                                  <p:stCondLst>
+                                    <p:cond delay="0"/>
+                                  </p:stCondLst>
+                                  <p:childTnLst>
+                                    <p:set>
+                                      <p:cBhvr>
+                                        <p:cTn id="14" dur="1" fill="hold">
+                                          <p:stCondLst>
+                                            <p:cond delay="0"/>
+                                          </p:stCondLst>
+                                        </p:cTn>
+                                        <p:tgtEl>
+                                          <p:spTgt spid="3">
+                                            <p:txEl>
+                                              <p:pRg st="3" end="3"/>
+                                            </p:txEl>
+                                          </p:spTgt>
+                                        </p:tgtEl>
+                                        <p:attrNameLst>
+                                          <p:attrName>style.visibility</p:attrName>
+                                        </p:attrNameLst>
+                                      </p:cBhvr>
+                                      <p:to>
+                                        <p:strVal val="visible"/>
+                                      </p:to>
+                                    </p:set>
+                                  </p:childTnLst>
+                                </p:cTn>
+                              </p:par>
+                            </p:childTnLst>
+                          </p:cTn>
+                        </p:par>
+                      </p:childTnLst>
+                    </p:cTn>
+                  </p:par>
+                  <p:par>
+                    <p:cTn id="15" fill="hold">
+                      <p:stCondLst>
+                        <p:cond delay="indefinite"/>
+                      </p:stCondLst>
+                      <p:childTnLst>
+                        <p:par>
+                          <p:cTn id="16" fill="hold">
+                            <p:stCondLst>
+                              <p:cond delay="0"/>
+                            </p:stCondLst>
+                            <p:childTnLst>
+                              <p:par>
+                                <p:cTn id="17" presetID="1" presetClass="entr" presetSubtype="0" fill="hold" grpId="0" nodeType="clickEffect">
+                                  <p:stCondLst>
+                                    <p:cond delay="0"/>
+                                  </p:stCondLst>
+                                  <p:childTnLst>
+                                    <p:set>
+                                      <p:cBhvr>
+                                        <p:cTn id="18" dur="1" fill="hold">
+                                          <p:stCondLst>
+                                            <p:cond delay="0"/>
+                                          </p:stCondLst>
+                                        </p:cTn>
+                                        <p:tgtEl>
+                                          <p:spTgt spid="3">
+                                            <p:txEl>
+                                              <p:pRg st="4" end="4"/>
+                                            </p:txEl>
+                                          </p:spTgt>
+                                        </p:tgtEl>
+                                        <p:attrNameLst>
+                                          <p:attrName>style.visibility</p:attrName>
+                                        </p:attrNameLst>
+                                      </p:cBhvr>
+                                      <p:to>
+                                        <p:strVal val="visible"/>
+                                      </p:to>
+                                    </p:set>
+                                  </p:childTnLst>
+                                </p:cTn>
+                              </p:par>
+                            </p:childTnLst>
+                          </p:cTn>
+                        </p:par>
+                      </p:childTnLst>
+                    </p:cTn>
+                  </p:par>
+                  <p:par>
+                    <p:cTn id="19" fill="hold">
+                      <p:stCondLst>
+                        <p:cond delay="indefinite"/>
+                      </p:stCondLst>
+                      <p:childTnLst>
+                        <p:par>
+                          <p:cTn id="20" fill="hold">
+                            <p:stCondLst>
+                              <p:cond delay="0"/>
+                            </p:stCondLst>
+                            <p:childTnLst>
+                              <p:par>
+                                <p:cTn id="21" presetID="1" presetClass="entr" presetSubtype="0" fill="hold" grpId="0" nodeType="clickEffect">
+                                  <p:stCondLst>
+                                    <p:cond delay="0"/>
+                                  </p:stCondLst>
+                                  <p:childTnLst>
+                                    <p:set>
+                                      <p:cBhvr>
+                                        <p:cTn id="22" dur="1" fill="hold">
+                                          <p:stCondLst>
+                                            <p:cond delay="0"/>
+                                          </p:stCondLst>
+                                        </p:cTn>
+                                        <p:tgtEl>
+                                          <p:spTgt spid="3">
+                                            <p:txEl>
+                                              <p:pRg st="5" end="5"/>
+                                            </p:txEl>
+                                          </p:spTgt>
+                                        </p:tgtEl>
+                                        <p:attrNameLst>
+                                          <p:attrName>style.visibility</p:attrName>
+                                        </p:attrNameLst>
+                                      </p:cBhvr>
+                                      <p:to>
+                                        <p:strVal val="visible"/>
+                                      </p:to>
+                                    </p:set>
+                                  </p:childTnLst>
+                                </p:cTn>
+                              </p:par>
+                            </p:childTnLst>
+                          </p:cTn>
+                        </p:par>
+                      </p:childTnLst>
+                    </p:cTn>
+                  </p:par>
+                </p:childTnLst>
+              </p:cTn>
+              <p:prevCondLst>
+                <p:cond evt="onPrev" delay="0">
+                  <p:tgtEl>
+                    <p:sldTgt/>
+                  </p:tgtEl>
+                </p:cond>
+              </p:prevCondLst>
+              <p:nextCondLst>
+                <p:cond evt="onNext" delay="0">
+                  <p:tgtEl>
+                    <p:sldTgt/>
+                  </p:tgtEl>
+                </p:cond>
+              </p:nextCondLst>
+            </p:seq>
+          </p:childTnLst>
+        </p:cTn>
+      </p:par>
+    </p:tnLst>
+    <p:bldLst>
+      <p:bldP spid="3" grpId="0" uiExpand="1" build="p"/>
+    </p:bldLst>
+  </p:timing>
+</p:sld>
+</file>
+
+<file path=ppt/slides/slide12.xml><?xml version="1.0" encoding="utf-8"?>
+<p:sld xmlns:a="http://schemas.openxmlformats.org/drawingml/2006/main" xmlns:r="http://schemas.openxmlformats.org/officeDocument/2006/relationships" xmlns:p="http://schemas.openxmlformats.org/presentationml/2006/main">
+  <p:cSld>
+    <p:spTree>
+      <p:nvGrpSpPr>
+        <p:cNvPr id="1" name=""/>
+        <p:cNvGrpSpPr/>
+        <p:nvPr/>
+      </p:nvGrpSpPr>
+      <p:grpSpPr>
+        <a:xfrm>
+          <a:off x="0" y="0"/>
+          <a:ext cx="0" cy="0"/>
+          <a:chOff x="0" y="0"/>
+          <a:chExt cx="0" cy="0"/>
+        </a:xfrm>
+      </p:grpSpPr>
+      <p:sp>
+        <p:nvSpPr>
+          <p:cNvPr id="2" name="Title 1"/>
+          <p:cNvSpPr>
+            <a:spLocks noGrp="1"/>
+          </p:cNvSpPr>
+          <p:nvPr>
+            <p:ph type="title"/>
+          </p:nvPr>
+        </p:nvSpPr>
+        <p:spPr/>
+        <p:txBody>
+          <a:bodyPr/>
+          <a:lstStyle/>
+          <a:p>
+            <a:pPr lvl="0" indent="0" marL="0">
+              <a:buNone/>
+            </a:pPr>
+            <a:r>
+              <a:rPr/>
+              <a:t>페이지 Pages</a:t>
+            </a:r>
+          </a:p>
+        </p:txBody>
+      </p:sp>
+      <p:sp>
+        <p:nvSpPr>
+          <p:cNvPr id="3" name="Content Placeholder 2"/>
+          <p:cNvSpPr>
+            <a:spLocks noGrp="1"/>
+          </p:cNvSpPr>
+          <p:nvPr>
+            <p:ph idx="1"/>
+          </p:nvPr>
+        </p:nvSpPr>
+        <p:spPr/>
+        <p:txBody>
+          <a:bodyPr/>
+          <a:lstStyle/>
+          <a:p>
+            <a:pPr lvl="0"/>
+            <a:r>
+              <a:rPr/>
+              <a:t>페이지 이름은 URL에 반영되므로, 영어로 써주어야 함.</a:t>
+            </a:r>
+          </a:p>
+          <a:p>
+            <a:pPr lvl="0"/>
+            <a:r>
+              <a:rPr/>
+              <a:t>속성</a:t>
+            </a:r>
+          </a:p>
+          <a:p>
+            <a:pPr lvl="1"/>
+            <a:r>
+              <a:rPr/>
+              <a:t>Page title </a:t>
+            </a:r>
+            <a:r>
+              <a:rPr>
+                <a:latin typeface="Courier"/>
+              </a:rPr>
+              <a:t>text</a:t>
+            </a:r>
+            <a:r>
+              <a:rPr/>
+              <a:t> : 페이지 제목. 탭 이름이나 브라우저 제목창에 표시된다.</a:t>
+            </a:r>
+          </a:p>
+          <a:p>
+            <a:pPr lvl="1"/>
+            <a:r>
+              <a:rPr/>
+              <a:t>This page is a native app </a:t>
+            </a:r>
+            <a:r>
+              <a:rPr>
+                <a:latin typeface="Courier"/>
+              </a:rPr>
+              <a:t>boolean</a:t>
+            </a:r>
+          </a:p>
+          <a:p>
+            <a:pPr lvl="1"/>
+            <a:r>
+              <a:rPr/>
+              <a:t>Mobile version</a:t>
+            </a:r>
+          </a:p>
+          <a:p>
+            <a:pPr lvl="1"/>
+            <a:r>
+              <a:rPr/>
+              <a:t>Type of content</a:t>
+            </a:r>
+          </a:p>
+          <a:p>
+            <a:pPr lvl="2"/>
+            <a:r>
+              <a:rPr/>
+              <a:t>Type of content를 지정한 페이지에서는 </a:t>
+            </a:r>
+            <a:r>
+              <a:rPr>
+                <a:latin typeface="Courier"/>
+              </a:rPr>
+              <a:t>Current Page</a:t>
+            </a:r>
+            <a:r>
+              <a:rPr/>
+              <a:t> 표현식을 사용해 해당 타입의 데이터에 접근이 가능하며</a:t>
+            </a:r>
+          </a:p>
+          <a:p>
+            <a:pPr lvl="2"/>
+            <a:r>
+              <a:rPr/>
+              <a:t>또한 이 페이지에 접근 시 </a:t>
+            </a:r>
+            <a:r>
+              <a:rPr>
+                <a:latin typeface="Courier"/>
+              </a:rPr>
+              <a:t>Data to Send</a:t>
+            </a:r>
+            <a:r>
+              <a:rPr/>
+              <a:t> 필드를 통해 해당 페이지에 지정된 타입의 값을 하나 ‘물고 들어와야’ 함</a:t>
+            </a:r>
+          </a:p>
+        </p:txBody>
+      </p:sp>
+    </p:spTree>
+  </p:cSld>
+  <p:timing>
+    <p:tnLst>
+      <p:par>
+        <p:cTn id="1" dur="indefinite" restart="never" nodeType="tmRoot">
+          <p:childTnLst>
+            <p:seq concurrent="1" nextAc="seek">
+              <p:cTn id="2" dur="indefinite" nodeType="mainSeq">
+                <p:childTnLst>
+                  <p:par>
+                    <p:cTn id="3" fill="hold">
+                      <p:stCondLst>
+                        <p:cond delay="indefinite"/>
+                      </p:stCondLst>
+                      <p:childTnLst>
+                        <p:par>
+                          <p:cTn id="4" fill="hold">
+                            <p:stCondLst>
+                              <p:cond delay="0"/>
+                            </p:stCondLst>
+                            <p:childTnLst>
+                              <p:par>
+                                <p:cTn id="5" presetID="1" presetClass="entr" presetSubtype="0" fill="hold" grpId="0" nodeType="clickEffect">
+                                  <p:stCondLst>
+                                    <p:cond delay="0"/>
+                                  </p:stCondLst>
+                                  <p:childTnLst>
+                                    <p:set>
+                                      <p:cBhvr>
+                                        <p:cTn id="6" dur="1" fill="hold">
+                                          <p:stCondLst>
+                                            <p:cond delay="0"/>
+                                          </p:stCondLst>
+                                        </p:cTn>
+                                        <p:tgtEl>
+                                          <p:spTgt spid="3">
+                                            <p:txEl>
+                                              <p:pRg st="0" end="0"/>
+                                            </p:txEl>
+                                          </p:spTgt>
+                                        </p:tgtEl>
+                                        <p:attrNameLst>
+                                          <p:attrName>style.visibility</p:attrName>
+                                        </p:attrNameLst>
+                                      </p:cBhvr>
+                                      <p:to>
+                                        <p:strVal val="visible"/>
+                                      </p:to>
+                                    </p:set>
+                                  </p:childTnLst>
+                                </p:cTn>
+                              </p:par>
+                            </p:childTnLst>
+                          </p:cTn>
+                        </p:par>
+                      </p:childTnLst>
+                    </p:cTn>
+                  </p:par>
+                  <p:par>
+                    <p:cTn id="7" fill="hold">
+                      <p:stCondLst>
+                        <p:cond delay="indefinite"/>
+                      </p:stCondLst>
+                      <p:childTnLst>
+                        <p:par>
+                          <p:cTn id="8" fill="hold">
+                            <p:stCondLst>
+                              <p:cond delay="0"/>
+                            </p:stCondLst>
+                            <p:childTnLst>
+                              <p:par>
+                                <p:cTn id="9" presetID="1" presetClass="entr" presetSubtype="0" fill="hold" grpId="0" nodeType="clickEffect">
+                                  <p:stCondLst>
+                                    <p:cond delay="0"/>
+                                  </p:stCondLst>
+                                  <p:childTnLst>
+                                    <p:set>
+                                      <p:cBhvr>
+                                        <p:cTn id="10" dur="1" fill="hold">
+                                          <p:stCondLst>
+                                            <p:cond delay="0"/>
+                                          </p:stCondLst>
+                                        </p:cTn>
+                                        <p:tgtEl>
+                                          <p:spTgt spid="3">
+                                            <p:txEl>
+                                              <p:pRg st="1" end="1"/>
+                                            </p:txEl>
+                                          </p:spTgt>
+                                        </p:tgtEl>
+                                        <p:attrNameLst>
+                                          <p:attrName>style.visibility</p:attrName>
+                                        </p:attrNameLst>
+                                      </p:cBhvr>
+                                      <p:to>
+                                        <p:strVal val="visible"/>
+                                      </p:to>
+                                    </p:set>
+                                  </p:childTnLst>
+                                </p:cTn>
+                              </p:par>
+                            </p:childTnLst>
+                          </p:cTn>
+                        </p:par>
+                      </p:childTnLst>
+                    </p:cTn>
+                  </p:par>
+                  <p:par>
+                    <p:cTn id="11" fill="hold">
+                      <p:stCondLst>
+                        <p:cond delay="indefinite"/>
+                      </p:stCondLst>
+                      <p:childTnLst>
+                        <p:par>
+                          <p:cTn id="12" fill="hold">
+                            <p:stCondLst>
+                              <p:cond delay="0"/>
+                            </p:stCondLst>
+                            <p:childTnLst>
+                              <p:par>
+                                <p:cTn id="13" presetID="1" presetClass="entr" presetSubtype="0" fill="hold" grpId="0" nodeType="clickEffect">
+                                  <p:stCondLst>
+                                    <p:cond delay="0"/>
+                                  </p:stCondLst>
+                                  <p:childTnLst>
+                                    <p:set>
+                                      <p:cBhvr>
+                                        <p:cTn id="14" dur="1" fill="hold">
+                                          <p:stCondLst>
+                                            <p:cond delay="0"/>
+                                          </p:stCondLst>
+                                        </p:cTn>
+                                        <p:tgtEl>
+                                          <p:spTgt spid="3">
+                                            <p:txEl>
+                                              <p:pRg st="2" end="2"/>
+                                            </p:txEl>
+                                          </p:spTgt>
+                                        </p:tgtEl>
+                                        <p:attrNameLst>
+                                          <p:attrName>style.visibility</p:attrName>
+                                        </p:attrNameLst>
+                                      </p:cBhvr>
+                                      <p:to>
+                                        <p:strVal val="visible"/>
+                                      </p:to>
+                                    </p:set>
+                                  </p:childTnLst>
+                                </p:cTn>
+                              </p:par>
+                            </p:childTnLst>
+                          </p:cTn>
+                        </p:par>
+                      </p:childTnLst>
+                    </p:cTn>
+                  </p:par>
+                  <p:par>
+                    <p:cTn id="15" fill="hold">
+                      <p:stCondLst>
+                        <p:cond delay="indefinite"/>
+                      </p:stCondLst>
+                      <p:childTnLst>
+                        <p:par>
+                          <p:cTn id="16" fill="hold">
+                            <p:stCondLst>
+                              <p:cond delay="0"/>
+                            </p:stCondLst>
+                            <p:childTnLst>
+                              <p:par>
+                                <p:cTn id="17" presetID="1" presetClass="entr" presetSubtype="0" fill="hold" grpId="0" nodeType="clickEffect">
+                                  <p:stCondLst>
+                                    <p:cond delay="0"/>
+                                  </p:stCondLst>
+                                  <p:childTnLst>
+                                    <p:set>
+                                      <p:cBhvr>
+                                        <p:cTn id="18" dur="1" fill="hold">
+                                          <p:stCondLst>
+                                            <p:cond delay="0"/>
+                                          </p:stCondLst>
+                                        </p:cTn>
+                                        <p:tgtEl>
+                                          <p:spTgt spid="3">
+                                            <p:txEl>
+                                              <p:pRg st="3" end="3"/>
+                                            </p:txEl>
+                                          </p:spTgt>
+                                        </p:tgtEl>
+                                        <p:attrNameLst>
+                                          <p:attrName>style.visibility</p:attrName>
+                                        </p:attrNameLst>
+                                      </p:cBhvr>
+                                      <p:to>
+                                        <p:strVal val="visible"/>
+                                      </p:to>
+                                    </p:set>
+                                  </p:childTnLst>
+                                </p:cTn>
+                              </p:par>
+                            </p:childTnLst>
+                          </p:cTn>
+                        </p:par>
+                      </p:childTnLst>
+                    </p:cTn>
+                  </p:par>
+                  <p:par>
+                    <p:cTn id="19" fill="hold">
+                      <p:stCondLst>
+                        <p:cond delay="indefinite"/>
+                      </p:stCondLst>
+                      <p:childTnLst>
+                        <p:par>
+                          <p:cTn id="20" fill="hold">
+                            <p:stCondLst>
+                              <p:cond delay="0"/>
+                            </p:stCondLst>
+                            <p:childTnLst>
+                              <p:par>
+                                <p:cTn id="21" presetID="1" presetClass="entr" presetSubtype="0" fill="hold" grpId="0" nodeType="clickEffect">
+                                  <p:stCondLst>
+                                    <p:cond delay="0"/>
+                                  </p:stCondLst>
+                                  <p:childTnLst>
+                                    <p:set>
+                                      <p:cBhvr>
+                                        <p:cTn id="22" dur="1" fill="hold">
+                                          <p:stCondLst>
+                                            <p:cond delay="0"/>
+                                          </p:stCondLst>
+                                        </p:cTn>
+                                        <p:tgtEl>
+                                          <p:spTgt spid="3">
+                                            <p:txEl>
+                                              <p:pRg st="4" end="4"/>
+                                            </p:txEl>
+                                          </p:spTgt>
+                                        </p:tgtEl>
+                                        <p:attrNameLst>
+                                          <p:attrName>style.visibility</p:attrName>
+                                        </p:attrNameLst>
+                                      </p:cBhvr>
+                                      <p:to>
+                                        <p:strVal val="visible"/>
+                                      </p:to>
+                                    </p:set>
+                                  </p:childTnLst>
+                                </p:cTn>
+                              </p:par>
+                            </p:childTnLst>
+                          </p:cTn>
+                        </p:par>
+                      </p:childTnLst>
+                    </p:cTn>
+                  </p:par>
+                  <p:par>
+                    <p:cTn id="23" fill="hold">
+                      <p:stCondLst>
+                        <p:cond delay="indefinite"/>
+                      </p:stCondLst>
+                      <p:childTnLst>
+                        <p:par>
+                          <p:cTn id="24" fill="hold">
+                            <p:stCondLst>
+                              <p:cond delay="0"/>
+                            </p:stCondLst>
+                            <p:childTnLst>
+                              <p:par>
+                                <p:cTn id="25" presetID="1" presetClass="entr" presetSubtype="0" fill="hold" grpId="0" nodeType="clickEffect">
+                                  <p:stCondLst>
+                                    <p:cond delay="0"/>
+                                  </p:stCondLst>
+                                  <p:childTnLst>
+                                    <p:set>
+                                      <p:cBhvr>
+                                        <p:cTn id="26" dur="1" fill="hold">
+                                          <p:stCondLst>
+                                            <p:cond delay="0"/>
+                                          </p:stCondLst>
+                                        </p:cTn>
+                                        <p:tgtEl>
+                                          <p:spTgt spid="3">
+                                            <p:txEl>
+                                              <p:pRg st="5" end="5"/>
+                                            </p:txEl>
+                                          </p:spTgt>
+                                        </p:tgtEl>
+                                        <p:attrNameLst>
+                                          <p:attrName>style.visibility</p:attrName>
+                                        </p:attrNameLst>
+                                      </p:cBhvr>
+                                      <p:to>
+                                        <p:strVal val="visible"/>
+                                      </p:to>
+                                    </p:set>
+                                  </p:childTnLst>
+                                </p:cTn>
+                              </p:par>
+                            </p:childTnLst>
+                          </p:cTn>
+                        </p:par>
+                      </p:childTnLst>
+                    </p:cTn>
+                  </p:par>
+                  <p:par>
+                    <p:cTn id="27" fill="hold">
+                      <p:stCondLst>
+                        <p:cond delay="indefinite"/>
+                      </p:stCondLst>
+                      <p:childTnLst>
+                        <p:par>
+                          <p:cTn id="28" fill="hold">
+                            <p:stCondLst>
+                              <p:cond delay="0"/>
+                            </p:stCondLst>
+                            <p:childTnLst>
+                              <p:par>
+                                <p:cTn id="29" presetID="1" presetClass="entr" presetSubtype="0" fill="hold" grpId="0" nodeType="clickEffect">
+                                  <p:stCondLst>
+                                    <p:cond delay="0"/>
+                                  </p:stCondLst>
+                                  <p:childTnLst>
+                                    <p:set>
+                                      <p:cBhvr>
+                                        <p:cTn id="30" dur="1" fill="hold">
+                                          <p:stCondLst>
+                                            <p:cond delay="0"/>
+                                          </p:stCondLst>
+                                        </p:cTn>
+                                        <p:tgtEl>
+                                          <p:spTgt spid="3">
+                                            <p:txEl>
+                                              <p:pRg st="6" end="6"/>
+                                            </p:txEl>
+                                          </p:spTgt>
+                                        </p:tgtEl>
+                                        <p:attrNameLst>
+                                          <p:attrName>style.visibility</p:attrName>
+                                        </p:attrNameLst>
+                                      </p:cBhvr>
+                                      <p:to>
+                                        <p:strVal val="visible"/>
+                                      </p:to>
+                                    </p:set>
+                                  </p:childTnLst>
+                                </p:cTn>
+                              </p:par>
+                            </p:childTnLst>
+                          </p:cTn>
+                        </p:par>
+                      </p:childTnLst>
+                    </p:cTn>
+                  </p:par>
+                  <p:par>
+                    <p:cTn id="31" fill="hold">
+                      <p:stCondLst>
+                        <p:cond delay="indefinite"/>
+                      </p:stCondLst>
+                      <p:childTnLst>
+                        <p:par>
+                          <p:cTn id="32" fill="hold">
+                            <p:stCondLst>
+                              <p:cond delay="0"/>
+                            </p:stCondLst>
+                            <p:childTnLst>
+                              <p:par>
+                                <p:cTn id="33" presetID="1" presetClass="entr" presetSubtype="0" fill="hold" grpId="0" nodeType="clickEffect">
+                                  <p:stCondLst>
+                                    <p:cond delay="0"/>
+                                  </p:stCondLst>
+                                  <p:childTnLst>
+                                    <p:set>
+                                      <p:cBhvr>
+                                        <p:cTn id="34" dur="1" fill="hold">
+                                          <p:stCondLst>
+                                            <p:cond delay="0"/>
+                                          </p:stCondLst>
+                                        </p:cTn>
+                                        <p:tgtEl>
+                                          <p:spTgt spid="3">
+                                            <p:txEl>
+                                              <p:pRg st="7" end="7"/>
+                                            </p:txEl>
+                                          </p:spTgt>
+                                        </p:tgtEl>
+                                        <p:attrNameLst>
+                                          <p:attrName>style.visibility</p:attrName>
+                                        </p:attrNameLst>
+                                      </p:cBhvr>
+                                      <p:to>
+                                        <p:strVal val="visible"/>
+                                      </p:to>
+                                    </p:set>
+                                  </p:childTnLst>
+                                </p:cTn>
+                              </p:par>
+                            </p:childTnLst>
+                          </p:cTn>
+                        </p:par>
+                      </p:childTnLst>
+                    </p:cTn>
+                  </p:par>
+                </p:childTnLst>
+              </p:cTn>
+              <p:prevCondLst>
+                <p:cond evt="onPrev" delay="0">
+                  <p:tgtEl>
+                    <p:sldTgt/>
+                  </p:tgtEl>
+                </p:cond>
+              </p:prevCondLst>
+              <p:nextCondLst>
+                <p:cond evt="onNext" delay="0">
+                  <p:tgtEl>
+                    <p:sldTgt/>
+                  </p:tgtEl>
+                </p:cond>
+              </p:nextCondLst>
+            </p:seq>
+          </p:childTnLst>
+        </p:cTn>
+      </p:par>
+    </p:tnLst>
+    <p:bldLst>
+      <p:bldP spid="3" grpId="0" uiExpand="1" build="p"/>
+    </p:bldLst>
+  </p:timing>
 </p:sld>
 </file>
 
@@ -6744,6 +7996,1616 @@
 </p:sld>
 </file>
 
+<file path=ppt/slides/slide7.xml><?xml version="1.0" encoding="utf-8"?>
+<p:sld xmlns:a="http://schemas.openxmlformats.org/drawingml/2006/main" xmlns:r="http://schemas.openxmlformats.org/officeDocument/2006/relationships" xmlns:p="http://schemas.openxmlformats.org/presentationml/2006/main">
+  <p:cSld>
+    <p:spTree>
+      <p:nvGrpSpPr>
+        <p:cNvPr id="1" name=""/>
+        <p:cNvGrpSpPr/>
+        <p:nvPr/>
+      </p:nvGrpSpPr>
+      <p:grpSpPr>
+        <a:xfrm>
+          <a:off x="0" y="0"/>
+          <a:ext cx="0" cy="0"/>
+          <a:chOff x="0" y="0"/>
+          <a:chExt cx="0" cy="0"/>
+        </a:xfrm>
+      </p:grpSpPr>
+      <p:sp>
+        <p:nvSpPr>
+          <p:cNvPr id="2" name="Title 1"/>
+          <p:cNvSpPr>
+            <a:spLocks noGrp="1"/>
+          </p:cNvSpPr>
+          <p:nvPr>
+            <p:ph type="title"/>
+          </p:nvPr>
+        </p:nvSpPr>
+        <p:spPr/>
+        <p:txBody>
+          <a:bodyPr/>
+          <a:lstStyle/>
+          <a:p>
+            <a:pPr lvl="0" indent="0" marL="0">
+              <a:buNone/>
+            </a:pPr>
+            <a:r>
+              <a:rPr/>
+              <a:t>버블 데이터베이스</a:t>
+            </a:r>
+          </a:p>
+        </p:txBody>
+      </p:sp>
+      <p:sp>
+        <p:nvSpPr>
+          <p:cNvPr id="3" name="Content Placeholder 2"/>
+          <p:cNvSpPr>
+            <a:spLocks noGrp="1"/>
+          </p:cNvSpPr>
+          <p:nvPr>
+            <p:ph idx="1"/>
+          </p:nvPr>
+        </p:nvSpPr>
+        <p:spPr/>
+        <p:txBody>
+          <a:bodyPr/>
+          <a:lstStyle/>
+          <a:p>
+            <a:pPr lvl="0"/>
+            <a:r>
+              <a:rPr/>
+              <a:t>표준 관계형 데이터베이스의 형태를 따르고 있어 CRUD와 관련한 작업이 모두 원활</a:t>
+            </a:r>
+          </a:p>
+          <a:p>
+            <a:pPr lvl="0"/>
+            <a:r>
+              <a:rPr/>
+              <a:t>CMS 수준이 아닌 상용 서비스를 구축할 수 있을 정도의 복잡한 구성이 가능한 것이 다른 노코드 도구와 차별화되는 점</a:t>
+            </a:r>
+          </a:p>
+          <a:p>
+            <a:pPr lvl="0" indent="0" marL="0">
+              <a:spcBef>
+                <a:spcPts val="3000"/>
+              </a:spcBef>
+              <a:buNone/>
+            </a:pPr>
+            <a:r>
+              <a:rPr b="1"/>
+              <a:t>타입</a:t>
+            </a:r>
+          </a:p>
+          <a:p>
+            <a:pPr lvl="0"/>
+            <a:r>
+              <a:rPr/>
+              <a:t>텍스트, 숫자, Yes/No, Thing 등 버블에서 다루는 정보의 형태</a:t>
+            </a:r>
+          </a:p>
+          <a:p>
+            <a:pPr lvl="0"/>
+            <a:r>
+              <a:rPr/>
+              <a:t>버블의 데이터베이스에는 데이터가 </a:t>
+            </a:r>
+            <a:r>
+              <a:rPr>
+                <a:latin typeface="Courier"/>
+              </a:rPr>
+              <a:t>Thing</a:t>
+            </a:r>
+            <a:r>
+              <a:rPr/>
+              <a:t>의 형태로 저장된다.</a:t>
+            </a:r>
+          </a:p>
+          <a:p>
+            <a:pPr lvl="0" indent="0" marL="0">
+              <a:spcBef>
+                <a:spcPts val="3000"/>
+              </a:spcBef>
+              <a:buNone/>
+            </a:pPr>
+            <a:r>
+              <a:rPr b="1"/>
+              <a:t>CRUD</a:t>
+            </a:r>
+          </a:p>
+          <a:p>
+            <a:pPr lvl="0"/>
+            <a:r>
+              <a:rPr/>
+              <a:t>각 CREATE, READ, UPDATE, DELETE의 약자로 데이터베이스를 다루는 기본 조작의 일람</a:t>
+            </a:r>
+          </a:p>
+          <a:p>
+            <a:pPr lvl="1"/>
+            <a:r>
+              <a:rPr/>
+              <a:t>데이터베이스와 관련해서는 이것만 알면 된다고 말해도 좋은 정도.</a:t>
+            </a:r>
+          </a:p>
+          <a:p>
+            <a:pPr lvl="1"/>
+            <a:r>
+              <a:rPr/>
+              <a:t>그러나 복잡한 소프트웨어의 각종 기능을 CRUD로 설명할 수 있으려면 장시간의 경험과 연습이 필요.</a:t>
+            </a:r>
+          </a:p>
+        </p:txBody>
+      </p:sp>
+    </p:spTree>
+  </p:cSld>
+  <p:timing>
+    <p:tnLst>
+      <p:par>
+        <p:cTn id="1" dur="indefinite" restart="never" nodeType="tmRoot">
+          <p:childTnLst>
+            <p:seq concurrent="1" nextAc="seek">
+              <p:cTn id="2" dur="indefinite" nodeType="mainSeq">
+                <p:childTnLst>
+                  <p:par>
+                    <p:cTn id="3" fill="hold">
+                      <p:stCondLst>
+                        <p:cond delay="indefinite"/>
+                      </p:stCondLst>
+                      <p:childTnLst>
+                        <p:par>
+                          <p:cTn id="4" fill="hold">
+                            <p:stCondLst>
+                              <p:cond delay="0"/>
+                            </p:stCondLst>
+                            <p:childTnLst>
+                              <p:par>
+                                <p:cTn id="5" presetID="1" presetClass="entr" presetSubtype="0" fill="hold" grpId="0" nodeType="clickEffect">
+                                  <p:stCondLst>
+                                    <p:cond delay="0"/>
+                                  </p:stCondLst>
+                                  <p:childTnLst>
+                                    <p:set>
+                                      <p:cBhvr>
+                                        <p:cTn id="6" dur="1" fill="hold">
+                                          <p:stCondLst>
+                                            <p:cond delay="0"/>
+                                          </p:stCondLst>
+                                        </p:cTn>
+                                        <p:tgtEl>
+                                          <p:spTgt spid="3">
+                                            <p:txEl>
+                                              <p:pRg st="0" end="0"/>
+                                            </p:txEl>
+                                          </p:spTgt>
+                                        </p:tgtEl>
+                                        <p:attrNameLst>
+                                          <p:attrName>style.visibility</p:attrName>
+                                        </p:attrNameLst>
+                                      </p:cBhvr>
+                                      <p:to>
+                                        <p:strVal val="visible"/>
+                                      </p:to>
+                                    </p:set>
+                                  </p:childTnLst>
+                                </p:cTn>
+                              </p:par>
+                            </p:childTnLst>
+                          </p:cTn>
+                        </p:par>
+                      </p:childTnLst>
+                    </p:cTn>
+                  </p:par>
+                  <p:par>
+                    <p:cTn id="7" fill="hold">
+                      <p:stCondLst>
+                        <p:cond delay="indefinite"/>
+                      </p:stCondLst>
+                      <p:childTnLst>
+                        <p:par>
+                          <p:cTn id="8" fill="hold">
+                            <p:stCondLst>
+                              <p:cond delay="0"/>
+                            </p:stCondLst>
+                            <p:childTnLst>
+                              <p:par>
+                                <p:cTn id="9" presetID="1" presetClass="entr" presetSubtype="0" fill="hold" grpId="0" nodeType="clickEffect">
+                                  <p:stCondLst>
+                                    <p:cond delay="0"/>
+                                  </p:stCondLst>
+                                  <p:childTnLst>
+                                    <p:set>
+                                      <p:cBhvr>
+                                        <p:cTn id="10" dur="1" fill="hold">
+                                          <p:stCondLst>
+                                            <p:cond delay="0"/>
+                                          </p:stCondLst>
+                                        </p:cTn>
+                                        <p:tgtEl>
+                                          <p:spTgt spid="3">
+                                            <p:txEl>
+                                              <p:pRg st="1" end="1"/>
+                                            </p:txEl>
+                                          </p:spTgt>
+                                        </p:tgtEl>
+                                        <p:attrNameLst>
+                                          <p:attrName>style.visibility</p:attrName>
+                                        </p:attrNameLst>
+                                      </p:cBhvr>
+                                      <p:to>
+                                        <p:strVal val="visible"/>
+                                      </p:to>
+                                    </p:set>
+                                  </p:childTnLst>
+                                </p:cTn>
+                              </p:par>
+                            </p:childTnLst>
+                          </p:cTn>
+                        </p:par>
+                      </p:childTnLst>
+                    </p:cTn>
+                  </p:par>
+                  <p:par>
+                    <p:cTn id="11" fill="hold">
+                      <p:stCondLst>
+                        <p:cond delay="indefinite"/>
+                      </p:stCondLst>
+                      <p:childTnLst>
+                        <p:par>
+                          <p:cTn id="12" fill="hold">
+                            <p:stCondLst>
+                              <p:cond delay="0"/>
+                            </p:stCondLst>
+                            <p:childTnLst>
+                              <p:par>
+                                <p:cTn id="13" presetID="1" presetClass="entr" presetSubtype="0" fill="hold" grpId="0" nodeType="clickEffect">
+                                  <p:stCondLst>
+                                    <p:cond delay="0"/>
+                                  </p:stCondLst>
+                                  <p:childTnLst>
+                                    <p:set>
+                                      <p:cBhvr>
+                                        <p:cTn id="14" dur="1" fill="hold">
+                                          <p:stCondLst>
+                                            <p:cond delay="0"/>
+                                          </p:stCondLst>
+                                        </p:cTn>
+                                        <p:tgtEl>
+                                          <p:spTgt spid="3">
+                                            <p:txEl>
+                                              <p:pRg st="3" end="3"/>
+                                            </p:txEl>
+                                          </p:spTgt>
+                                        </p:tgtEl>
+                                        <p:attrNameLst>
+                                          <p:attrName>style.visibility</p:attrName>
+                                        </p:attrNameLst>
+                                      </p:cBhvr>
+                                      <p:to>
+                                        <p:strVal val="visible"/>
+                                      </p:to>
+                                    </p:set>
+                                  </p:childTnLst>
+                                </p:cTn>
+                              </p:par>
+                            </p:childTnLst>
+                          </p:cTn>
+                        </p:par>
+                      </p:childTnLst>
+                    </p:cTn>
+                  </p:par>
+                  <p:par>
+                    <p:cTn id="15" fill="hold">
+                      <p:stCondLst>
+                        <p:cond delay="indefinite"/>
+                      </p:stCondLst>
+                      <p:childTnLst>
+                        <p:par>
+                          <p:cTn id="16" fill="hold">
+                            <p:stCondLst>
+                              <p:cond delay="0"/>
+                            </p:stCondLst>
+                            <p:childTnLst>
+                              <p:par>
+                                <p:cTn id="17" presetID="1" presetClass="entr" presetSubtype="0" fill="hold" grpId="0" nodeType="clickEffect">
+                                  <p:stCondLst>
+                                    <p:cond delay="0"/>
+                                  </p:stCondLst>
+                                  <p:childTnLst>
+                                    <p:set>
+                                      <p:cBhvr>
+                                        <p:cTn id="18" dur="1" fill="hold">
+                                          <p:stCondLst>
+                                            <p:cond delay="0"/>
+                                          </p:stCondLst>
+                                        </p:cTn>
+                                        <p:tgtEl>
+                                          <p:spTgt spid="3">
+                                            <p:txEl>
+                                              <p:pRg st="4" end="4"/>
+                                            </p:txEl>
+                                          </p:spTgt>
+                                        </p:tgtEl>
+                                        <p:attrNameLst>
+                                          <p:attrName>style.visibility</p:attrName>
+                                        </p:attrNameLst>
+                                      </p:cBhvr>
+                                      <p:to>
+                                        <p:strVal val="visible"/>
+                                      </p:to>
+                                    </p:set>
+                                  </p:childTnLst>
+                                </p:cTn>
+                              </p:par>
+                            </p:childTnLst>
+                          </p:cTn>
+                        </p:par>
+                      </p:childTnLst>
+                    </p:cTn>
+                  </p:par>
+                  <p:par>
+                    <p:cTn id="19" fill="hold">
+                      <p:stCondLst>
+                        <p:cond delay="indefinite"/>
+                      </p:stCondLst>
+                      <p:childTnLst>
+                        <p:par>
+                          <p:cTn id="20" fill="hold">
+                            <p:stCondLst>
+                              <p:cond delay="0"/>
+                            </p:stCondLst>
+                            <p:childTnLst>
+                              <p:par>
+                                <p:cTn id="21" presetID="1" presetClass="entr" presetSubtype="0" fill="hold" grpId="0" nodeType="clickEffect">
+                                  <p:stCondLst>
+                                    <p:cond delay="0"/>
+                                  </p:stCondLst>
+                                  <p:childTnLst>
+                                    <p:set>
+                                      <p:cBhvr>
+                                        <p:cTn id="22" dur="1" fill="hold">
+                                          <p:stCondLst>
+                                            <p:cond delay="0"/>
+                                          </p:stCondLst>
+                                        </p:cTn>
+                                        <p:tgtEl>
+                                          <p:spTgt spid="3">
+                                            <p:txEl>
+                                              <p:pRg st="6" end="6"/>
+                                            </p:txEl>
+                                          </p:spTgt>
+                                        </p:tgtEl>
+                                        <p:attrNameLst>
+                                          <p:attrName>style.visibility</p:attrName>
+                                        </p:attrNameLst>
+                                      </p:cBhvr>
+                                      <p:to>
+                                        <p:strVal val="visible"/>
+                                      </p:to>
+                                    </p:set>
+                                  </p:childTnLst>
+                                </p:cTn>
+                              </p:par>
+                            </p:childTnLst>
+                          </p:cTn>
+                        </p:par>
+                      </p:childTnLst>
+                    </p:cTn>
+                  </p:par>
+                  <p:par>
+                    <p:cTn id="23" fill="hold">
+                      <p:stCondLst>
+                        <p:cond delay="indefinite"/>
+                      </p:stCondLst>
+                      <p:childTnLst>
+                        <p:par>
+                          <p:cTn id="24" fill="hold">
+                            <p:stCondLst>
+                              <p:cond delay="0"/>
+                            </p:stCondLst>
+                            <p:childTnLst>
+                              <p:par>
+                                <p:cTn id="25" presetID="1" presetClass="entr" presetSubtype="0" fill="hold" grpId="0" nodeType="clickEffect">
+                                  <p:stCondLst>
+                                    <p:cond delay="0"/>
+                                  </p:stCondLst>
+                                  <p:childTnLst>
+                                    <p:set>
+                                      <p:cBhvr>
+                                        <p:cTn id="26" dur="1" fill="hold">
+                                          <p:stCondLst>
+                                            <p:cond delay="0"/>
+                                          </p:stCondLst>
+                                        </p:cTn>
+                                        <p:tgtEl>
+                                          <p:spTgt spid="3">
+                                            <p:txEl>
+                                              <p:pRg st="7" end="7"/>
+                                            </p:txEl>
+                                          </p:spTgt>
+                                        </p:tgtEl>
+                                        <p:attrNameLst>
+                                          <p:attrName>style.visibility</p:attrName>
+                                        </p:attrNameLst>
+                                      </p:cBhvr>
+                                      <p:to>
+                                        <p:strVal val="visible"/>
+                                      </p:to>
+                                    </p:set>
+                                  </p:childTnLst>
+                                </p:cTn>
+                              </p:par>
+                            </p:childTnLst>
+                          </p:cTn>
+                        </p:par>
+                      </p:childTnLst>
+                    </p:cTn>
+                  </p:par>
+                  <p:par>
+                    <p:cTn id="27" fill="hold">
+                      <p:stCondLst>
+                        <p:cond delay="indefinite"/>
+                      </p:stCondLst>
+                      <p:childTnLst>
+                        <p:par>
+                          <p:cTn id="28" fill="hold">
+                            <p:stCondLst>
+                              <p:cond delay="0"/>
+                            </p:stCondLst>
+                            <p:childTnLst>
+                              <p:par>
+                                <p:cTn id="29" presetID="1" presetClass="entr" presetSubtype="0" fill="hold" grpId="0" nodeType="clickEffect">
+                                  <p:stCondLst>
+                                    <p:cond delay="0"/>
+                                  </p:stCondLst>
+                                  <p:childTnLst>
+                                    <p:set>
+                                      <p:cBhvr>
+                                        <p:cTn id="30" dur="1" fill="hold">
+                                          <p:stCondLst>
+                                            <p:cond delay="0"/>
+                                          </p:stCondLst>
+                                        </p:cTn>
+                                        <p:tgtEl>
+                                          <p:spTgt spid="3">
+                                            <p:txEl>
+                                              <p:pRg st="8" end="8"/>
+                                            </p:txEl>
+                                          </p:spTgt>
+                                        </p:tgtEl>
+                                        <p:attrNameLst>
+                                          <p:attrName>style.visibility</p:attrName>
+                                        </p:attrNameLst>
+                                      </p:cBhvr>
+                                      <p:to>
+                                        <p:strVal val="visible"/>
+                                      </p:to>
+                                    </p:set>
+                                  </p:childTnLst>
+                                </p:cTn>
+                              </p:par>
+                            </p:childTnLst>
+                          </p:cTn>
+                        </p:par>
+                      </p:childTnLst>
+                    </p:cTn>
+                  </p:par>
+                </p:childTnLst>
+              </p:cTn>
+              <p:prevCondLst>
+                <p:cond evt="onPrev" delay="0">
+                  <p:tgtEl>
+                    <p:sldTgt/>
+                  </p:tgtEl>
+                </p:cond>
+              </p:prevCondLst>
+              <p:nextCondLst>
+                <p:cond evt="onNext" delay="0">
+                  <p:tgtEl>
+                    <p:sldTgt/>
+                  </p:tgtEl>
+                </p:cond>
+              </p:nextCondLst>
+            </p:seq>
+          </p:childTnLst>
+        </p:cTn>
+      </p:par>
+    </p:tnLst>
+    <p:bldLst>
+      <p:bldP spid="3" grpId="0" uiExpand="1" build="p"/>
+    </p:bldLst>
+  </p:timing>
+</p:sld>
+</file>
+
+<file path=ppt/slides/slide8.xml><?xml version="1.0" encoding="utf-8"?>
+<p:sld xmlns:a="http://schemas.openxmlformats.org/drawingml/2006/main" xmlns:r="http://schemas.openxmlformats.org/officeDocument/2006/relationships" xmlns:p="http://schemas.openxmlformats.org/presentationml/2006/main">
+  <p:cSld>
+    <p:spTree>
+      <p:nvGrpSpPr>
+        <p:cNvPr id="1" name=""/>
+        <p:cNvGrpSpPr/>
+        <p:nvPr/>
+      </p:nvGrpSpPr>
+      <p:grpSpPr>
+        <a:xfrm>
+          <a:off x="0" y="0"/>
+          <a:ext cx="0" cy="0"/>
+          <a:chOff x="0" y="0"/>
+          <a:chExt cx="0" cy="0"/>
+        </a:xfrm>
+      </p:grpSpPr>
+      <p:sp>
+        <p:nvSpPr>
+          <p:cNvPr id="2" name="Title 1"/>
+          <p:cNvSpPr>
+            <a:spLocks noGrp="1"/>
+          </p:cNvSpPr>
+          <p:nvPr>
+            <p:ph type="title"/>
+          </p:nvPr>
+        </p:nvSpPr>
+        <p:spPr/>
+        <p:txBody>
+          <a:bodyPr/>
+          <a:lstStyle/>
+          <a:p>
+            <a:pPr lvl="0" indent="0" marL="0">
+              <a:buNone/>
+            </a:pPr>
+            <a:r>
+              <a:rPr/>
+              <a:t>기본 타입(Basic Types)</a:t>
+            </a:r>
+          </a:p>
+        </p:txBody>
+      </p:sp>
+      <p:sp>
+        <p:nvSpPr>
+          <p:cNvPr id="3" name="Content Placeholder 2"/>
+          <p:cNvSpPr>
+            <a:spLocks noGrp="1"/>
+          </p:cNvSpPr>
+          <p:nvPr>
+            <p:ph idx="1"/>
+          </p:nvPr>
+        </p:nvSpPr>
+        <p:spPr/>
+        <p:txBody>
+          <a:bodyPr/>
+          <a:lstStyle/>
+          <a:p>
+            <a:pPr lvl="0"/>
+            <a:r>
+              <a:rPr/>
+              <a:t>텍스트(Text)</a:t>
+            </a:r>
+          </a:p>
+          <a:p>
+            <a:pPr lvl="0"/>
+            <a:r>
+              <a:rPr/>
+              <a:t>숫자(Number)</a:t>
+            </a:r>
+          </a:p>
+          <a:p>
+            <a:pPr lvl="0"/>
+            <a:r>
+              <a:rPr/>
+              <a:t>숫자 범위(Numeric Range)</a:t>
+            </a:r>
+          </a:p>
+          <a:p>
+            <a:pPr lvl="0"/>
+            <a:r>
+              <a:rPr/>
+              <a:t>날짜(Date) // 시간을 포함</a:t>
+            </a:r>
+          </a:p>
+          <a:p>
+            <a:pPr lvl="0"/>
+            <a:r>
+              <a:rPr/>
+              <a:t>기간(Date range)</a:t>
+            </a:r>
+          </a:p>
+          <a:p>
+            <a:pPr lvl="0"/>
+            <a:r>
+              <a:rPr/>
+              <a:t>시간상 간격(Date interval)</a:t>
+            </a:r>
+          </a:p>
+          <a:p>
+            <a:pPr lvl="0"/>
+            <a:r>
+              <a:rPr/>
+              <a:t>예 또는 아니오(Yes or No) // 불리언(Boolean)</a:t>
+            </a:r>
+          </a:p>
+          <a:p>
+            <a:pPr lvl="0"/>
+            <a:r>
+              <a:rPr/>
+              <a:t>파일(File)</a:t>
+            </a:r>
+          </a:p>
+          <a:p>
+            <a:pPr lvl="0"/>
+            <a:r>
+              <a:rPr/>
+              <a:t>이미지(Image)</a:t>
+            </a:r>
+          </a:p>
+          <a:p>
+            <a:pPr lvl="0"/>
+            <a:r>
+              <a:rPr/>
+              <a:t>지리적 주소(Geographic Address)</a:t>
+            </a:r>
+          </a:p>
+        </p:txBody>
+      </p:sp>
+    </p:spTree>
+  </p:cSld>
+  <p:timing>
+    <p:tnLst>
+      <p:par>
+        <p:cTn id="1" dur="indefinite" restart="never" nodeType="tmRoot">
+          <p:childTnLst>
+            <p:seq concurrent="1" nextAc="seek">
+              <p:cTn id="2" dur="indefinite" nodeType="mainSeq">
+                <p:childTnLst>
+                  <p:par>
+                    <p:cTn id="3" fill="hold">
+                      <p:stCondLst>
+                        <p:cond delay="indefinite"/>
+                      </p:stCondLst>
+                      <p:childTnLst>
+                        <p:par>
+                          <p:cTn id="4" fill="hold">
+                            <p:stCondLst>
+                              <p:cond delay="0"/>
+                            </p:stCondLst>
+                            <p:childTnLst>
+                              <p:par>
+                                <p:cTn id="5" presetID="1" presetClass="entr" presetSubtype="0" fill="hold" grpId="0" nodeType="clickEffect">
+                                  <p:stCondLst>
+                                    <p:cond delay="0"/>
+                                  </p:stCondLst>
+                                  <p:childTnLst>
+                                    <p:set>
+                                      <p:cBhvr>
+                                        <p:cTn id="6" dur="1" fill="hold">
+                                          <p:stCondLst>
+                                            <p:cond delay="0"/>
+                                          </p:stCondLst>
+                                        </p:cTn>
+                                        <p:tgtEl>
+                                          <p:spTgt spid="3">
+                                            <p:txEl>
+                                              <p:pRg st="0" end="0"/>
+                                            </p:txEl>
+                                          </p:spTgt>
+                                        </p:tgtEl>
+                                        <p:attrNameLst>
+                                          <p:attrName>style.visibility</p:attrName>
+                                        </p:attrNameLst>
+                                      </p:cBhvr>
+                                      <p:to>
+                                        <p:strVal val="visible"/>
+                                      </p:to>
+                                    </p:set>
+                                  </p:childTnLst>
+                                </p:cTn>
+                              </p:par>
+                            </p:childTnLst>
+                          </p:cTn>
+                        </p:par>
+                      </p:childTnLst>
+                    </p:cTn>
+                  </p:par>
+                  <p:par>
+                    <p:cTn id="7" fill="hold">
+                      <p:stCondLst>
+                        <p:cond delay="indefinite"/>
+                      </p:stCondLst>
+                      <p:childTnLst>
+                        <p:par>
+                          <p:cTn id="8" fill="hold">
+                            <p:stCondLst>
+                              <p:cond delay="0"/>
+                            </p:stCondLst>
+                            <p:childTnLst>
+                              <p:par>
+                                <p:cTn id="9" presetID="1" presetClass="entr" presetSubtype="0" fill="hold" grpId="0" nodeType="clickEffect">
+                                  <p:stCondLst>
+                                    <p:cond delay="0"/>
+                                  </p:stCondLst>
+                                  <p:childTnLst>
+                                    <p:set>
+                                      <p:cBhvr>
+                                        <p:cTn id="10" dur="1" fill="hold">
+                                          <p:stCondLst>
+                                            <p:cond delay="0"/>
+                                          </p:stCondLst>
+                                        </p:cTn>
+                                        <p:tgtEl>
+                                          <p:spTgt spid="3">
+                                            <p:txEl>
+                                              <p:pRg st="1" end="1"/>
+                                            </p:txEl>
+                                          </p:spTgt>
+                                        </p:tgtEl>
+                                        <p:attrNameLst>
+                                          <p:attrName>style.visibility</p:attrName>
+                                        </p:attrNameLst>
+                                      </p:cBhvr>
+                                      <p:to>
+                                        <p:strVal val="visible"/>
+                                      </p:to>
+                                    </p:set>
+                                  </p:childTnLst>
+                                </p:cTn>
+                              </p:par>
+                            </p:childTnLst>
+                          </p:cTn>
+                        </p:par>
+                      </p:childTnLst>
+                    </p:cTn>
+                  </p:par>
+                  <p:par>
+                    <p:cTn id="11" fill="hold">
+                      <p:stCondLst>
+                        <p:cond delay="indefinite"/>
+                      </p:stCondLst>
+                      <p:childTnLst>
+                        <p:par>
+                          <p:cTn id="12" fill="hold">
+                            <p:stCondLst>
+                              <p:cond delay="0"/>
+                            </p:stCondLst>
+                            <p:childTnLst>
+                              <p:par>
+                                <p:cTn id="13" presetID="1" presetClass="entr" presetSubtype="0" fill="hold" grpId="0" nodeType="clickEffect">
+                                  <p:stCondLst>
+                                    <p:cond delay="0"/>
+                                  </p:stCondLst>
+                                  <p:childTnLst>
+                                    <p:set>
+                                      <p:cBhvr>
+                                        <p:cTn id="14" dur="1" fill="hold">
+                                          <p:stCondLst>
+                                            <p:cond delay="0"/>
+                                          </p:stCondLst>
+                                        </p:cTn>
+                                        <p:tgtEl>
+                                          <p:spTgt spid="3">
+                                            <p:txEl>
+                                              <p:pRg st="2" end="2"/>
+                                            </p:txEl>
+                                          </p:spTgt>
+                                        </p:tgtEl>
+                                        <p:attrNameLst>
+                                          <p:attrName>style.visibility</p:attrName>
+                                        </p:attrNameLst>
+                                      </p:cBhvr>
+                                      <p:to>
+                                        <p:strVal val="visible"/>
+                                      </p:to>
+                                    </p:set>
+                                  </p:childTnLst>
+                                </p:cTn>
+                              </p:par>
+                            </p:childTnLst>
+                          </p:cTn>
+                        </p:par>
+                      </p:childTnLst>
+                    </p:cTn>
+                  </p:par>
+                  <p:par>
+                    <p:cTn id="15" fill="hold">
+                      <p:stCondLst>
+                        <p:cond delay="indefinite"/>
+                      </p:stCondLst>
+                      <p:childTnLst>
+                        <p:par>
+                          <p:cTn id="16" fill="hold">
+                            <p:stCondLst>
+                              <p:cond delay="0"/>
+                            </p:stCondLst>
+                            <p:childTnLst>
+                              <p:par>
+                                <p:cTn id="17" presetID="1" presetClass="entr" presetSubtype="0" fill="hold" grpId="0" nodeType="clickEffect">
+                                  <p:stCondLst>
+                                    <p:cond delay="0"/>
+                                  </p:stCondLst>
+                                  <p:childTnLst>
+                                    <p:set>
+                                      <p:cBhvr>
+                                        <p:cTn id="18" dur="1" fill="hold">
+                                          <p:stCondLst>
+                                            <p:cond delay="0"/>
+                                          </p:stCondLst>
+                                        </p:cTn>
+                                        <p:tgtEl>
+                                          <p:spTgt spid="3">
+                                            <p:txEl>
+                                              <p:pRg st="3" end="3"/>
+                                            </p:txEl>
+                                          </p:spTgt>
+                                        </p:tgtEl>
+                                        <p:attrNameLst>
+                                          <p:attrName>style.visibility</p:attrName>
+                                        </p:attrNameLst>
+                                      </p:cBhvr>
+                                      <p:to>
+                                        <p:strVal val="visible"/>
+                                      </p:to>
+                                    </p:set>
+                                  </p:childTnLst>
+                                </p:cTn>
+                              </p:par>
+                            </p:childTnLst>
+                          </p:cTn>
+                        </p:par>
+                      </p:childTnLst>
+                    </p:cTn>
+                  </p:par>
+                  <p:par>
+                    <p:cTn id="19" fill="hold">
+                      <p:stCondLst>
+                        <p:cond delay="indefinite"/>
+                      </p:stCondLst>
+                      <p:childTnLst>
+                        <p:par>
+                          <p:cTn id="20" fill="hold">
+                            <p:stCondLst>
+                              <p:cond delay="0"/>
+                            </p:stCondLst>
+                            <p:childTnLst>
+                              <p:par>
+                                <p:cTn id="21" presetID="1" presetClass="entr" presetSubtype="0" fill="hold" grpId="0" nodeType="clickEffect">
+                                  <p:stCondLst>
+                                    <p:cond delay="0"/>
+                                  </p:stCondLst>
+                                  <p:childTnLst>
+                                    <p:set>
+                                      <p:cBhvr>
+                                        <p:cTn id="22" dur="1" fill="hold">
+                                          <p:stCondLst>
+                                            <p:cond delay="0"/>
+                                          </p:stCondLst>
+                                        </p:cTn>
+                                        <p:tgtEl>
+                                          <p:spTgt spid="3">
+                                            <p:txEl>
+                                              <p:pRg st="4" end="4"/>
+                                            </p:txEl>
+                                          </p:spTgt>
+                                        </p:tgtEl>
+                                        <p:attrNameLst>
+                                          <p:attrName>style.visibility</p:attrName>
+                                        </p:attrNameLst>
+                                      </p:cBhvr>
+                                      <p:to>
+                                        <p:strVal val="visible"/>
+                                      </p:to>
+                                    </p:set>
+                                  </p:childTnLst>
+                                </p:cTn>
+                              </p:par>
+                            </p:childTnLst>
+                          </p:cTn>
+                        </p:par>
+                      </p:childTnLst>
+                    </p:cTn>
+                  </p:par>
+                  <p:par>
+                    <p:cTn id="23" fill="hold">
+                      <p:stCondLst>
+                        <p:cond delay="indefinite"/>
+                      </p:stCondLst>
+                      <p:childTnLst>
+                        <p:par>
+                          <p:cTn id="24" fill="hold">
+                            <p:stCondLst>
+                              <p:cond delay="0"/>
+                            </p:stCondLst>
+                            <p:childTnLst>
+                              <p:par>
+                                <p:cTn id="25" presetID="1" presetClass="entr" presetSubtype="0" fill="hold" grpId="0" nodeType="clickEffect">
+                                  <p:stCondLst>
+                                    <p:cond delay="0"/>
+                                  </p:stCondLst>
+                                  <p:childTnLst>
+                                    <p:set>
+                                      <p:cBhvr>
+                                        <p:cTn id="26" dur="1" fill="hold">
+                                          <p:stCondLst>
+                                            <p:cond delay="0"/>
+                                          </p:stCondLst>
+                                        </p:cTn>
+                                        <p:tgtEl>
+                                          <p:spTgt spid="3">
+                                            <p:txEl>
+                                              <p:pRg st="5" end="5"/>
+                                            </p:txEl>
+                                          </p:spTgt>
+                                        </p:tgtEl>
+                                        <p:attrNameLst>
+                                          <p:attrName>style.visibility</p:attrName>
+                                        </p:attrNameLst>
+                                      </p:cBhvr>
+                                      <p:to>
+                                        <p:strVal val="visible"/>
+                                      </p:to>
+                                    </p:set>
+                                  </p:childTnLst>
+                                </p:cTn>
+                              </p:par>
+                            </p:childTnLst>
+                          </p:cTn>
+                        </p:par>
+                      </p:childTnLst>
+                    </p:cTn>
+                  </p:par>
+                  <p:par>
+                    <p:cTn id="27" fill="hold">
+                      <p:stCondLst>
+                        <p:cond delay="indefinite"/>
+                      </p:stCondLst>
+                      <p:childTnLst>
+                        <p:par>
+                          <p:cTn id="28" fill="hold">
+                            <p:stCondLst>
+                              <p:cond delay="0"/>
+                            </p:stCondLst>
+                            <p:childTnLst>
+                              <p:par>
+                                <p:cTn id="29" presetID="1" presetClass="entr" presetSubtype="0" fill="hold" grpId="0" nodeType="clickEffect">
+                                  <p:stCondLst>
+                                    <p:cond delay="0"/>
+                                  </p:stCondLst>
+                                  <p:childTnLst>
+                                    <p:set>
+                                      <p:cBhvr>
+                                        <p:cTn id="30" dur="1" fill="hold">
+                                          <p:stCondLst>
+                                            <p:cond delay="0"/>
+                                          </p:stCondLst>
+                                        </p:cTn>
+                                        <p:tgtEl>
+                                          <p:spTgt spid="3">
+                                            <p:txEl>
+                                              <p:pRg st="6" end="6"/>
+                                            </p:txEl>
+                                          </p:spTgt>
+                                        </p:tgtEl>
+                                        <p:attrNameLst>
+                                          <p:attrName>style.visibility</p:attrName>
+                                        </p:attrNameLst>
+                                      </p:cBhvr>
+                                      <p:to>
+                                        <p:strVal val="visible"/>
+                                      </p:to>
+                                    </p:set>
+                                  </p:childTnLst>
+                                </p:cTn>
+                              </p:par>
+                            </p:childTnLst>
+                          </p:cTn>
+                        </p:par>
+                      </p:childTnLst>
+                    </p:cTn>
+                  </p:par>
+                  <p:par>
+                    <p:cTn id="31" fill="hold">
+                      <p:stCondLst>
+                        <p:cond delay="indefinite"/>
+                      </p:stCondLst>
+                      <p:childTnLst>
+                        <p:par>
+                          <p:cTn id="32" fill="hold">
+                            <p:stCondLst>
+                              <p:cond delay="0"/>
+                            </p:stCondLst>
+                            <p:childTnLst>
+                              <p:par>
+                                <p:cTn id="33" presetID="1" presetClass="entr" presetSubtype="0" fill="hold" grpId="0" nodeType="clickEffect">
+                                  <p:stCondLst>
+                                    <p:cond delay="0"/>
+                                  </p:stCondLst>
+                                  <p:childTnLst>
+                                    <p:set>
+                                      <p:cBhvr>
+                                        <p:cTn id="34" dur="1" fill="hold">
+                                          <p:stCondLst>
+                                            <p:cond delay="0"/>
+                                          </p:stCondLst>
+                                        </p:cTn>
+                                        <p:tgtEl>
+                                          <p:spTgt spid="3">
+                                            <p:txEl>
+                                              <p:pRg st="7" end="7"/>
+                                            </p:txEl>
+                                          </p:spTgt>
+                                        </p:tgtEl>
+                                        <p:attrNameLst>
+                                          <p:attrName>style.visibility</p:attrName>
+                                        </p:attrNameLst>
+                                      </p:cBhvr>
+                                      <p:to>
+                                        <p:strVal val="visible"/>
+                                      </p:to>
+                                    </p:set>
+                                  </p:childTnLst>
+                                </p:cTn>
+                              </p:par>
+                            </p:childTnLst>
+                          </p:cTn>
+                        </p:par>
+                      </p:childTnLst>
+                    </p:cTn>
+                  </p:par>
+                  <p:par>
+                    <p:cTn id="35" fill="hold">
+                      <p:stCondLst>
+                        <p:cond delay="indefinite"/>
+                      </p:stCondLst>
+                      <p:childTnLst>
+                        <p:par>
+                          <p:cTn id="36" fill="hold">
+                            <p:stCondLst>
+                              <p:cond delay="0"/>
+                            </p:stCondLst>
+                            <p:childTnLst>
+                              <p:par>
+                                <p:cTn id="37" presetID="1" presetClass="entr" presetSubtype="0" fill="hold" grpId="0" nodeType="clickEffect">
+                                  <p:stCondLst>
+                                    <p:cond delay="0"/>
+                                  </p:stCondLst>
+                                  <p:childTnLst>
+                                    <p:set>
+                                      <p:cBhvr>
+                                        <p:cTn id="38" dur="1" fill="hold">
+                                          <p:stCondLst>
+                                            <p:cond delay="0"/>
+                                          </p:stCondLst>
+                                        </p:cTn>
+                                        <p:tgtEl>
+                                          <p:spTgt spid="3">
+                                            <p:txEl>
+                                              <p:pRg st="8" end="8"/>
+                                            </p:txEl>
+                                          </p:spTgt>
+                                        </p:tgtEl>
+                                        <p:attrNameLst>
+                                          <p:attrName>style.visibility</p:attrName>
+                                        </p:attrNameLst>
+                                      </p:cBhvr>
+                                      <p:to>
+                                        <p:strVal val="visible"/>
+                                      </p:to>
+                                    </p:set>
+                                  </p:childTnLst>
+                                </p:cTn>
+                              </p:par>
+                            </p:childTnLst>
+                          </p:cTn>
+                        </p:par>
+                      </p:childTnLst>
+                    </p:cTn>
+                  </p:par>
+                  <p:par>
+                    <p:cTn id="39" fill="hold">
+                      <p:stCondLst>
+                        <p:cond delay="indefinite"/>
+                      </p:stCondLst>
+                      <p:childTnLst>
+                        <p:par>
+                          <p:cTn id="40" fill="hold">
+                            <p:stCondLst>
+                              <p:cond delay="0"/>
+                            </p:stCondLst>
+                            <p:childTnLst>
+                              <p:par>
+                                <p:cTn id="41" presetID="1" presetClass="entr" presetSubtype="0" fill="hold" grpId="0" nodeType="clickEffect">
+                                  <p:stCondLst>
+                                    <p:cond delay="0"/>
+                                  </p:stCondLst>
+                                  <p:childTnLst>
+                                    <p:set>
+                                      <p:cBhvr>
+                                        <p:cTn id="42" dur="1" fill="hold">
+                                          <p:stCondLst>
+                                            <p:cond delay="0"/>
+                                          </p:stCondLst>
+                                        </p:cTn>
+                                        <p:tgtEl>
+                                          <p:spTgt spid="3">
+                                            <p:txEl>
+                                              <p:pRg st="9" end="9"/>
+                                            </p:txEl>
+                                          </p:spTgt>
+                                        </p:tgtEl>
+                                        <p:attrNameLst>
+                                          <p:attrName>style.visibility</p:attrName>
+                                        </p:attrNameLst>
+                                      </p:cBhvr>
+                                      <p:to>
+                                        <p:strVal val="visible"/>
+                                      </p:to>
+                                    </p:set>
+                                  </p:childTnLst>
+                                </p:cTn>
+                              </p:par>
+                            </p:childTnLst>
+                          </p:cTn>
+                        </p:par>
+                      </p:childTnLst>
+                    </p:cTn>
+                  </p:par>
+                </p:childTnLst>
+              </p:cTn>
+              <p:prevCondLst>
+                <p:cond evt="onPrev" delay="0">
+                  <p:tgtEl>
+                    <p:sldTgt/>
+                  </p:tgtEl>
+                </p:cond>
+              </p:prevCondLst>
+              <p:nextCondLst>
+                <p:cond evt="onNext" delay="0">
+                  <p:tgtEl>
+                    <p:sldTgt/>
+                  </p:tgtEl>
+                </p:cond>
+              </p:nextCondLst>
+            </p:seq>
+          </p:childTnLst>
+        </p:cTn>
+      </p:par>
+    </p:tnLst>
+    <p:bldLst>
+      <p:bldP spid="3" grpId="0" uiExpand="1" build="p"/>
+    </p:bldLst>
+  </p:timing>
+</p:sld>
+</file>
+
+<file path=ppt/slides/slide9.xml><?xml version="1.0" encoding="utf-8"?>
+<p:sld xmlns:a="http://schemas.openxmlformats.org/drawingml/2006/main" xmlns:r="http://schemas.openxmlformats.org/officeDocument/2006/relationships" xmlns:p="http://schemas.openxmlformats.org/presentationml/2006/main">
+  <p:cSld>
+    <p:spTree>
+      <p:nvGrpSpPr>
+        <p:cNvPr id="1" name=""/>
+        <p:cNvGrpSpPr/>
+        <p:nvPr/>
+      </p:nvGrpSpPr>
+      <p:grpSpPr>
+        <a:xfrm>
+          <a:off x="0" y="0"/>
+          <a:ext cx="0" cy="0"/>
+          <a:chOff x="0" y="0"/>
+          <a:chExt cx="0" cy="0"/>
+        </a:xfrm>
+      </p:grpSpPr>
+      <p:sp>
+        <p:nvSpPr>
+          <p:cNvPr id="2" name="Title 1"/>
+          <p:cNvSpPr>
+            <a:spLocks noGrp="1"/>
+          </p:cNvSpPr>
+          <p:nvPr>
+            <p:ph type="title"/>
+          </p:nvPr>
+        </p:nvSpPr>
+        <p:spPr/>
+        <p:txBody>
+          <a:bodyPr/>
+          <a:lstStyle/>
+          <a:p>
+            <a:pPr lvl="0" indent="0" marL="0">
+              <a:buNone/>
+            </a:pPr>
+            <a:r>
+              <a:rPr/>
+              <a:t>띵 (Things, Data types)</a:t>
+            </a:r>
+          </a:p>
+        </p:txBody>
+      </p:sp>
+      <p:sp>
+        <p:nvSpPr>
+          <p:cNvPr id="3" name="Content Placeholder 2"/>
+          <p:cNvSpPr>
+            <a:spLocks noGrp="1"/>
+          </p:cNvSpPr>
+          <p:nvPr>
+            <p:ph idx="1"/>
+          </p:nvPr>
+        </p:nvSpPr>
+        <p:spPr/>
+        <p:txBody>
+          <a:bodyPr/>
+          <a:lstStyle/>
+          <a:p>
+            <a:pPr lvl="0"/>
+            <a:r>
+              <a:rPr/>
+              <a:t>기본 제공되는 기본 타입 외에 유저가 생성하는 타입.</a:t>
+            </a:r>
+          </a:p>
+          <a:p>
+            <a:pPr lvl="0"/>
+            <a:r>
+              <a:rPr/>
+              <a:t>프로퍼티(필드)를 가진 것.</a:t>
+            </a:r>
+          </a:p>
+          <a:p>
+            <a:pPr lvl="1"/>
+            <a:r>
+              <a:rPr/>
+              <a:t>프로퍼티는 키와 타입을 가진 값의 구조로 된 정보를 말함</a:t>
+            </a:r>
+          </a:p>
+          <a:p>
+            <a:pPr lvl="0"/>
+            <a:r>
+              <a:rPr/>
+              <a:t>구글시트 등의 2차원 데이터베이스에서는 컬럼을 프로퍼티에 할당하여 저장하므로 Thing과 2차원 데이터베이스가 서로 호환된다</a:t>
+            </a:r>
+          </a:p>
+          <a:p>
+            <a:pPr lvl="0"/>
+            <a:r>
+              <a:rPr/>
+              <a:t>즉 Data types 로 타입을 정의했다면, 해당 타입을 따르는 실제 값이 입력된 레코드를 Thing이라고 부르는 것.</a:t>
+            </a:r>
+          </a:p>
+          <a:p>
+            <a:pPr lvl="0"/>
+            <a:r>
+              <a:rPr/>
+              <a:t>Thing에 대한 이해가 곧 버블 데이터베이스의 골자</a:t>
+            </a:r>
+          </a:p>
+        </p:txBody>
+      </p:sp>
+    </p:spTree>
+  </p:cSld>
+  <p:timing>
+    <p:tnLst>
+      <p:par>
+        <p:cTn id="1" dur="indefinite" restart="never" nodeType="tmRoot">
+          <p:childTnLst>
+            <p:seq concurrent="1" nextAc="seek">
+              <p:cTn id="2" dur="indefinite" nodeType="mainSeq">
+                <p:childTnLst>
+                  <p:par>
+                    <p:cTn id="3" fill="hold">
+                      <p:stCondLst>
+                        <p:cond delay="indefinite"/>
+                      </p:stCondLst>
+                      <p:childTnLst>
+                        <p:par>
+                          <p:cTn id="4" fill="hold">
+                            <p:stCondLst>
+                              <p:cond delay="0"/>
+                            </p:stCondLst>
+                            <p:childTnLst>
+                              <p:par>
+                                <p:cTn id="5" presetID="1" presetClass="entr" presetSubtype="0" fill="hold" grpId="0" nodeType="clickEffect">
+                                  <p:stCondLst>
+                                    <p:cond delay="0"/>
+                                  </p:stCondLst>
+                                  <p:childTnLst>
+                                    <p:set>
+                                      <p:cBhvr>
+                                        <p:cTn id="6" dur="1" fill="hold">
+                                          <p:stCondLst>
+                                            <p:cond delay="0"/>
+                                          </p:stCondLst>
+                                        </p:cTn>
+                                        <p:tgtEl>
+                                          <p:spTgt spid="3">
+                                            <p:txEl>
+                                              <p:pRg st="0" end="0"/>
+                                            </p:txEl>
+                                          </p:spTgt>
+                                        </p:tgtEl>
+                                        <p:attrNameLst>
+                                          <p:attrName>style.visibility</p:attrName>
+                                        </p:attrNameLst>
+                                      </p:cBhvr>
+                                      <p:to>
+                                        <p:strVal val="visible"/>
+                                      </p:to>
+                                    </p:set>
+                                  </p:childTnLst>
+                                </p:cTn>
+                              </p:par>
+                            </p:childTnLst>
+                          </p:cTn>
+                        </p:par>
+                      </p:childTnLst>
+                    </p:cTn>
+                  </p:par>
+                  <p:par>
+                    <p:cTn id="7" fill="hold">
+                      <p:stCondLst>
+                        <p:cond delay="indefinite"/>
+                      </p:stCondLst>
+                      <p:childTnLst>
+                        <p:par>
+                          <p:cTn id="8" fill="hold">
+                            <p:stCondLst>
+                              <p:cond delay="0"/>
+                            </p:stCondLst>
+                            <p:childTnLst>
+                              <p:par>
+                                <p:cTn id="9" presetID="1" presetClass="entr" presetSubtype="0" fill="hold" grpId="0" nodeType="clickEffect">
+                                  <p:stCondLst>
+                                    <p:cond delay="0"/>
+                                  </p:stCondLst>
+                                  <p:childTnLst>
+                                    <p:set>
+                                      <p:cBhvr>
+                                        <p:cTn id="10" dur="1" fill="hold">
+                                          <p:stCondLst>
+                                            <p:cond delay="0"/>
+                                          </p:stCondLst>
+                                        </p:cTn>
+                                        <p:tgtEl>
+                                          <p:spTgt spid="3">
+                                            <p:txEl>
+                                              <p:pRg st="1" end="1"/>
+                                            </p:txEl>
+                                          </p:spTgt>
+                                        </p:tgtEl>
+                                        <p:attrNameLst>
+                                          <p:attrName>style.visibility</p:attrName>
+                                        </p:attrNameLst>
+                                      </p:cBhvr>
+                                      <p:to>
+                                        <p:strVal val="visible"/>
+                                      </p:to>
+                                    </p:set>
+                                  </p:childTnLst>
+                                </p:cTn>
+                              </p:par>
+                            </p:childTnLst>
+                          </p:cTn>
+                        </p:par>
+                      </p:childTnLst>
+                    </p:cTn>
+                  </p:par>
+                  <p:par>
+                    <p:cTn id="11" fill="hold">
+                      <p:stCondLst>
+                        <p:cond delay="indefinite"/>
+                      </p:stCondLst>
+                      <p:childTnLst>
+                        <p:par>
+                          <p:cTn id="12" fill="hold">
+                            <p:stCondLst>
+                              <p:cond delay="0"/>
+                            </p:stCondLst>
+                            <p:childTnLst>
+                              <p:par>
+                                <p:cTn id="13" presetID="1" presetClass="entr" presetSubtype="0" fill="hold" grpId="0" nodeType="clickEffect">
+                                  <p:stCondLst>
+                                    <p:cond delay="0"/>
+                                  </p:stCondLst>
+                                  <p:childTnLst>
+                                    <p:set>
+                                      <p:cBhvr>
+                                        <p:cTn id="14" dur="1" fill="hold">
+                                          <p:stCondLst>
+                                            <p:cond delay="0"/>
+                                          </p:stCondLst>
+                                        </p:cTn>
+                                        <p:tgtEl>
+                                          <p:spTgt spid="3">
+                                            <p:txEl>
+                                              <p:pRg st="2" end="2"/>
+                                            </p:txEl>
+                                          </p:spTgt>
+                                        </p:tgtEl>
+                                        <p:attrNameLst>
+                                          <p:attrName>style.visibility</p:attrName>
+                                        </p:attrNameLst>
+                                      </p:cBhvr>
+                                      <p:to>
+                                        <p:strVal val="visible"/>
+                                      </p:to>
+                                    </p:set>
+                                  </p:childTnLst>
+                                </p:cTn>
+                              </p:par>
+                            </p:childTnLst>
+                          </p:cTn>
+                        </p:par>
+                      </p:childTnLst>
+                    </p:cTn>
+                  </p:par>
+                  <p:par>
+                    <p:cTn id="15" fill="hold">
+                      <p:stCondLst>
+                        <p:cond delay="indefinite"/>
+                      </p:stCondLst>
+                      <p:childTnLst>
+                        <p:par>
+                          <p:cTn id="16" fill="hold">
+                            <p:stCondLst>
+                              <p:cond delay="0"/>
+                            </p:stCondLst>
+                            <p:childTnLst>
+                              <p:par>
+                                <p:cTn id="17" presetID="1" presetClass="entr" presetSubtype="0" fill="hold" grpId="0" nodeType="clickEffect">
+                                  <p:stCondLst>
+                                    <p:cond delay="0"/>
+                                  </p:stCondLst>
+                                  <p:childTnLst>
+                                    <p:set>
+                                      <p:cBhvr>
+                                        <p:cTn id="18" dur="1" fill="hold">
+                                          <p:stCondLst>
+                                            <p:cond delay="0"/>
+                                          </p:stCondLst>
+                                        </p:cTn>
+                                        <p:tgtEl>
+                                          <p:spTgt spid="3">
+                                            <p:txEl>
+                                              <p:pRg st="3" end="3"/>
+                                            </p:txEl>
+                                          </p:spTgt>
+                                        </p:tgtEl>
+                                        <p:attrNameLst>
+                                          <p:attrName>style.visibility</p:attrName>
+                                        </p:attrNameLst>
+                                      </p:cBhvr>
+                                      <p:to>
+                                        <p:strVal val="visible"/>
+                                      </p:to>
+                                    </p:set>
+                                  </p:childTnLst>
+                                </p:cTn>
+                              </p:par>
+                            </p:childTnLst>
+                          </p:cTn>
+                        </p:par>
+                      </p:childTnLst>
+                    </p:cTn>
+                  </p:par>
+                  <p:par>
+                    <p:cTn id="19" fill="hold">
+                      <p:stCondLst>
+                        <p:cond delay="indefinite"/>
+                      </p:stCondLst>
+                      <p:childTnLst>
+                        <p:par>
+                          <p:cTn id="20" fill="hold">
+                            <p:stCondLst>
+                              <p:cond delay="0"/>
+                            </p:stCondLst>
+                            <p:childTnLst>
+                              <p:par>
+                                <p:cTn id="21" presetID="1" presetClass="entr" presetSubtype="0" fill="hold" grpId="0" nodeType="clickEffect">
+                                  <p:stCondLst>
+                                    <p:cond delay="0"/>
+                                  </p:stCondLst>
+                                  <p:childTnLst>
+                                    <p:set>
+                                      <p:cBhvr>
+                                        <p:cTn id="22" dur="1" fill="hold">
+                                          <p:stCondLst>
+                                            <p:cond delay="0"/>
+                                          </p:stCondLst>
+                                        </p:cTn>
+                                        <p:tgtEl>
+                                          <p:spTgt spid="3">
+                                            <p:txEl>
+                                              <p:pRg st="4" end="4"/>
+                                            </p:txEl>
+                                          </p:spTgt>
+                                        </p:tgtEl>
+                                        <p:attrNameLst>
+                                          <p:attrName>style.visibility</p:attrName>
+                                        </p:attrNameLst>
+                                      </p:cBhvr>
+                                      <p:to>
+                                        <p:strVal val="visible"/>
+                                      </p:to>
+                                    </p:set>
+                                  </p:childTnLst>
+                                </p:cTn>
+                              </p:par>
+                            </p:childTnLst>
+                          </p:cTn>
+                        </p:par>
+                      </p:childTnLst>
+                    </p:cTn>
+                  </p:par>
+                  <p:par>
+                    <p:cTn id="23" fill="hold">
+                      <p:stCondLst>
+                        <p:cond delay="indefinite"/>
+                      </p:stCondLst>
+                      <p:childTnLst>
+                        <p:par>
+                          <p:cTn id="24" fill="hold">
+                            <p:stCondLst>
+                              <p:cond delay="0"/>
+                            </p:stCondLst>
+                            <p:childTnLst>
+                              <p:par>
+                                <p:cTn id="25" presetID="1" presetClass="entr" presetSubtype="0" fill="hold" grpId="0" nodeType="clickEffect">
+                                  <p:stCondLst>
+                                    <p:cond delay="0"/>
+                                  </p:stCondLst>
+                                  <p:childTnLst>
+                                    <p:set>
+                                      <p:cBhvr>
+                                        <p:cTn id="26" dur="1" fill="hold">
+                                          <p:stCondLst>
+                                            <p:cond delay="0"/>
+                                          </p:stCondLst>
+                                        </p:cTn>
+                                        <p:tgtEl>
+                                          <p:spTgt spid="3">
+                                            <p:txEl>
+                                              <p:pRg st="5" end="5"/>
+                                            </p:txEl>
+                                          </p:spTgt>
+                                        </p:tgtEl>
+                                        <p:attrNameLst>
+                                          <p:attrName>style.visibility</p:attrName>
+                                        </p:attrNameLst>
+                                      </p:cBhvr>
+                                      <p:to>
+                                        <p:strVal val="visible"/>
+                                      </p:to>
+                                    </p:set>
+                                  </p:childTnLst>
+                                </p:cTn>
+                              </p:par>
+                            </p:childTnLst>
+                          </p:cTn>
+                        </p:par>
+                      </p:childTnLst>
+                    </p:cTn>
+                  </p:par>
+                </p:childTnLst>
+              </p:cTn>
+              <p:prevCondLst>
+                <p:cond evt="onPrev" delay="0">
+                  <p:tgtEl>
+                    <p:sldTgt/>
+                  </p:tgtEl>
+                </p:cond>
+              </p:prevCondLst>
+              <p:nextCondLst>
+                <p:cond evt="onNext" delay="0">
+                  <p:tgtEl>
+                    <p:sldTgt/>
+                  </p:tgtEl>
+                </p:cond>
+              </p:nextCondLst>
+            </p:seq>
+          </p:childTnLst>
+        </p:cTn>
+      </p:par>
+    </p:tnLst>
+    <p:bldLst>
+      <p:bldP spid="3" grpId="0" uiExpand="1" build="p"/>
+    </p:bldLst>
+  </p:timing>
+</p:sld>
+</file>
+
 <file path=ppt/theme/theme1.xml><?xml version="1.0" encoding="utf-8"?>
 <a:theme xmlns:a="http://schemas.openxmlformats.org/drawingml/2006/main" name="Gallery">
   <a:themeElements>

</xml_diff>

<commit_message>
백업 완료: 2023-11-26 06:30:42
Affected files:
노코드 엔지니어링/노코드 최강자 버블.md
노코드 엔지니어링/노코드 최강자 버블.pptx
</commit_message>
<xml_diff>
--- a/노코드 엔지니어링/노코드 최강자 버블.pptx
+++ b/노코드 엔지니어링/노코드 최강자 버블.pptx
@@ -17,6 +17,12 @@
     <p:sldId id="265" r:id="rId11"/>
     <p:sldId id="266" r:id="rId12"/>
     <p:sldId id="267" r:id="rId13"/>
+    <p:sldId id="268" r:id="rId14"/>
+    <p:sldId id="269" r:id="rId15"/>
+    <p:sldId id="270" r:id="rId16"/>
+    <p:sldId id="271" r:id="rId17"/>
+    <p:sldId id="272" r:id="rId18"/>
+    <p:sldId id="273" r:id="rId19"/>
   </p:sldIdLst>
   <p:sldSz cx="12192000" cy="6858000"/>
   <p:notesSz cx="6858000" cy="9144000"/>
@@ -4056,6 +4062,438 @@
             </a:pPr>
             <a:r>
               <a:rPr/>
+              <a:t>띵 (Things, Data types)</a:t>
+            </a:r>
+          </a:p>
+        </p:txBody>
+      </p:sp>
+      <p:sp>
+        <p:nvSpPr>
+          <p:cNvPr id="3" name="Content Placeholder 2"/>
+          <p:cNvSpPr>
+            <a:spLocks noGrp="1"/>
+          </p:cNvSpPr>
+          <p:nvPr>
+            <p:ph idx="1"/>
+          </p:nvPr>
+        </p:nvSpPr>
+        <p:spPr/>
+        <p:txBody>
+          <a:bodyPr/>
+          <a:lstStyle/>
+          <a:p>
+            <a:pPr lvl="0"/>
+            <a:r>
+              <a:rPr/>
+              <a:t>기본 제공되는 기본 타입 외에 유저가 생성하는 타입.</a:t>
+            </a:r>
+          </a:p>
+          <a:p>
+            <a:pPr lvl="0"/>
+            <a:r>
+              <a:rPr/>
+              <a:t>프로퍼티(필드)를 가진 것.</a:t>
+            </a:r>
+          </a:p>
+          <a:p>
+            <a:pPr lvl="1"/>
+            <a:r>
+              <a:rPr/>
+              <a:t>프로퍼티는 키와 타입을 가진 값의 구조로 된 정보를 말함</a:t>
+            </a:r>
+          </a:p>
+          <a:p>
+            <a:pPr lvl="0"/>
+            <a:r>
+              <a:rPr/>
+              <a:t>구글시트 등의 2차원 데이터베이스에서는 컬럼을 프로퍼티에 할당하여 저장하므로 Thing과 2차원 데이터베이스가 서로 호환된다</a:t>
+            </a:r>
+          </a:p>
+          <a:p>
+            <a:pPr lvl="0"/>
+            <a:r>
+              <a:rPr/>
+              <a:t>즉 Data types 로 타입을 정의했다면, 해당 타입을 따르는 실제 값이 입력된 레코드를 Thing이라고 부르는 것.</a:t>
+            </a:r>
+          </a:p>
+          <a:p>
+            <a:pPr lvl="0"/>
+            <a:r>
+              <a:rPr/>
+              <a:t>Thing에 대한 이해가 곧 버블 데이터베이스의 골자</a:t>
+            </a:r>
+          </a:p>
+        </p:txBody>
+      </p:sp>
+    </p:spTree>
+  </p:cSld>
+  <p:timing>
+    <p:tnLst>
+      <p:par>
+        <p:cTn id="1" dur="indefinite" restart="never" nodeType="tmRoot">
+          <p:childTnLst>
+            <p:seq concurrent="1" nextAc="seek">
+              <p:cTn id="2" dur="indefinite" nodeType="mainSeq">
+                <p:childTnLst>
+                  <p:par>
+                    <p:cTn id="3" fill="hold">
+                      <p:stCondLst>
+                        <p:cond delay="indefinite"/>
+                      </p:stCondLst>
+                      <p:childTnLst>
+                        <p:par>
+                          <p:cTn id="4" fill="hold">
+                            <p:stCondLst>
+                              <p:cond delay="0"/>
+                            </p:stCondLst>
+                            <p:childTnLst>
+                              <p:par>
+                                <p:cTn id="5" presetID="1" presetClass="entr" presetSubtype="0" fill="hold" grpId="0" nodeType="clickEffect">
+                                  <p:stCondLst>
+                                    <p:cond delay="0"/>
+                                  </p:stCondLst>
+                                  <p:childTnLst>
+                                    <p:set>
+                                      <p:cBhvr>
+                                        <p:cTn id="6" dur="1" fill="hold">
+                                          <p:stCondLst>
+                                            <p:cond delay="0"/>
+                                          </p:stCondLst>
+                                        </p:cTn>
+                                        <p:tgtEl>
+                                          <p:spTgt spid="3">
+                                            <p:txEl>
+                                              <p:pRg st="0" end="0"/>
+                                            </p:txEl>
+                                          </p:spTgt>
+                                        </p:tgtEl>
+                                        <p:attrNameLst>
+                                          <p:attrName>style.visibility</p:attrName>
+                                        </p:attrNameLst>
+                                      </p:cBhvr>
+                                      <p:to>
+                                        <p:strVal val="visible"/>
+                                      </p:to>
+                                    </p:set>
+                                  </p:childTnLst>
+                                </p:cTn>
+                              </p:par>
+                            </p:childTnLst>
+                          </p:cTn>
+                        </p:par>
+                      </p:childTnLst>
+                    </p:cTn>
+                  </p:par>
+                  <p:par>
+                    <p:cTn id="7" fill="hold">
+                      <p:stCondLst>
+                        <p:cond delay="indefinite"/>
+                      </p:stCondLst>
+                      <p:childTnLst>
+                        <p:par>
+                          <p:cTn id="8" fill="hold">
+                            <p:stCondLst>
+                              <p:cond delay="0"/>
+                            </p:stCondLst>
+                            <p:childTnLst>
+                              <p:par>
+                                <p:cTn id="9" presetID="1" presetClass="entr" presetSubtype="0" fill="hold" grpId="0" nodeType="clickEffect">
+                                  <p:stCondLst>
+                                    <p:cond delay="0"/>
+                                  </p:stCondLst>
+                                  <p:childTnLst>
+                                    <p:set>
+                                      <p:cBhvr>
+                                        <p:cTn id="10" dur="1" fill="hold">
+                                          <p:stCondLst>
+                                            <p:cond delay="0"/>
+                                          </p:stCondLst>
+                                        </p:cTn>
+                                        <p:tgtEl>
+                                          <p:spTgt spid="3">
+                                            <p:txEl>
+                                              <p:pRg st="1" end="1"/>
+                                            </p:txEl>
+                                          </p:spTgt>
+                                        </p:tgtEl>
+                                        <p:attrNameLst>
+                                          <p:attrName>style.visibility</p:attrName>
+                                        </p:attrNameLst>
+                                      </p:cBhvr>
+                                      <p:to>
+                                        <p:strVal val="visible"/>
+                                      </p:to>
+                                    </p:set>
+                                  </p:childTnLst>
+                                </p:cTn>
+                              </p:par>
+                            </p:childTnLst>
+                          </p:cTn>
+                        </p:par>
+                      </p:childTnLst>
+                    </p:cTn>
+                  </p:par>
+                  <p:par>
+                    <p:cTn id="11" fill="hold">
+                      <p:stCondLst>
+                        <p:cond delay="indefinite"/>
+                      </p:stCondLst>
+                      <p:childTnLst>
+                        <p:par>
+                          <p:cTn id="12" fill="hold">
+                            <p:stCondLst>
+                              <p:cond delay="0"/>
+                            </p:stCondLst>
+                            <p:childTnLst>
+                              <p:par>
+                                <p:cTn id="13" presetID="1" presetClass="entr" presetSubtype="0" fill="hold" grpId="0" nodeType="clickEffect">
+                                  <p:stCondLst>
+                                    <p:cond delay="0"/>
+                                  </p:stCondLst>
+                                  <p:childTnLst>
+                                    <p:set>
+                                      <p:cBhvr>
+                                        <p:cTn id="14" dur="1" fill="hold">
+                                          <p:stCondLst>
+                                            <p:cond delay="0"/>
+                                          </p:stCondLst>
+                                        </p:cTn>
+                                        <p:tgtEl>
+                                          <p:spTgt spid="3">
+                                            <p:txEl>
+                                              <p:pRg st="2" end="2"/>
+                                            </p:txEl>
+                                          </p:spTgt>
+                                        </p:tgtEl>
+                                        <p:attrNameLst>
+                                          <p:attrName>style.visibility</p:attrName>
+                                        </p:attrNameLst>
+                                      </p:cBhvr>
+                                      <p:to>
+                                        <p:strVal val="visible"/>
+                                      </p:to>
+                                    </p:set>
+                                  </p:childTnLst>
+                                </p:cTn>
+                              </p:par>
+                            </p:childTnLst>
+                          </p:cTn>
+                        </p:par>
+                      </p:childTnLst>
+                    </p:cTn>
+                  </p:par>
+                  <p:par>
+                    <p:cTn id="15" fill="hold">
+                      <p:stCondLst>
+                        <p:cond delay="indefinite"/>
+                      </p:stCondLst>
+                      <p:childTnLst>
+                        <p:par>
+                          <p:cTn id="16" fill="hold">
+                            <p:stCondLst>
+                              <p:cond delay="0"/>
+                            </p:stCondLst>
+                            <p:childTnLst>
+                              <p:par>
+                                <p:cTn id="17" presetID="1" presetClass="entr" presetSubtype="0" fill="hold" grpId="0" nodeType="clickEffect">
+                                  <p:stCondLst>
+                                    <p:cond delay="0"/>
+                                  </p:stCondLst>
+                                  <p:childTnLst>
+                                    <p:set>
+                                      <p:cBhvr>
+                                        <p:cTn id="18" dur="1" fill="hold">
+                                          <p:stCondLst>
+                                            <p:cond delay="0"/>
+                                          </p:stCondLst>
+                                        </p:cTn>
+                                        <p:tgtEl>
+                                          <p:spTgt spid="3">
+                                            <p:txEl>
+                                              <p:pRg st="3" end="3"/>
+                                            </p:txEl>
+                                          </p:spTgt>
+                                        </p:tgtEl>
+                                        <p:attrNameLst>
+                                          <p:attrName>style.visibility</p:attrName>
+                                        </p:attrNameLst>
+                                      </p:cBhvr>
+                                      <p:to>
+                                        <p:strVal val="visible"/>
+                                      </p:to>
+                                    </p:set>
+                                  </p:childTnLst>
+                                </p:cTn>
+                              </p:par>
+                            </p:childTnLst>
+                          </p:cTn>
+                        </p:par>
+                      </p:childTnLst>
+                    </p:cTn>
+                  </p:par>
+                  <p:par>
+                    <p:cTn id="19" fill="hold">
+                      <p:stCondLst>
+                        <p:cond delay="indefinite"/>
+                      </p:stCondLst>
+                      <p:childTnLst>
+                        <p:par>
+                          <p:cTn id="20" fill="hold">
+                            <p:stCondLst>
+                              <p:cond delay="0"/>
+                            </p:stCondLst>
+                            <p:childTnLst>
+                              <p:par>
+                                <p:cTn id="21" presetID="1" presetClass="entr" presetSubtype="0" fill="hold" grpId="0" nodeType="clickEffect">
+                                  <p:stCondLst>
+                                    <p:cond delay="0"/>
+                                  </p:stCondLst>
+                                  <p:childTnLst>
+                                    <p:set>
+                                      <p:cBhvr>
+                                        <p:cTn id="22" dur="1" fill="hold">
+                                          <p:stCondLst>
+                                            <p:cond delay="0"/>
+                                          </p:stCondLst>
+                                        </p:cTn>
+                                        <p:tgtEl>
+                                          <p:spTgt spid="3">
+                                            <p:txEl>
+                                              <p:pRg st="4" end="4"/>
+                                            </p:txEl>
+                                          </p:spTgt>
+                                        </p:tgtEl>
+                                        <p:attrNameLst>
+                                          <p:attrName>style.visibility</p:attrName>
+                                        </p:attrNameLst>
+                                      </p:cBhvr>
+                                      <p:to>
+                                        <p:strVal val="visible"/>
+                                      </p:to>
+                                    </p:set>
+                                  </p:childTnLst>
+                                </p:cTn>
+                              </p:par>
+                            </p:childTnLst>
+                          </p:cTn>
+                        </p:par>
+                      </p:childTnLst>
+                    </p:cTn>
+                  </p:par>
+                  <p:par>
+                    <p:cTn id="23" fill="hold">
+                      <p:stCondLst>
+                        <p:cond delay="indefinite"/>
+                      </p:stCondLst>
+                      <p:childTnLst>
+                        <p:par>
+                          <p:cTn id="24" fill="hold">
+                            <p:stCondLst>
+                              <p:cond delay="0"/>
+                            </p:stCondLst>
+                            <p:childTnLst>
+                              <p:par>
+                                <p:cTn id="25" presetID="1" presetClass="entr" presetSubtype="0" fill="hold" grpId="0" nodeType="clickEffect">
+                                  <p:stCondLst>
+                                    <p:cond delay="0"/>
+                                  </p:stCondLst>
+                                  <p:childTnLst>
+                                    <p:set>
+                                      <p:cBhvr>
+                                        <p:cTn id="26" dur="1" fill="hold">
+                                          <p:stCondLst>
+                                            <p:cond delay="0"/>
+                                          </p:stCondLst>
+                                        </p:cTn>
+                                        <p:tgtEl>
+                                          <p:spTgt spid="3">
+                                            <p:txEl>
+                                              <p:pRg st="5" end="5"/>
+                                            </p:txEl>
+                                          </p:spTgt>
+                                        </p:tgtEl>
+                                        <p:attrNameLst>
+                                          <p:attrName>style.visibility</p:attrName>
+                                        </p:attrNameLst>
+                                      </p:cBhvr>
+                                      <p:to>
+                                        <p:strVal val="visible"/>
+                                      </p:to>
+                                    </p:set>
+                                  </p:childTnLst>
+                                </p:cTn>
+                              </p:par>
+                            </p:childTnLst>
+                          </p:cTn>
+                        </p:par>
+                      </p:childTnLst>
+                    </p:cTn>
+                  </p:par>
+                </p:childTnLst>
+              </p:cTn>
+              <p:prevCondLst>
+                <p:cond evt="onPrev" delay="0">
+                  <p:tgtEl>
+                    <p:sldTgt/>
+                  </p:tgtEl>
+                </p:cond>
+              </p:prevCondLst>
+              <p:nextCondLst>
+                <p:cond evt="onNext" delay="0">
+                  <p:tgtEl>
+                    <p:sldTgt/>
+                  </p:tgtEl>
+                </p:cond>
+              </p:nextCondLst>
+            </p:seq>
+          </p:childTnLst>
+        </p:cTn>
+      </p:par>
+    </p:tnLst>
+    <p:bldLst>
+      <p:bldP spid="3" grpId="0" uiExpand="1" build="p"/>
+    </p:bldLst>
+  </p:timing>
+</p:sld>
+</file>
+
+<file path=ppt/slides/slide11.xml><?xml version="1.0" encoding="utf-8"?>
+<p:sld xmlns:a="http://schemas.openxmlformats.org/drawingml/2006/main" xmlns:r="http://schemas.openxmlformats.org/officeDocument/2006/relationships" xmlns:p="http://schemas.openxmlformats.org/presentationml/2006/main">
+  <p:cSld>
+    <p:spTree>
+      <p:nvGrpSpPr>
+        <p:cNvPr id="1" name=""/>
+        <p:cNvGrpSpPr/>
+        <p:nvPr/>
+      </p:nvGrpSpPr>
+      <p:grpSpPr>
+        <a:xfrm>
+          <a:off x="0" y="0"/>
+          <a:ext cx="0" cy="0"/>
+          <a:chOff x="0" y="0"/>
+          <a:chExt cx="0" cy="0"/>
+        </a:xfrm>
+      </p:grpSpPr>
+      <p:sp>
+        <p:nvSpPr>
+          <p:cNvPr id="2" name="Title 1"/>
+          <p:cNvSpPr>
+            <a:spLocks noGrp="1"/>
+          </p:cNvSpPr>
+          <p:nvPr>
+            <p:ph type="title"/>
+          </p:nvPr>
+        </p:nvSpPr>
+        <p:spPr/>
+        <p:txBody>
+          <a:bodyPr/>
+          <a:lstStyle/>
+          <a:p>
+            <a:pPr lvl="0" indent="0" marL="0">
+              <a:buNone/>
+            </a:pPr>
+            <a:r>
+              <a:rPr/>
               <a:t>정적 데이터와 동적 데이터</a:t>
             </a:r>
           </a:p>
@@ -4283,7 +4721,7 @@
 </p:sld>
 </file>
 
-<file path=ppt/slides/slide11.xml><?xml version="1.0" encoding="utf-8"?>
+<file path=ppt/slides/slide12.xml><?xml version="1.0" encoding="utf-8"?>
 <p:sld xmlns:a="http://schemas.openxmlformats.org/drawingml/2006/main" xmlns:r="http://schemas.openxmlformats.org/officeDocument/2006/relationships" xmlns:p="http://schemas.openxmlformats.org/presentationml/2006/main">
   <p:cSld>
     <p:spTree>
@@ -4685,7 +5123,7 @@
 </p:sld>
 </file>
 
-<file path=ppt/slides/slide12.xml><?xml version="1.0" encoding="utf-8"?>
+<file path=ppt/slides/slide13.xml><?xml version="1.0" encoding="utf-8"?>
 <p:sld xmlns:a="http://schemas.openxmlformats.org/drawingml/2006/main" xmlns:r="http://schemas.openxmlformats.org/officeDocument/2006/relationships" xmlns:p="http://schemas.openxmlformats.org/presentationml/2006/main">
   <p:cSld>
     <p:spTree>
@@ -5217,6 +5655,2270 @@
                                           <p:spTgt spid="3">
                                             <p:txEl>
                                               <p:pRg st="7" end="7"/>
+                                            </p:txEl>
+                                          </p:spTgt>
+                                        </p:tgtEl>
+                                        <p:attrNameLst>
+                                          <p:attrName>style.visibility</p:attrName>
+                                        </p:attrNameLst>
+                                      </p:cBhvr>
+                                      <p:to>
+                                        <p:strVal val="visible"/>
+                                      </p:to>
+                                    </p:set>
+                                  </p:childTnLst>
+                                </p:cTn>
+                              </p:par>
+                            </p:childTnLst>
+                          </p:cTn>
+                        </p:par>
+                      </p:childTnLst>
+                    </p:cTn>
+                  </p:par>
+                </p:childTnLst>
+              </p:cTn>
+              <p:prevCondLst>
+                <p:cond evt="onPrev" delay="0">
+                  <p:tgtEl>
+                    <p:sldTgt/>
+                  </p:tgtEl>
+                </p:cond>
+              </p:prevCondLst>
+              <p:nextCondLst>
+                <p:cond evt="onNext" delay="0">
+                  <p:tgtEl>
+                    <p:sldTgt/>
+                  </p:tgtEl>
+                </p:cond>
+              </p:nextCondLst>
+            </p:seq>
+          </p:childTnLst>
+        </p:cTn>
+      </p:par>
+    </p:tnLst>
+    <p:bldLst>
+      <p:bldP spid="3" grpId="0" uiExpand="1" build="p"/>
+    </p:bldLst>
+  </p:timing>
+</p:sld>
+</file>
+
+<file path=ppt/slides/slide14.xml><?xml version="1.0" encoding="utf-8"?>
+<p:sld xmlns:a="http://schemas.openxmlformats.org/drawingml/2006/main" xmlns:r="http://schemas.openxmlformats.org/officeDocument/2006/relationships" xmlns:p="http://schemas.openxmlformats.org/presentationml/2006/main">
+  <p:cSld>
+    <p:spTree>
+      <p:nvGrpSpPr>
+        <p:cNvPr id="1" name=""/>
+        <p:cNvGrpSpPr/>
+        <p:nvPr/>
+      </p:nvGrpSpPr>
+      <p:grpSpPr>
+        <a:xfrm>
+          <a:off x="0" y="0"/>
+          <a:ext cx="0" cy="0"/>
+          <a:chOff x="0" y="0"/>
+          <a:chExt cx="0" cy="0"/>
+        </a:xfrm>
+      </p:grpSpPr>
+      <p:sp>
+        <p:nvSpPr>
+          <p:cNvPr id="2" name="Title 1"/>
+          <p:cNvSpPr>
+            <a:spLocks noGrp="1"/>
+          </p:cNvSpPr>
+          <p:nvPr>
+            <p:ph type="title"/>
+          </p:nvPr>
+        </p:nvSpPr>
+        <p:spPr/>
+        <p:txBody>
+          <a:bodyPr/>
+          <a:lstStyle/>
+          <a:p>
+            <a:pPr lvl="0" indent="0" marL="0">
+              <a:buNone/>
+            </a:pPr>
+            <a:r>
+              <a:rPr/>
+              <a:t>데이터 바인딩 (Data Binding)</a:t>
+            </a:r>
+          </a:p>
+        </p:txBody>
+      </p:sp>
+      <p:sp>
+        <p:nvSpPr>
+          <p:cNvPr id="3" name="Content Placeholder 2"/>
+          <p:cNvSpPr>
+            <a:spLocks noGrp="1"/>
+          </p:cNvSpPr>
+          <p:nvPr>
+            <p:ph idx="1"/>
+          </p:nvPr>
+        </p:nvSpPr>
+        <p:spPr/>
+        <p:txBody>
+          <a:bodyPr/>
+          <a:lstStyle/>
+          <a:p>
+            <a:pPr lvl="0"/>
+            <a:r>
+              <a:rPr/>
+              <a:t>Data Binding</a:t>
+            </a:r>
+          </a:p>
+          <a:p>
+            <a:pPr lvl="1"/>
+            <a:r>
+              <a:rPr/>
+              <a:t>데이터 = 값 (타입을 가지고 있는 정보)</a:t>
+            </a:r>
+          </a:p>
+          <a:p>
+            <a:pPr lvl="1"/>
+            <a:r>
+              <a:rPr/>
+              <a:t>Bind, 묶다</a:t>
+            </a:r>
+          </a:p>
+          <a:p>
+            <a:pPr lvl="1"/>
+            <a:r>
+              <a:rPr/>
+              <a:t>시각 요소(UI)에 데이터를 매달아 둔다.</a:t>
+            </a:r>
+          </a:p>
+          <a:p>
+            <a:pPr lvl="0"/>
+            <a:r>
+              <a:rPr/>
+              <a:t>데이터를 변경하면 시각 요소가 따라간다.</a:t>
+            </a:r>
+          </a:p>
+          <a:p>
+            <a:pPr lvl="1"/>
+            <a:r>
+              <a:rPr/>
+              <a:t>리액티브(Reactive)</a:t>
+            </a:r>
+          </a:p>
+          <a:p>
+            <a:pPr lvl="2"/>
+            <a:r>
+              <a:rPr/>
+              <a:t>&lt;-&gt; 리스폰시브(Responsive), 반응형</a:t>
+            </a:r>
+          </a:p>
+          <a:p>
+            <a:pPr lvl="2"/>
+            <a:r>
+              <a:rPr/>
+              <a:t>데이터의 실시간성.</a:t>
+            </a:r>
+          </a:p>
+          <a:p>
+            <a:pPr lvl="2"/>
+            <a:r>
+              <a:rPr/>
+              <a:t>React.js, 리액티브 UI</a:t>
+            </a:r>
+          </a:p>
+          <a:p>
+            <a:pPr lvl="1"/>
+            <a:r>
+              <a:rPr/>
+              <a:t>데이터의 변화를 실시간으로 추적하고 있다가, 값이 달라지면 그 때 UI를 새로 그림</a:t>
+            </a:r>
+          </a:p>
+        </p:txBody>
+      </p:sp>
+    </p:spTree>
+  </p:cSld>
+  <p:timing>
+    <p:tnLst>
+      <p:par>
+        <p:cTn id="1" dur="indefinite" restart="never" nodeType="tmRoot">
+          <p:childTnLst>
+            <p:seq concurrent="1" nextAc="seek">
+              <p:cTn id="2" dur="indefinite" nodeType="mainSeq">
+                <p:childTnLst>
+                  <p:par>
+                    <p:cTn id="3" fill="hold">
+                      <p:stCondLst>
+                        <p:cond delay="indefinite"/>
+                      </p:stCondLst>
+                      <p:childTnLst>
+                        <p:par>
+                          <p:cTn id="4" fill="hold">
+                            <p:stCondLst>
+                              <p:cond delay="0"/>
+                            </p:stCondLst>
+                            <p:childTnLst>
+                              <p:par>
+                                <p:cTn id="5" presetID="1" presetClass="entr" presetSubtype="0" fill="hold" grpId="0" nodeType="clickEffect">
+                                  <p:stCondLst>
+                                    <p:cond delay="0"/>
+                                  </p:stCondLst>
+                                  <p:childTnLst>
+                                    <p:set>
+                                      <p:cBhvr>
+                                        <p:cTn id="6" dur="1" fill="hold">
+                                          <p:stCondLst>
+                                            <p:cond delay="0"/>
+                                          </p:stCondLst>
+                                        </p:cTn>
+                                        <p:tgtEl>
+                                          <p:spTgt spid="3">
+                                            <p:txEl>
+                                              <p:pRg st="0" end="0"/>
+                                            </p:txEl>
+                                          </p:spTgt>
+                                        </p:tgtEl>
+                                        <p:attrNameLst>
+                                          <p:attrName>style.visibility</p:attrName>
+                                        </p:attrNameLst>
+                                      </p:cBhvr>
+                                      <p:to>
+                                        <p:strVal val="visible"/>
+                                      </p:to>
+                                    </p:set>
+                                  </p:childTnLst>
+                                </p:cTn>
+                              </p:par>
+                            </p:childTnLst>
+                          </p:cTn>
+                        </p:par>
+                      </p:childTnLst>
+                    </p:cTn>
+                  </p:par>
+                  <p:par>
+                    <p:cTn id="7" fill="hold">
+                      <p:stCondLst>
+                        <p:cond delay="indefinite"/>
+                      </p:stCondLst>
+                      <p:childTnLst>
+                        <p:par>
+                          <p:cTn id="8" fill="hold">
+                            <p:stCondLst>
+                              <p:cond delay="0"/>
+                            </p:stCondLst>
+                            <p:childTnLst>
+                              <p:par>
+                                <p:cTn id="9" presetID="1" presetClass="entr" presetSubtype="0" fill="hold" grpId="0" nodeType="clickEffect">
+                                  <p:stCondLst>
+                                    <p:cond delay="0"/>
+                                  </p:stCondLst>
+                                  <p:childTnLst>
+                                    <p:set>
+                                      <p:cBhvr>
+                                        <p:cTn id="10" dur="1" fill="hold">
+                                          <p:stCondLst>
+                                            <p:cond delay="0"/>
+                                          </p:stCondLst>
+                                        </p:cTn>
+                                        <p:tgtEl>
+                                          <p:spTgt spid="3">
+                                            <p:txEl>
+                                              <p:pRg st="1" end="1"/>
+                                            </p:txEl>
+                                          </p:spTgt>
+                                        </p:tgtEl>
+                                        <p:attrNameLst>
+                                          <p:attrName>style.visibility</p:attrName>
+                                        </p:attrNameLst>
+                                      </p:cBhvr>
+                                      <p:to>
+                                        <p:strVal val="visible"/>
+                                      </p:to>
+                                    </p:set>
+                                  </p:childTnLst>
+                                </p:cTn>
+                              </p:par>
+                            </p:childTnLst>
+                          </p:cTn>
+                        </p:par>
+                      </p:childTnLst>
+                    </p:cTn>
+                  </p:par>
+                  <p:par>
+                    <p:cTn id="11" fill="hold">
+                      <p:stCondLst>
+                        <p:cond delay="indefinite"/>
+                      </p:stCondLst>
+                      <p:childTnLst>
+                        <p:par>
+                          <p:cTn id="12" fill="hold">
+                            <p:stCondLst>
+                              <p:cond delay="0"/>
+                            </p:stCondLst>
+                            <p:childTnLst>
+                              <p:par>
+                                <p:cTn id="13" presetID="1" presetClass="entr" presetSubtype="0" fill="hold" grpId="0" nodeType="clickEffect">
+                                  <p:stCondLst>
+                                    <p:cond delay="0"/>
+                                  </p:stCondLst>
+                                  <p:childTnLst>
+                                    <p:set>
+                                      <p:cBhvr>
+                                        <p:cTn id="14" dur="1" fill="hold">
+                                          <p:stCondLst>
+                                            <p:cond delay="0"/>
+                                          </p:stCondLst>
+                                        </p:cTn>
+                                        <p:tgtEl>
+                                          <p:spTgt spid="3">
+                                            <p:txEl>
+                                              <p:pRg st="2" end="2"/>
+                                            </p:txEl>
+                                          </p:spTgt>
+                                        </p:tgtEl>
+                                        <p:attrNameLst>
+                                          <p:attrName>style.visibility</p:attrName>
+                                        </p:attrNameLst>
+                                      </p:cBhvr>
+                                      <p:to>
+                                        <p:strVal val="visible"/>
+                                      </p:to>
+                                    </p:set>
+                                  </p:childTnLst>
+                                </p:cTn>
+                              </p:par>
+                            </p:childTnLst>
+                          </p:cTn>
+                        </p:par>
+                      </p:childTnLst>
+                    </p:cTn>
+                  </p:par>
+                  <p:par>
+                    <p:cTn id="15" fill="hold">
+                      <p:stCondLst>
+                        <p:cond delay="indefinite"/>
+                      </p:stCondLst>
+                      <p:childTnLst>
+                        <p:par>
+                          <p:cTn id="16" fill="hold">
+                            <p:stCondLst>
+                              <p:cond delay="0"/>
+                            </p:stCondLst>
+                            <p:childTnLst>
+                              <p:par>
+                                <p:cTn id="17" presetID="1" presetClass="entr" presetSubtype="0" fill="hold" grpId="0" nodeType="clickEffect">
+                                  <p:stCondLst>
+                                    <p:cond delay="0"/>
+                                  </p:stCondLst>
+                                  <p:childTnLst>
+                                    <p:set>
+                                      <p:cBhvr>
+                                        <p:cTn id="18" dur="1" fill="hold">
+                                          <p:stCondLst>
+                                            <p:cond delay="0"/>
+                                          </p:stCondLst>
+                                        </p:cTn>
+                                        <p:tgtEl>
+                                          <p:spTgt spid="3">
+                                            <p:txEl>
+                                              <p:pRg st="3" end="3"/>
+                                            </p:txEl>
+                                          </p:spTgt>
+                                        </p:tgtEl>
+                                        <p:attrNameLst>
+                                          <p:attrName>style.visibility</p:attrName>
+                                        </p:attrNameLst>
+                                      </p:cBhvr>
+                                      <p:to>
+                                        <p:strVal val="visible"/>
+                                      </p:to>
+                                    </p:set>
+                                  </p:childTnLst>
+                                </p:cTn>
+                              </p:par>
+                            </p:childTnLst>
+                          </p:cTn>
+                        </p:par>
+                      </p:childTnLst>
+                    </p:cTn>
+                  </p:par>
+                  <p:par>
+                    <p:cTn id="19" fill="hold">
+                      <p:stCondLst>
+                        <p:cond delay="indefinite"/>
+                      </p:stCondLst>
+                      <p:childTnLst>
+                        <p:par>
+                          <p:cTn id="20" fill="hold">
+                            <p:stCondLst>
+                              <p:cond delay="0"/>
+                            </p:stCondLst>
+                            <p:childTnLst>
+                              <p:par>
+                                <p:cTn id="21" presetID="1" presetClass="entr" presetSubtype="0" fill="hold" grpId="0" nodeType="clickEffect">
+                                  <p:stCondLst>
+                                    <p:cond delay="0"/>
+                                  </p:stCondLst>
+                                  <p:childTnLst>
+                                    <p:set>
+                                      <p:cBhvr>
+                                        <p:cTn id="22" dur="1" fill="hold">
+                                          <p:stCondLst>
+                                            <p:cond delay="0"/>
+                                          </p:stCondLst>
+                                        </p:cTn>
+                                        <p:tgtEl>
+                                          <p:spTgt spid="3">
+                                            <p:txEl>
+                                              <p:pRg st="4" end="4"/>
+                                            </p:txEl>
+                                          </p:spTgt>
+                                        </p:tgtEl>
+                                        <p:attrNameLst>
+                                          <p:attrName>style.visibility</p:attrName>
+                                        </p:attrNameLst>
+                                      </p:cBhvr>
+                                      <p:to>
+                                        <p:strVal val="visible"/>
+                                      </p:to>
+                                    </p:set>
+                                  </p:childTnLst>
+                                </p:cTn>
+                              </p:par>
+                            </p:childTnLst>
+                          </p:cTn>
+                        </p:par>
+                      </p:childTnLst>
+                    </p:cTn>
+                  </p:par>
+                  <p:par>
+                    <p:cTn id="23" fill="hold">
+                      <p:stCondLst>
+                        <p:cond delay="indefinite"/>
+                      </p:stCondLst>
+                      <p:childTnLst>
+                        <p:par>
+                          <p:cTn id="24" fill="hold">
+                            <p:stCondLst>
+                              <p:cond delay="0"/>
+                            </p:stCondLst>
+                            <p:childTnLst>
+                              <p:par>
+                                <p:cTn id="25" presetID="1" presetClass="entr" presetSubtype="0" fill="hold" grpId="0" nodeType="clickEffect">
+                                  <p:stCondLst>
+                                    <p:cond delay="0"/>
+                                  </p:stCondLst>
+                                  <p:childTnLst>
+                                    <p:set>
+                                      <p:cBhvr>
+                                        <p:cTn id="26" dur="1" fill="hold">
+                                          <p:stCondLst>
+                                            <p:cond delay="0"/>
+                                          </p:stCondLst>
+                                        </p:cTn>
+                                        <p:tgtEl>
+                                          <p:spTgt spid="3">
+                                            <p:txEl>
+                                              <p:pRg st="5" end="5"/>
+                                            </p:txEl>
+                                          </p:spTgt>
+                                        </p:tgtEl>
+                                        <p:attrNameLst>
+                                          <p:attrName>style.visibility</p:attrName>
+                                        </p:attrNameLst>
+                                      </p:cBhvr>
+                                      <p:to>
+                                        <p:strVal val="visible"/>
+                                      </p:to>
+                                    </p:set>
+                                  </p:childTnLst>
+                                </p:cTn>
+                              </p:par>
+                            </p:childTnLst>
+                          </p:cTn>
+                        </p:par>
+                      </p:childTnLst>
+                    </p:cTn>
+                  </p:par>
+                  <p:par>
+                    <p:cTn id="27" fill="hold">
+                      <p:stCondLst>
+                        <p:cond delay="indefinite"/>
+                      </p:stCondLst>
+                      <p:childTnLst>
+                        <p:par>
+                          <p:cTn id="28" fill="hold">
+                            <p:stCondLst>
+                              <p:cond delay="0"/>
+                            </p:stCondLst>
+                            <p:childTnLst>
+                              <p:par>
+                                <p:cTn id="29" presetID="1" presetClass="entr" presetSubtype="0" fill="hold" grpId="0" nodeType="clickEffect">
+                                  <p:stCondLst>
+                                    <p:cond delay="0"/>
+                                  </p:stCondLst>
+                                  <p:childTnLst>
+                                    <p:set>
+                                      <p:cBhvr>
+                                        <p:cTn id="30" dur="1" fill="hold">
+                                          <p:stCondLst>
+                                            <p:cond delay="0"/>
+                                          </p:stCondLst>
+                                        </p:cTn>
+                                        <p:tgtEl>
+                                          <p:spTgt spid="3">
+                                            <p:txEl>
+                                              <p:pRg st="6" end="6"/>
+                                            </p:txEl>
+                                          </p:spTgt>
+                                        </p:tgtEl>
+                                        <p:attrNameLst>
+                                          <p:attrName>style.visibility</p:attrName>
+                                        </p:attrNameLst>
+                                      </p:cBhvr>
+                                      <p:to>
+                                        <p:strVal val="visible"/>
+                                      </p:to>
+                                    </p:set>
+                                  </p:childTnLst>
+                                </p:cTn>
+                              </p:par>
+                            </p:childTnLst>
+                          </p:cTn>
+                        </p:par>
+                      </p:childTnLst>
+                    </p:cTn>
+                  </p:par>
+                  <p:par>
+                    <p:cTn id="31" fill="hold">
+                      <p:stCondLst>
+                        <p:cond delay="indefinite"/>
+                      </p:stCondLst>
+                      <p:childTnLst>
+                        <p:par>
+                          <p:cTn id="32" fill="hold">
+                            <p:stCondLst>
+                              <p:cond delay="0"/>
+                            </p:stCondLst>
+                            <p:childTnLst>
+                              <p:par>
+                                <p:cTn id="33" presetID="1" presetClass="entr" presetSubtype="0" fill="hold" grpId="0" nodeType="clickEffect">
+                                  <p:stCondLst>
+                                    <p:cond delay="0"/>
+                                  </p:stCondLst>
+                                  <p:childTnLst>
+                                    <p:set>
+                                      <p:cBhvr>
+                                        <p:cTn id="34" dur="1" fill="hold">
+                                          <p:stCondLst>
+                                            <p:cond delay="0"/>
+                                          </p:stCondLst>
+                                        </p:cTn>
+                                        <p:tgtEl>
+                                          <p:spTgt spid="3">
+                                            <p:txEl>
+                                              <p:pRg st="7" end="7"/>
+                                            </p:txEl>
+                                          </p:spTgt>
+                                        </p:tgtEl>
+                                        <p:attrNameLst>
+                                          <p:attrName>style.visibility</p:attrName>
+                                        </p:attrNameLst>
+                                      </p:cBhvr>
+                                      <p:to>
+                                        <p:strVal val="visible"/>
+                                      </p:to>
+                                    </p:set>
+                                  </p:childTnLst>
+                                </p:cTn>
+                              </p:par>
+                            </p:childTnLst>
+                          </p:cTn>
+                        </p:par>
+                      </p:childTnLst>
+                    </p:cTn>
+                  </p:par>
+                  <p:par>
+                    <p:cTn id="35" fill="hold">
+                      <p:stCondLst>
+                        <p:cond delay="indefinite"/>
+                      </p:stCondLst>
+                      <p:childTnLst>
+                        <p:par>
+                          <p:cTn id="36" fill="hold">
+                            <p:stCondLst>
+                              <p:cond delay="0"/>
+                            </p:stCondLst>
+                            <p:childTnLst>
+                              <p:par>
+                                <p:cTn id="37" presetID="1" presetClass="entr" presetSubtype="0" fill="hold" grpId="0" nodeType="clickEffect">
+                                  <p:stCondLst>
+                                    <p:cond delay="0"/>
+                                  </p:stCondLst>
+                                  <p:childTnLst>
+                                    <p:set>
+                                      <p:cBhvr>
+                                        <p:cTn id="38" dur="1" fill="hold">
+                                          <p:stCondLst>
+                                            <p:cond delay="0"/>
+                                          </p:stCondLst>
+                                        </p:cTn>
+                                        <p:tgtEl>
+                                          <p:spTgt spid="3">
+                                            <p:txEl>
+                                              <p:pRg st="8" end="8"/>
+                                            </p:txEl>
+                                          </p:spTgt>
+                                        </p:tgtEl>
+                                        <p:attrNameLst>
+                                          <p:attrName>style.visibility</p:attrName>
+                                        </p:attrNameLst>
+                                      </p:cBhvr>
+                                      <p:to>
+                                        <p:strVal val="visible"/>
+                                      </p:to>
+                                    </p:set>
+                                  </p:childTnLst>
+                                </p:cTn>
+                              </p:par>
+                            </p:childTnLst>
+                          </p:cTn>
+                        </p:par>
+                      </p:childTnLst>
+                    </p:cTn>
+                  </p:par>
+                  <p:par>
+                    <p:cTn id="39" fill="hold">
+                      <p:stCondLst>
+                        <p:cond delay="indefinite"/>
+                      </p:stCondLst>
+                      <p:childTnLst>
+                        <p:par>
+                          <p:cTn id="40" fill="hold">
+                            <p:stCondLst>
+                              <p:cond delay="0"/>
+                            </p:stCondLst>
+                            <p:childTnLst>
+                              <p:par>
+                                <p:cTn id="41" presetID="1" presetClass="entr" presetSubtype="0" fill="hold" grpId="0" nodeType="clickEffect">
+                                  <p:stCondLst>
+                                    <p:cond delay="0"/>
+                                  </p:stCondLst>
+                                  <p:childTnLst>
+                                    <p:set>
+                                      <p:cBhvr>
+                                        <p:cTn id="42" dur="1" fill="hold">
+                                          <p:stCondLst>
+                                            <p:cond delay="0"/>
+                                          </p:stCondLst>
+                                        </p:cTn>
+                                        <p:tgtEl>
+                                          <p:spTgt spid="3">
+                                            <p:txEl>
+                                              <p:pRg st="9" end="9"/>
+                                            </p:txEl>
+                                          </p:spTgt>
+                                        </p:tgtEl>
+                                        <p:attrNameLst>
+                                          <p:attrName>style.visibility</p:attrName>
+                                        </p:attrNameLst>
+                                      </p:cBhvr>
+                                      <p:to>
+                                        <p:strVal val="visible"/>
+                                      </p:to>
+                                    </p:set>
+                                  </p:childTnLst>
+                                </p:cTn>
+                              </p:par>
+                            </p:childTnLst>
+                          </p:cTn>
+                        </p:par>
+                      </p:childTnLst>
+                    </p:cTn>
+                  </p:par>
+                </p:childTnLst>
+              </p:cTn>
+              <p:prevCondLst>
+                <p:cond evt="onPrev" delay="0">
+                  <p:tgtEl>
+                    <p:sldTgt/>
+                  </p:tgtEl>
+                </p:cond>
+              </p:prevCondLst>
+              <p:nextCondLst>
+                <p:cond evt="onNext" delay="0">
+                  <p:tgtEl>
+                    <p:sldTgt/>
+                  </p:tgtEl>
+                </p:cond>
+              </p:nextCondLst>
+            </p:seq>
+          </p:childTnLst>
+        </p:cTn>
+      </p:par>
+    </p:tnLst>
+    <p:bldLst>
+      <p:bldP spid="3" grpId="0" uiExpand="1" build="p"/>
+    </p:bldLst>
+  </p:timing>
+</p:sld>
+</file>
+
+<file path=ppt/slides/slide15.xml><?xml version="1.0" encoding="utf-8"?>
+<p:sld xmlns:a="http://schemas.openxmlformats.org/drawingml/2006/main" xmlns:r="http://schemas.openxmlformats.org/officeDocument/2006/relationships" xmlns:p="http://schemas.openxmlformats.org/presentationml/2006/main">
+  <p:cSld>
+    <p:spTree>
+      <p:nvGrpSpPr>
+        <p:cNvPr id="1" name=""/>
+        <p:cNvGrpSpPr/>
+        <p:nvPr/>
+      </p:nvGrpSpPr>
+      <p:grpSpPr>
+        <a:xfrm>
+          <a:off x="0" y="0"/>
+          <a:ext cx="0" cy="0"/>
+          <a:chOff x="0" y="0"/>
+          <a:chExt cx="0" cy="0"/>
+        </a:xfrm>
+      </p:grpSpPr>
+      <p:sp>
+        <p:nvSpPr>
+          <p:cNvPr id="3" name="Content Placeholder 2"/>
+          <p:cNvSpPr>
+            <a:spLocks noGrp="1"/>
+          </p:cNvSpPr>
+          <p:nvPr>
+            <p:ph idx="1"/>
+          </p:nvPr>
+        </p:nvSpPr>
+        <p:spPr/>
+        <p:txBody>
+          <a:bodyPr/>
+          <a:lstStyle/>
+          <a:p>
+            <a:pPr lvl="0"/>
+            <a:r>
+              <a:rPr/>
+              <a:t>버블에서는 그룹에 데이터를 묶어둘 수 있다.</a:t>
+            </a:r>
+          </a:p>
+          <a:p>
+            <a:pPr lvl="1"/>
+            <a:r>
+              <a:rPr>
+                <a:latin typeface="Courier"/>
+              </a:rPr>
+              <a:t>Element Actions</a:t>
+            </a:r>
+            <a:r>
+              <a:rPr/>
+              <a:t> - </a:t>
+            </a:r>
+            <a:r>
+              <a:rPr>
+                <a:latin typeface="Courier"/>
+              </a:rPr>
+              <a:t>Display Data</a:t>
+            </a:r>
+          </a:p>
+          <a:p>
+            <a:pPr lvl="1"/>
+            <a:r>
+              <a:rPr/>
+              <a:t>그룹은 다른 엘리먼트와 그룹을 담을 수 있어 위계 구조를 표현할 수 있기 때문에 데이터의 형태(프로퍼티를 사용한 위계구조)를 그대로 모방할 수 있게 된다.</a:t>
+            </a:r>
+          </a:p>
+          <a:p>
+            <a:pPr lvl="2"/>
+            <a:r>
+              <a:rPr/>
+              <a:t>데이터의 형식과 UI의 형태를 일치시키는 것은 유지보수나 히스토리에 대한 의존성을 낮추므로 권장됨.</a:t>
+            </a:r>
+          </a:p>
+        </p:txBody>
+      </p:sp>
+    </p:spTree>
+  </p:cSld>
+  <p:timing>
+    <p:tnLst>
+      <p:par>
+        <p:cTn id="1" dur="indefinite" restart="never" nodeType="tmRoot">
+          <p:childTnLst>
+            <p:seq concurrent="1" nextAc="seek">
+              <p:cTn id="2" dur="indefinite" nodeType="mainSeq">
+                <p:childTnLst>
+                  <p:par>
+                    <p:cTn id="3" fill="hold">
+                      <p:stCondLst>
+                        <p:cond delay="indefinite"/>
+                      </p:stCondLst>
+                      <p:childTnLst>
+                        <p:par>
+                          <p:cTn id="4" fill="hold">
+                            <p:stCondLst>
+                              <p:cond delay="0"/>
+                            </p:stCondLst>
+                            <p:childTnLst>
+                              <p:par>
+                                <p:cTn id="5" presetID="1" presetClass="entr" presetSubtype="0" fill="hold" grpId="0" nodeType="clickEffect">
+                                  <p:stCondLst>
+                                    <p:cond delay="0"/>
+                                  </p:stCondLst>
+                                  <p:childTnLst>
+                                    <p:set>
+                                      <p:cBhvr>
+                                        <p:cTn id="6" dur="1" fill="hold">
+                                          <p:stCondLst>
+                                            <p:cond delay="0"/>
+                                          </p:stCondLst>
+                                        </p:cTn>
+                                        <p:tgtEl>
+                                          <p:spTgt spid="3">
+                                            <p:txEl>
+                                              <p:pRg st="0" end="0"/>
+                                            </p:txEl>
+                                          </p:spTgt>
+                                        </p:tgtEl>
+                                        <p:attrNameLst>
+                                          <p:attrName>style.visibility</p:attrName>
+                                        </p:attrNameLst>
+                                      </p:cBhvr>
+                                      <p:to>
+                                        <p:strVal val="visible"/>
+                                      </p:to>
+                                    </p:set>
+                                  </p:childTnLst>
+                                </p:cTn>
+                              </p:par>
+                            </p:childTnLst>
+                          </p:cTn>
+                        </p:par>
+                      </p:childTnLst>
+                    </p:cTn>
+                  </p:par>
+                  <p:par>
+                    <p:cTn id="7" fill="hold">
+                      <p:stCondLst>
+                        <p:cond delay="indefinite"/>
+                      </p:stCondLst>
+                      <p:childTnLst>
+                        <p:par>
+                          <p:cTn id="8" fill="hold">
+                            <p:stCondLst>
+                              <p:cond delay="0"/>
+                            </p:stCondLst>
+                            <p:childTnLst>
+                              <p:par>
+                                <p:cTn id="9" presetID="1" presetClass="entr" presetSubtype="0" fill="hold" grpId="0" nodeType="clickEffect">
+                                  <p:stCondLst>
+                                    <p:cond delay="0"/>
+                                  </p:stCondLst>
+                                  <p:childTnLst>
+                                    <p:set>
+                                      <p:cBhvr>
+                                        <p:cTn id="10" dur="1" fill="hold">
+                                          <p:stCondLst>
+                                            <p:cond delay="0"/>
+                                          </p:stCondLst>
+                                        </p:cTn>
+                                        <p:tgtEl>
+                                          <p:spTgt spid="3">
+                                            <p:txEl>
+                                              <p:pRg st="1" end="1"/>
+                                            </p:txEl>
+                                          </p:spTgt>
+                                        </p:tgtEl>
+                                        <p:attrNameLst>
+                                          <p:attrName>style.visibility</p:attrName>
+                                        </p:attrNameLst>
+                                      </p:cBhvr>
+                                      <p:to>
+                                        <p:strVal val="visible"/>
+                                      </p:to>
+                                    </p:set>
+                                  </p:childTnLst>
+                                </p:cTn>
+                              </p:par>
+                            </p:childTnLst>
+                          </p:cTn>
+                        </p:par>
+                      </p:childTnLst>
+                    </p:cTn>
+                  </p:par>
+                  <p:par>
+                    <p:cTn id="11" fill="hold">
+                      <p:stCondLst>
+                        <p:cond delay="indefinite"/>
+                      </p:stCondLst>
+                      <p:childTnLst>
+                        <p:par>
+                          <p:cTn id="12" fill="hold">
+                            <p:stCondLst>
+                              <p:cond delay="0"/>
+                            </p:stCondLst>
+                            <p:childTnLst>
+                              <p:par>
+                                <p:cTn id="13" presetID="1" presetClass="entr" presetSubtype="0" fill="hold" grpId="0" nodeType="clickEffect">
+                                  <p:stCondLst>
+                                    <p:cond delay="0"/>
+                                  </p:stCondLst>
+                                  <p:childTnLst>
+                                    <p:set>
+                                      <p:cBhvr>
+                                        <p:cTn id="14" dur="1" fill="hold">
+                                          <p:stCondLst>
+                                            <p:cond delay="0"/>
+                                          </p:stCondLst>
+                                        </p:cTn>
+                                        <p:tgtEl>
+                                          <p:spTgt spid="3">
+                                            <p:txEl>
+                                              <p:pRg st="2" end="2"/>
+                                            </p:txEl>
+                                          </p:spTgt>
+                                        </p:tgtEl>
+                                        <p:attrNameLst>
+                                          <p:attrName>style.visibility</p:attrName>
+                                        </p:attrNameLst>
+                                      </p:cBhvr>
+                                      <p:to>
+                                        <p:strVal val="visible"/>
+                                      </p:to>
+                                    </p:set>
+                                  </p:childTnLst>
+                                </p:cTn>
+                              </p:par>
+                            </p:childTnLst>
+                          </p:cTn>
+                        </p:par>
+                      </p:childTnLst>
+                    </p:cTn>
+                  </p:par>
+                  <p:par>
+                    <p:cTn id="15" fill="hold">
+                      <p:stCondLst>
+                        <p:cond delay="indefinite"/>
+                      </p:stCondLst>
+                      <p:childTnLst>
+                        <p:par>
+                          <p:cTn id="16" fill="hold">
+                            <p:stCondLst>
+                              <p:cond delay="0"/>
+                            </p:stCondLst>
+                            <p:childTnLst>
+                              <p:par>
+                                <p:cTn id="17" presetID="1" presetClass="entr" presetSubtype="0" fill="hold" grpId="0" nodeType="clickEffect">
+                                  <p:stCondLst>
+                                    <p:cond delay="0"/>
+                                  </p:stCondLst>
+                                  <p:childTnLst>
+                                    <p:set>
+                                      <p:cBhvr>
+                                        <p:cTn id="18" dur="1" fill="hold">
+                                          <p:stCondLst>
+                                            <p:cond delay="0"/>
+                                          </p:stCondLst>
+                                        </p:cTn>
+                                        <p:tgtEl>
+                                          <p:spTgt spid="3">
+                                            <p:txEl>
+                                              <p:pRg st="3" end="3"/>
+                                            </p:txEl>
+                                          </p:spTgt>
+                                        </p:tgtEl>
+                                        <p:attrNameLst>
+                                          <p:attrName>style.visibility</p:attrName>
+                                        </p:attrNameLst>
+                                      </p:cBhvr>
+                                      <p:to>
+                                        <p:strVal val="visible"/>
+                                      </p:to>
+                                    </p:set>
+                                  </p:childTnLst>
+                                </p:cTn>
+                              </p:par>
+                            </p:childTnLst>
+                          </p:cTn>
+                        </p:par>
+                      </p:childTnLst>
+                    </p:cTn>
+                  </p:par>
+                </p:childTnLst>
+              </p:cTn>
+              <p:prevCondLst>
+                <p:cond evt="onPrev" delay="0">
+                  <p:tgtEl>
+                    <p:sldTgt/>
+                  </p:tgtEl>
+                </p:cond>
+              </p:prevCondLst>
+              <p:nextCondLst>
+                <p:cond evt="onNext" delay="0">
+                  <p:tgtEl>
+                    <p:sldTgt/>
+                  </p:tgtEl>
+                </p:cond>
+              </p:nextCondLst>
+            </p:seq>
+          </p:childTnLst>
+        </p:cTn>
+      </p:par>
+    </p:tnLst>
+    <p:bldLst>
+      <p:bldP spid="3" grpId="0" uiExpand="1" build="p"/>
+    </p:bldLst>
+  </p:timing>
+</p:sld>
+</file>
+
+<file path=ppt/slides/slide16.xml><?xml version="1.0" encoding="utf-8"?>
+<p:sld xmlns:a="http://schemas.openxmlformats.org/drawingml/2006/main" xmlns:r="http://schemas.openxmlformats.org/officeDocument/2006/relationships" xmlns:p="http://schemas.openxmlformats.org/presentationml/2006/main">
+  <p:cSld>
+    <p:spTree>
+      <p:nvGrpSpPr>
+        <p:cNvPr id="1" name=""/>
+        <p:cNvGrpSpPr/>
+        <p:nvPr/>
+      </p:nvGrpSpPr>
+      <p:grpSpPr>
+        <a:xfrm>
+          <a:off x="0" y="0"/>
+          <a:ext cx="0" cy="0"/>
+          <a:chOff x="0" y="0"/>
+          <a:chExt cx="0" cy="0"/>
+        </a:xfrm>
+      </p:grpSpPr>
+      <p:sp>
+        <p:nvSpPr>
+          <p:cNvPr id="2" name="Title 1"/>
+          <p:cNvSpPr>
+            <a:spLocks noGrp="1"/>
+          </p:cNvSpPr>
+          <p:nvPr>
+            <p:ph type="title"/>
+          </p:nvPr>
+        </p:nvSpPr>
+        <p:spPr/>
+        <p:txBody>
+          <a:bodyPr/>
+          <a:lstStyle/>
+          <a:p>
+            <a:pPr lvl="0" indent="0" marL="0">
+              <a:buNone/>
+            </a:pPr>
+            <a:r>
+              <a:rPr/>
+              <a:t>커스텀 스테이트 (Custom States)</a:t>
+            </a:r>
+          </a:p>
+        </p:txBody>
+      </p:sp>
+      <p:sp>
+        <p:nvSpPr>
+          <p:cNvPr id="3" name="Content Placeholder 2"/>
+          <p:cNvSpPr>
+            <a:spLocks noGrp="1"/>
+          </p:cNvSpPr>
+          <p:nvPr>
+            <p:ph idx="1"/>
+          </p:nvPr>
+        </p:nvSpPr>
+        <p:spPr/>
+        <p:txBody>
+          <a:bodyPr/>
+          <a:lstStyle/>
+          <a:p>
+            <a:pPr lvl="0"/>
+            <a:r>
+              <a:rPr/>
+              <a:t>화면의 요소에 임시 값을 설정하여 매달아 놓을 수 있음.</a:t>
+            </a:r>
+          </a:p>
+          <a:p>
+            <a:pPr lvl="1"/>
+            <a:r>
+              <a:rPr/>
+              <a:t>그러나 현재 화면을 떠나면 값은 증발되고 보관되지 않음</a:t>
+            </a:r>
+          </a:p>
+          <a:p>
+            <a:pPr lvl="0"/>
+            <a:r>
+              <a:rPr/>
+              <a:t>UI의 상태 또는 중간 계산 값, 인풋의 참조값 등을 위해 사용할 수 있다</a:t>
+            </a:r>
+          </a:p>
+          <a:p>
+            <a:pPr lvl="1"/>
+            <a:r>
+              <a:rPr/>
+              <a:t>워크플로우에서 </a:t>
+            </a:r>
+            <a:r>
+              <a:rPr>
+                <a:latin typeface="Courier"/>
+              </a:rPr>
+              <a:t>Element Actions</a:t>
+            </a:r>
+            <a:r>
+              <a:rPr/>
+              <a:t> - </a:t>
+            </a:r>
+            <a:r>
+              <a:rPr>
+                <a:latin typeface="Courier"/>
+              </a:rPr>
+              <a:t>Set State</a:t>
+            </a:r>
+            <a:r>
+              <a:rPr/>
+              <a:t> 액션 사용</a:t>
+            </a:r>
+          </a:p>
+          <a:p>
+            <a:pPr lvl="0"/>
+            <a:r>
+              <a:rPr/>
+              <a:t>버블 UX상 커스텀 스테이트를 설정한 엘리먼트를 찾기가 어려우므로, 일정한 규칙과 컨벤션을 작성해 따르는 것이 좋음.</a:t>
+            </a:r>
+          </a:p>
+        </p:txBody>
+      </p:sp>
+    </p:spTree>
+  </p:cSld>
+  <p:timing>
+    <p:tnLst>
+      <p:par>
+        <p:cTn id="1" dur="indefinite" restart="never" nodeType="tmRoot">
+          <p:childTnLst>
+            <p:seq concurrent="1" nextAc="seek">
+              <p:cTn id="2" dur="indefinite" nodeType="mainSeq">
+                <p:childTnLst>
+                  <p:par>
+                    <p:cTn id="3" fill="hold">
+                      <p:stCondLst>
+                        <p:cond delay="indefinite"/>
+                      </p:stCondLst>
+                      <p:childTnLst>
+                        <p:par>
+                          <p:cTn id="4" fill="hold">
+                            <p:stCondLst>
+                              <p:cond delay="0"/>
+                            </p:stCondLst>
+                            <p:childTnLst>
+                              <p:par>
+                                <p:cTn id="5" presetID="1" presetClass="entr" presetSubtype="0" fill="hold" grpId="0" nodeType="clickEffect">
+                                  <p:stCondLst>
+                                    <p:cond delay="0"/>
+                                  </p:stCondLst>
+                                  <p:childTnLst>
+                                    <p:set>
+                                      <p:cBhvr>
+                                        <p:cTn id="6" dur="1" fill="hold">
+                                          <p:stCondLst>
+                                            <p:cond delay="0"/>
+                                          </p:stCondLst>
+                                        </p:cTn>
+                                        <p:tgtEl>
+                                          <p:spTgt spid="3">
+                                            <p:txEl>
+                                              <p:pRg st="0" end="0"/>
+                                            </p:txEl>
+                                          </p:spTgt>
+                                        </p:tgtEl>
+                                        <p:attrNameLst>
+                                          <p:attrName>style.visibility</p:attrName>
+                                        </p:attrNameLst>
+                                      </p:cBhvr>
+                                      <p:to>
+                                        <p:strVal val="visible"/>
+                                      </p:to>
+                                    </p:set>
+                                  </p:childTnLst>
+                                </p:cTn>
+                              </p:par>
+                            </p:childTnLst>
+                          </p:cTn>
+                        </p:par>
+                      </p:childTnLst>
+                    </p:cTn>
+                  </p:par>
+                  <p:par>
+                    <p:cTn id="7" fill="hold">
+                      <p:stCondLst>
+                        <p:cond delay="indefinite"/>
+                      </p:stCondLst>
+                      <p:childTnLst>
+                        <p:par>
+                          <p:cTn id="8" fill="hold">
+                            <p:stCondLst>
+                              <p:cond delay="0"/>
+                            </p:stCondLst>
+                            <p:childTnLst>
+                              <p:par>
+                                <p:cTn id="9" presetID="1" presetClass="entr" presetSubtype="0" fill="hold" grpId="0" nodeType="clickEffect">
+                                  <p:stCondLst>
+                                    <p:cond delay="0"/>
+                                  </p:stCondLst>
+                                  <p:childTnLst>
+                                    <p:set>
+                                      <p:cBhvr>
+                                        <p:cTn id="10" dur="1" fill="hold">
+                                          <p:stCondLst>
+                                            <p:cond delay="0"/>
+                                          </p:stCondLst>
+                                        </p:cTn>
+                                        <p:tgtEl>
+                                          <p:spTgt spid="3">
+                                            <p:txEl>
+                                              <p:pRg st="1" end="1"/>
+                                            </p:txEl>
+                                          </p:spTgt>
+                                        </p:tgtEl>
+                                        <p:attrNameLst>
+                                          <p:attrName>style.visibility</p:attrName>
+                                        </p:attrNameLst>
+                                      </p:cBhvr>
+                                      <p:to>
+                                        <p:strVal val="visible"/>
+                                      </p:to>
+                                    </p:set>
+                                  </p:childTnLst>
+                                </p:cTn>
+                              </p:par>
+                            </p:childTnLst>
+                          </p:cTn>
+                        </p:par>
+                      </p:childTnLst>
+                    </p:cTn>
+                  </p:par>
+                  <p:par>
+                    <p:cTn id="11" fill="hold">
+                      <p:stCondLst>
+                        <p:cond delay="indefinite"/>
+                      </p:stCondLst>
+                      <p:childTnLst>
+                        <p:par>
+                          <p:cTn id="12" fill="hold">
+                            <p:stCondLst>
+                              <p:cond delay="0"/>
+                            </p:stCondLst>
+                            <p:childTnLst>
+                              <p:par>
+                                <p:cTn id="13" presetID="1" presetClass="entr" presetSubtype="0" fill="hold" grpId="0" nodeType="clickEffect">
+                                  <p:stCondLst>
+                                    <p:cond delay="0"/>
+                                  </p:stCondLst>
+                                  <p:childTnLst>
+                                    <p:set>
+                                      <p:cBhvr>
+                                        <p:cTn id="14" dur="1" fill="hold">
+                                          <p:stCondLst>
+                                            <p:cond delay="0"/>
+                                          </p:stCondLst>
+                                        </p:cTn>
+                                        <p:tgtEl>
+                                          <p:spTgt spid="3">
+                                            <p:txEl>
+                                              <p:pRg st="2" end="2"/>
+                                            </p:txEl>
+                                          </p:spTgt>
+                                        </p:tgtEl>
+                                        <p:attrNameLst>
+                                          <p:attrName>style.visibility</p:attrName>
+                                        </p:attrNameLst>
+                                      </p:cBhvr>
+                                      <p:to>
+                                        <p:strVal val="visible"/>
+                                      </p:to>
+                                    </p:set>
+                                  </p:childTnLst>
+                                </p:cTn>
+                              </p:par>
+                            </p:childTnLst>
+                          </p:cTn>
+                        </p:par>
+                      </p:childTnLst>
+                    </p:cTn>
+                  </p:par>
+                  <p:par>
+                    <p:cTn id="15" fill="hold">
+                      <p:stCondLst>
+                        <p:cond delay="indefinite"/>
+                      </p:stCondLst>
+                      <p:childTnLst>
+                        <p:par>
+                          <p:cTn id="16" fill="hold">
+                            <p:stCondLst>
+                              <p:cond delay="0"/>
+                            </p:stCondLst>
+                            <p:childTnLst>
+                              <p:par>
+                                <p:cTn id="17" presetID="1" presetClass="entr" presetSubtype="0" fill="hold" grpId="0" nodeType="clickEffect">
+                                  <p:stCondLst>
+                                    <p:cond delay="0"/>
+                                  </p:stCondLst>
+                                  <p:childTnLst>
+                                    <p:set>
+                                      <p:cBhvr>
+                                        <p:cTn id="18" dur="1" fill="hold">
+                                          <p:stCondLst>
+                                            <p:cond delay="0"/>
+                                          </p:stCondLst>
+                                        </p:cTn>
+                                        <p:tgtEl>
+                                          <p:spTgt spid="3">
+                                            <p:txEl>
+                                              <p:pRg st="3" end="3"/>
+                                            </p:txEl>
+                                          </p:spTgt>
+                                        </p:tgtEl>
+                                        <p:attrNameLst>
+                                          <p:attrName>style.visibility</p:attrName>
+                                        </p:attrNameLst>
+                                      </p:cBhvr>
+                                      <p:to>
+                                        <p:strVal val="visible"/>
+                                      </p:to>
+                                    </p:set>
+                                  </p:childTnLst>
+                                </p:cTn>
+                              </p:par>
+                            </p:childTnLst>
+                          </p:cTn>
+                        </p:par>
+                      </p:childTnLst>
+                    </p:cTn>
+                  </p:par>
+                  <p:par>
+                    <p:cTn id="19" fill="hold">
+                      <p:stCondLst>
+                        <p:cond delay="indefinite"/>
+                      </p:stCondLst>
+                      <p:childTnLst>
+                        <p:par>
+                          <p:cTn id="20" fill="hold">
+                            <p:stCondLst>
+                              <p:cond delay="0"/>
+                            </p:stCondLst>
+                            <p:childTnLst>
+                              <p:par>
+                                <p:cTn id="21" presetID="1" presetClass="entr" presetSubtype="0" fill="hold" grpId="0" nodeType="clickEffect">
+                                  <p:stCondLst>
+                                    <p:cond delay="0"/>
+                                  </p:stCondLst>
+                                  <p:childTnLst>
+                                    <p:set>
+                                      <p:cBhvr>
+                                        <p:cTn id="22" dur="1" fill="hold">
+                                          <p:stCondLst>
+                                            <p:cond delay="0"/>
+                                          </p:stCondLst>
+                                        </p:cTn>
+                                        <p:tgtEl>
+                                          <p:spTgt spid="3">
+                                            <p:txEl>
+                                              <p:pRg st="4" end="4"/>
+                                            </p:txEl>
+                                          </p:spTgt>
+                                        </p:tgtEl>
+                                        <p:attrNameLst>
+                                          <p:attrName>style.visibility</p:attrName>
+                                        </p:attrNameLst>
+                                      </p:cBhvr>
+                                      <p:to>
+                                        <p:strVal val="visible"/>
+                                      </p:to>
+                                    </p:set>
+                                  </p:childTnLst>
+                                </p:cTn>
+                              </p:par>
+                            </p:childTnLst>
+                          </p:cTn>
+                        </p:par>
+                      </p:childTnLst>
+                    </p:cTn>
+                  </p:par>
+                </p:childTnLst>
+              </p:cTn>
+              <p:prevCondLst>
+                <p:cond evt="onPrev" delay="0">
+                  <p:tgtEl>
+                    <p:sldTgt/>
+                  </p:tgtEl>
+                </p:cond>
+              </p:prevCondLst>
+              <p:nextCondLst>
+                <p:cond evt="onNext" delay="0">
+                  <p:tgtEl>
+                    <p:sldTgt/>
+                  </p:tgtEl>
+                </p:cond>
+              </p:nextCondLst>
+            </p:seq>
+          </p:childTnLst>
+        </p:cTn>
+      </p:par>
+    </p:tnLst>
+    <p:bldLst>
+      <p:bldP spid="3" grpId="0" uiExpand="1" build="p"/>
+    </p:bldLst>
+  </p:timing>
+</p:sld>
+</file>
+
+<file path=ppt/slides/slide17.xml><?xml version="1.0" encoding="utf-8"?>
+<p:sld xmlns:a="http://schemas.openxmlformats.org/drawingml/2006/main" xmlns:r="http://schemas.openxmlformats.org/officeDocument/2006/relationships" xmlns:p="http://schemas.openxmlformats.org/presentationml/2006/main">
+  <p:cSld>
+    <p:spTree>
+      <p:nvGrpSpPr>
+        <p:cNvPr id="1" name=""/>
+        <p:cNvGrpSpPr/>
+        <p:nvPr/>
+      </p:nvGrpSpPr>
+      <p:grpSpPr>
+        <a:xfrm>
+          <a:off x="0" y="0"/>
+          <a:ext cx="0" cy="0"/>
+          <a:chOff x="0" y="0"/>
+          <a:chExt cx="0" cy="0"/>
+        </a:xfrm>
+      </p:grpSpPr>
+      <p:sp>
+        <p:nvSpPr>
+          <p:cNvPr id="2" name="Title 1"/>
+          <p:cNvSpPr>
+            <a:spLocks noGrp="1"/>
+          </p:cNvSpPr>
+          <p:nvPr>
+            <p:ph type="title"/>
+          </p:nvPr>
+        </p:nvSpPr>
+        <p:spPr/>
+        <p:txBody>
+          <a:bodyPr/>
+          <a:lstStyle/>
+          <a:p>
+            <a:pPr lvl="0" indent="0" marL="0">
+              <a:buNone/>
+            </a:pPr>
+            <a:r>
+              <a:rPr/>
+              <a:t>엘리먼트 스타일링</a:t>
+            </a:r>
+          </a:p>
+        </p:txBody>
+      </p:sp>
+      <p:sp>
+        <p:nvSpPr>
+          <p:cNvPr id="3" name="Content Placeholder 2"/>
+          <p:cNvSpPr>
+            <a:spLocks noGrp="1"/>
+          </p:cNvSpPr>
+          <p:nvPr>
+            <p:ph idx="1"/>
+          </p:nvPr>
+        </p:nvSpPr>
+        <p:spPr/>
+        <p:txBody>
+          <a:bodyPr/>
+          <a:lstStyle/>
+          <a:p>
+            <a:pPr lvl="0"/>
+            <a:r>
+              <a:rPr/>
+              <a:t>엘리먼트마다 공통된 스타일이 디폴트로 지정되어 있음.</a:t>
+            </a:r>
+          </a:p>
+          <a:p>
+            <a:pPr lvl="0"/>
+            <a:r>
+              <a:rPr/>
+              <a:t>Style Variables</a:t>
+            </a:r>
+          </a:p>
+          <a:p>
+            <a:pPr lvl="1"/>
+            <a:r>
+              <a:rPr/>
+              <a:t>App Font</a:t>
+            </a:r>
+          </a:p>
+          <a:p>
+            <a:pPr lvl="2"/>
+            <a:r>
+              <a:rPr/>
+              <a:t>앱 전역에서 기본으로 사용하기로 정해놓은 폰트 (Style Variables)</a:t>
+            </a:r>
+          </a:p>
+          <a:p>
+            <a:pPr lvl="1"/>
+            <a:r>
+              <a:rPr/>
+              <a:t>Color Variables</a:t>
+            </a:r>
+          </a:p>
+          <a:p>
+            <a:pPr lvl="2"/>
+            <a:r>
+              <a:rPr/>
+              <a:t>앱 전역에서 의도와 목적에 따라 미리 정의해둔 색상들.</a:t>
+            </a:r>
+          </a:p>
+          <a:p>
+            <a:pPr lvl="0"/>
+            <a:r>
+              <a:rPr/>
+              <a:t>스타일을 적용하면 마스터 스타일 규칙을 각 엘리먼트가 상속하는 형태로 적용</a:t>
+            </a:r>
+          </a:p>
+          <a:p>
+            <a:pPr lvl="1"/>
+            <a:r>
+              <a:rPr/>
+              <a:t>따라서 스타일을 적용한 엘리먼트에서 상속된 값을 변경하면 오버라이드됨.</a:t>
+            </a:r>
+          </a:p>
+        </p:txBody>
+      </p:sp>
+    </p:spTree>
+  </p:cSld>
+  <p:timing>
+    <p:tnLst>
+      <p:par>
+        <p:cTn id="1" dur="indefinite" restart="never" nodeType="tmRoot">
+          <p:childTnLst>
+            <p:seq concurrent="1" nextAc="seek">
+              <p:cTn id="2" dur="indefinite" nodeType="mainSeq">
+                <p:childTnLst>
+                  <p:par>
+                    <p:cTn id="3" fill="hold">
+                      <p:stCondLst>
+                        <p:cond delay="indefinite"/>
+                      </p:stCondLst>
+                      <p:childTnLst>
+                        <p:par>
+                          <p:cTn id="4" fill="hold">
+                            <p:stCondLst>
+                              <p:cond delay="0"/>
+                            </p:stCondLst>
+                            <p:childTnLst>
+                              <p:par>
+                                <p:cTn id="5" presetID="1" presetClass="entr" presetSubtype="0" fill="hold" grpId="0" nodeType="clickEffect">
+                                  <p:stCondLst>
+                                    <p:cond delay="0"/>
+                                  </p:stCondLst>
+                                  <p:childTnLst>
+                                    <p:set>
+                                      <p:cBhvr>
+                                        <p:cTn id="6" dur="1" fill="hold">
+                                          <p:stCondLst>
+                                            <p:cond delay="0"/>
+                                          </p:stCondLst>
+                                        </p:cTn>
+                                        <p:tgtEl>
+                                          <p:spTgt spid="3">
+                                            <p:txEl>
+                                              <p:pRg st="0" end="0"/>
+                                            </p:txEl>
+                                          </p:spTgt>
+                                        </p:tgtEl>
+                                        <p:attrNameLst>
+                                          <p:attrName>style.visibility</p:attrName>
+                                        </p:attrNameLst>
+                                      </p:cBhvr>
+                                      <p:to>
+                                        <p:strVal val="visible"/>
+                                      </p:to>
+                                    </p:set>
+                                  </p:childTnLst>
+                                </p:cTn>
+                              </p:par>
+                            </p:childTnLst>
+                          </p:cTn>
+                        </p:par>
+                      </p:childTnLst>
+                    </p:cTn>
+                  </p:par>
+                  <p:par>
+                    <p:cTn id="7" fill="hold">
+                      <p:stCondLst>
+                        <p:cond delay="indefinite"/>
+                      </p:stCondLst>
+                      <p:childTnLst>
+                        <p:par>
+                          <p:cTn id="8" fill="hold">
+                            <p:stCondLst>
+                              <p:cond delay="0"/>
+                            </p:stCondLst>
+                            <p:childTnLst>
+                              <p:par>
+                                <p:cTn id="9" presetID="1" presetClass="entr" presetSubtype="0" fill="hold" grpId="0" nodeType="clickEffect">
+                                  <p:stCondLst>
+                                    <p:cond delay="0"/>
+                                  </p:stCondLst>
+                                  <p:childTnLst>
+                                    <p:set>
+                                      <p:cBhvr>
+                                        <p:cTn id="10" dur="1" fill="hold">
+                                          <p:stCondLst>
+                                            <p:cond delay="0"/>
+                                          </p:stCondLst>
+                                        </p:cTn>
+                                        <p:tgtEl>
+                                          <p:spTgt spid="3">
+                                            <p:txEl>
+                                              <p:pRg st="1" end="1"/>
+                                            </p:txEl>
+                                          </p:spTgt>
+                                        </p:tgtEl>
+                                        <p:attrNameLst>
+                                          <p:attrName>style.visibility</p:attrName>
+                                        </p:attrNameLst>
+                                      </p:cBhvr>
+                                      <p:to>
+                                        <p:strVal val="visible"/>
+                                      </p:to>
+                                    </p:set>
+                                  </p:childTnLst>
+                                </p:cTn>
+                              </p:par>
+                            </p:childTnLst>
+                          </p:cTn>
+                        </p:par>
+                      </p:childTnLst>
+                    </p:cTn>
+                  </p:par>
+                  <p:par>
+                    <p:cTn id="11" fill="hold">
+                      <p:stCondLst>
+                        <p:cond delay="indefinite"/>
+                      </p:stCondLst>
+                      <p:childTnLst>
+                        <p:par>
+                          <p:cTn id="12" fill="hold">
+                            <p:stCondLst>
+                              <p:cond delay="0"/>
+                            </p:stCondLst>
+                            <p:childTnLst>
+                              <p:par>
+                                <p:cTn id="13" presetID="1" presetClass="entr" presetSubtype="0" fill="hold" grpId="0" nodeType="clickEffect">
+                                  <p:stCondLst>
+                                    <p:cond delay="0"/>
+                                  </p:stCondLst>
+                                  <p:childTnLst>
+                                    <p:set>
+                                      <p:cBhvr>
+                                        <p:cTn id="14" dur="1" fill="hold">
+                                          <p:stCondLst>
+                                            <p:cond delay="0"/>
+                                          </p:stCondLst>
+                                        </p:cTn>
+                                        <p:tgtEl>
+                                          <p:spTgt spid="3">
+                                            <p:txEl>
+                                              <p:pRg st="2" end="2"/>
+                                            </p:txEl>
+                                          </p:spTgt>
+                                        </p:tgtEl>
+                                        <p:attrNameLst>
+                                          <p:attrName>style.visibility</p:attrName>
+                                        </p:attrNameLst>
+                                      </p:cBhvr>
+                                      <p:to>
+                                        <p:strVal val="visible"/>
+                                      </p:to>
+                                    </p:set>
+                                  </p:childTnLst>
+                                </p:cTn>
+                              </p:par>
+                            </p:childTnLst>
+                          </p:cTn>
+                        </p:par>
+                      </p:childTnLst>
+                    </p:cTn>
+                  </p:par>
+                  <p:par>
+                    <p:cTn id="15" fill="hold">
+                      <p:stCondLst>
+                        <p:cond delay="indefinite"/>
+                      </p:stCondLst>
+                      <p:childTnLst>
+                        <p:par>
+                          <p:cTn id="16" fill="hold">
+                            <p:stCondLst>
+                              <p:cond delay="0"/>
+                            </p:stCondLst>
+                            <p:childTnLst>
+                              <p:par>
+                                <p:cTn id="17" presetID="1" presetClass="entr" presetSubtype="0" fill="hold" grpId="0" nodeType="clickEffect">
+                                  <p:stCondLst>
+                                    <p:cond delay="0"/>
+                                  </p:stCondLst>
+                                  <p:childTnLst>
+                                    <p:set>
+                                      <p:cBhvr>
+                                        <p:cTn id="18" dur="1" fill="hold">
+                                          <p:stCondLst>
+                                            <p:cond delay="0"/>
+                                          </p:stCondLst>
+                                        </p:cTn>
+                                        <p:tgtEl>
+                                          <p:spTgt spid="3">
+                                            <p:txEl>
+                                              <p:pRg st="3" end="3"/>
+                                            </p:txEl>
+                                          </p:spTgt>
+                                        </p:tgtEl>
+                                        <p:attrNameLst>
+                                          <p:attrName>style.visibility</p:attrName>
+                                        </p:attrNameLst>
+                                      </p:cBhvr>
+                                      <p:to>
+                                        <p:strVal val="visible"/>
+                                      </p:to>
+                                    </p:set>
+                                  </p:childTnLst>
+                                </p:cTn>
+                              </p:par>
+                            </p:childTnLst>
+                          </p:cTn>
+                        </p:par>
+                      </p:childTnLst>
+                    </p:cTn>
+                  </p:par>
+                  <p:par>
+                    <p:cTn id="19" fill="hold">
+                      <p:stCondLst>
+                        <p:cond delay="indefinite"/>
+                      </p:stCondLst>
+                      <p:childTnLst>
+                        <p:par>
+                          <p:cTn id="20" fill="hold">
+                            <p:stCondLst>
+                              <p:cond delay="0"/>
+                            </p:stCondLst>
+                            <p:childTnLst>
+                              <p:par>
+                                <p:cTn id="21" presetID="1" presetClass="entr" presetSubtype="0" fill="hold" grpId="0" nodeType="clickEffect">
+                                  <p:stCondLst>
+                                    <p:cond delay="0"/>
+                                  </p:stCondLst>
+                                  <p:childTnLst>
+                                    <p:set>
+                                      <p:cBhvr>
+                                        <p:cTn id="22" dur="1" fill="hold">
+                                          <p:stCondLst>
+                                            <p:cond delay="0"/>
+                                          </p:stCondLst>
+                                        </p:cTn>
+                                        <p:tgtEl>
+                                          <p:spTgt spid="3">
+                                            <p:txEl>
+                                              <p:pRg st="4" end="4"/>
+                                            </p:txEl>
+                                          </p:spTgt>
+                                        </p:tgtEl>
+                                        <p:attrNameLst>
+                                          <p:attrName>style.visibility</p:attrName>
+                                        </p:attrNameLst>
+                                      </p:cBhvr>
+                                      <p:to>
+                                        <p:strVal val="visible"/>
+                                      </p:to>
+                                    </p:set>
+                                  </p:childTnLst>
+                                </p:cTn>
+                              </p:par>
+                            </p:childTnLst>
+                          </p:cTn>
+                        </p:par>
+                      </p:childTnLst>
+                    </p:cTn>
+                  </p:par>
+                  <p:par>
+                    <p:cTn id="23" fill="hold">
+                      <p:stCondLst>
+                        <p:cond delay="indefinite"/>
+                      </p:stCondLst>
+                      <p:childTnLst>
+                        <p:par>
+                          <p:cTn id="24" fill="hold">
+                            <p:stCondLst>
+                              <p:cond delay="0"/>
+                            </p:stCondLst>
+                            <p:childTnLst>
+                              <p:par>
+                                <p:cTn id="25" presetID="1" presetClass="entr" presetSubtype="0" fill="hold" grpId="0" nodeType="clickEffect">
+                                  <p:stCondLst>
+                                    <p:cond delay="0"/>
+                                  </p:stCondLst>
+                                  <p:childTnLst>
+                                    <p:set>
+                                      <p:cBhvr>
+                                        <p:cTn id="26" dur="1" fill="hold">
+                                          <p:stCondLst>
+                                            <p:cond delay="0"/>
+                                          </p:stCondLst>
+                                        </p:cTn>
+                                        <p:tgtEl>
+                                          <p:spTgt spid="3">
+                                            <p:txEl>
+                                              <p:pRg st="5" end="5"/>
+                                            </p:txEl>
+                                          </p:spTgt>
+                                        </p:tgtEl>
+                                        <p:attrNameLst>
+                                          <p:attrName>style.visibility</p:attrName>
+                                        </p:attrNameLst>
+                                      </p:cBhvr>
+                                      <p:to>
+                                        <p:strVal val="visible"/>
+                                      </p:to>
+                                    </p:set>
+                                  </p:childTnLst>
+                                </p:cTn>
+                              </p:par>
+                            </p:childTnLst>
+                          </p:cTn>
+                        </p:par>
+                      </p:childTnLst>
+                    </p:cTn>
+                  </p:par>
+                  <p:par>
+                    <p:cTn id="27" fill="hold">
+                      <p:stCondLst>
+                        <p:cond delay="indefinite"/>
+                      </p:stCondLst>
+                      <p:childTnLst>
+                        <p:par>
+                          <p:cTn id="28" fill="hold">
+                            <p:stCondLst>
+                              <p:cond delay="0"/>
+                            </p:stCondLst>
+                            <p:childTnLst>
+                              <p:par>
+                                <p:cTn id="29" presetID="1" presetClass="entr" presetSubtype="0" fill="hold" grpId="0" nodeType="clickEffect">
+                                  <p:stCondLst>
+                                    <p:cond delay="0"/>
+                                  </p:stCondLst>
+                                  <p:childTnLst>
+                                    <p:set>
+                                      <p:cBhvr>
+                                        <p:cTn id="30" dur="1" fill="hold">
+                                          <p:stCondLst>
+                                            <p:cond delay="0"/>
+                                          </p:stCondLst>
+                                        </p:cTn>
+                                        <p:tgtEl>
+                                          <p:spTgt spid="3">
+                                            <p:txEl>
+                                              <p:pRg st="6" end="6"/>
+                                            </p:txEl>
+                                          </p:spTgt>
+                                        </p:tgtEl>
+                                        <p:attrNameLst>
+                                          <p:attrName>style.visibility</p:attrName>
+                                        </p:attrNameLst>
+                                      </p:cBhvr>
+                                      <p:to>
+                                        <p:strVal val="visible"/>
+                                      </p:to>
+                                    </p:set>
+                                  </p:childTnLst>
+                                </p:cTn>
+                              </p:par>
+                            </p:childTnLst>
+                          </p:cTn>
+                        </p:par>
+                      </p:childTnLst>
+                    </p:cTn>
+                  </p:par>
+                  <p:par>
+                    <p:cTn id="31" fill="hold">
+                      <p:stCondLst>
+                        <p:cond delay="indefinite"/>
+                      </p:stCondLst>
+                      <p:childTnLst>
+                        <p:par>
+                          <p:cTn id="32" fill="hold">
+                            <p:stCondLst>
+                              <p:cond delay="0"/>
+                            </p:stCondLst>
+                            <p:childTnLst>
+                              <p:par>
+                                <p:cTn id="33" presetID="1" presetClass="entr" presetSubtype="0" fill="hold" grpId="0" nodeType="clickEffect">
+                                  <p:stCondLst>
+                                    <p:cond delay="0"/>
+                                  </p:stCondLst>
+                                  <p:childTnLst>
+                                    <p:set>
+                                      <p:cBhvr>
+                                        <p:cTn id="34" dur="1" fill="hold">
+                                          <p:stCondLst>
+                                            <p:cond delay="0"/>
+                                          </p:stCondLst>
+                                        </p:cTn>
+                                        <p:tgtEl>
+                                          <p:spTgt spid="3">
+                                            <p:txEl>
+                                              <p:pRg st="7" end="7"/>
+                                            </p:txEl>
+                                          </p:spTgt>
+                                        </p:tgtEl>
+                                        <p:attrNameLst>
+                                          <p:attrName>style.visibility</p:attrName>
+                                        </p:attrNameLst>
+                                      </p:cBhvr>
+                                      <p:to>
+                                        <p:strVal val="visible"/>
+                                      </p:to>
+                                    </p:set>
+                                  </p:childTnLst>
+                                </p:cTn>
+                              </p:par>
+                            </p:childTnLst>
+                          </p:cTn>
+                        </p:par>
+                      </p:childTnLst>
+                    </p:cTn>
+                  </p:par>
+                </p:childTnLst>
+              </p:cTn>
+              <p:prevCondLst>
+                <p:cond evt="onPrev" delay="0">
+                  <p:tgtEl>
+                    <p:sldTgt/>
+                  </p:tgtEl>
+                </p:cond>
+              </p:prevCondLst>
+              <p:nextCondLst>
+                <p:cond evt="onNext" delay="0">
+                  <p:tgtEl>
+                    <p:sldTgt/>
+                  </p:tgtEl>
+                </p:cond>
+              </p:nextCondLst>
+            </p:seq>
+          </p:childTnLst>
+        </p:cTn>
+      </p:par>
+    </p:tnLst>
+    <p:bldLst>
+      <p:bldP spid="3" grpId="0" uiExpand="1" build="p"/>
+    </p:bldLst>
+  </p:timing>
+</p:sld>
+</file>
+
+<file path=ppt/slides/slide18.xml><?xml version="1.0" encoding="utf-8"?>
+<p:sld xmlns:a="http://schemas.openxmlformats.org/drawingml/2006/main" xmlns:r="http://schemas.openxmlformats.org/officeDocument/2006/relationships" xmlns:p="http://schemas.openxmlformats.org/presentationml/2006/main">
+  <p:cSld>
+    <p:spTree>
+      <p:nvGrpSpPr>
+        <p:cNvPr id="1" name=""/>
+        <p:cNvGrpSpPr/>
+        <p:nvPr/>
+      </p:nvGrpSpPr>
+      <p:grpSpPr>
+        <a:xfrm>
+          <a:off x="0" y="0"/>
+          <a:ext cx="0" cy="0"/>
+          <a:chOff x="0" y="0"/>
+          <a:chExt cx="0" cy="0"/>
+        </a:xfrm>
+      </p:grpSpPr>
+      <p:sp>
+        <p:nvSpPr>
+          <p:cNvPr id="2" name="Title 1"/>
+          <p:cNvSpPr>
+            <a:spLocks noGrp="1"/>
+          </p:cNvSpPr>
+          <p:nvPr>
+            <p:ph type="title"/>
+          </p:nvPr>
+        </p:nvSpPr>
+        <p:spPr/>
+        <p:txBody>
+          <a:bodyPr/>
+          <a:lstStyle/>
+          <a:p>
+            <a:pPr lvl="0" indent="0" marL="0">
+              <a:buNone/>
+            </a:pPr>
+            <a:r>
+              <a:rPr/>
+              <a:t>리피팅 그룹의 overflow 강제로 보여주기</a:t>
+            </a:r>
+          </a:p>
+        </p:txBody>
+      </p:sp>
+      <p:sp>
+        <p:nvSpPr>
+          <p:cNvPr id="3" name="Content Placeholder 2"/>
+          <p:cNvSpPr>
+            <a:spLocks noGrp="1"/>
+          </p:cNvSpPr>
+          <p:nvPr>
+            <p:ph idx="1"/>
+          </p:nvPr>
+        </p:nvSpPr>
+        <p:spPr/>
+        <p:txBody>
+          <a:bodyPr/>
+          <a:lstStyle/>
+          <a:p>
+            <a:pPr lvl="0"/>
+            <a:r>
+              <a:rPr/>
+              <a:t>리피팅 그룹의 overflow가 기본으로 보여주지 않게 설정돼있어 그림자 등이 잘리게 되는데, 아래와 같이 overflow를 표시 허용 해준다.</a:t>
+            </a:r>
+          </a:p>
+          <a:p>
+            <a:pPr lvl="0" indent="-457200" marL="457200">
+              <a:buAutoNum type="arabicPeriod"/>
+            </a:pPr>
+            <a:r>
+              <a:rPr/>
+              <a:t>Settings - General - </a:t>
+            </a:r>
+            <a:r>
+              <a:rPr>
+                <a:latin typeface="Courier"/>
+              </a:rPr>
+              <a:t>Expose the option to add an ID attribute to HTML elements</a:t>
+            </a:r>
+            <a:r>
+              <a:rPr/>
+              <a:t> 를 체크</a:t>
+            </a:r>
+          </a:p>
+          <a:p>
+            <a:pPr lvl="0" indent="-457200" marL="457200">
+              <a:buAutoNum type="arabicPeriod"/>
+            </a:pPr>
+            <a:r>
+              <a:rPr/>
+              <a:t>리피팅 그룹을 선택하고 프로퍼티 에디터의 가장 아래 ID Attribute 항목에 </a:t>
+            </a:r>
+            <a:r>
+              <a:rPr>
+                <a:latin typeface="Courier"/>
+              </a:rPr>
+              <a:t>rg-overflow</a:t>
+            </a:r>
+            <a:r>
+              <a:rPr/>
+              <a:t> 라고 적어줌</a:t>
+            </a:r>
+          </a:p>
+          <a:p>
+            <a:pPr lvl="0" indent="-457200" marL="457200">
+              <a:buAutoNum type="arabicPeriod"/>
+            </a:pPr>
+            <a:r>
+              <a:rPr/>
+              <a:t>HTML 요소를 아주 작은 크기로 삽입 하고 레이아웃에 방해되지 않도록 배치한 후 아래와 같이 적어줌</a:t>
+            </a:r>
+          </a:p>
+          <a:p>
+            <a:pPr lvl="0" indent="0">
+              <a:buNone/>
+            </a:pPr>
+            <a:r>
+              <a:rPr>
+                <a:latin typeface="Courier"/>
+              </a:rPr>
+              <a:t>&lt;style&gt;
+        #rg-overflow {
+                overflow: visible !important;
+        }
+&lt;/style&gt;</a:t>
+            </a:r>
+          </a:p>
+        </p:txBody>
+      </p:sp>
+    </p:spTree>
+  </p:cSld>
+  <p:timing>
+    <p:tnLst>
+      <p:par>
+        <p:cTn id="1" dur="indefinite" restart="never" nodeType="tmRoot">
+          <p:childTnLst>
+            <p:seq concurrent="1" nextAc="seek">
+              <p:cTn id="2" dur="indefinite" nodeType="mainSeq">
+                <p:childTnLst>
+                  <p:par>
+                    <p:cTn id="3" fill="hold">
+                      <p:stCondLst>
+                        <p:cond delay="indefinite"/>
+                      </p:stCondLst>
+                      <p:childTnLst>
+                        <p:par>
+                          <p:cTn id="4" fill="hold">
+                            <p:stCondLst>
+                              <p:cond delay="0"/>
+                            </p:stCondLst>
+                            <p:childTnLst>
+                              <p:par>
+                                <p:cTn id="5" presetID="1" presetClass="entr" presetSubtype="0" fill="hold" grpId="0" nodeType="clickEffect">
+                                  <p:stCondLst>
+                                    <p:cond delay="0"/>
+                                  </p:stCondLst>
+                                  <p:childTnLst>
+                                    <p:set>
+                                      <p:cBhvr>
+                                        <p:cTn id="6" dur="1" fill="hold">
+                                          <p:stCondLst>
+                                            <p:cond delay="0"/>
+                                          </p:stCondLst>
+                                        </p:cTn>
+                                        <p:tgtEl>
+                                          <p:spTgt spid="3">
+                                            <p:txEl>
+                                              <p:pRg st="0" end="0"/>
+                                            </p:txEl>
+                                          </p:spTgt>
+                                        </p:tgtEl>
+                                        <p:attrNameLst>
+                                          <p:attrName>style.visibility</p:attrName>
+                                        </p:attrNameLst>
+                                      </p:cBhvr>
+                                      <p:to>
+                                        <p:strVal val="visible"/>
+                                      </p:to>
+                                    </p:set>
+                                  </p:childTnLst>
+                                </p:cTn>
+                              </p:par>
+                            </p:childTnLst>
+                          </p:cTn>
+                        </p:par>
+                      </p:childTnLst>
+                    </p:cTn>
+                  </p:par>
+                  <p:par>
+                    <p:cTn id="7" fill="hold">
+                      <p:stCondLst>
+                        <p:cond delay="indefinite"/>
+                      </p:stCondLst>
+                      <p:childTnLst>
+                        <p:par>
+                          <p:cTn id="8" fill="hold">
+                            <p:stCondLst>
+                              <p:cond delay="0"/>
+                            </p:stCondLst>
+                            <p:childTnLst>
+                              <p:par>
+                                <p:cTn id="9" presetID="1" presetClass="entr" presetSubtype="0" fill="hold" grpId="0" nodeType="clickEffect">
+                                  <p:stCondLst>
+                                    <p:cond delay="0"/>
+                                  </p:stCondLst>
+                                  <p:childTnLst>
+                                    <p:set>
+                                      <p:cBhvr>
+                                        <p:cTn id="10" dur="1" fill="hold">
+                                          <p:stCondLst>
+                                            <p:cond delay="0"/>
+                                          </p:stCondLst>
+                                        </p:cTn>
+                                        <p:tgtEl>
+                                          <p:spTgt spid="3">
+                                            <p:txEl>
+                                              <p:pRg st="1" end="1"/>
+                                            </p:txEl>
+                                          </p:spTgt>
+                                        </p:tgtEl>
+                                        <p:attrNameLst>
+                                          <p:attrName>style.visibility</p:attrName>
+                                        </p:attrNameLst>
+                                      </p:cBhvr>
+                                      <p:to>
+                                        <p:strVal val="visible"/>
+                                      </p:to>
+                                    </p:set>
+                                  </p:childTnLst>
+                                </p:cTn>
+                              </p:par>
+                            </p:childTnLst>
+                          </p:cTn>
+                        </p:par>
+                      </p:childTnLst>
+                    </p:cTn>
+                  </p:par>
+                  <p:par>
+                    <p:cTn id="11" fill="hold">
+                      <p:stCondLst>
+                        <p:cond delay="indefinite"/>
+                      </p:stCondLst>
+                      <p:childTnLst>
+                        <p:par>
+                          <p:cTn id="12" fill="hold">
+                            <p:stCondLst>
+                              <p:cond delay="0"/>
+                            </p:stCondLst>
+                            <p:childTnLst>
+                              <p:par>
+                                <p:cTn id="13" presetID="1" presetClass="entr" presetSubtype="0" fill="hold" grpId="0" nodeType="clickEffect">
+                                  <p:stCondLst>
+                                    <p:cond delay="0"/>
+                                  </p:stCondLst>
+                                  <p:childTnLst>
+                                    <p:set>
+                                      <p:cBhvr>
+                                        <p:cTn id="14" dur="1" fill="hold">
+                                          <p:stCondLst>
+                                            <p:cond delay="0"/>
+                                          </p:stCondLst>
+                                        </p:cTn>
+                                        <p:tgtEl>
+                                          <p:spTgt spid="3">
+                                            <p:txEl>
+                                              <p:pRg st="2" end="2"/>
+                                            </p:txEl>
+                                          </p:spTgt>
+                                        </p:tgtEl>
+                                        <p:attrNameLst>
+                                          <p:attrName>style.visibility</p:attrName>
+                                        </p:attrNameLst>
+                                      </p:cBhvr>
+                                      <p:to>
+                                        <p:strVal val="visible"/>
+                                      </p:to>
+                                    </p:set>
+                                  </p:childTnLst>
+                                </p:cTn>
+                              </p:par>
+                            </p:childTnLst>
+                          </p:cTn>
+                        </p:par>
+                      </p:childTnLst>
+                    </p:cTn>
+                  </p:par>
+                  <p:par>
+                    <p:cTn id="15" fill="hold">
+                      <p:stCondLst>
+                        <p:cond delay="indefinite"/>
+                      </p:stCondLst>
+                      <p:childTnLst>
+                        <p:par>
+                          <p:cTn id="16" fill="hold">
+                            <p:stCondLst>
+                              <p:cond delay="0"/>
+                            </p:stCondLst>
+                            <p:childTnLst>
+                              <p:par>
+                                <p:cTn id="17" presetID="1" presetClass="entr" presetSubtype="0" fill="hold" grpId="0" nodeType="clickEffect">
+                                  <p:stCondLst>
+                                    <p:cond delay="0"/>
+                                  </p:stCondLst>
+                                  <p:childTnLst>
+                                    <p:set>
+                                      <p:cBhvr>
+                                        <p:cTn id="18" dur="1" fill="hold">
+                                          <p:stCondLst>
+                                            <p:cond delay="0"/>
+                                          </p:stCondLst>
+                                        </p:cTn>
+                                        <p:tgtEl>
+                                          <p:spTgt spid="3">
+                                            <p:txEl>
+                                              <p:pRg st="3" end="3"/>
                                             </p:txEl>
                                           </p:spTgt>
                                         </p:tgtEl>
@@ -9193,31 +11895,6 @@
       </p:grpSpPr>
       <p:sp>
         <p:nvSpPr>
-          <p:cNvPr id="2" name="Title 1"/>
-          <p:cNvSpPr>
-            <a:spLocks noGrp="1"/>
-          </p:cNvSpPr>
-          <p:nvPr>
-            <p:ph type="title"/>
-          </p:nvPr>
-        </p:nvSpPr>
-        <p:spPr/>
-        <p:txBody>
-          <a:bodyPr/>
-          <a:lstStyle/>
-          <a:p>
-            <a:pPr lvl="0" indent="0" marL="0">
-              <a:buNone/>
-            </a:pPr>
-            <a:r>
-              <a:rPr/>
-              <a:t>띵 (Things, Data types)</a:t>
-            </a:r>
-          </a:p>
-        </p:txBody>
-      </p:sp>
-      <p:sp>
-        <p:nvSpPr>
           <p:cNvPr id="3" name="Content Placeholder 2"/>
           <p:cNvSpPr>
             <a:spLocks noGrp="1"/>
@@ -9231,45 +11908,57 @@
           <a:bodyPr/>
           <a:lstStyle/>
           <a:p>
+            <a:pPr lvl="0" indent="0" marL="0">
+              <a:spcBef>
+                <a:spcPts val="3000"/>
+              </a:spcBef>
+              <a:buNone/>
+            </a:pPr>
+            <a:r>
+              <a:rPr b="1"/>
+              <a:t>날짜를 처리하는 방법</a:t>
+            </a:r>
+          </a:p>
+          <a:p>
             <a:pPr lvl="0"/>
             <a:r>
               <a:rPr/>
-              <a:t>기본 제공되는 기본 타입 외에 유저가 생성하는 타입.</a:t>
+              <a:t>날짜는 내부적으로 숫자로 처리되는데, 그 값은 특정 시점으로부터 얼마나 지났는지를 표시.</a:t>
+            </a:r>
+          </a:p>
+          <a:p>
+            <a:pPr lvl="1"/>
+            <a:r>
+              <a:rPr/>
+              <a:t>엑셀과 구글 시트의 경우, 1899-12-31 00:00 부터</a:t>
+            </a:r>
+          </a:p>
+          <a:p>
+            <a:pPr lvl="2"/>
+            <a:r>
+              <a:rPr/>
+              <a:t>1이 24시간(하루)</a:t>
+            </a:r>
+          </a:p>
+          <a:p>
+            <a:pPr lvl="1"/>
+            <a:r>
+              <a:rPr/>
+              <a:t>유닉스 타임스탬프의 경우, 1970-1-1 00:00 부터</a:t>
+            </a:r>
+          </a:p>
+          <a:p>
+            <a:pPr lvl="2"/>
+            <a:r>
+              <a:rPr/>
+              <a:t>1이 1초</a:t>
             </a:r>
           </a:p>
           <a:p>
             <a:pPr lvl="0"/>
             <a:r>
               <a:rPr/>
-              <a:t>프로퍼티(필드)를 가진 것.</a:t>
-            </a:r>
-          </a:p>
-          <a:p>
-            <a:pPr lvl="1"/>
-            <a:r>
-              <a:rPr/>
-              <a:t>프로퍼티는 키와 타입을 가진 값의 구조로 된 정보를 말함</a:t>
-            </a:r>
-          </a:p>
-          <a:p>
-            <a:pPr lvl="0"/>
-            <a:r>
-              <a:rPr/>
-              <a:t>구글시트 등의 2차원 데이터베이스에서는 컬럼을 프로퍼티에 할당하여 저장하므로 Thing과 2차원 데이터베이스가 서로 호환된다</a:t>
-            </a:r>
-          </a:p>
-          <a:p>
-            <a:pPr lvl="0"/>
-            <a:r>
-              <a:rPr/>
-              <a:t>즉 Data types 로 타입을 정의했다면, 해당 타입을 따르는 실제 값이 입력된 레코드를 Thing이라고 부르는 것.</a:t>
-            </a:r>
-          </a:p>
-          <a:p>
-            <a:pPr lvl="0"/>
-            <a:r>
-              <a:rPr/>
-              <a:t>Thing에 대한 이해가 곧 버블 데이터베이스의 골자</a:t>
+              <a:t>따라서 버블의 date 타입 역시 기본적으로 시간을 포함한 값임.</a:t>
             </a:r>
           </a:p>
         </p:txBody>
@@ -9312,7 +12001,7 @@
                                         <p:tgtEl>
                                           <p:spTgt spid="3">
                                             <p:txEl>
-                                              <p:pRg st="0" end="0"/>
+                                              <p:pRg st="1" end="1"/>
                                             </p:txEl>
                                           </p:spTgt>
                                         </p:tgtEl>
@@ -9361,7 +12050,7 @@
                                         <p:tgtEl>
                                           <p:spTgt spid="3">
                                             <p:txEl>
-                                              <p:pRg st="1" end="1"/>
+                                              <p:pRg st="2" end="2"/>
                                             </p:txEl>
                                           </p:spTgt>
                                         </p:tgtEl>
@@ -9410,7 +12099,7 @@
                                         <p:tgtEl>
                                           <p:spTgt spid="3">
                                             <p:txEl>
-                                              <p:pRg st="2" end="2"/>
+                                              <p:pRg st="3" end="3"/>
                                             </p:txEl>
                                           </p:spTgt>
                                         </p:tgtEl>
@@ -9459,7 +12148,7 @@
                                         <p:tgtEl>
                                           <p:spTgt spid="3">
                                             <p:txEl>
-                                              <p:pRg st="3" end="3"/>
+                                              <p:pRg st="4" end="4"/>
                                             </p:txEl>
                                           </p:spTgt>
                                         </p:tgtEl>
@@ -9508,7 +12197,7 @@
                                         <p:tgtEl>
                                           <p:spTgt spid="3">
                                             <p:txEl>
-                                              <p:pRg st="4" end="4"/>
+                                              <p:pRg st="5" end="5"/>
                                             </p:txEl>
                                           </p:spTgt>
                                         </p:tgtEl>
@@ -9557,7 +12246,7 @@
                                         <p:tgtEl>
                                           <p:spTgt spid="3">
                                             <p:txEl>
-                                              <p:pRg st="5" end="5"/>
+                                              <p:pRg st="6" end="6"/>
                                             </p:txEl>
                                           </p:spTgt>
                                         </p:tgtEl>

</xml_diff>

<commit_message>
백업 완료: 2023-11-26 06:45:21
Affected files:
노코드 엔지니어링/노코드 최강자 버블.md
노코드 엔지니어링/노코드 최강자 버블.pptx
</commit_message>
<xml_diff>
--- a/노코드 엔지니어링/노코드 최강자 버블.pptx
+++ b/노코드 엔지니어링/노코드 최강자 버블.pptx
@@ -23,6 +23,8 @@
     <p:sldId id="271" r:id="rId17"/>
     <p:sldId id="272" r:id="rId18"/>
     <p:sldId id="273" r:id="rId19"/>
+    <p:sldId id="274" r:id="rId20"/>
+    <p:sldId id="275" r:id="rId21"/>
   </p:sldIdLst>
   <p:sldSz cx="12192000" cy="6858000"/>
   <p:notesSz cx="6858000" cy="9144000"/>
@@ -6703,6 +6705,518 @@
             </a:pPr>
             <a:r>
               <a:rPr/>
+              <a:t>SPA(Single Page Application)의 장단점</a:t>
+            </a:r>
+          </a:p>
+        </p:txBody>
+      </p:sp>
+      <p:sp>
+        <p:nvSpPr>
+          <p:cNvPr id="3" name="Content Placeholder 2"/>
+          <p:cNvSpPr>
+            <a:spLocks noGrp="1"/>
+          </p:cNvSpPr>
+          <p:nvPr>
+            <p:ph idx="1"/>
+          </p:nvPr>
+        </p:nvSpPr>
+        <p:spPr/>
+        <p:txBody>
+          <a:bodyPr/>
+          <a:lstStyle/>
+          <a:p>
+            <a:pPr lvl="0" indent="0" marL="0">
+              <a:spcBef>
+                <a:spcPts val="3000"/>
+              </a:spcBef>
+              <a:buNone/>
+            </a:pPr>
+            <a:r>
+              <a:rPr b="1"/>
+              <a:t>장점</a:t>
+            </a:r>
+          </a:p>
+          <a:p>
+            <a:pPr lvl="0"/>
+            <a:r>
+              <a:rPr/>
+              <a:t>페이지 간의 로딩을 없애서, 유저에게 심리스(seam-less)한 경험을 준다.</a:t>
+            </a:r>
+          </a:p>
+          <a:p>
+            <a:pPr lvl="1"/>
+            <a:r>
+              <a:rPr/>
+              <a:t>페이지간 이동 속도가 빠르다.</a:t>
+            </a:r>
+          </a:p>
+          <a:p>
+            <a:pPr lvl="0" indent="0" marL="0">
+              <a:spcBef>
+                <a:spcPts val="3000"/>
+              </a:spcBef>
+              <a:buNone/>
+            </a:pPr>
+            <a:r>
+              <a:rPr b="1"/>
+              <a:t>단점</a:t>
+            </a:r>
+          </a:p>
+          <a:p>
+            <a:pPr lvl="0"/>
+            <a:r>
+              <a:rPr/>
+              <a:t>최초 로딩 시 오래걸림.</a:t>
+            </a:r>
+          </a:p>
+          <a:p>
+            <a:pPr lvl="1"/>
+            <a:r>
+              <a:rPr/>
+              <a:t>페이지를 이동할 때 호출되는 워크플로우라든가, 페이지 이동에 기반한 기능들을 사용할 수 없음.</a:t>
+            </a:r>
+          </a:p>
+          <a:p>
+            <a:pPr lvl="2"/>
+            <a:r>
+              <a:rPr/>
+              <a:t>URL 파라미터</a:t>
+            </a:r>
+          </a:p>
+          <a:p>
+            <a:pPr lvl="2"/>
+            <a:r>
+              <a:rPr/>
+              <a:t>Page is Loaded 이벤트</a:t>
+            </a:r>
+          </a:p>
+          <a:p>
+            <a:pPr lvl="1"/>
+            <a:r>
+              <a:rPr/>
+              <a:t>미리보기가 항상 첫페이지로 열림</a:t>
+            </a:r>
+          </a:p>
+        </p:txBody>
+      </p:sp>
+    </p:spTree>
+  </p:cSld>
+  <p:timing>
+    <p:tnLst>
+      <p:par>
+        <p:cTn id="1" dur="indefinite" restart="never" nodeType="tmRoot">
+          <p:childTnLst>
+            <p:seq concurrent="1" nextAc="seek">
+              <p:cTn id="2" dur="indefinite" nodeType="mainSeq">
+                <p:childTnLst>
+                  <p:par>
+                    <p:cTn id="3" fill="hold">
+                      <p:stCondLst>
+                        <p:cond delay="indefinite"/>
+                      </p:stCondLst>
+                      <p:childTnLst>
+                        <p:par>
+                          <p:cTn id="4" fill="hold">
+                            <p:stCondLst>
+                              <p:cond delay="0"/>
+                            </p:stCondLst>
+                            <p:childTnLst>
+                              <p:par>
+                                <p:cTn id="5" presetID="1" presetClass="entr" presetSubtype="0" fill="hold" grpId="0" nodeType="clickEffect">
+                                  <p:stCondLst>
+                                    <p:cond delay="0"/>
+                                  </p:stCondLst>
+                                  <p:childTnLst>
+                                    <p:set>
+                                      <p:cBhvr>
+                                        <p:cTn id="6" dur="1" fill="hold">
+                                          <p:stCondLst>
+                                            <p:cond delay="0"/>
+                                          </p:stCondLst>
+                                        </p:cTn>
+                                        <p:tgtEl>
+                                          <p:spTgt spid="3">
+                                            <p:txEl>
+                                              <p:pRg st="1" end="1"/>
+                                            </p:txEl>
+                                          </p:spTgt>
+                                        </p:tgtEl>
+                                        <p:attrNameLst>
+                                          <p:attrName>style.visibility</p:attrName>
+                                        </p:attrNameLst>
+                                      </p:cBhvr>
+                                      <p:to>
+                                        <p:strVal val="visible"/>
+                                      </p:to>
+                                    </p:set>
+                                  </p:childTnLst>
+                                </p:cTn>
+                              </p:par>
+                            </p:childTnLst>
+                          </p:cTn>
+                        </p:par>
+                      </p:childTnLst>
+                    </p:cTn>
+                  </p:par>
+                  <p:par>
+                    <p:cTn id="7" fill="hold">
+                      <p:stCondLst>
+                        <p:cond delay="indefinite"/>
+                      </p:stCondLst>
+                      <p:childTnLst>
+                        <p:par>
+                          <p:cTn id="8" fill="hold">
+                            <p:stCondLst>
+                              <p:cond delay="0"/>
+                            </p:stCondLst>
+                            <p:childTnLst>
+                              <p:par>
+                                <p:cTn id="9" presetID="1" presetClass="entr" presetSubtype="0" fill="hold" grpId="0" nodeType="clickEffect">
+                                  <p:stCondLst>
+                                    <p:cond delay="0"/>
+                                  </p:stCondLst>
+                                  <p:childTnLst>
+                                    <p:set>
+                                      <p:cBhvr>
+                                        <p:cTn id="10" dur="1" fill="hold">
+                                          <p:stCondLst>
+                                            <p:cond delay="0"/>
+                                          </p:stCondLst>
+                                        </p:cTn>
+                                        <p:tgtEl>
+                                          <p:spTgt spid="3">
+                                            <p:txEl>
+                                              <p:pRg st="2" end="2"/>
+                                            </p:txEl>
+                                          </p:spTgt>
+                                        </p:tgtEl>
+                                        <p:attrNameLst>
+                                          <p:attrName>style.visibility</p:attrName>
+                                        </p:attrNameLst>
+                                      </p:cBhvr>
+                                      <p:to>
+                                        <p:strVal val="visible"/>
+                                      </p:to>
+                                    </p:set>
+                                  </p:childTnLst>
+                                </p:cTn>
+                              </p:par>
+                            </p:childTnLst>
+                          </p:cTn>
+                        </p:par>
+                      </p:childTnLst>
+                    </p:cTn>
+                  </p:par>
+                  <p:par>
+                    <p:cTn id="11" fill="hold">
+                      <p:stCondLst>
+                        <p:cond delay="indefinite"/>
+                      </p:stCondLst>
+                      <p:childTnLst>
+                        <p:par>
+                          <p:cTn id="12" fill="hold">
+                            <p:stCondLst>
+                              <p:cond delay="0"/>
+                            </p:stCondLst>
+                            <p:childTnLst>
+                              <p:par>
+                                <p:cTn id="13" presetID="1" presetClass="entr" presetSubtype="0" fill="hold" grpId="0" nodeType="clickEffect">
+                                  <p:stCondLst>
+                                    <p:cond delay="0"/>
+                                  </p:stCondLst>
+                                  <p:childTnLst>
+                                    <p:set>
+                                      <p:cBhvr>
+                                        <p:cTn id="14" dur="1" fill="hold">
+                                          <p:stCondLst>
+                                            <p:cond delay="0"/>
+                                          </p:stCondLst>
+                                        </p:cTn>
+                                        <p:tgtEl>
+                                          <p:spTgt spid="3">
+                                            <p:txEl>
+                                              <p:pRg st="4" end="4"/>
+                                            </p:txEl>
+                                          </p:spTgt>
+                                        </p:tgtEl>
+                                        <p:attrNameLst>
+                                          <p:attrName>style.visibility</p:attrName>
+                                        </p:attrNameLst>
+                                      </p:cBhvr>
+                                      <p:to>
+                                        <p:strVal val="visible"/>
+                                      </p:to>
+                                    </p:set>
+                                  </p:childTnLst>
+                                </p:cTn>
+                              </p:par>
+                            </p:childTnLst>
+                          </p:cTn>
+                        </p:par>
+                      </p:childTnLst>
+                    </p:cTn>
+                  </p:par>
+                  <p:par>
+                    <p:cTn id="15" fill="hold">
+                      <p:stCondLst>
+                        <p:cond delay="indefinite"/>
+                      </p:stCondLst>
+                      <p:childTnLst>
+                        <p:par>
+                          <p:cTn id="16" fill="hold">
+                            <p:stCondLst>
+                              <p:cond delay="0"/>
+                            </p:stCondLst>
+                            <p:childTnLst>
+                              <p:par>
+                                <p:cTn id="17" presetID="1" presetClass="entr" presetSubtype="0" fill="hold" grpId="0" nodeType="clickEffect">
+                                  <p:stCondLst>
+                                    <p:cond delay="0"/>
+                                  </p:stCondLst>
+                                  <p:childTnLst>
+                                    <p:set>
+                                      <p:cBhvr>
+                                        <p:cTn id="18" dur="1" fill="hold">
+                                          <p:stCondLst>
+                                            <p:cond delay="0"/>
+                                          </p:stCondLst>
+                                        </p:cTn>
+                                        <p:tgtEl>
+                                          <p:spTgt spid="3">
+                                            <p:txEl>
+                                              <p:pRg st="5" end="5"/>
+                                            </p:txEl>
+                                          </p:spTgt>
+                                        </p:tgtEl>
+                                        <p:attrNameLst>
+                                          <p:attrName>style.visibility</p:attrName>
+                                        </p:attrNameLst>
+                                      </p:cBhvr>
+                                      <p:to>
+                                        <p:strVal val="visible"/>
+                                      </p:to>
+                                    </p:set>
+                                  </p:childTnLst>
+                                </p:cTn>
+                              </p:par>
+                            </p:childTnLst>
+                          </p:cTn>
+                        </p:par>
+                      </p:childTnLst>
+                    </p:cTn>
+                  </p:par>
+                  <p:par>
+                    <p:cTn id="19" fill="hold">
+                      <p:stCondLst>
+                        <p:cond delay="indefinite"/>
+                      </p:stCondLst>
+                      <p:childTnLst>
+                        <p:par>
+                          <p:cTn id="20" fill="hold">
+                            <p:stCondLst>
+                              <p:cond delay="0"/>
+                            </p:stCondLst>
+                            <p:childTnLst>
+                              <p:par>
+                                <p:cTn id="21" presetID="1" presetClass="entr" presetSubtype="0" fill="hold" grpId="0" nodeType="clickEffect">
+                                  <p:stCondLst>
+                                    <p:cond delay="0"/>
+                                  </p:stCondLst>
+                                  <p:childTnLst>
+                                    <p:set>
+                                      <p:cBhvr>
+                                        <p:cTn id="22" dur="1" fill="hold">
+                                          <p:stCondLst>
+                                            <p:cond delay="0"/>
+                                          </p:stCondLst>
+                                        </p:cTn>
+                                        <p:tgtEl>
+                                          <p:spTgt spid="3">
+                                            <p:txEl>
+                                              <p:pRg st="6" end="6"/>
+                                            </p:txEl>
+                                          </p:spTgt>
+                                        </p:tgtEl>
+                                        <p:attrNameLst>
+                                          <p:attrName>style.visibility</p:attrName>
+                                        </p:attrNameLst>
+                                      </p:cBhvr>
+                                      <p:to>
+                                        <p:strVal val="visible"/>
+                                      </p:to>
+                                    </p:set>
+                                  </p:childTnLst>
+                                </p:cTn>
+                              </p:par>
+                            </p:childTnLst>
+                          </p:cTn>
+                        </p:par>
+                      </p:childTnLst>
+                    </p:cTn>
+                  </p:par>
+                  <p:par>
+                    <p:cTn id="23" fill="hold">
+                      <p:stCondLst>
+                        <p:cond delay="indefinite"/>
+                      </p:stCondLst>
+                      <p:childTnLst>
+                        <p:par>
+                          <p:cTn id="24" fill="hold">
+                            <p:stCondLst>
+                              <p:cond delay="0"/>
+                            </p:stCondLst>
+                            <p:childTnLst>
+                              <p:par>
+                                <p:cTn id="25" presetID="1" presetClass="entr" presetSubtype="0" fill="hold" grpId="0" nodeType="clickEffect">
+                                  <p:stCondLst>
+                                    <p:cond delay="0"/>
+                                  </p:stCondLst>
+                                  <p:childTnLst>
+                                    <p:set>
+                                      <p:cBhvr>
+                                        <p:cTn id="26" dur="1" fill="hold">
+                                          <p:stCondLst>
+                                            <p:cond delay="0"/>
+                                          </p:stCondLst>
+                                        </p:cTn>
+                                        <p:tgtEl>
+                                          <p:spTgt spid="3">
+                                            <p:txEl>
+                                              <p:pRg st="7" end="7"/>
+                                            </p:txEl>
+                                          </p:spTgt>
+                                        </p:tgtEl>
+                                        <p:attrNameLst>
+                                          <p:attrName>style.visibility</p:attrName>
+                                        </p:attrNameLst>
+                                      </p:cBhvr>
+                                      <p:to>
+                                        <p:strVal val="visible"/>
+                                      </p:to>
+                                    </p:set>
+                                  </p:childTnLst>
+                                </p:cTn>
+                              </p:par>
+                            </p:childTnLst>
+                          </p:cTn>
+                        </p:par>
+                      </p:childTnLst>
+                    </p:cTn>
+                  </p:par>
+                  <p:par>
+                    <p:cTn id="27" fill="hold">
+                      <p:stCondLst>
+                        <p:cond delay="indefinite"/>
+                      </p:stCondLst>
+                      <p:childTnLst>
+                        <p:par>
+                          <p:cTn id="28" fill="hold">
+                            <p:stCondLst>
+                              <p:cond delay="0"/>
+                            </p:stCondLst>
+                            <p:childTnLst>
+                              <p:par>
+                                <p:cTn id="29" presetID="1" presetClass="entr" presetSubtype="0" fill="hold" grpId="0" nodeType="clickEffect">
+                                  <p:stCondLst>
+                                    <p:cond delay="0"/>
+                                  </p:stCondLst>
+                                  <p:childTnLst>
+                                    <p:set>
+                                      <p:cBhvr>
+                                        <p:cTn id="30" dur="1" fill="hold">
+                                          <p:stCondLst>
+                                            <p:cond delay="0"/>
+                                          </p:stCondLst>
+                                        </p:cTn>
+                                        <p:tgtEl>
+                                          <p:spTgt spid="3">
+                                            <p:txEl>
+                                              <p:pRg st="8" end="8"/>
+                                            </p:txEl>
+                                          </p:spTgt>
+                                        </p:tgtEl>
+                                        <p:attrNameLst>
+                                          <p:attrName>style.visibility</p:attrName>
+                                        </p:attrNameLst>
+                                      </p:cBhvr>
+                                      <p:to>
+                                        <p:strVal val="visible"/>
+                                      </p:to>
+                                    </p:set>
+                                  </p:childTnLst>
+                                </p:cTn>
+                              </p:par>
+                            </p:childTnLst>
+                          </p:cTn>
+                        </p:par>
+                      </p:childTnLst>
+                    </p:cTn>
+                  </p:par>
+                </p:childTnLst>
+              </p:cTn>
+              <p:prevCondLst>
+                <p:cond evt="onPrev" delay="0">
+                  <p:tgtEl>
+                    <p:sldTgt/>
+                  </p:tgtEl>
+                </p:cond>
+              </p:prevCondLst>
+              <p:nextCondLst>
+                <p:cond evt="onNext" delay="0">
+                  <p:tgtEl>
+                    <p:sldTgt/>
+                  </p:tgtEl>
+                </p:cond>
+              </p:nextCondLst>
+            </p:seq>
+          </p:childTnLst>
+        </p:cTn>
+      </p:par>
+    </p:tnLst>
+    <p:bldLst>
+      <p:bldP spid="3" grpId="0" uiExpand="1" build="p"/>
+    </p:bldLst>
+  </p:timing>
+</p:sld>
+</file>
+
+<file path=ppt/slides/slide17.xml><?xml version="1.0" encoding="utf-8"?>
+<p:sld xmlns:a="http://schemas.openxmlformats.org/drawingml/2006/main" xmlns:r="http://schemas.openxmlformats.org/officeDocument/2006/relationships" xmlns:p="http://schemas.openxmlformats.org/presentationml/2006/main">
+  <p:cSld>
+    <p:spTree>
+      <p:nvGrpSpPr>
+        <p:cNvPr id="1" name=""/>
+        <p:cNvGrpSpPr/>
+        <p:nvPr/>
+      </p:nvGrpSpPr>
+      <p:grpSpPr>
+        <a:xfrm>
+          <a:off x="0" y="0"/>
+          <a:ext cx="0" cy="0"/>
+          <a:chOff x="0" y="0"/>
+          <a:chExt cx="0" cy="0"/>
+        </a:xfrm>
+      </p:grpSpPr>
+      <p:sp>
+        <p:nvSpPr>
+          <p:cNvPr id="2" name="Title 1"/>
+          <p:cNvSpPr>
+            <a:spLocks noGrp="1"/>
+          </p:cNvSpPr>
+          <p:nvPr>
+            <p:ph type="title"/>
+          </p:nvPr>
+        </p:nvSpPr>
+        <p:spPr/>
+        <p:txBody>
+          <a:bodyPr/>
+          <a:lstStyle/>
+          <a:p>
+            <a:pPr lvl="0" indent="0" marL="0">
+              <a:buNone/>
+            </a:pPr>
+            <a:r>
+              <a:rPr/>
               <a:t>커스텀 스테이트 (Custom States)</a:t>
             </a:r>
           </a:p>
@@ -7062,7 +7576,7 @@
 </p:sld>
 </file>
 
-<file path=ppt/slides/slide17.xml><?xml version="1.0" encoding="utf-8"?>
+<file path=ppt/slides/slide18.xml><?xml version="1.0" encoding="utf-8"?>
 <p:sld xmlns:a="http://schemas.openxmlformats.org/drawingml/2006/main" xmlns:r="http://schemas.openxmlformats.org/officeDocument/2006/relationships" xmlns:p="http://schemas.openxmlformats.org/presentationml/2006/main">
   <p:cSld>
     <p:spTree>
@@ -7606,7 +8120,7 @@
 </p:sld>
 </file>
 
-<file path=ppt/slides/slide18.xml><?xml version="1.0" encoding="utf-8"?>
+<file path=ppt/slides/slide19.xml><?xml version="1.0" encoding="utf-8"?>
 <p:sld xmlns:a="http://schemas.openxmlformats.org/drawingml/2006/main" xmlns:r="http://schemas.openxmlformats.org/officeDocument/2006/relationships" xmlns:p="http://schemas.openxmlformats.org/presentationml/2006/main">
   <p:cSld>
     <p:spTree>
@@ -8487,6 +9001,514 @@
                                           <p:spTgt spid="3">
                                             <p:txEl>
                                               <p:pRg st="9" end="9"/>
+                                            </p:txEl>
+                                          </p:spTgt>
+                                        </p:tgtEl>
+                                        <p:attrNameLst>
+                                          <p:attrName>style.visibility</p:attrName>
+                                        </p:attrNameLst>
+                                      </p:cBhvr>
+                                      <p:to>
+                                        <p:strVal val="visible"/>
+                                      </p:to>
+                                    </p:set>
+                                  </p:childTnLst>
+                                </p:cTn>
+                              </p:par>
+                            </p:childTnLst>
+                          </p:cTn>
+                        </p:par>
+                      </p:childTnLst>
+                    </p:cTn>
+                  </p:par>
+                </p:childTnLst>
+              </p:cTn>
+              <p:prevCondLst>
+                <p:cond evt="onPrev" delay="0">
+                  <p:tgtEl>
+                    <p:sldTgt/>
+                  </p:tgtEl>
+                </p:cond>
+              </p:prevCondLst>
+              <p:nextCondLst>
+                <p:cond evt="onNext" delay="0">
+                  <p:tgtEl>
+                    <p:sldTgt/>
+                  </p:tgtEl>
+                </p:cond>
+              </p:nextCondLst>
+            </p:seq>
+          </p:childTnLst>
+        </p:cTn>
+      </p:par>
+    </p:tnLst>
+    <p:bldLst>
+      <p:bldP spid="3" grpId="0" uiExpand="1" build="p"/>
+    </p:bldLst>
+  </p:timing>
+</p:sld>
+</file>
+
+<file path=ppt/slides/slide20.xml><?xml version="1.0" encoding="utf-8"?>
+<p:sld xmlns:a="http://schemas.openxmlformats.org/drawingml/2006/main" xmlns:r="http://schemas.openxmlformats.org/officeDocument/2006/relationships" xmlns:p="http://schemas.openxmlformats.org/presentationml/2006/main">
+  <p:cSld>
+    <p:spTree>
+      <p:nvGrpSpPr>
+        <p:cNvPr id="1" name=""/>
+        <p:cNvGrpSpPr/>
+        <p:nvPr/>
+      </p:nvGrpSpPr>
+      <p:grpSpPr>
+        <a:xfrm>
+          <a:off x="0" y="0"/>
+          <a:ext cx="0" cy="0"/>
+          <a:chOff x="0" y="0"/>
+          <a:chExt cx="0" cy="0"/>
+        </a:xfrm>
+      </p:grpSpPr>
+      <p:sp>
+        <p:nvSpPr>
+          <p:cNvPr id="2" name="Title 1"/>
+          <p:cNvSpPr>
+            <a:spLocks noGrp="1"/>
+          </p:cNvSpPr>
+          <p:nvPr>
+            <p:ph type="title"/>
+          </p:nvPr>
+        </p:nvSpPr>
+        <p:spPr/>
+        <p:txBody>
+          <a:bodyPr/>
+          <a:lstStyle/>
+          <a:p>
+            <a:pPr lvl="0" indent="0" marL="0">
+              <a:buNone/>
+            </a:pPr>
+            <a:r>
+              <a:rPr/>
+              <a:t>리유저블 엘리먼트(Reusable Elements)</a:t>
+            </a:r>
+          </a:p>
+        </p:txBody>
+      </p:sp>
+      <p:sp>
+        <p:nvSpPr>
+          <p:cNvPr id="3" name="Content Placeholder 2"/>
+          <p:cNvSpPr>
+            <a:spLocks noGrp="1"/>
+          </p:cNvSpPr>
+          <p:nvPr>
+            <p:ph idx="1"/>
+          </p:nvPr>
+        </p:nvSpPr>
+        <p:spPr/>
+        <p:txBody>
+          <a:bodyPr/>
+          <a:lstStyle/>
+          <a:p>
+            <a:pPr lvl="0"/>
+            <a:r>
+              <a:rPr/>
+              <a:t>피그마나 프레이머의 컴포넌트와 비슷한 역할</a:t>
+            </a:r>
+          </a:p>
+          <a:p>
+            <a:pPr lvl="0"/>
+            <a:r>
+              <a:rPr/>
+              <a:t>역시 ’닫힌 세계’의 개념이 비슷하나 워크플로우 등을 독자적으로 구축할 수 있어 좀 더 기능성이 있는 모습</a:t>
+            </a:r>
+          </a:p>
+          <a:p>
+            <a:pPr lvl="0"/>
+            <a:r>
+              <a:rPr/>
+              <a:t>모두 같은 모양에 Data to Send 를 통해 </a:t>
+            </a:r>
+            <a:r>
+              <a:rPr b="1"/>
+              <a:t>하나의 값만을 내부로 전달</a:t>
+            </a:r>
+            <a:r>
+              <a:rPr/>
+              <a:t>할 수 있어 활용이 어려웠으나</a:t>
+            </a:r>
+          </a:p>
+          <a:p>
+            <a:pPr lvl="1"/>
+            <a:r>
+              <a:rPr/>
+              <a:t>최근 커스텀 프로퍼티가 추가되어 활용도가 크게 높아졌음</a:t>
+            </a:r>
+          </a:p>
+          <a:p>
+            <a:pPr lvl="0" indent="0" marL="0">
+              <a:spcBef>
+                <a:spcPts val="3000"/>
+              </a:spcBef>
+              <a:buNone/>
+            </a:pPr>
+            <a:r>
+              <a:rPr b="1"/>
+              <a:t>커스텀 프로퍼티 (Custom Properties)</a:t>
+            </a:r>
+          </a:p>
+          <a:p>
+            <a:pPr lvl="0"/>
+            <a:r>
+              <a:rPr/>
+              <a:t>피그마, 프레이머의 Component Property와 비슷한 개념</a:t>
+            </a:r>
+          </a:p>
+          <a:p>
+            <a:pPr lvl="0"/>
+            <a:r>
+              <a:rPr/>
+              <a:t>기존 Data to send로 하나의 값만을 전달할 수 있었던 것과는 달리, 리유저블 엘리먼트 내부로 여러 개의 커스텀 프로퍼티를 전달 가능</a:t>
+            </a:r>
+          </a:p>
+          <a:p>
+            <a:pPr lvl="1"/>
+            <a:r>
+              <a:rPr/>
+              <a:t>커스텀 프로퍼티는 최초 전달 후 기능하지 않기 때문에, 이후 데이터를 반환하거나 하려면 커스텀 스테이트를 사용해야함</a:t>
+            </a:r>
+          </a:p>
+        </p:txBody>
+      </p:sp>
+    </p:spTree>
+  </p:cSld>
+  <p:timing>
+    <p:tnLst>
+      <p:par>
+        <p:cTn id="1" dur="indefinite" restart="never" nodeType="tmRoot">
+          <p:childTnLst>
+            <p:seq concurrent="1" nextAc="seek">
+              <p:cTn id="2" dur="indefinite" nodeType="mainSeq">
+                <p:childTnLst>
+                  <p:par>
+                    <p:cTn id="3" fill="hold">
+                      <p:stCondLst>
+                        <p:cond delay="indefinite"/>
+                      </p:stCondLst>
+                      <p:childTnLst>
+                        <p:par>
+                          <p:cTn id="4" fill="hold">
+                            <p:stCondLst>
+                              <p:cond delay="0"/>
+                            </p:stCondLst>
+                            <p:childTnLst>
+                              <p:par>
+                                <p:cTn id="5" presetID="1" presetClass="entr" presetSubtype="0" fill="hold" grpId="0" nodeType="clickEffect">
+                                  <p:stCondLst>
+                                    <p:cond delay="0"/>
+                                  </p:stCondLst>
+                                  <p:childTnLst>
+                                    <p:set>
+                                      <p:cBhvr>
+                                        <p:cTn id="6" dur="1" fill="hold">
+                                          <p:stCondLst>
+                                            <p:cond delay="0"/>
+                                          </p:stCondLst>
+                                        </p:cTn>
+                                        <p:tgtEl>
+                                          <p:spTgt spid="3">
+                                            <p:txEl>
+                                              <p:pRg st="0" end="0"/>
+                                            </p:txEl>
+                                          </p:spTgt>
+                                        </p:tgtEl>
+                                        <p:attrNameLst>
+                                          <p:attrName>style.visibility</p:attrName>
+                                        </p:attrNameLst>
+                                      </p:cBhvr>
+                                      <p:to>
+                                        <p:strVal val="visible"/>
+                                      </p:to>
+                                    </p:set>
+                                  </p:childTnLst>
+                                </p:cTn>
+                              </p:par>
+                            </p:childTnLst>
+                          </p:cTn>
+                        </p:par>
+                      </p:childTnLst>
+                    </p:cTn>
+                  </p:par>
+                  <p:par>
+                    <p:cTn id="7" fill="hold">
+                      <p:stCondLst>
+                        <p:cond delay="indefinite"/>
+                      </p:stCondLst>
+                      <p:childTnLst>
+                        <p:par>
+                          <p:cTn id="8" fill="hold">
+                            <p:stCondLst>
+                              <p:cond delay="0"/>
+                            </p:stCondLst>
+                            <p:childTnLst>
+                              <p:par>
+                                <p:cTn id="9" presetID="1" presetClass="entr" presetSubtype="0" fill="hold" grpId="0" nodeType="clickEffect">
+                                  <p:stCondLst>
+                                    <p:cond delay="0"/>
+                                  </p:stCondLst>
+                                  <p:childTnLst>
+                                    <p:set>
+                                      <p:cBhvr>
+                                        <p:cTn id="10" dur="1" fill="hold">
+                                          <p:stCondLst>
+                                            <p:cond delay="0"/>
+                                          </p:stCondLst>
+                                        </p:cTn>
+                                        <p:tgtEl>
+                                          <p:spTgt spid="3">
+                                            <p:txEl>
+                                              <p:pRg st="1" end="1"/>
+                                            </p:txEl>
+                                          </p:spTgt>
+                                        </p:tgtEl>
+                                        <p:attrNameLst>
+                                          <p:attrName>style.visibility</p:attrName>
+                                        </p:attrNameLst>
+                                      </p:cBhvr>
+                                      <p:to>
+                                        <p:strVal val="visible"/>
+                                      </p:to>
+                                    </p:set>
+                                  </p:childTnLst>
+                                </p:cTn>
+                              </p:par>
+                            </p:childTnLst>
+                          </p:cTn>
+                        </p:par>
+                      </p:childTnLst>
+                    </p:cTn>
+                  </p:par>
+                  <p:par>
+                    <p:cTn id="11" fill="hold">
+                      <p:stCondLst>
+                        <p:cond delay="indefinite"/>
+                      </p:stCondLst>
+                      <p:childTnLst>
+                        <p:par>
+                          <p:cTn id="12" fill="hold">
+                            <p:stCondLst>
+                              <p:cond delay="0"/>
+                            </p:stCondLst>
+                            <p:childTnLst>
+                              <p:par>
+                                <p:cTn id="13" presetID="1" presetClass="entr" presetSubtype="0" fill="hold" grpId="0" nodeType="clickEffect">
+                                  <p:stCondLst>
+                                    <p:cond delay="0"/>
+                                  </p:stCondLst>
+                                  <p:childTnLst>
+                                    <p:set>
+                                      <p:cBhvr>
+                                        <p:cTn id="14" dur="1" fill="hold">
+                                          <p:stCondLst>
+                                            <p:cond delay="0"/>
+                                          </p:stCondLst>
+                                        </p:cTn>
+                                        <p:tgtEl>
+                                          <p:spTgt spid="3">
+                                            <p:txEl>
+                                              <p:pRg st="2" end="2"/>
+                                            </p:txEl>
+                                          </p:spTgt>
+                                        </p:tgtEl>
+                                        <p:attrNameLst>
+                                          <p:attrName>style.visibility</p:attrName>
+                                        </p:attrNameLst>
+                                      </p:cBhvr>
+                                      <p:to>
+                                        <p:strVal val="visible"/>
+                                      </p:to>
+                                    </p:set>
+                                  </p:childTnLst>
+                                </p:cTn>
+                              </p:par>
+                            </p:childTnLst>
+                          </p:cTn>
+                        </p:par>
+                      </p:childTnLst>
+                    </p:cTn>
+                  </p:par>
+                  <p:par>
+                    <p:cTn id="15" fill="hold">
+                      <p:stCondLst>
+                        <p:cond delay="indefinite"/>
+                      </p:stCondLst>
+                      <p:childTnLst>
+                        <p:par>
+                          <p:cTn id="16" fill="hold">
+                            <p:stCondLst>
+                              <p:cond delay="0"/>
+                            </p:stCondLst>
+                            <p:childTnLst>
+                              <p:par>
+                                <p:cTn id="17" presetID="1" presetClass="entr" presetSubtype="0" fill="hold" grpId="0" nodeType="clickEffect">
+                                  <p:stCondLst>
+                                    <p:cond delay="0"/>
+                                  </p:stCondLst>
+                                  <p:childTnLst>
+                                    <p:set>
+                                      <p:cBhvr>
+                                        <p:cTn id="18" dur="1" fill="hold">
+                                          <p:stCondLst>
+                                            <p:cond delay="0"/>
+                                          </p:stCondLst>
+                                        </p:cTn>
+                                        <p:tgtEl>
+                                          <p:spTgt spid="3">
+                                            <p:txEl>
+                                              <p:pRg st="3" end="3"/>
+                                            </p:txEl>
+                                          </p:spTgt>
+                                        </p:tgtEl>
+                                        <p:attrNameLst>
+                                          <p:attrName>style.visibility</p:attrName>
+                                        </p:attrNameLst>
+                                      </p:cBhvr>
+                                      <p:to>
+                                        <p:strVal val="visible"/>
+                                      </p:to>
+                                    </p:set>
+                                  </p:childTnLst>
+                                </p:cTn>
+                              </p:par>
+                            </p:childTnLst>
+                          </p:cTn>
+                        </p:par>
+                      </p:childTnLst>
+                    </p:cTn>
+                  </p:par>
+                  <p:par>
+                    <p:cTn id="19" fill="hold">
+                      <p:stCondLst>
+                        <p:cond delay="indefinite"/>
+                      </p:stCondLst>
+                      <p:childTnLst>
+                        <p:par>
+                          <p:cTn id="20" fill="hold">
+                            <p:stCondLst>
+                              <p:cond delay="0"/>
+                            </p:stCondLst>
+                            <p:childTnLst>
+                              <p:par>
+                                <p:cTn id="21" presetID="1" presetClass="entr" presetSubtype="0" fill="hold" grpId="0" nodeType="clickEffect">
+                                  <p:stCondLst>
+                                    <p:cond delay="0"/>
+                                  </p:stCondLst>
+                                  <p:childTnLst>
+                                    <p:set>
+                                      <p:cBhvr>
+                                        <p:cTn id="22" dur="1" fill="hold">
+                                          <p:stCondLst>
+                                            <p:cond delay="0"/>
+                                          </p:stCondLst>
+                                        </p:cTn>
+                                        <p:tgtEl>
+                                          <p:spTgt spid="3">
+                                            <p:txEl>
+                                              <p:pRg st="5" end="5"/>
+                                            </p:txEl>
+                                          </p:spTgt>
+                                        </p:tgtEl>
+                                        <p:attrNameLst>
+                                          <p:attrName>style.visibility</p:attrName>
+                                        </p:attrNameLst>
+                                      </p:cBhvr>
+                                      <p:to>
+                                        <p:strVal val="visible"/>
+                                      </p:to>
+                                    </p:set>
+                                  </p:childTnLst>
+                                </p:cTn>
+                              </p:par>
+                            </p:childTnLst>
+                          </p:cTn>
+                        </p:par>
+                      </p:childTnLst>
+                    </p:cTn>
+                  </p:par>
+                  <p:par>
+                    <p:cTn id="23" fill="hold">
+                      <p:stCondLst>
+                        <p:cond delay="indefinite"/>
+                      </p:stCondLst>
+                      <p:childTnLst>
+                        <p:par>
+                          <p:cTn id="24" fill="hold">
+                            <p:stCondLst>
+                              <p:cond delay="0"/>
+                            </p:stCondLst>
+                            <p:childTnLst>
+                              <p:par>
+                                <p:cTn id="25" presetID="1" presetClass="entr" presetSubtype="0" fill="hold" grpId="0" nodeType="clickEffect">
+                                  <p:stCondLst>
+                                    <p:cond delay="0"/>
+                                  </p:stCondLst>
+                                  <p:childTnLst>
+                                    <p:set>
+                                      <p:cBhvr>
+                                        <p:cTn id="26" dur="1" fill="hold">
+                                          <p:stCondLst>
+                                            <p:cond delay="0"/>
+                                          </p:stCondLst>
+                                        </p:cTn>
+                                        <p:tgtEl>
+                                          <p:spTgt spid="3">
+                                            <p:txEl>
+                                              <p:pRg st="6" end="6"/>
+                                            </p:txEl>
+                                          </p:spTgt>
+                                        </p:tgtEl>
+                                        <p:attrNameLst>
+                                          <p:attrName>style.visibility</p:attrName>
+                                        </p:attrNameLst>
+                                      </p:cBhvr>
+                                      <p:to>
+                                        <p:strVal val="visible"/>
+                                      </p:to>
+                                    </p:set>
+                                  </p:childTnLst>
+                                </p:cTn>
+                              </p:par>
+                            </p:childTnLst>
+                          </p:cTn>
+                        </p:par>
+                      </p:childTnLst>
+                    </p:cTn>
+                  </p:par>
+                  <p:par>
+                    <p:cTn id="27" fill="hold">
+                      <p:stCondLst>
+                        <p:cond delay="indefinite"/>
+                      </p:stCondLst>
+                      <p:childTnLst>
+                        <p:par>
+                          <p:cTn id="28" fill="hold">
+                            <p:stCondLst>
+                              <p:cond delay="0"/>
+                            </p:stCondLst>
+                            <p:childTnLst>
+                              <p:par>
+                                <p:cTn id="29" presetID="1" presetClass="entr" presetSubtype="0" fill="hold" grpId="0" nodeType="clickEffect">
+                                  <p:stCondLst>
+                                    <p:cond delay="0"/>
+                                  </p:stCondLst>
+                                  <p:childTnLst>
+                                    <p:set>
+                                      <p:cBhvr>
+                                        <p:cTn id="30" dur="1" fill="hold">
+                                          <p:stCondLst>
+                                            <p:cond delay="0"/>
+                                          </p:stCondLst>
+                                        </p:cTn>
+                                        <p:tgtEl>
+                                          <p:spTgt spid="3">
+                                            <p:txEl>
+                                              <p:pRg st="7" end="7"/>
                                             </p:txEl>
                                           </p:spTgt>
                                         </p:tgtEl>
@@ -9497,6 +10519,22 @@
             </a:r>
           </a:p>
           <a:p>
+            <a:pPr lvl="1"/>
+            <a:r>
+              <a:rPr/>
+              <a:t>북마클릿 설정</a:t>
+            </a:r>
+          </a:p>
+          <a:p>
+            <a:pPr lvl="2"/>
+            <a:r>
+              <a:rPr>
+                <a:latin typeface="Courier"/>
+              </a:rPr>
+              <a:t>javascript:location.href=location.href.replaceAll("?debug_mode=true","");</a:t>
+            </a:r>
+          </a:p>
+          <a:p>
             <a:pPr lvl="0" indent="0" marL="0">
               <a:spcBef>
                 <a:spcPts val="3000"/>
@@ -9758,7 +10796,7 @@
                                         <p:tgtEl>
                                           <p:spTgt spid="3">
                                             <p:txEl>
-                                              <p:pRg st="6" end="6"/>
+                                              <p:pRg st="5" end="5"/>
                                             </p:txEl>
                                           </p:spTgt>
                                         </p:tgtEl>
@@ -9807,7 +10845,105 @@
                                         <p:tgtEl>
                                           <p:spTgt spid="3">
                                             <p:txEl>
-                                              <p:pRg st="7" end="7"/>
+                                              <p:pRg st="6" end="6"/>
+                                            </p:txEl>
+                                          </p:spTgt>
+                                        </p:tgtEl>
+                                        <p:attrNameLst>
+                                          <p:attrName>style.visibility</p:attrName>
+                                        </p:attrNameLst>
+                                      </p:cBhvr>
+                                      <p:to>
+                                        <p:strVal val="visible"/>
+                                      </p:to>
+                                    </p:set>
+                                  </p:childTnLst>
+                                </p:cTn>
+                              </p:par>
+                            </p:childTnLst>
+                          </p:cTn>
+                        </p:par>
+                      </p:childTnLst>
+                    </p:cTn>
+                  </p:par>
+                  <p:par>
+                    <p:cTn id="27" fill="hold">
+                      <p:stCondLst>
+                        <p:cond delay="indefinite"/>
+                      </p:stCondLst>
+                      <p:childTnLst>
+                        <p:par>
+                          <p:cTn id="28" fill="hold">
+                            <p:stCondLst>
+                              <p:cond delay="0"/>
+                            </p:stCondLst>
+                            <p:childTnLst>
+                              <p:par>
+                                <p:cTn id="29" presetID="1" presetClass="entr" presetSubtype="0" fill="hold" grpId="0" nodeType="clickEffect">
+                                  <p:stCondLst>
+                                    <p:cond delay="0"/>
+                                  </p:stCondLst>
+                                  <p:childTnLst>
+                                    <p:set>
+                                      <p:cBhvr>
+                                        <p:cTn id="30" dur="1" fill="hold">
+                                          <p:stCondLst>
+                                            <p:cond delay="0"/>
+                                          </p:stCondLst>
+                                        </p:cTn>
+                                        <p:tgtEl>
+                                          <p:spTgt spid="3">
+                                            <p:txEl>
+                                              <p:pRg st="8" end="8"/>
+                                            </p:txEl>
+                                          </p:spTgt>
+                                        </p:tgtEl>
+                                        <p:attrNameLst>
+                                          <p:attrName>style.visibility</p:attrName>
+                                        </p:attrNameLst>
+                                      </p:cBhvr>
+                                      <p:to>
+                                        <p:strVal val="visible"/>
+                                      </p:to>
+                                    </p:set>
+                                  </p:childTnLst>
+                                </p:cTn>
+                              </p:par>
+                            </p:childTnLst>
+                          </p:cTn>
+                        </p:par>
+                      </p:childTnLst>
+                    </p:cTn>
+                  </p:par>
+                  <p:par>
+                    <p:cTn id="31" fill="hold">
+                      <p:stCondLst>
+                        <p:cond delay="indefinite"/>
+                      </p:stCondLst>
+                      <p:childTnLst>
+                        <p:par>
+                          <p:cTn id="32" fill="hold">
+                            <p:stCondLst>
+                              <p:cond delay="0"/>
+                            </p:stCondLst>
+                            <p:childTnLst>
+                              <p:par>
+                                <p:cTn id="33" presetID="1" presetClass="entr" presetSubtype="0" fill="hold" grpId="0" nodeType="clickEffect">
+                                  <p:stCondLst>
+                                    <p:cond delay="0"/>
+                                  </p:stCondLst>
+                                  <p:childTnLst>
+                                    <p:set>
+                                      <p:cBhvr>
+                                        <p:cTn id="34" dur="1" fill="hold">
+                                          <p:stCondLst>
+                                            <p:cond delay="0"/>
+                                          </p:stCondLst>
+                                        </p:cTn>
+                                        <p:tgtEl>
+                                          <p:spTgt spid="3">
+                                            <p:txEl>
+                                              <p:pRg st="9" end="9"/>
                                             </p:txEl>
                                           </p:spTgt>
                                         </p:tgtEl>

</xml_diff>

<commit_message>
백업 완료: 2023-11-26 06:58:20
Affected files:
노코드 엔지니어링/노코드 최강자 버블.md
노코드 엔지니어링/노코드 최강자 버블.pptx
</commit_message>
<xml_diff>
--- a/노코드 엔지니어링/노코드 최강자 버블.pptx
+++ b/노코드 엔지니어링/노코드 최강자 버블.pptx
@@ -25,6 +25,9 @@
     <p:sldId id="273" r:id="rId19"/>
     <p:sldId id="274" r:id="rId20"/>
     <p:sldId id="275" r:id="rId21"/>
+    <p:sldId id="276" r:id="rId22"/>
+    <p:sldId id="277" r:id="rId23"/>
+    <p:sldId id="278" r:id="rId24"/>
   </p:sldIdLst>
   <p:sldSz cx="12192000" cy="6858000"/>
   <p:notesSz cx="6858000" cy="9144000"/>
@@ -4496,6 +4499,1076 @@
             </a:pPr>
             <a:r>
               <a:rPr/>
+              <a:t>User 타입</a:t>
+            </a:r>
+          </a:p>
+        </p:txBody>
+      </p:sp>
+      <p:sp>
+        <p:nvSpPr>
+          <p:cNvPr id="3" name="Content Placeholder 2"/>
+          <p:cNvSpPr>
+            <a:spLocks noGrp="1"/>
+          </p:cNvSpPr>
+          <p:nvPr>
+            <p:ph idx="1"/>
+          </p:nvPr>
+        </p:nvSpPr>
+        <p:spPr/>
+        <p:txBody>
+          <a:bodyPr/>
+          <a:lstStyle/>
+          <a:p>
+            <a:pPr lvl="0"/>
+            <a:r>
+              <a:rPr/>
+              <a:t>버블이 빌트인으로 제공하는 Data Type의 하나</a:t>
+            </a:r>
+          </a:p>
+          <a:p>
+            <a:pPr lvl="1"/>
+            <a:r>
+              <a:rPr/>
+              <a:t>회원을 가입시키고, 로그인시키는 데에 필요한 인증/보안 관련 기능을 지원하기 위해 기본으로 지원.</a:t>
+            </a:r>
+          </a:p>
+          <a:p>
+            <a:pPr lvl="0"/>
+            <a:r>
+              <a:rPr/>
+              <a:t>이메일 주소를 ID로 사용하고 다양한 가입/로그인 방식 지원</a:t>
+            </a:r>
+          </a:p>
+          <a:p>
+            <a:pPr lvl="1"/>
+            <a:r>
+              <a:rPr/>
+              <a:t>매직 링크 (링크로 바로 로그인할 수 있는) 이메일 전송</a:t>
+            </a:r>
+          </a:p>
+          <a:p>
+            <a:pPr lvl="1"/>
+            <a:r>
+              <a:rPr/>
+              <a:t>비밀번호 변경 지원</a:t>
+            </a:r>
+          </a:p>
+          <a:p>
+            <a:pPr lvl="1"/>
+            <a:r>
+              <a:rPr/>
+              <a:t>구글 등 외부 oAuth 2.0 API 사용 가능</a:t>
+            </a:r>
+          </a:p>
+          <a:p>
+            <a:pPr lvl="2"/>
+            <a:r>
+              <a:rPr/>
+              <a:t>Open Authorization 2.0</a:t>
+            </a:r>
+          </a:p>
+          <a:p>
+            <a:pPr lvl="0" indent="0" marL="0">
+              <a:spcBef>
+                <a:spcPts val="3000"/>
+              </a:spcBef>
+              <a:buNone/>
+            </a:pPr>
+            <a:r>
+              <a:rPr b="1"/>
+              <a:t>User를 사용할 때 주의할 점.</a:t>
+            </a:r>
+          </a:p>
+          <a:p>
+            <a:pPr lvl="0"/>
+            <a:r>
+              <a:rPr/>
+              <a:t>Privacy Rules를 항상 신경써야 함.</a:t>
+            </a:r>
+          </a:p>
+          <a:p>
+            <a:pPr lvl="0"/>
+            <a:r>
+              <a:rPr>
+                <a:latin typeface="Courier"/>
+              </a:rPr>
+              <a:t>Sign the user up</a:t>
+            </a:r>
+            <a:r>
+              <a:rPr/>
+              <a:t> 액션은,</a:t>
+            </a:r>
+          </a:p>
+          <a:p>
+            <a:pPr lvl="1"/>
+            <a:r>
+              <a:rPr/>
+              <a:t>유저를 가입시키고, 로그인도 시킴.</a:t>
+            </a:r>
+          </a:p>
+          <a:p>
+            <a:pPr lvl="1"/>
+            <a:r>
+              <a:rPr/>
+              <a:t>현재 유저의 로그인을 해제하지 않고 다른 유저를 생성하려면 </a:t>
+            </a:r>
+            <a:r>
+              <a:rPr>
+                <a:latin typeface="Courier"/>
+              </a:rPr>
+              <a:t>Create account for someone else</a:t>
+            </a:r>
+            <a:r>
+              <a:rPr/>
+              <a:t> 액션을 사용</a:t>
+            </a:r>
+          </a:p>
+        </p:txBody>
+      </p:sp>
+    </p:spTree>
+  </p:cSld>
+  <p:timing>
+    <p:tnLst>
+      <p:par>
+        <p:cTn id="1" dur="indefinite" restart="never" nodeType="tmRoot">
+          <p:childTnLst>
+            <p:seq concurrent="1" nextAc="seek">
+              <p:cTn id="2" dur="indefinite" nodeType="mainSeq">
+                <p:childTnLst>
+                  <p:par>
+                    <p:cTn id="3" fill="hold">
+                      <p:stCondLst>
+                        <p:cond delay="indefinite"/>
+                      </p:stCondLst>
+                      <p:childTnLst>
+                        <p:par>
+                          <p:cTn id="4" fill="hold">
+                            <p:stCondLst>
+                              <p:cond delay="0"/>
+                            </p:stCondLst>
+                            <p:childTnLst>
+                              <p:par>
+                                <p:cTn id="5" presetID="1" presetClass="entr" presetSubtype="0" fill="hold" grpId="0" nodeType="clickEffect">
+                                  <p:stCondLst>
+                                    <p:cond delay="0"/>
+                                  </p:stCondLst>
+                                  <p:childTnLst>
+                                    <p:set>
+                                      <p:cBhvr>
+                                        <p:cTn id="6" dur="1" fill="hold">
+                                          <p:stCondLst>
+                                            <p:cond delay="0"/>
+                                          </p:stCondLst>
+                                        </p:cTn>
+                                        <p:tgtEl>
+                                          <p:spTgt spid="3">
+                                            <p:txEl>
+                                              <p:pRg st="0" end="0"/>
+                                            </p:txEl>
+                                          </p:spTgt>
+                                        </p:tgtEl>
+                                        <p:attrNameLst>
+                                          <p:attrName>style.visibility</p:attrName>
+                                        </p:attrNameLst>
+                                      </p:cBhvr>
+                                      <p:to>
+                                        <p:strVal val="visible"/>
+                                      </p:to>
+                                    </p:set>
+                                  </p:childTnLst>
+                                </p:cTn>
+                              </p:par>
+                            </p:childTnLst>
+                          </p:cTn>
+                        </p:par>
+                      </p:childTnLst>
+                    </p:cTn>
+                  </p:par>
+                  <p:par>
+                    <p:cTn id="7" fill="hold">
+                      <p:stCondLst>
+                        <p:cond delay="indefinite"/>
+                      </p:stCondLst>
+                      <p:childTnLst>
+                        <p:par>
+                          <p:cTn id="8" fill="hold">
+                            <p:stCondLst>
+                              <p:cond delay="0"/>
+                            </p:stCondLst>
+                            <p:childTnLst>
+                              <p:par>
+                                <p:cTn id="9" presetID="1" presetClass="entr" presetSubtype="0" fill="hold" grpId="0" nodeType="clickEffect">
+                                  <p:stCondLst>
+                                    <p:cond delay="0"/>
+                                  </p:stCondLst>
+                                  <p:childTnLst>
+                                    <p:set>
+                                      <p:cBhvr>
+                                        <p:cTn id="10" dur="1" fill="hold">
+                                          <p:stCondLst>
+                                            <p:cond delay="0"/>
+                                          </p:stCondLst>
+                                        </p:cTn>
+                                        <p:tgtEl>
+                                          <p:spTgt spid="3">
+                                            <p:txEl>
+                                              <p:pRg st="1" end="1"/>
+                                            </p:txEl>
+                                          </p:spTgt>
+                                        </p:tgtEl>
+                                        <p:attrNameLst>
+                                          <p:attrName>style.visibility</p:attrName>
+                                        </p:attrNameLst>
+                                      </p:cBhvr>
+                                      <p:to>
+                                        <p:strVal val="visible"/>
+                                      </p:to>
+                                    </p:set>
+                                  </p:childTnLst>
+                                </p:cTn>
+                              </p:par>
+                            </p:childTnLst>
+                          </p:cTn>
+                        </p:par>
+                      </p:childTnLst>
+                    </p:cTn>
+                  </p:par>
+                  <p:par>
+                    <p:cTn id="11" fill="hold">
+                      <p:stCondLst>
+                        <p:cond delay="indefinite"/>
+                      </p:stCondLst>
+                      <p:childTnLst>
+                        <p:par>
+                          <p:cTn id="12" fill="hold">
+                            <p:stCondLst>
+                              <p:cond delay="0"/>
+                            </p:stCondLst>
+                            <p:childTnLst>
+                              <p:par>
+                                <p:cTn id="13" presetID="1" presetClass="entr" presetSubtype="0" fill="hold" grpId="0" nodeType="clickEffect">
+                                  <p:stCondLst>
+                                    <p:cond delay="0"/>
+                                  </p:stCondLst>
+                                  <p:childTnLst>
+                                    <p:set>
+                                      <p:cBhvr>
+                                        <p:cTn id="14" dur="1" fill="hold">
+                                          <p:stCondLst>
+                                            <p:cond delay="0"/>
+                                          </p:stCondLst>
+                                        </p:cTn>
+                                        <p:tgtEl>
+                                          <p:spTgt spid="3">
+                                            <p:txEl>
+                                              <p:pRg st="2" end="2"/>
+                                            </p:txEl>
+                                          </p:spTgt>
+                                        </p:tgtEl>
+                                        <p:attrNameLst>
+                                          <p:attrName>style.visibility</p:attrName>
+                                        </p:attrNameLst>
+                                      </p:cBhvr>
+                                      <p:to>
+                                        <p:strVal val="visible"/>
+                                      </p:to>
+                                    </p:set>
+                                  </p:childTnLst>
+                                </p:cTn>
+                              </p:par>
+                            </p:childTnLst>
+                          </p:cTn>
+                        </p:par>
+                      </p:childTnLst>
+                    </p:cTn>
+                  </p:par>
+                  <p:par>
+                    <p:cTn id="15" fill="hold">
+                      <p:stCondLst>
+                        <p:cond delay="indefinite"/>
+                      </p:stCondLst>
+                      <p:childTnLst>
+                        <p:par>
+                          <p:cTn id="16" fill="hold">
+                            <p:stCondLst>
+                              <p:cond delay="0"/>
+                            </p:stCondLst>
+                            <p:childTnLst>
+                              <p:par>
+                                <p:cTn id="17" presetID="1" presetClass="entr" presetSubtype="0" fill="hold" grpId="0" nodeType="clickEffect">
+                                  <p:stCondLst>
+                                    <p:cond delay="0"/>
+                                  </p:stCondLst>
+                                  <p:childTnLst>
+                                    <p:set>
+                                      <p:cBhvr>
+                                        <p:cTn id="18" dur="1" fill="hold">
+                                          <p:stCondLst>
+                                            <p:cond delay="0"/>
+                                          </p:stCondLst>
+                                        </p:cTn>
+                                        <p:tgtEl>
+                                          <p:spTgt spid="3">
+                                            <p:txEl>
+                                              <p:pRg st="3" end="3"/>
+                                            </p:txEl>
+                                          </p:spTgt>
+                                        </p:tgtEl>
+                                        <p:attrNameLst>
+                                          <p:attrName>style.visibility</p:attrName>
+                                        </p:attrNameLst>
+                                      </p:cBhvr>
+                                      <p:to>
+                                        <p:strVal val="visible"/>
+                                      </p:to>
+                                    </p:set>
+                                  </p:childTnLst>
+                                </p:cTn>
+                              </p:par>
+                            </p:childTnLst>
+                          </p:cTn>
+                        </p:par>
+                      </p:childTnLst>
+                    </p:cTn>
+                  </p:par>
+                  <p:par>
+                    <p:cTn id="19" fill="hold">
+                      <p:stCondLst>
+                        <p:cond delay="indefinite"/>
+                      </p:stCondLst>
+                      <p:childTnLst>
+                        <p:par>
+                          <p:cTn id="20" fill="hold">
+                            <p:stCondLst>
+                              <p:cond delay="0"/>
+                            </p:stCondLst>
+                            <p:childTnLst>
+                              <p:par>
+                                <p:cTn id="21" presetID="1" presetClass="entr" presetSubtype="0" fill="hold" grpId="0" nodeType="clickEffect">
+                                  <p:stCondLst>
+                                    <p:cond delay="0"/>
+                                  </p:stCondLst>
+                                  <p:childTnLst>
+                                    <p:set>
+                                      <p:cBhvr>
+                                        <p:cTn id="22" dur="1" fill="hold">
+                                          <p:stCondLst>
+                                            <p:cond delay="0"/>
+                                          </p:stCondLst>
+                                        </p:cTn>
+                                        <p:tgtEl>
+                                          <p:spTgt spid="3">
+                                            <p:txEl>
+                                              <p:pRg st="4" end="4"/>
+                                            </p:txEl>
+                                          </p:spTgt>
+                                        </p:tgtEl>
+                                        <p:attrNameLst>
+                                          <p:attrName>style.visibility</p:attrName>
+                                        </p:attrNameLst>
+                                      </p:cBhvr>
+                                      <p:to>
+                                        <p:strVal val="visible"/>
+                                      </p:to>
+                                    </p:set>
+                                  </p:childTnLst>
+                                </p:cTn>
+                              </p:par>
+                            </p:childTnLst>
+                          </p:cTn>
+                        </p:par>
+                      </p:childTnLst>
+                    </p:cTn>
+                  </p:par>
+                  <p:par>
+                    <p:cTn id="23" fill="hold">
+                      <p:stCondLst>
+                        <p:cond delay="indefinite"/>
+                      </p:stCondLst>
+                      <p:childTnLst>
+                        <p:par>
+                          <p:cTn id="24" fill="hold">
+                            <p:stCondLst>
+                              <p:cond delay="0"/>
+                            </p:stCondLst>
+                            <p:childTnLst>
+                              <p:par>
+                                <p:cTn id="25" presetID="1" presetClass="entr" presetSubtype="0" fill="hold" grpId="0" nodeType="clickEffect">
+                                  <p:stCondLst>
+                                    <p:cond delay="0"/>
+                                  </p:stCondLst>
+                                  <p:childTnLst>
+                                    <p:set>
+                                      <p:cBhvr>
+                                        <p:cTn id="26" dur="1" fill="hold">
+                                          <p:stCondLst>
+                                            <p:cond delay="0"/>
+                                          </p:stCondLst>
+                                        </p:cTn>
+                                        <p:tgtEl>
+                                          <p:spTgt spid="3">
+                                            <p:txEl>
+                                              <p:pRg st="5" end="5"/>
+                                            </p:txEl>
+                                          </p:spTgt>
+                                        </p:tgtEl>
+                                        <p:attrNameLst>
+                                          <p:attrName>style.visibility</p:attrName>
+                                        </p:attrNameLst>
+                                      </p:cBhvr>
+                                      <p:to>
+                                        <p:strVal val="visible"/>
+                                      </p:to>
+                                    </p:set>
+                                  </p:childTnLst>
+                                </p:cTn>
+                              </p:par>
+                            </p:childTnLst>
+                          </p:cTn>
+                        </p:par>
+                      </p:childTnLst>
+                    </p:cTn>
+                  </p:par>
+                  <p:par>
+                    <p:cTn id="27" fill="hold">
+                      <p:stCondLst>
+                        <p:cond delay="indefinite"/>
+                      </p:stCondLst>
+                      <p:childTnLst>
+                        <p:par>
+                          <p:cTn id="28" fill="hold">
+                            <p:stCondLst>
+                              <p:cond delay="0"/>
+                            </p:stCondLst>
+                            <p:childTnLst>
+                              <p:par>
+                                <p:cTn id="29" presetID="1" presetClass="entr" presetSubtype="0" fill="hold" grpId="0" nodeType="clickEffect">
+                                  <p:stCondLst>
+                                    <p:cond delay="0"/>
+                                  </p:stCondLst>
+                                  <p:childTnLst>
+                                    <p:set>
+                                      <p:cBhvr>
+                                        <p:cTn id="30" dur="1" fill="hold">
+                                          <p:stCondLst>
+                                            <p:cond delay="0"/>
+                                          </p:stCondLst>
+                                        </p:cTn>
+                                        <p:tgtEl>
+                                          <p:spTgt spid="3">
+                                            <p:txEl>
+                                              <p:pRg st="6" end="6"/>
+                                            </p:txEl>
+                                          </p:spTgt>
+                                        </p:tgtEl>
+                                        <p:attrNameLst>
+                                          <p:attrName>style.visibility</p:attrName>
+                                        </p:attrNameLst>
+                                      </p:cBhvr>
+                                      <p:to>
+                                        <p:strVal val="visible"/>
+                                      </p:to>
+                                    </p:set>
+                                  </p:childTnLst>
+                                </p:cTn>
+                              </p:par>
+                            </p:childTnLst>
+                          </p:cTn>
+                        </p:par>
+                      </p:childTnLst>
+                    </p:cTn>
+                  </p:par>
+                  <p:par>
+                    <p:cTn id="31" fill="hold">
+                      <p:stCondLst>
+                        <p:cond delay="indefinite"/>
+                      </p:stCondLst>
+                      <p:childTnLst>
+                        <p:par>
+                          <p:cTn id="32" fill="hold">
+                            <p:stCondLst>
+                              <p:cond delay="0"/>
+                            </p:stCondLst>
+                            <p:childTnLst>
+                              <p:par>
+                                <p:cTn id="33" presetID="1" presetClass="entr" presetSubtype="0" fill="hold" grpId="0" nodeType="clickEffect">
+                                  <p:stCondLst>
+                                    <p:cond delay="0"/>
+                                  </p:stCondLst>
+                                  <p:childTnLst>
+                                    <p:set>
+                                      <p:cBhvr>
+                                        <p:cTn id="34" dur="1" fill="hold">
+                                          <p:stCondLst>
+                                            <p:cond delay="0"/>
+                                          </p:stCondLst>
+                                        </p:cTn>
+                                        <p:tgtEl>
+                                          <p:spTgt spid="3">
+                                            <p:txEl>
+                                              <p:pRg st="8" end="8"/>
+                                            </p:txEl>
+                                          </p:spTgt>
+                                        </p:tgtEl>
+                                        <p:attrNameLst>
+                                          <p:attrName>style.visibility</p:attrName>
+                                        </p:attrNameLst>
+                                      </p:cBhvr>
+                                      <p:to>
+                                        <p:strVal val="visible"/>
+                                      </p:to>
+                                    </p:set>
+                                  </p:childTnLst>
+                                </p:cTn>
+                              </p:par>
+                            </p:childTnLst>
+                          </p:cTn>
+                        </p:par>
+                      </p:childTnLst>
+                    </p:cTn>
+                  </p:par>
+                  <p:par>
+                    <p:cTn id="35" fill="hold">
+                      <p:stCondLst>
+                        <p:cond delay="indefinite"/>
+                      </p:stCondLst>
+                      <p:childTnLst>
+                        <p:par>
+                          <p:cTn id="36" fill="hold">
+                            <p:stCondLst>
+                              <p:cond delay="0"/>
+                            </p:stCondLst>
+                            <p:childTnLst>
+                              <p:par>
+                                <p:cTn id="37" presetID="1" presetClass="entr" presetSubtype="0" fill="hold" grpId="0" nodeType="clickEffect">
+                                  <p:stCondLst>
+                                    <p:cond delay="0"/>
+                                  </p:stCondLst>
+                                  <p:childTnLst>
+                                    <p:set>
+                                      <p:cBhvr>
+                                        <p:cTn id="38" dur="1" fill="hold">
+                                          <p:stCondLst>
+                                            <p:cond delay="0"/>
+                                          </p:stCondLst>
+                                        </p:cTn>
+                                        <p:tgtEl>
+                                          <p:spTgt spid="3">
+                                            <p:txEl>
+                                              <p:pRg st="9" end="9"/>
+                                            </p:txEl>
+                                          </p:spTgt>
+                                        </p:tgtEl>
+                                        <p:attrNameLst>
+                                          <p:attrName>style.visibility</p:attrName>
+                                        </p:attrNameLst>
+                                      </p:cBhvr>
+                                      <p:to>
+                                        <p:strVal val="visible"/>
+                                      </p:to>
+                                    </p:set>
+                                  </p:childTnLst>
+                                </p:cTn>
+                              </p:par>
+                            </p:childTnLst>
+                          </p:cTn>
+                        </p:par>
+                      </p:childTnLst>
+                    </p:cTn>
+                  </p:par>
+                  <p:par>
+                    <p:cTn id="39" fill="hold">
+                      <p:stCondLst>
+                        <p:cond delay="indefinite"/>
+                      </p:stCondLst>
+                      <p:childTnLst>
+                        <p:par>
+                          <p:cTn id="40" fill="hold">
+                            <p:stCondLst>
+                              <p:cond delay="0"/>
+                            </p:stCondLst>
+                            <p:childTnLst>
+                              <p:par>
+                                <p:cTn id="41" presetID="1" presetClass="entr" presetSubtype="0" fill="hold" grpId="0" nodeType="clickEffect">
+                                  <p:stCondLst>
+                                    <p:cond delay="0"/>
+                                  </p:stCondLst>
+                                  <p:childTnLst>
+                                    <p:set>
+                                      <p:cBhvr>
+                                        <p:cTn id="42" dur="1" fill="hold">
+                                          <p:stCondLst>
+                                            <p:cond delay="0"/>
+                                          </p:stCondLst>
+                                        </p:cTn>
+                                        <p:tgtEl>
+                                          <p:spTgt spid="3">
+                                            <p:txEl>
+                                              <p:pRg st="10" end="10"/>
+                                            </p:txEl>
+                                          </p:spTgt>
+                                        </p:tgtEl>
+                                        <p:attrNameLst>
+                                          <p:attrName>style.visibility</p:attrName>
+                                        </p:attrNameLst>
+                                      </p:cBhvr>
+                                      <p:to>
+                                        <p:strVal val="visible"/>
+                                      </p:to>
+                                    </p:set>
+                                  </p:childTnLst>
+                                </p:cTn>
+                              </p:par>
+                            </p:childTnLst>
+                          </p:cTn>
+                        </p:par>
+                      </p:childTnLst>
+                    </p:cTn>
+                  </p:par>
+                  <p:par>
+                    <p:cTn id="43" fill="hold">
+                      <p:stCondLst>
+                        <p:cond delay="indefinite"/>
+                      </p:stCondLst>
+                      <p:childTnLst>
+                        <p:par>
+                          <p:cTn id="44" fill="hold">
+                            <p:stCondLst>
+                              <p:cond delay="0"/>
+                            </p:stCondLst>
+                            <p:childTnLst>
+                              <p:par>
+                                <p:cTn id="45" presetID="1" presetClass="entr" presetSubtype="0" fill="hold" grpId="0" nodeType="clickEffect">
+                                  <p:stCondLst>
+                                    <p:cond delay="0"/>
+                                  </p:stCondLst>
+                                  <p:childTnLst>
+                                    <p:set>
+                                      <p:cBhvr>
+                                        <p:cTn id="46" dur="1" fill="hold">
+                                          <p:stCondLst>
+                                            <p:cond delay="0"/>
+                                          </p:stCondLst>
+                                        </p:cTn>
+                                        <p:tgtEl>
+                                          <p:spTgt spid="3">
+                                            <p:txEl>
+                                              <p:pRg st="11" end="11"/>
+                                            </p:txEl>
+                                          </p:spTgt>
+                                        </p:tgtEl>
+                                        <p:attrNameLst>
+                                          <p:attrName>style.visibility</p:attrName>
+                                        </p:attrNameLst>
+                                      </p:cBhvr>
+                                      <p:to>
+                                        <p:strVal val="visible"/>
+                                      </p:to>
+                                    </p:set>
+                                  </p:childTnLst>
+                                </p:cTn>
+                              </p:par>
+                            </p:childTnLst>
+                          </p:cTn>
+                        </p:par>
+                      </p:childTnLst>
+                    </p:cTn>
+                  </p:par>
+                </p:childTnLst>
+              </p:cTn>
+              <p:prevCondLst>
+                <p:cond evt="onPrev" delay="0">
+                  <p:tgtEl>
+                    <p:sldTgt/>
+                  </p:tgtEl>
+                </p:cond>
+              </p:prevCondLst>
+              <p:nextCondLst>
+                <p:cond evt="onNext" delay="0">
+                  <p:tgtEl>
+                    <p:sldTgt/>
+                  </p:tgtEl>
+                </p:cond>
+              </p:nextCondLst>
+            </p:seq>
+          </p:childTnLst>
+        </p:cTn>
+      </p:par>
+    </p:tnLst>
+    <p:bldLst>
+      <p:bldP spid="3" grpId="0" uiExpand="1" build="p"/>
+    </p:bldLst>
+  </p:timing>
+</p:sld>
+</file>
+
+<file path=ppt/slides/slide12.xml><?xml version="1.0" encoding="utf-8"?>
+<p:sld xmlns:a="http://schemas.openxmlformats.org/drawingml/2006/main" xmlns:r="http://schemas.openxmlformats.org/officeDocument/2006/relationships" xmlns:p="http://schemas.openxmlformats.org/presentationml/2006/main">
+  <p:cSld>
+    <p:spTree>
+      <p:nvGrpSpPr>
+        <p:cNvPr id="1" name=""/>
+        <p:cNvGrpSpPr/>
+        <p:nvPr/>
+      </p:nvGrpSpPr>
+      <p:grpSpPr>
+        <a:xfrm>
+          <a:off x="0" y="0"/>
+          <a:ext cx="0" cy="0"/>
+          <a:chOff x="0" y="0"/>
+          <a:chExt cx="0" cy="0"/>
+        </a:xfrm>
+      </p:grpSpPr>
+      <p:sp>
+        <p:nvSpPr>
+          <p:cNvPr id="2" name="Title 1"/>
+          <p:cNvSpPr>
+            <a:spLocks noGrp="1"/>
+          </p:cNvSpPr>
+          <p:nvPr>
+            <p:ph type="title"/>
+          </p:nvPr>
+        </p:nvSpPr>
+        <p:spPr/>
+        <p:txBody>
+          <a:bodyPr/>
+          <a:lstStyle/>
+          <a:p>
+            <a:pPr lvl="0" indent="0" marL="0">
+              <a:buNone/>
+            </a:pPr>
+            <a:r>
+              <a:rPr/>
+              <a:t>Privacy Rules</a:t>
+            </a:r>
+          </a:p>
+        </p:txBody>
+      </p:sp>
+      <p:sp>
+        <p:nvSpPr>
+          <p:cNvPr id="3" name="Content Placeholder 2"/>
+          <p:cNvSpPr>
+            <a:spLocks noGrp="1"/>
+          </p:cNvSpPr>
+          <p:nvPr>
+            <p:ph idx="1"/>
+          </p:nvPr>
+        </p:nvSpPr>
+        <p:spPr/>
+        <p:txBody>
+          <a:bodyPr/>
+          <a:lstStyle/>
+          <a:p>
+            <a:pPr lvl="0"/>
+            <a:r>
+              <a:rPr/>
+              <a:t>프라이버시를 지키기 위해 데이터베이스에 대한 접근권한을 화이트리스트 방식으로 풀어주는 방법</a:t>
+            </a:r>
+          </a:p>
+          <a:p>
+            <a:pPr lvl="0"/>
+            <a:r>
+              <a:rPr/>
+              <a:t>각 Data Type 마다 별도로 조건을 설정</a:t>
+            </a:r>
+          </a:p>
+          <a:p>
+            <a:pPr lvl="0"/>
+            <a:r>
+              <a:rPr/>
+              <a:t>User 타입의 데이터는 기본적으로 </a:t>
+            </a:r>
+            <a:r>
+              <a:rPr>
+                <a:latin typeface="Courier"/>
+              </a:rPr>
+              <a:t>This User is Current User</a:t>
+            </a:r>
+            <a:r>
+              <a:rPr/>
+              <a:t>, 즉 데이터의 소유자가 로그인해있을 때만 수정, 조회 가능하도록 설정되어 있음.</a:t>
+            </a:r>
+          </a:p>
+          <a:p>
+            <a:pPr lvl="1"/>
+            <a:r>
+              <a:rPr/>
+              <a:t>따라서 다른 유저의 데이터가 보이지 않는다면 이 Privacy Rules가 원인일 가능성 높음</a:t>
+            </a:r>
+          </a:p>
+        </p:txBody>
+      </p:sp>
+    </p:spTree>
+  </p:cSld>
+  <p:timing>
+    <p:tnLst>
+      <p:par>
+        <p:cTn id="1" dur="indefinite" restart="never" nodeType="tmRoot">
+          <p:childTnLst>
+            <p:seq concurrent="1" nextAc="seek">
+              <p:cTn id="2" dur="indefinite" nodeType="mainSeq">
+                <p:childTnLst>
+                  <p:par>
+                    <p:cTn id="3" fill="hold">
+                      <p:stCondLst>
+                        <p:cond delay="indefinite"/>
+                      </p:stCondLst>
+                      <p:childTnLst>
+                        <p:par>
+                          <p:cTn id="4" fill="hold">
+                            <p:stCondLst>
+                              <p:cond delay="0"/>
+                            </p:stCondLst>
+                            <p:childTnLst>
+                              <p:par>
+                                <p:cTn id="5" presetID="1" presetClass="entr" presetSubtype="0" fill="hold" grpId="0" nodeType="clickEffect">
+                                  <p:stCondLst>
+                                    <p:cond delay="0"/>
+                                  </p:stCondLst>
+                                  <p:childTnLst>
+                                    <p:set>
+                                      <p:cBhvr>
+                                        <p:cTn id="6" dur="1" fill="hold">
+                                          <p:stCondLst>
+                                            <p:cond delay="0"/>
+                                          </p:stCondLst>
+                                        </p:cTn>
+                                        <p:tgtEl>
+                                          <p:spTgt spid="3">
+                                            <p:txEl>
+                                              <p:pRg st="0" end="0"/>
+                                            </p:txEl>
+                                          </p:spTgt>
+                                        </p:tgtEl>
+                                        <p:attrNameLst>
+                                          <p:attrName>style.visibility</p:attrName>
+                                        </p:attrNameLst>
+                                      </p:cBhvr>
+                                      <p:to>
+                                        <p:strVal val="visible"/>
+                                      </p:to>
+                                    </p:set>
+                                  </p:childTnLst>
+                                </p:cTn>
+                              </p:par>
+                            </p:childTnLst>
+                          </p:cTn>
+                        </p:par>
+                      </p:childTnLst>
+                    </p:cTn>
+                  </p:par>
+                  <p:par>
+                    <p:cTn id="7" fill="hold">
+                      <p:stCondLst>
+                        <p:cond delay="indefinite"/>
+                      </p:stCondLst>
+                      <p:childTnLst>
+                        <p:par>
+                          <p:cTn id="8" fill="hold">
+                            <p:stCondLst>
+                              <p:cond delay="0"/>
+                            </p:stCondLst>
+                            <p:childTnLst>
+                              <p:par>
+                                <p:cTn id="9" presetID="1" presetClass="entr" presetSubtype="0" fill="hold" grpId="0" nodeType="clickEffect">
+                                  <p:stCondLst>
+                                    <p:cond delay="0"/>
+                                  </p:stCondLst>
+                                  <p:childTnLst>
+                                    <p:set>
+                                      <p:cBhvr>
+                                        <p:cTn id="10" dur="1" fill="hold">
+                                          <p:stCondLst>
+                                            <p:cond delay="0"/>
+                                          </p:stCondLst>
+                                        </p:cTn>
+                                        <p:tgtEl>
+                                          <p:spTgt spid="3">
+                                            <p:txEl>
+                                              <p:pRg st="1" end="1"/>
+                                            </p:txEl>
+                                          </p:spTgt>
+                                        </p:tgtEl>
+                                        <p:attrNameLst>
+                                          <p:attrName>style.visibility</p:attrName>
+                                        </p:attrNameLst>
+                                      </p:cBhvr>
+                                      <p:to>
+                                        <p:strVal val="visible"/>
+                                      </p:to>
+                                    </p:set>
+                                  </p:childTnLst>
+                                </p:cTn>
+                              </p:par>
+                            </p:childTnLst>
+                          </p:cTn>
+                        </p:par>
+                      </p:childTnLst>
+                    </p:cTn>
+                  </p:par>
+                  <p:par>
+                    <p:cTn id="11" fill="hold">
+                      <p:stCondLst>
+                        <p:cond delay="indefinite"/>
+                      </p:stCondLst>
+                      <p:childTnLst>
+                        <p:par>
+                          <p:cTn id="12" fill="hold">
+                            <p:stCondLst>
+                              <p:cond delay="0"/>
+                            </p:stCondLst>
+                            <p:childTnLst>
+                              <p:par>
+                                <p:cTn id="13" presetID="1" presetClass="entr" presetSubtype="0" fill="hold" grpId="0" nodeType="clickEffect">
+                                  <p:stCondLst>
+                                    <p:cond delay="0"/>
+                                  </p:stCondLst>
+                                  <p:childTnLst>
+                                    <p:set>
+                                      <p:cBhvr>
+                                        <p:cTn id="14" dur="1" fill="hold">
+                                          <p:stCondLst>
+                                            <p:cond delay="0"/>
+                                          </p:stCondLst>
+                                        </p:cTn>
+                                        <p:tgtEl>
+                                          <p:spTgt spid="3">
+                                            <p:txEl>
+                                              <p:pRg st="2" end="2"/>
+                                            </p:txEl>
+                                          </p:spTgt>
+                                        </p:tgtEl>
+                                        <p:attrNameLst>
+                                          <p:attrName>style.visibility</p:attrName>
+                                        </p:attrNameLst>
+                                      </p:cBhvr>
+                                      <p:to>
+                                        <p:strVal val="visible"/>
+                                      </p:to>
+                                    </p:set>
+                                  </p:childTnLst>
+                                </p:cTn>
+                              </p:par>
+                            </p:childTnLst>
+                          </p:cTn>
+                        </p:par>
+                      </p:childTnLst>
+                    </p:cTn>
+                  </p:par>
+                  <p:par>
+                    <p:cTn id="15" fill="hold">
+                      <p:stCondLst>
+                        <p:cond delay="indefinite"/>
+                      </p:stCondLst>
+                      <p:childTnLst>
+                        <p:par>
+                          <p:cTn id="16" fill="hold">
+                            <p:stCondLst>
+                              <p:cond delay="0"/>
+                            </p:stCondLst>
+                            <p:childTnLst>
+                              <p:par>
+                                <p:cTn id="17" presetID="1" presetClass="entr" presetSubtype="0" fill="hold" grpId="0" nodeType="clickEffect">
+                                  <p:stCondLst>
+                                    <p:cond delay="0"/>
+                                  </p:stCondLst>
+                                  <p:childTnLst>
+                                    <p:set>
+                                      <p:cBhvr>
+                                        <p:cTn id="18" dur="1" fill="hold">
+                                          <p:stCondLst>
+                                            <p:cond delay="0"/>
+                                          </p:stCondLst>
+                                        </p:cTn>
+                                        <p:tgtEl>
+                                          <p:spTgt spid="3">
+                                            <p:txEl>
+                                              <p:pRg st="3" end="3"/>
+                                            </p:txEl>
+                                          </p:spTgt>
+                                        </p:tgtEl>
+                                        <p:attrNameLst>
+                                          <p:attrName>style.visibility</p:attrName>
+                                        </p:attrNameLst>
+                                      </p:cBhvr>
+                                      <p:to>
+                                        <p:strVal val="visible"/>
+                                      </p:to>
+                                    </p:set>
+                                  </p:childTnLst>
+                                </p:cTn>
+                              </p:par>
+                            </p:childTnLst>
+                          </p:cTn>
+                        </p:par>
+                      </p:childTnLst>
+                    </p:cTn>
+                  </p:par>
+                </p:childTnLst>
+              </p:cTn>
+              <p:prevCondLst>
+                <p:cond evt="onPrev" delay="0">
+                  <p:tgtEl>
+                    <p:sldTgt/>
+                  </p:tgtEl>
+                </p:cond>
+              </p:prevCondLst>
+              <p:nextCondLst>
+                <p:cond evt="onNext" delay="0">
+                  <p:tgtEl>
+                    <p:sldTgt/>
+                  </p:tgtEl>
+                </p:cond>
+              </p:nextCondLst>
+            </p:seq>
+          </p:childTnLst>
+        </p:cTn>
+      </p:par>
+    </p:tnLst>
+    <p:bldLst>
+      <p:bldP spid="3" grpId="0" uiExpand="1" build="p"/>
+    </p:bldLst>
+  </p:timing>
+</p:sld>
+</file>
+
+<file path=ppt/slides/slide13.xml><?xml version="1.0" encoding="utf-8"?>
+<p:sld xmlns:a="http://schemas.openxmlformats.org/drawingml/2006/main" xmlns:r="http://schemas.openxmlformats.org/officeDocument/2006/relationships" xmlns:p="http://schemas.openxmlformats.org/presentationml/2006/main">
+  <p:cSld>
+    <p:spTree>
+      <p:nvGrpSpPr>
+        <p:cNvPr id="1" name=""/>
+        <p:cNvGrpSpPr/>
+        <p:nvPr/>
+      </p:nvGrpSpPr>
+      <p:grpSpPr>
+        <a:xfrm>
+          <a:off x="0" y="0"/>
+          <a:ext cx="0" cy="0"/>
+          <a:chOff x="0" y="0"/>
+          <a:chExt cx="0" cy="0"/>
+        </a:xfrm>
+      </p:grpSpPr>
+      <p:sp>
+        <p:nvSpPr>
+          <p:cNvPr id="2" name="Title 1"/>
+          <p:cNvSpPr>
+            <a:spLocks noGrp="1"/>
+          </p:cNvSpPr>
+          <p:nvPr>
+            <p:ph type="title"/>
+          </p:nvPr>
+        </p:nvSpPr>
+        <p:spPr/>
+        <p:txBody>
+          <a:bodyPr/>
+          <a:lstStyle/>
+          <a:p>
+            <a:pPr lvl="0" indent="0" marL="0">
+              <a:buNone/>
+            </a:pPr>
+            <a:r>
+              <a:rPr/>
               <a:t>정적 데이터와 동적 데이터</a:t>
             </a:r>
           </a:p>
@@ -4723,7 +5796,7 @@
 </p:sld>
 </file>
 
-<file path=ppt/slides/slide12.xml><?xml version="1.0" encoding="utf-8"?>
+<file path=ppt/slides/slide14.xml><?xml version="1.0" encoding="utf-8"?>
 <p:sld xmlns:a="http://schemas.openxmlformats.org/drawingml/2006/main" xmlns:r="http://schemas.openxmlformats.org/officeDocument/2006/relationships" xmlns:p="http://schemas.openxmlformats.org/presentationml/2006/main">
   <p:cSld>
     <p:spTree>
@@ -4806,7 +5879,7 @@
             </a:pPr>
             <a:r>
               <a:rPr b="1"/>
-              <a:t>평가되다(Evaluate)</a:t>
+              <a:t>평가되다 (Evaluate)</a:t>
             </a:r>
           </a:p>
           <a:p>
@@ -5125,7 +6198,7 @@
 </p:sld>
 </file>
 
-<file path=ppt/slides/slide13.xml><?xml version="1.0" encoding="utf-8"?>
+<file path=ppt/slides/slide15.xml><?xml version="1.0" encoding="utf-8"?>
 <p:sld xmlns:a="http://schemas.openxmlformats.org/drawingml/2006/main" xmlns:r="http://schemas.openxmlformats.org/officeDocument/2006/relationships" xmlns:p="http://schemas.openxmlformats.org/presentationml/2006/main">
   <p:cSld>
     <p:spTree>
@@ -5162,7 +6235,7 @@
             </a:pPr>
             <a:r>
               <a:rPr/>
-              <a:t>페이지 Pages</a:t>
+              <a:t>페이지 (Pages)</a:t>
             </a:r>
           </a:p>
         </p:txBody>
@@ -5705,7 +6778,7 @@
 </p:sld>
 </file>
 
-<file path=ppt/slides/slide14.xml><?xml version="1.0" encoding="utf-8"?>
+<file path=ppt/slides/slide16.xml><?xml version="1.0" encoding="utf-8"?>
 <p:sld xmlns:a="http://schemas.openxmlformats.org/drawingml/2006/main" xmlns:r="http://schemas.openxmlformats.org/officeDocument/2006/relationships" xmlns:p="http://schemas.openxmlformats.org/presentationml/2006/main">
   <p:cSld>
     <p:spTree>
@@ -6361,7 +7434,7 @@
 </p:sld>
 </file>
 
-<file path=ppt/slides/slide15.xml><?xml version="1.0" encoding="utf-8"?>
+<file path=ppt/slides/slide17.xml><?xml version="1.0" encoding="utf-8"?>
 <p:sld xmlns:a="http://schemas.openxmlformats.org/drawingml/2006/main" xmlns:r="http://schemas.openxmlformats.org/officeDocument/2006/relationships" xmlns:p="http://schemas.openxmlformats.org/presentationml/2006/main">
   <p:cSld>
     <p:spTree>
@@ -6668,7 +7741,7 @@
 </p:sld>
 </file>
 
-<file path=ppt/slides/slide16.xml><?xml version="1.0" encoding="utf-8"?>
+<file path=ppt/slides/slide18.xml><?xml version="1.0" encoding="utf-8"?>
 <p:sld xmlns:a="http://schemas.openxmlformats.org/drawingml/2006/main" xmlns:r="http://schemas.openxmlformats.org/officeDocument/2006/relationships" xmlns:p="http://schemas.openxmlformats.org/presentationml/2006/main">
   <p:cSld>
     <p:spTree>
@@ -7180,7 +8253,7 @@
 </p:sld>
 </file>
 
-<file path=ppt/slides/slide17.xml><?xml version="1.0" encoding="utf-8"?>
+<file path=ppt/slides/slide19.xml><?xml version="1.0" encoding="utf-8"?>
 <p:sld xmlns:a="http://schemas.openxmlformats.org/drawingml/2006/main" xmlns:r="http://schemas.openxmlformats.org/officeDocument/2006/relationships" xmlns:p="http://schemas.openxmlformats.org/presentationml/2006/main">
   <p:cSld>
     <p:spTree>
@@ -7528,911 +8601,6 @@
                                           <p:spTgt spid="3">
                                             <p:txEl>
                                               <p:pRg st="4" end="4"/>
-                                            </p:txEl>
-                                          </p:spTgt>
-                                        </p:tgtEl>
-                                        <p:attrNameLst>
-                                          <p:attrName>style.visibility</p:attrName>
-                                        </p:attrNameLst>
-                                      </p:cBhvr>
-                                      <p:to>
-                                        <p:strVal val="visible"/>
-                                      </p:to>
-                                    </p:set>
-                                  </p:childTnLst>
-                                </p:cTn>
-                              </p:par>
-                            </p:childTnLst>
-                          </p:cTn>
-                        </p:par>
-                      </p:childTnLst>
-                    </p:cTn>
-                  </p:par>
-                </p:childTnLst>
-              </p:cTn>
-              <p:prevCondLst>
-                <p:cond evt="onPrev" delay="0">
-                  <p:tgtEl>
-                    <p:sldTgt/>
-                  </p:tgtEl>
-                </p:cond>
-              </p:prevCondLst>
-              <p:nextCondLst>
-                <p:cond evt="onNext" delay="0">
-                  <p:tgtEl>
-                    <p:sldTgt/>
-                  </p:tgtEl>
-                </p:cond>
-              </p:nextCondLst>
-            </p:seq>
-          </p:childTnLst>
-        </p:cTn>
-      </p:par>
-    </p:tnLst>
-    <p:bldLst>
-      <p:bldP spid="3" grpId="0" uiExpand="1" build="p"/>
-    </p:bldLst>
-  </p:timing>
-</p:sld>
-</file>
-
-<file path=ppt/slides/slide18.xml><?xml version="1.0" encoding="utf-8"?>
-<p:sld xmlns:a="http://schemas.openxmlformats.org/drawingml/2006/main" xmlns:r="http://schemas.openxmlformats.org/officeDocument/2006/relationships" xmlns:p="http://schemas.openxmlformats.org/presentationml/2006/main">
-  <p:cSld>
-    <p:spTree>
-      <p:nvGrpSpPr>
-        <p:cNvPr id="1" name=""/>
-        <p:cNvGrpSpPr/>
-        <p:nvPr/>
-      </p:nvGrpSpPr>
-      <p:grpSpPr>
-        <a:xfrm>
-          <a:off x="0" y="0"/>
-          <a:ext cx="0" cy="0"/>
-          <a:chOff x="0" y="0"/>
-          <a:chExt cx="0" cy="0"/>
-        </a:xfrm>
-      </p:grpSpPr>
-      <p:sp>
-        <p:nvSpPr>
-          <p:cNvPr id="2" name="Title 1"/>
-          <p:cNvSpPr>
-            <a:spLocks noGrp="1"/>
-          </p:cNvSpPr>
-          <p:nvPr>
-            <p:ph type="title"/>
-          </p:nvPr>
-        </p:nvSpPr>
-        <p:spPr/>
-        <p:txBody>
-          <a:bodyPr/>
-          <a:lstStyle/>
-          <a:p>
-            <a:pPr lvl="0" indent="0" marL="0">
-              <a:buNone/>
-            </a:pPr>
-            <a:r>
-              <a:rPr/>
-              <a:t>엘리먼트 스타일링</a:t>
-            </a:r>
-          </a:p>
-        </p:txBody>
-      </p:sp>
-      <p:sp>
-        <p:nvSpPr>
-          <p:cNvPr id="3" name="Content Placeholder 2"/>
-          <p:cNvSpPr>
-            <a:spLocks noGrp="1"/>
-          </p:cNvSpPr>
-          <p:nvPr>
-            <p:ph idx="1"/>
-          </p:nvPr>
-        </p:nvSpPr>
-        <p:spPr/>
-        <p:txBody>
-          <a:bodyPr/>
-          <a:lstStyle/>
-          <a:p>
-            <a:pPr lvl="0"/>
-            <a:r>
-              <a:rPr/>
-              <a:t>엘리먼트마다 공통된 스타일이 디폴트로 지정되어 있음.</a:t>
-            </a:r>
-          </a:p>
-          <a:p>
-            <a:pPr lvl="0"/>
-            <a:r>
-              <a:rPr/>
-              <a:t>Style Variables</a:t>
-            </a:r>
-          </a:p>
-          <a:p>
-            <a:pPr lvl="1"/>
-            <a:r>
-              <a:rPr/>
-              <a:t>App Font</a:t>
-            </a:r>
-          </a:p>
-          <a:p>
-            <a:pPr lvl="2"/>
-            <a:r>
-              <a:rPr/>
-              <a:t>앱 전역에서 기본으로 사용하기로 정해놓은 폰트 (Style Variables)</a:t>
-            </a:r>
-          </a:p>
-          <a:p>
-            <a:pPr lvl="1"/>
-            <a:r>
-              <a:rPr/>
-              <a:t>Color Variables</a:t>
-            </a:r>
-          </a:p>
-          <a:p>
-            <a:pPr lvl="2"/>
-            <a:r>
-              <a:rPr/>
-              <a:t>앱 전역에서 의도와 목적에 따라 미리 정의해둔 색상들.</a:t>
-            </a:r>
-          </a:p>
-          <a:p>
-            <a:pPr lvl="0"/>
-            <a:r>
-              <a:rPr/>
-              <a:t>스타일을 적용하면 마스터 스타일 규칙을 각 엘리먼트가 상속하는 형태로 적용</a:t>
-            </a:r>
-          </a:p>
-          <a:p>
-            <a:pPr lvl="1"/>
-            <a:r>
-              <a:rPr/>
-              <a:t>따라서 스타일을 적용한 엘리먼트에서 상속된 값을 변경하면 오버라이드됨.</a:t>
-            </a:r>
-          </a:p>
-        </p:txBody>
-      </p:sp>
-    </p:spTree>
-  </p:cSld>
-  <p:timing>
-    <p:tnLst>
-      <p:par>
-        <p:cTn id="1" dur="indefinite" restart="never" nodeType="tmRoot">
-          <p:childTnLst>
-            <p:seq concurrent="1" nextAc="seek">
-              <p:cTn id="2" dur="indefinite" nodeType="mainSeq">
-                <p:childTnLst>
-                  <p:par>
-                    <p:cTn id="3" fill="hold">
-                      <p:stCondLst>
-                        <p:cond delay="indefinite"/>
-                      </p:stCondLst>
-                      <p:childTnLst>
-                        <p:par>
-                          <p:cTn id="4" fill="hold">
-                            <p:stCondLst>
-                              <p:cond delay="0"/>
-                            </p:stCondLst>
-                            <p:childTnLst>
-                              <p:par>
-                                <p:cTn id="5" presetID="1" presetClass="entr" presetSubtype="0" fill="hold" grpId="0" nodeType="clickEffect">
-                                  <p:stCondLst>
-                                    <p:cond delay="0"/>
-                                  </p:stCondLst>
-                                  <p:childTnLst>
-                                    <p:set>
-                                      <p:cBhvr>
-                                        <p:cTn id="6" dur="1" fill="hold">
-                                          <p:stCondLst>
-                                            <p:cond delay="0"/>
-                                          </p:stCondLst>
-                                        </p:cTn>
-                                        <p:tgtEl>
-                                          <p:spTgt spid="3">
-                                            <p:txEl>
-                                              <p:pRg st="0" end="0"/>
-                                            </p:txEl>
-                                          </p:spTgt>
-                                        </p:tgtEl>
-                                        <p:attrNameLst>
-                                          <p:attrName>style.visibility</p:attrName>
-                                        </p:attrNameLst>
-                                      </p:cBhvr>
-                                      <p:to>
-                                        <p:strVal val="visible"/>
-                                      </p:to>
-                                    </p:set>
-                                  </p:childTnLst>
-                                </p:cTn>
-                              </p:par>
-                            </p:childTnLst>
-                          </p:cTn>
-                        </p:par>
-                      </p:childTnLst>
-                    </p:cTn>
-                  </p:par>
-                  <p:par>
-                    <p:cTn id="7" fill="hold">
-                      <p:stCondLst>
-                        <p:cond delay="indefinite"/>
-                      </p:stCondLst>
-                      <p:childTnLst>
-                        <p:par>
-                          <p:cTn id="8" fill="hold">
-                            <p:stCondLst>
-                              <p:cond delay="0"/>
-                            </p:stCondLst>
-                            <p:childTnLst>
-                              <p:par>
-                                <p:cTn id="9" presetID="1" presetClass="entr" presetSubtype="0" fill="hold" grpId="0" nodeType="clickEffect">
-                                  <p:stCondLst>
-                                    <p:cond delay="0"/>
-                                  </p:stCondLst>
-                                  <p:childTnLst>
-                                    <p:set>
-                                      <p:cBhvr>
-                                        <p:cTn id="10" dur="1" fill="hold">
-                                          <p:stCondLst>
-                                            <p:cond delay="0"/>
-                                          </p:stCondLst>
-                                        </p:cTn>
-                                        <p:tgtEl>
-                                          <p:spTgt spid="3">
-                                            <p:txEl>
-                                              <p:pRg st="1" end="1"/>
-                                            </p:txEl>
-                                          </p:spTgt>
-                                        </p:tgtEl>
-                                        <p:attrNameLst>
-                                          <p:attrName>style.visibility</p:attrName>
-                                        </p:attrNameLst>
-                                      </p:cBhvr>
-                                      <p:to>
-                                        <p:strVal val="visible"/>
-                                      </p:to>
-                                    </p:set>
-                                  </p:childTnLst>
-                                </p:cTn>
-                              </p:par>
-                            </p:childTnLst>
-                          </p:cTn>
-                        </p:par>
-                      </p:childTnLst>
-                    </p:cTn>
-                  </p:par>
-                  <p:par>
-                    <p:cTn id="11" fill="hold">
-                      <p:stCondLst>
-                        <p:cond delay="indefinite"/>
-                      </p:stCondLst>
-                      <p:childTnLst>
-                        <p:par>
-                          <p:cTn id="12" fill="hold">
-                            <p:stCondLst>
-                              <p:cond delay="0"/>
-                            </p:stCondLst>
-                            <p:childTnLst>
-                              <p:par>
-                                <p:cTn id="13" presetID="1" presetClass="entr" presetSubtype="0" fill="hold" grpId="0" nodeType="clickEffect">
-                                  <p:stCondLst>
-                                    <p:cond delay="0"/>
-                                  </p:stCondLst>
-                                  <p:childTnLst>
-                                    <p:set>
-                                      <p:cBhvr>
-                                        <p:cTn id="14" dur="1" fill="hold">
-                                          <p:stCondLst>
-                                            <p:cond delay="0"/>
-                                          </p:stCondLst>
-                                        </p:cTn>
-                                        <p:tgtEl>
-                                          <p:spTgt spid="3">
-                                            <p:txEl>
-                                              <p:pRg st="2" end="2"/>
-                                            </p:txEl>
-                                          </p:spTgt>
-                                        </p:tgtEl>
-                                        <p:attrNameLst>
-                                          <p:attrName>style.visibility</p:attrName>
-                                        </p:attrNameLst>
-                                      </p:cBhvr>
-                                      <p:to>
-                                        <p:strVal val="visible"/>
-                                      </p:to>
-                                    </p:set>
-                                  </p:childTnLst>
-                                </p:cTn>
-                              </p:par>
-                            </p:childTnLst>
-                          </p:cTn>
-                        </p:par>
-                      </p:childTnLst>
-                    </p:cTn>
-                  </p:par>
-                  <p:par>
-                    <p:cTn id="15" fill="hold">
-                      <p:stCondLst>
-                        <p:cond delay="indefinite"/>
-                      </p:stCondLst>
-                      <p:childTnLst>
-                        <p:par>
-                          <p:cTn id="16" fill="hold">
-                            <p:stCondLst>
-                              <p:cond delay="0"/>
-                            </p:stCondLst>
-                            <p:childTnLst>
-                              <p:par>
-                                <p:cTn id="17" presetID="1" presetClass="entr" presetSubtype="0" fill="hold" grpId="0" nodeType="clickEffect">
-                                  <p:stCondLst>
-                                    <p:cond delay="0"/>
-                                  </p:stCondLst>
-                                  <p:childTnLst>
-                                    <p:set>
-                                      <p:cBhvr>
-                                        <p:cTn id="18" dur="1" fill="hold">
-                                          <p:stCondLst>
-                                            <p:cond delay="0"/>
-                                          </p:stCondLst>
-                                        </p:cTn>
-                                        <p:tgtEl>
-                                          <p:spTgt spid="3">
-                                            <p:txEl>
-                                              <p:pRg st="3" end="3"/>
-                                            </p:txEl>
-                                          </p:spTgt>
-                                        </p:tgtEl>
-                                        <p:attrNameLst>
-                                          <p:attrName>style.visibility</p:attrName>
-                                        </p:attrNameLst>
-                                      </p:cBhvr>
-                                      <p:to>
-                                        <p:strVal val="visible"/>
-                                      </p:to>
-                                    </p:set>
-                                  </p:childTnLst>
-                                </p:cTn>
-                              </p:par>
-                            </p:childTnLst>
-                          </p:cTn>
-                        </p:par>
-                      </p:childTnLst>
-                    </p:cTn>
-                  </p:par>
-                  <p:par>
-                    <p:cTn id="19" fill="hold">
-                      <p:stCondLst>
-                        <p:cond delay="indefinite"/>
-                      </p:stCondLst>
-                      <p:childTnLst>
-                        <p:par>
-                          <p:cTn id="20" fill="hold">
-                            <p:stCondLst>
-                              <p:cond delay="0"/>
-                            </p:stCondLst>
-                            <p:childTnLst>
-                              <p:par>
-                                <p:cTn id="21" presetID="1" presetClass="entr" presetSubtype="0" fill="hold" grpId="0" nodeType="clickEffect">
-                                  <p:stCondLst>
-                                    <p:cond delay="0"/>
-                                  </p:stCondLst>
-                                  <p:childTnLst>
-                                    <p:set>
-                                      <p:cBhvr>
-                                        <p:cTn id="22" dur="1" fill="hold">
-                                          <p:stCondLst>
-                                            <p:cond delay="0"/>
-                                          </p:stCondLst>
-                                        </p:cTn>
-                                        <p:tgtEl>
-                                          <p:spTgt spid="3">
-                                            <p:txEl>
-                                              <p:pRg st="4" end="4"/>
-                                            </p:txEl>
-                                          </p:spTgt>
-                                        </p:tgtEl>
-                                        <p:attrNameLst>
-                                          <p:attrName>style.visibility</p:attrName>
-                                        </p:attrNameLst>
-                                      </p:cBhvr>
-                                      <p:to>
-                                        <p:strVal val="visible"/>
-                                      </p:to>
-                                    </p:set>
-                                  </p:childTnLst>
-                                </p:cTn>
-                              </p:par>
-                            </p:childTnLst>
-                          </p:cTn>
-                        </p:par>
-                      </p:childTnLst>
-                    </p:cTn>
-                  </p:par>
-                  <p:par>
-                    <p:cTn id="23" fill="hold">
-                      <p:stCondLst>
-                        <p:cond delay="indefinite"/>
-                      </p:stCondLst>
-                      <p:childTnLst>
-                        <p:par>
-                          <p:cTn id="24" fill="hold">
-                            <p:stCondLst>
-                              <p:cond delay="0"/>
-                            </p:stCondLst>
-                            <p:childTnLst>
-                              <p:par>
-                                <p:cTn id="25" presetID="1" presetClass="entr" presetSubtype="0" fill="hold" grpId="0" nodeType="clickEffect">
-                                  <p:stCondLst>
-                                    <p:cond delay="0"/>
-                                  </p:stCondLst>
-                                  <p:childTnLst>
-                                    <p:set>
-                                      <p:cBhvr>
-                                        <p:cTn id="26" dur="1" fill="hold">
-                                          <p:stCondLst>
-                                            <p:cond delay="0"/>
-                                          </p:stCondLst>
-                                        </p:cTn>
-                                        <p:tgtEl>
-                                          <p:spTgt spid="3">
-                                            <p:txEl>
-                                              <p:pRg st="5" end="5"/>
-                                            </p:txEl>
-                                          </p:spTgt>
-                                        </p:tgtEl>
-                                        <p:attrNameLst>
-                                          <p:attrName>style.visibility</p:attrName>
-                                        </p:attrNameLst>
-                                      </p:cBhvr>
-                                      <p:to>
-                                        <p:strVal val="visible"/>
-                                      </p:to>
-                                    </p:set>
-                                  </p:childTnLst>
-                                </p:cTn>
-                              </p:par>
-                            </p:childTnLst>
-                          </p:cTn>
-                        </p:par>
-                      </p:childTnLst>
-                    </p:cTn>
-                  </p:par>
-                  <p:par>
-                    <p:cTn id="27" fill="hold">
-                      <p:stCondLst>
-                        <p:cond delay="indefinite"/>
-                      </p:stCondLst>
-                      <p:childTnLst>
-                        <p:par>
-                          <p:cTn id="28" fill="hold">
-                            <p:stCondLst>
-                              <p:cond delay="0"/>
-                            </p:stCondLst>
-                            <p:childTnLst>
-                              <p:par>
-                                <p:cTn id="29" presetID="1" presetClass="entr" presetSubtype="0" fill="hold" grpId="0" nodeType="clickEffect">
-                                  <p:stCondLst>
-                                    <p:cond delay="0"/>
-                                  </p:stCondLst>
-                                  <p:childTnLst>
-                                    <p:set>
-                                      <p:cBhvr>
-                                        <p:cTn id="30" dur="1" fill="hold">
-                                          <p:stCondLst>
-                                            <p:cond delay="0"/>
-                                          </p:stCondLst>
-                                        </p:cTn>
-                                        <p:tgtEl>
-                                          <p:spTgt spid="3">
-                                            <p:txEl>
-                                              <p:pRg st="6" end="6"/>
-                                            </p:txEl>
-                                          </p:spTgt>
-                                        </p:tgtEl>
-                                        <p:attrNameLst>
-                                          <p:attrName>style.visibility</p:attrName>
-                                        </p:attrNameLst>
-                                      </p:cBhvr>
-                                      <p:to>
-                                        <p:strVal val="visible"/>
-                                      </p:to>
-                                    </p:set>
-                                  </p:childTnLst>
-                                </p:cTn>
-                              </p:par>
-                            </p:childTnLst>
-                          </p:cTn>
-                        </p:par>
-                      </p:childTnLst>
-                    </p:cTn>
-                  </p:par>
-                  <p:par>
-                    <p:cTn id="31" fill="hold">
-                      <p:stCondLst>
-                        <p:cond delay="indefinite"/>
-                      </p:stCondLst>
-                      <p:childTnLst>
-                        <p:par>
-                          <p:cTn id="32" fill="hold">
-                            <p:stCondLst>
-                              <p:cond delay="0"/>
-                            </p:stCondLst>
-                            <p:childTnLst>
-                              <p:par>
-                                <p:cTn id="33" presetID="1" presetClass="entr" presetSubtype="0" fill="hold" grpId="0" nodeType="clickEffect">
-                                  <p:stCondLst>
-                                    <p:cond delay="0"/>
-                                  </p:stCondLst>
-                                  <p:childTnLst>
-                                    <p:set>
-                                      <p:cBhvr>
-                                        <p:cTn id="34" dur="1" fill="hold">
-                                          <p:stCondLst>
-                                            <p:cond delay="0"/>
-                                          </p:stCondLst>
-                                        </p:cTn>
-                                        <p:tgtEl>
-                                          <p:spTgt spid="3">
-                                            <p:txEl>
-                                              <p:pRg st="7" end="7"/>
-                                            </p:txEl>
-                                          </p:spTgt>
-                                        </p:tgtEl>
-                                        <p:attrNameLst>
-                                          <p:attrName>style.visibility</p:attrName>
-                                        </p:attrNameLst>
-                                      </p:cBhvr>
-                                      <p:to>
-                                        <p:strVal val="visible"/>
-                                      </p:to>
-                                    </p:set>
-                                  </p:childTnLst>
-                                </p:cTn>
-                              </p:par>
-                            </p:childTnLst>
-                          </p:cTn>
-                        </p:par>
-                      </p:childTnLst>
-                    </p:cTn>
-                  </p:par>
-                </p:childTnLst>
-              </p:cTn>
-              <p:prevCondLst>
-                <p:cond evt="onPrev" delay="0">
-                  <p:tgtEl>
-                    <p:sldTgt/>
-                  </p:tgtEl>
-                </p:cond>
-              </p:prevCondLst>
-              <p:nextCondLst>
-                <p:cond evt="onNext" delay="0">
-                  <p:tgtEl>
-                    <p:sldTgt/>
-                  </p:tgtEl>
-                </p:cond>
-              </p:nextCondLst>
-            </p:seq>
-          </p:childTnLst>
-        </p:cTn>
-      </p:par>
-    </p:tnLst>
-    <p:bldLst>
-      <p:bldP spid="3" grpId="0" uiExpand="1" build="p"/>
-    </p:bldLst>
-  </p:timing>
-</p:sld>
-</file>
-
-<file path=ppt/slides/slide19.xml><?xml version="1.0" encoding="utf-8"?>
-<p:sld xmlns:a="http://schemas.openxmlformats.org/drawingml/2006/main" xmlns:r="http://schemas.openxmlformats.org/officeDocument/2006/relationships" xmlns:p="http://schemas.openxmlformats.org/presentationml/2006/main">
-  <p:cSld>
-    <p:spTree>
-      <p:nvGrpSpPr>
-        <p:cNvPr id="1" name=""/>
-        <p:cNvGrpSpPr/>
-        <p:nvPr/>
-      </p:nvGrpSpPr>
-      <p:grpSpPr>
-        <a:xfrm>
-          <a:off x="0" y="0"/>
-          <a:ext cx="0" cy="0"/>
-          <a:chOff x="0" y="0"/>
-          <a:chExt cx="0" cy="0"/>
-        </a:xfrm>
-      </p:grpSpPr>
-      <p:sp>
-        <p:nvSpPr>
-          <p:cNvPr id="2" name="Title 1"/>
-          <p:cNvSpPr>
-            <a:spLocks noGrp="1"/>
-          </p:cNvSpPr>
-          <p:nvPr>
-            <p:ph type="title"/>
-          </p:nvPr>
-        </p:nvSpPr>
-        <p:spPr/>
-        <p:txBody>
-          <a:bodyPr/>
-          <a:lstStyle/>
-          <a:p>
-            <a:pPr lvl="0" indent="0" marL="0">
-              <a:buNone/>
-            </a:pPr>
-            <a:r>
-              <a:rPr/>
-              <a:t>리피팅 그룹의 overflow 강제로 보여주기</a:t>
-            </a:r>
-          </a:p>
-        </p:txBody>
-      </p:sp>
-      <p:sp>
-        <p:nvSpPr>
-          <p:cNvPr id="3" name="Content Placeholder 2"/>
-          <p:cNvSpPr>
-            <a:spLocks noGrp="1"/>
-          </p:cNvSpPr>
-          <p:nvPr>
-            <p:ph idx="1"/>
-          </p:nvPr>
-        </p:nvSpPr>
-        <p:spPr/>
-        <p:txBody>
-          <a:bodyPr/>
-          <a:lstStyle/>
-          <a:p>
-            <a:pPr lvl="0"/>
-            <a:r>
-              <a:rPr/>
-              <a:t>리피팅 그룹의 overflow가 기본으로 보여주지 않게 설정돼있어 그림자 등이 잘리게 되는데, 아래와 같이 overflow를 표시 허용 해준다.</a:t>
-            </a:r>
-          </a:p>
-          <a:p>
-            <a:pPr lvl="0" indent="-457200" marL="457200">
-              <a:buAutoNum type="arabicPeriod"/>
-            </a:pPr>
-            <a:r>
-              <a:rPr/>
-              <a:t>Settings - General - </a:t>
-            </a:r>
-            <a:r>
-              <a:rPr>
-                <a:latin typeface="Courier"/>
-              </a:rPr>
-              <a:t>Expose the option to add an ID attribute to HTML elements</a:t>
-            </a:r>
-            <a:r>
-              <a:rPr/>
-              <a:t> 를 체크</a:t>
-            </a:r>
-          </a:p>
-          <a:p>
-            <a:pPr lvl="0" indent="-457200" marL="457200">
-              <a:buAutoNum type="arabicPeriod"/>
-            </a:pPr>
-            <a:r>
-              <a:rPr/>
-              <a:t>리피팅 그룹을 선택하고 프로퍼티 에디터의 가장 아래 ID Attribute 항목에 </a:t>
-            </a:r>
-            <a:r>
-              <a:rPr>
-                <a:latin typeface="Courier"/>
-              </a:rPr>
-              <a:t>rg-overflow</a:t>
-            </a:r>
-            <a:r>
-              <a:rPr/>
-              <a:t> 라고 적어줌</a:t>
-            </a:r>
-          </a:p>
-          <a:p>
-            <a:pPr lvl="0" indent="-457200" marL="457200">
-              <a:buAutoNum type="arabicPeriod"/>
-            </a:pPr>
-            <a:r>
-              <a:rPr/>
-              <a:t>HTML 요소를 아주 작은 크기로 삽입 하고 레이아웃에 방해되지 않도록 배치한 후 아래와 같이 적어줌</a:t>
-            </a:r>
-          </a:p>
-          <a:p>
-            <a:pPr lvl="0" indent="0">
-              <a:buNone/>
-            </a:pPr>
-            <a:r>
-              <a:rPr>
-                <a:latin typeface="Courier"/>
-              </a:rPr>
-              <a:t>&lt;style&gt;
-        #rg-overflow {
-                overflow: visible !important;
-        }
-&lt;/style&gt;</a:t>
-            </a:r>
-          </a:p>
-        </p:txBody>
-      </p:sp>
-    </p:spTree>
-  </p:cSld>
-  <p:timing>
-    <p:tnLst>
-      <p:par>
-        <p:cTn id="1" dur="indefinite" restart="never" nodeType="tmRoot">
-          <p:childTnLst>
-            <p:seq concurrent="1" nextAc="seek">
-              <p:cTn id="2" dur="indefinite" nodeType="mainSeq">
-                <p:childTnLst>
-                  <p:par>
-                    <p:cTn id="3" fill="hold">
-                      <p:stCondLst>
-                        <p:cond delay="indefinite"/>
-                      </p:stCondLst>
-                      <p:childTnLst>
-                        <p:par>
-                          <p:cTn id="4" fill="hold">
-                            <p:stCondLst>
-                              <p:cond delay="0"/>
-                            </p:stCondLst>
-                            <p:childTnLst>
-                              <p:par>
-                                <p:cTn id="5" presetID="1" presetClass="entr" presetSubtype="0" fill="hold" grpId="0" nodeType="clickEffect">
-                                  <p:stCondLst>
-                                    <p:cond delay="0"/>
-                                  </p:stCondLst>
-                                  <p:childTnLst>
-                                    <p:set>
-                                      <p:cBhvr>
-                                        <p:cTn id="6" dur="1" fill="hold">
-                                          <p:stCondLst>
-                                            <p:cond delay="0"/>
-                                          </p:stCondLst>
-                                        </p:cTn>
-                                        <p:tgtEl>
-                                          <p:spTgt spid="3">
-                                            <p:txEl>
-                                              <p:pRg st="0" end="0"/>
-                                            </p:txEl>
-                                          </p:spTgt>
-                                        </p:tgtEl>
-                                        <p:attrNameLst>
-                                          <p:attrName>style.visibility</p:attrName>
-                                        </p:attrNameLst>
-                                      </p:cBhvr>
-                                      <p:to>
-                                        <p:strVal val="visible"/>
-                                      </p:to>
-                                    </p:set>
-                                  </p:childTnLst>
-                                </p:cTn>
-                              </p:par>
-                            </p:childTnLst>
-                          </p:cTn>
-                        </p:par>
-                      </p:childTnLst>
-                    </p:cTn>
-                  </p:par>
-                  <p:par>
-                    <p:cTn id="7" fill="hold">
-                      <p:stCondLst>
-                        <p:cond delay="indefinite"/>
-                      </p:stCondLst>
-                      <p:childTnLst>
-                        <p:par>
-                          <p:cTn id="8" fill="hold">
-                            <p:stCondLst>
-                              <p:cond delay="0"/>
-                            </p:stCondLst>
-                            <p:childTnLst>
-                              <p:par>
-                                <p:cTn id="9" presetID="1" presetClass="entr" presetSubtype="0" fill="hold" grpId="0" nodeType="clickEffect">
-                                  <p:stCondLst>
-                                    <p:cond delay="0"/>
-                                  </p:stCondLst>
-                                  <p:childTnLst>
-                                    <p:set>
-                                      <p:cBhvr>
-                                        <p:cTn id="10" dur="1" fill="hold">
-                                          <p:stCondLst>
-                                            <p:cond delay="0"/>
-                                          </p:stCondLst>
-                                        </p:cTn>
-                                        <p:tgtEl>
-                                          <p:spTgt spid="3">
-                                            <p:txEl>
-                                              <p:pRg st="1" end="1"/>
-                                            </p:txEl>
-                                          </p:spTgt>
-                                        </p:tgtEl>
-                                        <p:attrNameLst>
-                                          <p:attrName>style.visibility</p:attrName>
-                                        </p:attrNameLst>
-                                      </p:cBhvr>
-                                      <p:to>
-                                        <p:strVal val="visible"/>
-                                      </p:to>
-                                    </p:set>
-                                  </p:childTnLst>
-                                </p:cTn>
-                              </p:par>
-                            </p:childTnLst>
-                          </p:cTn>
-                        </p:par>
-                      </p:childTnLst>
-                    </p:cTn>
-                  </p:par>
-                  <p:par>
-                    <p:cTn id="11" fill="hold">
-                      <p:stCondLst>
-                        <p:cond delay="indefinite"/>
-                      </p:stCondLst>
-                      <p:childTnLst>
-                        <p:par>
-                          <p:cTn id="12" fill="hold">
-                            <p:stCondLst>
-                              <p:cond delay="0"/>
-                            </p:stCondLst>
-                            <p:childTnLst>
-                              <p:par>
-                                <p:cTn id="13" presetID="1" presetClass="entr" presetSubtype="0" fill="hold" grpId="0" nodeType="clickEffect">
-                                  <p:stCondLst>
-                                    <p:cond delay="0"/>
-                                  </p:stCondLst>
-                                  <p:childTnLst>
-                                    <p:set>
-                                      <p:cBhvr>
-                                        <p:cTn id="14" dur="1" fill="hold">
-                                          <p:stCondLst>
-                                            <p:cond delay="0"/>
-                                          </p:stCondLst>
-                                        </p:cTn>
-                                        <p:tgtEl>
-                                          <p:spTgt spid="3">
-                                            <p:txEl>
-                                              <p:pRg st="2" end="2"/>
-                                            </p:txEl>
-                                          </p:spTgt>
-                                        </p:tgtEl>
-                                        <p:attrNameLst>
-                                          <p:attrName>style.visibility</p:attrName>
-                                        </p:attrNameLst>
-                                      </p:cBhvr>
-                                      <p:to>
-                                        <p:strVal val="visible"/>
-                                      </p:to>
-                                    </p:set>
-                                  </p:childTnLst>
-                                </p:cTn>
-                              </p:par>
-                            </p:childTnLst>
-                          </p:cTn>
-                        </p:par>
-                      </p:childTnLst>
-                    </p:cTn>
-                  </p:par>
-                  <p:par>
-                    <p:cTn id="15" fill="hold">
-                      <p:stCondLst>
-                        <p:cond delay="indefinite"/>
-                      </p:stCondLst>
-                      <p:childTnLst>
-                        <p:par>
-                          <p:cTn id="16" fill="hold">
-                            <p:stCondLst>
-                              <p:cond delay="0"/>
-                            </p:stCondLst>
-                            <p:childTnLst>
-                              <p:par>
-                                <p:cTn id="17" presetID="1" presetClass="entr" presetSubtype="0" fill="hold" grpId="0" nodeType="clickEffect">
-                                  <p:stCondLst>
-                                    <p:cond delay="0"/>
-                                  </p:stCondLst>
-                                  <p:childTnLst>
-                                    <p:set>
-                                      <p:cBhvr>
-                                        <p:cTn id="18" dur="1" fill="hold">
-                                          <p:stCondLst>
-                                            <p:cond delay="0"/>
-                                          </p:stCondLst>
-                                        </p:cTn>
-                                        <p:tgtEl>
-                                          <p:spTgt spid="3">
-                                            <p:txEl>
-                                              <p:pRg st="3" end="3"/>
                                             </p:txEl>
                                           </p:spTgt>
                                         </p:tgtEl>
@@ -9086,7 +9254,854 @@
             </a:pPr>
             <a:r>
               <a:rPr/>
-              <a:t>리유저블 엘리먼트(Reusable Elements)</a:t>
+              <a:t>엘리먼트 스타일링</a:t>
+            </a:r>
+          </a:p>
+        </p:txBody>
+      </p:sp>
+      <p:sp>
+        <p:nvSpPr>
+          <p:cNvPr id="3" name="Content Placeholder 2"/>
+          <p:cNvSpPr>
+            <a:spLocks noGrp="1"/>
+          </p:cNvSpPr>
+          <p:nvPr>
+            <p:ph idx="1"/>
+          </p:nvPr>
+        </p:nvSpPr>
+        <p:spPr/>
+        <p:txBody>
+          <a:bodyPr/>
+          <a:lstStyle/>
+          <a:p>
+            <a:pPr lvl="0"/>
+            <a:r>
+              <a:rPr/>
+              <a:t>엘리먼트마다 공통된 스타일이 디폴트로 지정되어 있음.</a:t>
+            </a:r>
+          </a:p>
+          <a:p>
+            <a:pPr lvl="0"/>
+            <a:r>
+              <a:rPr/>
+              <a:t>Style Variables</a:t>
+            </a:r>
+          </a:p>
+          <a:p>
+            <a:pPr lvl="1"/>
+            <a:r>
+              <a:rPr/>
+              <a:t>App Font</a:t>
+            </a:r>
+          </a:p>
+          <a:p>
+            <a:pPr lvl="2"/>
+            <a:r>
+              <a:rPr/>
+              <a:t>앱 전역에서 기본으로 사용하기로 정해놓은 폰트 (Style Variables)</a:t>
+            </a:r>
+          </a:p>
+          <a:p>
+            <a:pPr lvl="1"/>
+            <a:r>
+              <a:rPr/>
+              <a:t>Color Variables</a:t>
+            </a:r>
+          </a:p>
+          <a:p>
+            <a:pPr lvl="2"/>
+            <a:r>
+              <a:rPr/>
+              <a:t>앱 전역에서 의도와 목적에 따라 미리 정의해둔 색상들.</a:t>
+            </a:r>
+          </a:p>
+          <a:p>
+            <a:pPr lvl="0"/>
+            <a:r>
+              <a:rPr/>
+              <a:t>스타일을 적용하면 마스터 스타일 규칙을 각 엘리먼트가 상속하는 형태로 적용</a:t>
+            </a:r>
+          </a:p>
+          <a:p>
+            <a:pPr lvl="1"/>
+            <a:r>
+              <a:rPr/>
+              <a:t>따라서 스타일을 적용한 엘리먼트에서 상속된 값을 변경하면 오버라이드됨.</a:t>
+            </a:r>
+          </a:p>
+        </p:txBody>
+      </p:sp>
+    </p:spTree>
+  </p:cSld>
+  <p:timing>
+    <p:tnLst>
+      <p:par>
+        <p:cTn id="1" dur="indefinite" restart="never" nodeType="tmRoot">
+          <p:childTnLst>
+            <p:seq concurrent="1" nextAc="seek">
+              <p:cTn id="2" dur="indefinite" nodeType="mainSeq">
+                <p:childTnLst>
+                  <p:par>
+                    <p:cTn id="3" fill="hold">
+                      <p:stCondLst>
+                        <p:cond delay="indefinite"/>
+                      </p:stCondLst>
+                      <p:childTnLst>
+                        <p:par>
+                          <p:cTn id="4" fill="hold">
+                            <p:stCondLst>
+                              <p:cond delay="0"/>
+                            </p:stCondLst>
+                            <p:childTnLst>
+                              <p:par>
+                                <p:cTn id="5" presetID="1" presetClass="entr" presetSubtype="0" fill="hold" grpId="0" nodeType="clickEffect">
+                                  <p:stCondLst>
+                                    <p:cond delay="0"/>
+                                  </p:stCondLst>
+                                  <p:childTnLst>
+                                    <p:set>
+                                      <p:cBhvr>
+                                        <p:cTn id="6" dur="1" fill="hold">
+                                          <p:stCondLst>
+                                            <p:cond delay="0"/>
+                                          </p:stCondLst>
+                                        </p:cTn>
+                                        <p:tgtEl>
+                                          <p:spTgt spid="3">
+                                            <p:txEl>
+                                              <p:pRg st="0" end="0"/>
+                                            </p:txEl>
+                                          </p:spTgt>
+                                        </p:tgtEl>
+                                        <p:attrNameLst>
+                                          <p:attrName>style.visibility</p:attrName>
+                                        </p:attrNameLst>
+                                      </p:cBhvr>
+                                      <p:to>
+                                        <p:strVal val="visible"/>
+                                      </p:to>
+                                    </p:set>
+                                  </p:childTnLst>
+                                </p:cTn>
+                              </p:par>
+                            </p:childTnLst>
+                          </p:cTn>
+                        </p:par>
+                      </p:childTnLst>
+                    </p:cTn>
+                  </p:par>
+                  <p:par>
+                    <p:cTn id="7" fill="hold">
+                      <p:stCondLst>
+                        <p:cond delay="indefinite"/>
+                      </p:stCondLst>
+                      <p:childTnLst>
+                        <p:par>
+                          <p:cTn id="8" fill="hold">
+                            <p:stCondLst>
+                              <p:cond delay="0"/>
+                            </p:stCondLst>
+                            <p:childTnLst>
+                              <p:par>
+                                <p:cTn id="9" presetID="1" presetClass="entr" presetSubtype="0" fill="hold" grpId="0" nodeType="clickEffect">
+                                  <p:stCondLst>
+                                    <p:cond delay="0"/>
+                                  </p:stCondLst>
+                                  <p:childTnLst>
+                                    <p:set>
+                                      <p:cBhvr>
+                                        <p:cTn id="10" dur="1" fill="hold">
+                                          <p:stCondLst>
+                                            <p:cond delay="0"/>
+                                          </p:stCondLst>
+                                        </p:cTn>
+                                        <p:tgtEl>
+                                          <p:spTgt spid="3">
+                                            <p:txEl>
+                                              <p:pRg st="1" end="1"/>
+                                            </p:txEl>
+                                          </p:spTgt>
+                                        </p:tgtEl>
+                                        <p:attrNameLst>
+                                          <p:attrName>style.visibility</p:attrName>
+                                        </p:attrNameLst>
+                                      </p:cBhvr>
+                                      <p:to>
+                                        <p:strVal val="visible"/>
+                                      </p:to>
+                                    </p:set>
+                                  </p:childTnLst>
+                                </p:cTn>
+                              </p:par>
+                            </p:childTnLst>
+                          </p:cTn>
+                        </p:par>
+                      </p:childTnLst>
+                    </p:cTn>
+                  </p:par>
+                  <p:par>
+                    <p:cTn id="11" fill="hold">
+                      <p:stCondLst>
+                        <p:cond delay="indefinite"/>
+                      </p:stCondLst>
+                      <p:childTnLst>
+                        <p:par>
+                          <p:cTn id="12" fill="hold">
+                            <p:stCondLst>
+                              <p:cond delay="0"/>
+                            </p:stCondLst>
+                            <p:childTnLst>
+                              <p:par>
+                                <p:cTn id="13" presetID="1" presetClass="entr" presetSubtype="0" fill="hold" grpId="0" nodeType="clickEffect">
+                                  <p:stCondLst>
+                                    <p:cond delay="0"/>
+                                  </p:stCondLst>
+                                  <p:childTnLst>
+                                    <p:set>
+                                      <p:cBhvr>
+                                        <p:cTn id="14" dur="1" fill="hold">
+                                          <p:stCondLst>
+                                            <p:cond delay="0"/>
+                                          </p:stCondLst>
+                                        </p:cTn>
+                                        <p:tgtEl>
+                                          <p:spTgt spid="3">
+                                            <p:txEl>
+                                              <p:pRg st="2" end="2"/>
+                                            </p:txEl>
+                                          </p:spTgt>
+                                        </p:tgtEl>
+                                        <p:attrNameLst>
+                                          <p:attrName>style.visibility</p:attrName>
+                                        </p:attrNameLst>
+                                      </p:cBhvr>
+                                      <p:to>
+                                        <p:strVal val="visible"/>
+                                      </p:to>
+                                    </p:set>
+                                  </p:childTnLst>
+                                </p:cTn>
+                              </p:par>
+                            </p:childTnLst>
+                          </p:cTn>
+                        </p:par>
+                      </p:childTnLst>
+                    </p:cTn>
+                  </p:par>
+                  <p:par>
+                    <p:cTn id="15" fill="hold">
+                      <p:stCondLst>
+                        <p:cond delay="indefinite"/>
+                      </p:stCondLst>
+                      <p:childTnLst>
+                        <p:par>
+                          <p:cTn id="16" fill="hold">
+                            <p:stCondLst>
+                              <p:cond delay="0"/>
+                            </p:stCondLst>
+                            <p:childTnLst>
+                              <p:par>
+                                <p:cTn id="17" presetID="1" presetClass="entr" presetSubtype="0" fill="hold" grpId="0" nodeType="clickEffect">
+                                  <p:stCondLst>
+                                    <p:cond delay="0"/>
+                                  </p:stCondLst>
+                                  <p:childTnLst>
+                                    <p:set>
+                                      <p:cBhvr>
+                                        <p:cTn id="18" dur="1" fill="hold">
+                                          <p:stCondLst>
+                                            <p:cond delay="0"/>
+                                          </p:stCondLst>
+                                        </p:cTn>
+                                        <p:tgtEl>
+                                          <p:spTgt spid="3">
+                                            <p:txEl>
+                                              <p:pRg st="3" end="3"/>
+                                            </p:txEl>
+                                          </p:spTgt>
+                                        </p:tgtEl>
+                                        <p:attrNameLst>
+                                          <p:attrName>style.visibility</p:attrName>
+                                        </p:attrNameLst>
+                                      </p:cBhvr>
+                                      <p:to>
+                                        <p:strVal val="visible"/>
+                                      </p:to>
+                                    </p:set>
+                                  </p:childTnLst>
+                                </p:cTn>
+                              </p:par>
+                            </p:childTnLst>
+                          </p:cTn>
+                        </p:par>
+                      </p:childTnLst>
+                    </p:cTn>
+                  </p:par>
+                  <p:par>
+                    <p:cTn id="19" fill="hold">
+                      <p:stCondLst>
+                        <p:cond delay="indefinite"/>
+                      </p:stCondLst>
+                      <p:childTnLst>
+                        <p:par>
+                          <p:cTn id="20" fill="hold">
+                            <p:stCondLst>
+                              <p:cond delay="0"/>
+                            </p:stCondLst>
+                            <p:childTnLst>
+                              <p:par>
+                                <p:cTn id="21" presetID="1" presetClass="entr" presetSubtype="0" fill="hold" grpId="0" nodeType="clickEffect">
+                                  <p:stCondLst>
+                                    <p:cond delay="0"/>
+                                  </p:stCondLst>
+                                  <p:childTnLst>
+                                    <p:set>
+                                      <p:cBhvr>
+                                        <p:cTn id="22" dur="1" fill="hold">
+                                          <p:stCondLst>
+                                            <p:cond delay="0"/>
+                                          </p:stCondLst>
+                                        </p:cTn>
+                                        <p:tgtEl>
+                                          <p:spTgt spid="3">
+                                            <p:txEl>
+                                              <p:pRg st="4" end="4"/>
+                                            </p:txEl>
+                                          </p:spTgt>
+                                        </p:tgtEl>
+                                        <p:attrNameLst>
+                                          <p:attrName>style.visibility</p:attrName>
+                                        </p:attrNameLst>
+                                      </p:cBhvr>
+                                      <p:to>
+                                        <p:strVal val="visible"/>
+                                      </p:to>
+                                    </p:set>
+                                  </p:childTnLst>
+                                </p:cTn>
+                              </p:par>
+                            </p:childTnLst>
+                          </p:cTn>
+                        </p:par>
+                      </p:childTnLst>
+                    </p:cTn>
+                  </p:par>
+                  <p:par>
+                    <p:cTn id="23" fill="hold">
+                      <p:stCondLst>
+                        <p:cond delay="indefinite"/>
+                      </p:stCondLst>
+                      <p:childTnLst>
+                        <p:par>
+                          <p:cTn id="24" fill="hold">
+                            <p:stCondLst>
+                              <p:cond delay="0"/>
+                            </p:stCondLst>
+                            <p:childTnLst>
+                              <p:par>
+                                <p:cTn id="25" presetID="1" presetClass="entr" presetSubtype="0" fill="hold" grpId="0" nodeType="clickEffect">
+                                  <p:stCondLst>
+                                    <p:cond delay="0"/>
+                                  </p:stCondLst>
+                                  <p:childTnLst>
+                                    <p:set>
+                                      <p:cBhvr>
+                                        <p:cTn id="26" dur="1" fill="hold">
+                                          <p:stCondLst>
+                                            <p:cond delay="0"/>
+                                          </p:stCondLst>
+                                        </p:cTn>
+                                        <p:tgtEl>
+                                          <p:spTgt spid="3">
+                                            <p:txEl>
+                                              <p:pRg st="5" end="5"/>
+                                            </p:txEl>
+                                          </p:spTgt>
+                                        </p:tgtEl>
+                                        <p:attrNameLst>
+                                          <p:attrName>style.visibility</p:attrName>
+                                        </p:attrNameLst>
+                                      </p:cBhvr>
+                                      <p:to>
+                                        <p:strVal val="visible"/>
+                                      </p:to>
+                                    </p:set>
+                                  </p:childTnLst>
+                                </p:cTn>
+                              </p:par>
+                            </p:childTnLst>
+                          </p:cTn>
+                        </p:par>
+                      </p:childTnLst>
+                    </p:cTn>
+                  </p:par>
+                  <p:par>
+                    <p:cTn id="27" fill="hold">
+                      <p:stCondLst>
+                        <p:cond delay="indefinite"/>
+                      </p:stCondLst>
+                      <p:childTnLst>
+                        <p:par>
+                          <p:cTn id="28" fill="hold">
+                            <p:stCondLst>
+                              <p:cond delay="0"/>
+                            </p:stCondLst>
+                            <p:childTnLst>
+                              <p:par>
+                                <p:cTn id="29" presetID="1" presetClass="entr" presetSubtype="0" fill="hold" grpId="0" nodeType="clickEffect">
+                                  <p:stCondLst>
+                                    <p:cond delay="0"/>
+                                  </p:stCondLst>
+                                  <p:childTnLst>
+                                    <p:set>
+                                      <p:cBhvr>
+                                        <p:cTn id="30" dur="1" fill="hold">
+                                          <p:stCondLst>
+                                            <p:cond delay="0"/>
+                                          </p:stCondLst>
+                                        </p:cTn>
+                                        <p:tgtEl>
+                                          <p:spTgt spid="3">
+                                            <p:txEl>
+                                              <p:pRg st="6" end="6"/>
+                                            </p:txEl>
+                                          </p:spTgt>
+                                        </p:tgtEl>
+                                        <p:attrNameLst>
+                                          <p:attrName>style.visibility</p:attrName>
+                                        </p:attrNameLst>
+                                      </p:cBhvr>
+                                      <p:to>
+                                        <p:strVal val="visible"/>
+                                      </p:to>
+                                    </p:set>
+                                  </p:childTnLst>
+                                </p:cTn>
+                              </p:par>
+                            </p:childTnLst>
+                          </p:cTn>
+                        </p:par>
+                      </p:childTnLst>
+                    </p:cTn>
+                  </p:par>
+                  <p:par>
+                    <p:cTn id="31" fill="hold">
+                      <p:stCondLst>
+                        <p:cond delay="indefinite"/>
+                      </p:stCondLst>
+                      <p:childTnLst>
+                        <p:par>
+                          <p:cTn id="32" fill="hold">
+                            <p:stCondLst>
+                              <p:cond delay="0"/>
+                            </p:stCondLst>
+                            <p:childTnLst>
+                              <p:par>
+                                <p:cTn id="33" presetID="1" presetClass="entr" presetSubtype="0" fill="hold" grpId="0" nodeType="clickEffect">
+                                  <p:stCondLst>
+                                    <p:cond delay="0"/>
+                                  </p:stCondLst>
+                                  <p:childTnLst>
+                                    <p:set>
+                                      <p:cBhvr>
+                                        <p:cTn id="34" dur="1" fill="hold">
+                                          <p:stCondLst>
+                                            <p:cond delay="0"/>
+                                          </p:stCondLst>
+                                        </p:cTn>
+                                        <p:tgtEl>
+                                          <p:spTgt spid="3">
+                                            <p:txEl>
+                                              <p:pRg st="7" end="7"/>
+                                            </p:txEl>
+                                          </p:spTgt>
+                                        </p:tgtEl>
+                                        <p:attrNameLst>
+                                          <p:attrName>style.visibility</p:attrName>
+                                        </p:attrNameLst>
+                                      </p:cBhvr>
+                                      <p:to>
+                                        <p:strVal val="visible"/>
+                                      </p:to>
+                                    </p:set>
+                                  </p:childTnLst>
+                                </p:cTn>
+                              </p:par>
+                            </p:childTnLst>
+                          </p:cTn>
+                        </p:par>
+                      </p:childTnLst>
+                    </p:cTn>
+                  </p:par>
+                </p:childTnLst>
+              </p:cTn>
+              <p:prevCondLst>
+                <p:cond evt="onPrev" delay="0">
+                  <p:tgtEl>
+                    <p:sldTgt/>
+                  </p:tgtEl>
+                </p:cond>
+              </p:prevCondLst>
+              <p:nextCondLst>
+                <p:cond evt="onNext" delay="0">
+                  <p:tgtEl>
+                    <p:sldTgt/>
+                  </p:tgtEl>
+                </p:cond>
+              </p:nextCondLst>
+            </p:seq>
+          </p:childTnLst>
+        </p:cTn>
+      </p:par>
+    </p:tnLst>
+    <p:bldLst>
+      <p:bldP spid="3" grpId="0" uiExpand="1" build="p"/>
+    </p:bldLst>
+  </p:timing>
+</p:sld>
+</file>
+
+<file path=ppt/slides/slide21.xml><?xml version="1.0" encoding="utf-8"?>
+<p:sld xmlns:a="http://schemas.openxmlformats.org/drawingml/2006/main" xmlns:r="http://schemas.openxmlformats.org/officeDocument/2006/relationships" xmlns:p="http://schemas.openxmlformats.org/presentationml/2006/main">
+  <p:cSld>
+    <p:spTree>
+      <p:nvGrpSpPr>
+        <p:cNvPr id="1" name=""/>
+        <p:cNvGrpSpPr/>
+        <p:nvPr/>
+      </p:nvGrpSpPr>
+      <p:grpSpPr>
+        <a:xfrm>
+          <a:off x="0" y="0"/>
+          <a:ext cx="0" cy="0"/>
+          <a:chOff x="0" y="0"/>
+          <a:chExt cx="0" cy="0"/>
+        </a:xfrm>
+      </p:grpSpPr>
+      <p:sp>
+        <p:nvSpPr>
+          <p:cNvPr id="2" name="Title 1"/>
+          <p:cNvSpPr>
+            <a:spLocks noGrp="1"/>
+          </p:cNvSpPr>
+          <p:nvPr>
+            <p:ph type="title"/>
+          </p:nvPr>
+        </p:nvSpPr>
+        <p:spPr/>
+        <p:txBody>
+          <a:bodyPr/>
+          <a:lstStyle/>
+          <a:p>
+            <a:pPr lvl="0" indent="0" marL="0">
+              <a:buNone/>
+            </a:pPr>
+            <a:r>
+              <a:rPr/>
+              <a:t>리피팅 그룹의 overflow 강제로 보여주기</a:t>
+            </a:r>
+          </a:p>
+        </p:txBody>
+      </p:sp>
+      <p:sp>
+        <p:nvSpPr>
+          <p:cNvPr id="3" name="Content Placeholder 2"/>
+          <p:cNvSpPr>
+            <a:spLocks noGrp="1"/>
+          </p:cNvSpPr>
+          <p:nvPr>
+            <p:ph idx="1"/>
+          </p:nvPr>
+        </p:nvSpPr>
+        <p:spPr/>
+        <p:txBody>
+          <a:bodyPr/>
+          <a:lstStyle/>
+          <a:p>
+            <a:pPr lvl="0"/>
+            <a:r>
+              <a:rPr/>
+              <a:t>리피팅 그룹의 overflow가 기본으로 보여주지 않게 설정돼있어 그림자 등이 잘리게 되는데, 아래와 같이 overflow를 표시 허용 해준다.</a:t>
+            </a:r>
+          </a:p>
+          <a:p>
+            <a:pPr lvl="0" indent="-457200" marL="457200">
+              <a:buAutoNum type="arabicPeriod"/>
+            </a:pPr>
+            <a:r>
+              <a:rPr/>
+              <a:t>Settings - General - </a:t>
+            </a:r>
+            <a:r>
+              <a:rPr>
+                <a:latin typeface="Courier"/>
+              </a:rPr>
+              <a:t>Expose the option to add an ID attribute to HTML elements</a:t>
+            </a:r>
+            <a:r>
+              <a:rPr/>
+              <a:t> 를 체크2. 리피팅 그룹을 선택하고 프로퍼티 에디터의 가장 아래 ID Attribute 항목에 </a:t>
+            </a:r>
+            <a:r>
+              <a:rPr>
+                <a:latin typeface="Courier"/>
+              </a:rPr>
+              <a:t>rg-overflow</a:t>
+            </a:r>
+            <a:r>
+              <a:rPr/>
+              <a:t> 라고 적어줌</a:t>
+            </a:r>
+          </a:p>
+          <a:p>
+            <a:pPr lvl="0" indent="-457200" marL="457200">
+              <a:buAutoNum type="arabicPeriod"/>
+            </a:pPr>
+            <a:r>
+              <a:rPr/>
+              <a:t>HTML 요소를 아주 작은 크기로 삽입 하고 레이아웃에 방해되지 않도록 배치한 후 아래와 같이 적어줌</a:t>
+            </a:r>
+          </a:p>
+          <a:p>
+            <a:pPr lvl="0" indent="0">
+              <a:buNone/>
+            </a:pPr>
+            <a:r>
+              <a:rPr>
+                <a:latin typeface="Courier"/>
+              </a:rPr>
+              <a:t>&lt;style&gt;
+        #rg-overflow {
+                overflow: visible !important;
+        }
+&lt;/style&gt;</a:t>
+            </a:r>
+          </a:p>
+        </p:txBody>
+      </p:sp>
+    </p:spTree>
+  </p:cSld>
+  <p:timing>
+    <p:tnLst>
+      <p:par>
+        <p:cTn id="1" dur="indefinite" restart="never" nodeType="tmRoot">
+          <p:childTnLst>
+            <p:seq concurrent="1" nextAc="seek">
+              <p:cTn id="2" dur="indefinite" nodeType="mainSeq">
+                <p:childTnLst>
+                  <p:par>
+                    <p:cTn id="3" fill="hold">
+                      <p:stCondLst>
+                        <p:cond delay="indefinite"/>
+                      </p:stCondLst>
+                      <p:childTnLst>
+                        <p:par>
+                          <p:cTn id="4" fill="hold">
+                            <p:stCondLst>
+                              <p:cond delay="0"/>
+                            </p:stCondLst>
+                            <p:childTnLst>
+                              <p:par>
+                                <p:cTn id="5" presetID="1" presetClass="entr" presetSubtype="0" fill="hold" grpId="0" nodeType="clickEffect">
+                                  <p:stCondLst>
+                                    <p:cond delay="0"/>
+                                  </p:stCondLst>
+                                  <p:childTnLst>
+                                    <p:set>
+                                      <p:cBhvr>
+                                        <p:cTn id="6" dur="1" fill="hold">
+                                          <p:stCondLst>
+                                            <p:cond delay="0"/>
+                                          </p:stCondLst>
+                                        </p:cTn>
+                                        <p:tgtEl>
+                                          <p:spTgt spid="3">
+                                            <p:txEl>
+                                              <p:pRg st="0" end="0"/>
+                                            </p:txEl>
+                                          </p:spTgt>
+                                        </p:tgtEl>
+                                        <p:attrNameLst>
+                                          <p:attrName>style.visibility</p:attrName>
+                                        </p:attrNameLst>
+                                      </p:cBhvr>
+                                      <p:to>
+                                        <p:strVal val="visible"/>
+                                      </p:to>
+                                    </p:set>
+                                  </p:childTnLst>
+                                </p:cTn>
+                              </p:par>
+                            </p:childTnLst>
+                          </p:cTn>
+                        </p:par>
+                      </p:childTnLst>
+                    </p:cTn>
+                  </p:par>
+                  <p:par>
+                    <p:cTn id="7" fill="hold">
+                      <p:stCondLst>
+                        <p:cond delay="indefinite"/>
+                      </p:stCondLst>
+                      <p:childTnLst>
+                        <p:par>
+                          <p:cTn id="8" fill="hold">
+                            <p:stCondLst>
+                              <p:cond delay="0"/>
+                            </p:stCondLst>
+                            <p:childTnLst>
+                              <p:par>
+                                <p:cTn id="9" presetID="1" presetClass="entr" presetSubtype="0" fill="hold" grpId="0" nodeType="clickEffect">
+                                  <p:stCondLst>
+                                    <p:cond delay="0"/>
+                                  </p:stCondLst>
+                                  <p:childTnLst>
+                                    <p:set>
+                                      <p:cBhvr>
+                                        <p:cTn id="10" dur="1" fill="hold">
+                                          <p:stCondLst>
+                                            <p:cond delay="0"/>
+                                          </p:stCondLst>
+                                        </p:cTn>
+                                        <p:tgtEl>
+                                          <p:spTgt spid="3">
+                                            <p:txEl>
+                                              <p:pRg st="1" end="1"/>
+                                            </p:txEl>
+                                          </p:spTgt>
+                                        </p:tgtEl>
+                                        <p:attrNameLst>
+                                          <p:attrName>style.visibility</p:attrName>
+                                        </p:attrNameLst>
+                                      </p:cBhvr>
+                                      <p:to>
+                                        <p:strVal val="visible"/>
+                                      </p:to>
+                                    </p:set>
+                                  </p:childTnLst>
+                                </p:cTn>
+                              </p:par>
+                            </p:childTnLst>
+                          </p:cTn>
+                        </p:par>
+                      </p:childTnLst>
+                    </p:cTn>
+                  </p:par>
+                  <p:par>
+                    <p:cTn id="11" fill="hold">
+                      <p:stCondLst>
+                        <p:cond delay="indefinite"/>
+                      </p:stCondLst>
+                      <p:childTnLst>
+                        <p:par>
+                          <p:cTn id="12" fill="hold">
+                            <p:stCondLst>
+                              <p:cond delay="0"/>
+                            </p:stCondLst>
+                            <p:childTnLst>
+                              <p:par>
+                                <p:cTn id="13" presetID="1" presetClass="entr" presetSubtype="0" fill="hold" grpId="0" nodeType="clickEffect">
+                                  <p:stCondLst>
+                                    <p:cond delay="0"/>
+                                  </p:stCondLst>
+                                  <p:childTnLst>
+                                    <p:set>
+                                      <p:cBhvr>
+                                        <p:cTn id="14" dur="1" fill="hold">
+                                          <p:stCondLst>
+                                            <p:cond delay="0"/>
+                                          </p:stCondLst>
+                                        </p:cTn>
+                                        <p:tgtEl>
+                                          <p:spTgt spid="3">
+                                            <p:txEl>
+                                              <p:pRg st="2" end="2"/>
+                                            </p:txEl>
+                                          </p:spTgt>
+                                        </p:tgtEl>
+                                        <p:attrNameLst>
+                                          <p:attrName>style.visibility</p:attrName>
+                                        </p:attrNameLst>
+                                      </p:cBhvr>
+                                      <p:to>
+                                        <p:strVal val="visible"/>
+                                      </p:to>
+                                    </p:set>
+                                  </p:childTnLst>
+                                </p:cTn>
+                              </p:par>
+                            </p:childTnLst>
+                          </p:cTn>
+                        </p:par>
+                      </p:childTnLst>
+                    </p:cTn>
+                  </p:par>
+                </p:childTnLst>
+              </p:cTn>
+              <p:prevCondLst>
+                <p:cond evt="onPrev" delay="0">
+                  <p:tgtEl>
+                    <p:sldTgt/>
+                  </p:tgtEl>
+                </p:cond>
+              </p:prevCondLst>
+              <p:nextCondLst>
+                <p:cond evt="onNext" delay="0">
+                  <p:tgtEl>
+                    <p:sldTgt/>
+                  </p:tgtEl>
+                </p:cond>
+              </p:nextCondLst>
+            </p:seq>
+          </p:childTnLst>
+        </p:cTn>
+      </p:par>
+    </p:tnLst>
+    <p:bldLst>
+      <p:bldP spid="3" grpId="0" uiExpand="1" build="p"/>
+    </p:bldLst>
+  </p:timing>
+</p:sld>
+</file>
+
+<file path=ppt/slides/slide22.xml><?xml version="1.0" encoding="utf-8"?>
+<p:sld xmlns:a="http://schemas.openxmlformats.org/drawingml/2006/main" xmlns:r="http://schemas.openxmlformats.org/officeDocument/2006/relationships" xmlns:p="http://schemas.openxmlformats.org/presentationml/2006/main">
+  <p:cSld>
+    <p:spTree>
+      <p:nvGrpSpPr>
+        <p:cNvPr id="1" name=""/>
+        <p:cNvGrpSpPr/>
+        <p:nvPr/>
+      </p:nvGrpSpPr>
+      <p:grpSpPr>
+        <a:xfrm>
+          <a:off x="0" y="0"/>
+          <a:ext cx="0" cy="0"/>
+          <a:chOff x="0" y="0"/>
+          <a:chExt cx="0" cy="0"/>
+        </a:xfrm>
+      </p:grpSpPr>
+      <p:sp>
+        <p:nvSpPr>
+          <p:cNvPr id="2" name="Title 1"/>
+          <p:cNvSpPr>
+            <a:spLocks noGrp="1"/>
+          </p:cNvSpPr>
+          <p:nvPr>
+            <p:ph type="title"/>
+          </p:nvPr>
+        </p:nvSpPr>
+        <p:spPr/>
+        <p:txBody>
+          <a:bodyPr/>
+          <a:lstStyle/>
+          <a:p>
+            <a:pPr lvl="0" indent="0" marL="0">
+              <a:buNone/>
+            </a:pPr>
+            <a:r>
+              <a:rPr/>
+              <a:t>리유저블 엘리먼트 (Reusable Elements)</a:t>
             </a:r>
           </a:p>
         </p:txBody>
@@ -9509,6 +10524,622 @@
                                           <p:spTgt spid="3">
                                             <p:txEl>
                                               <p:pRg st="7" end="7"/>
+                                            </p:txEl>
+                                          </p:spTgt>
+                                        </p:tgtEl>
+                                        <p:attrNameLst>
+                                          <p:attrName>style.visibility</p:attrName>
+                                        </p:attrNameLst>
+                                      </p:cBhvr>
+                                      <p:to>
+                                        <p:strVal val="visible"/>
+                                      </p:to>
+                                    </p:set>
+                                  </p:childTnLst>
+                                </p:cTn>
+                              </p:par>
+                            </p:childTnLst>
+                          </p:cTn>
+                        </p:par>
+                      </p:childTnLst>
+                    </p:cTn>
+                  </p:par>
+                </p:childTnLst>
+              </p:cTn>
+              <p:prevCondLst>
+                <p:cond evt="onPrev" delay="0">
+                  <p:tgtEl>
+                    <p:sldTgt/>
+                  </p:tgtEl>
+                </p:cond>
+              </p:prevCondLst>
+              <p:nextCondLst>
+                <p:cond evt="onNext" delay="0">
+                  <p:tgtEl>
+                    <p:sldTgt/>
+                  </p:tgtEl>
+                </p:cond>
+              </p:nextCondLst>
+            </p:seq>
+          </p:childTnLst>
+        </p:cTn>
+      </p:par>
+    </p:tnLst>
+    <p:bldLst>
+      <p:bldP spid="3" grpId="0" uiExpand="1" build="p"/>
+    </p:bldLst>
+  </p:timing>
+</p:sld>
+</file>
+
+<file path=ppt/slides/slide23.xml><?xml version="1.0" encoding="utf-8"?>
+<p:sld xmlns:a="http://schemas.openxmlformats.org/drawingml/2006/main" xmlns:r="http://schemas.openxmlformats.org/officeDocument/2006/relationships" xmlns:p="http://schemas.openxmlformats.org/presentationml/2006/main">
+  <p:cSld>
+    <p:spTree>
+      <p:nvGrpSpPr>
+        <p:cNvPr id="1" name=""/>
+        <p:cNvGrpSpPr/>
+        <p:nvPr/>
+      </p:nvGrpSpPr>
+      <p:grpSpPr>
+        <a:xfrm>
+          <a:off x="0" y="0"/>
+          <a:ext cx="0" cy="0"/>
+          <a:chOff x="0" y="0"/>
+          <a:chExt cx="0" cy="0"/>
+        </a:xfrm>
+      </p:grpSpPr>
+      <p:sp>
+        <p:nvSpPr>
+          <p:cNvPr id="2" name="Title 1"/>
+          <p:cNvSpPr>
+            <a:spLocks noGrp="1"/>
+          </p:cNvSpPr>
+          <p:nvPr>
+            <p:ph type="title"/>
+          </p:nvPr>
+        </p:nvSpPr>
+        <p:spPr/>
+        <p:txBody>
+          <a:bodyPr/>
+          <a:lstStyle/>
+          <a:p>
+            <a:pPr lvl="0" indent="0" marL="0">
+              <a:buNone/>
+            </a:pPr>
+            <a:r>
+              <a:rPr/>
+              <a:t>옵션 셋 (Option Sets)</a:t>
+            </a:r>
+          </a:p>
+        </p:txBody>
+      </p:sp>
+      <p:sp>
+        <p:nvSpPr>
+          <p:cNvPr id="3" name="Content Placeholder 2"/>
+          <p:cNvSpPr>
+            <a:spLocks noGrp="1"/>
+          </p:cNvSpPr>
+          <p:nvPr>
+            <p:ph idx="1"/>
+          </p:nvPr>
+        </p:nvSpPr>
+        <p:spPr/>
+        <p:txBody>
+          <a:bodyPr/>
+          <a:lstStyle/>
+          <a:p>
+            <a:pPr lvl="0"/>
+            <a:r>
+              <a:rPr/>
+              <a:t>DB의 일종</a:t>
+            </a:r>
+          </a:p>
+          <a:p>
+            <a:pPr lvl="0"/>
+            <a:r>
+              <a:rPr/>
+              <a:t>DB처럼 수시로 입력하거나 지우거나 하지 않는 어떤 </a:t>
+            </a:r>
+            <a:r>
+              <a:rPr b="1"/>
+              <a:t>복잡한 정보</a:t>
+            </a:r>
+            <a:r>
+              <a:rPr/>
+              <a:t>의 목록</a:t>
+            </a:r>
+          </a:p>
+          <a:p>
+            <a:pPr lvl="1"/>
+            <a:r>
+              <a:rPr/>
+              <a:t>통신사 정보, 은행의 정보, 국가코드, 혈액형, MBTI, 성별, 탭(메뉴) 정보, 테마</a:t>
+            </a:r>
+          </a:p>
+          <a:p>
+            <a:pPr lvl="0"/>
+            <a:r>
+              <a:rPr/>
+              <a:t>Enum 타입처럼 쓴다.</a:t>
+            </a:r>
+          </a:p>
+          <a:p>
+            <a:pPr lvl="1"/>
+            <a:r>
+              <a:rPr/>
+              <a:t>내부적으로는 정의된 값만을 받아들이는 text로 취급되는 듯</a:t>
+            </a:r>
+          </a:p>
+          <a:p>
+            <a:pPr lvl="0"/>
+            <a:r>
+              <a:rPr/>
+              <a:t>Option Set은 </a:t>
+            </a:r>
+            <a:r>
+              <a:rPr b="1"/>
+              <a:t>프로그램적으로</a:t>
+            </a:r>
+            <a:r>
+              <a:rPr/>
+              <a:t> 추가하거나 수정/삭제할 수 없다</a:t>
+            </a:r>
+          </a:p>
+          <a:p>
+            <a:pPr lvl="1"/>
+            <a:r>
+              <a:rPr/>
+              <a:t>버블의 워크플로우를 사용해서 추가/삭제/수정할 수 없다는 의미</a:t>
+            </a:r>
+          </a:p>
+          <a:p>
+            <a:pPr lvl="1"/>
+            <a:r>
+              <a:rPr/>
+              <a:t>즉 Option Set을 쓰느냐, 데이터베이스를 쓰느냐의 차이는 애플리케이션의 안에 있느냐 밖에 있느냐의 차이</a:t>
+            </a:r>
+          </a:p>
+          <a:p>
+            <a:pPr lvl="1"/>
+            <a:r>
+              <a:rPr/>
+              <a:t>프로덕트의 안에서 CRUD하지 않는 데이터</a:t>
+            </a:r>
+          </a:p>
+        </p:txBody>
+      </p:sp>
+    </p:spTree>
+  </p:cSld>
+  <p:timing>
+    <p:tnLst>
+      <p:par>
+        <p:cTn id="1" dur="indefinite" restart="never" nodeType="tmRoot">
+          <p:childTnLst>
+            <p:seq concurrent="1" nextAc="seek">
+              <p:cTn id="2" dur="indefinite" nodeType="mainSeq">
+                <p:childTnLst>
+                  <p:par>
+                    <p:cTn id="3" fill="hold">
+                      <p:stCondLst>
+                        <p:cond delay="indefinite"/>
+                      </p:stCondLst>
+                      <p:childTnLst>
+                        <p:par>
+                          <p:cTn id="4" fill="hold">
+                            <p:stCondLst>
+                              <p:cond delay="0"/>
+                            </p:stCondLst>
+                            <p:childTnLst>
+                              <p:par>
+                                <p:cTn id="5" presetID="1" presetClass="entr" presetSubtype="0" fill="hold" grpId="0" nodeType="clickEffect">
+                                  <p:stCondLst>
+                                    <p:cond delay="0"/>
+                                  </p:stCondLst>
+                                  <p:childTnLst>
+                                    <p:set>
+                                      <p:cBhvr>
+                                        <p:cTn id="6" dur="1" fill="hold">
+                                          <p:stCondLst>
+                                            <p:cond delay="0"/>
+                                          </p:stCondLst>
+                                        </p:cTn>
+                                        <p:tgtEl>
+                                          <p:spTgt spid="3">
+                                            <p:txEl>
+                                              <p:pRg st="0" end="0"/>
+                                            </p:txEl>
+                                          </p:spTgt>
+                                        </p:tgtEl>
+                                        <p:attrNameLst>
+                                          <p:attrName>style.visibility</p:attrName>
+                                        </p:attrNameLst>
+                                      </p:cBhvr>
+                                      <p:to>
+                                        <p:strVal val="visible"/>
+                                      </p:to>
+                                    </p:set>
+                                  </p:childTnLst>
+                                </p:cTn>
+                              </p:par>
+                            </p:childTnLst>
+                          </p:cTn>
+                        </p:par>
+                      </p:childTnLst>
+                    </p:cTn>
+                  </p:par>
+                  <p:par>
+                    <p:cTn id="7" fill="hold">
+                      <p:stCondLst>
+                        <p:cond delay="indefinite"/>
+                      </p:stCondLst>
+                      <p:childTnLst>
+                        <p:par>
+                          <p:cTn id="8" fill="hold">
+                            <p:stCondLst>
+                              <p:cond delay="0"/>
+                            </p:stCondLst>
+                            <p:childTnLst>
+                              <p:par>
+                                <p:cTn id="9" presetID="1" presetClass="entr" presetSubtype="0" fill="hold" grpId="0" nodeType="clickEffect">
+                                  <p:stCondLst>
+                                    <p:cond delay="0"/>
+                                  </p:stCondLst>
+                                  <p:childTnLst>
+                                    <p:set>
+                                      <p:cBhvr>
+                                        <p:cTn id="10" dur="1" fill="hold">
+                                          <p:stCondLst>
+                                            <p:cond delay="0"/>
+                                          </p:stCondLst>
+                                        </p:cTn>
+                                        <p:tgtEl>
+                                          <p:spTgt spid="3">
+                                            <p:txEl>
+                                              <p:pRg st="1" end="1"/>
+                                            </p:txEl>
+                                          </p:spTgt>
+                                        </p:tgtEl>
+                                        <p:attrNameLst>
+                                          <p:attrName>style.visibility</p:attrName>
+                                        </p:attrNameLst>
+                                      </p:cBhvr>
+                                      <p:to>
+                                        <p:strVal val="visible"/>
+                                      </p:to>
+                                    </p:set>
+                                  </p:childTnLst>
+                                </p:cTn>
+                              </p:par>
+                            </p:childTnLst>
+                          </p:cTn>
+                        </p:par>
+                      </p:childTnLst>
+                    </p:cTn>
+                  </p:par>
+                  <p:par>
+                    <p:cTn id="11" fill="hold">
+                      <p:stCondLst>
+                        <p:cond delay="indefinite"/>
+                      </p:stCondLst>
+                      <p:childTnLst>
+                        <p:par>
+                          <p:cTn id="12" fill="hold">
+                            <p:stCondLst>
+                              <p:cond delay="0"/>
+                            </p:stCondLst>
+                            <p:childTnLst>
+                              <p:par>
+                                <p:cTn id="13" presetID="1" presetClass="entr" presetSubtype="0" fill="hold" grpId="0" nodeType="clickEffect">
+                                  <p:stCondLst>
+                                    <p:cond delay="0"/>
+                                  </p:stCondLst>
+                                  <p:childTnLst>
+                                    <p:set>
+                                      <p:cBhvr>
+                                        <p:cTn id="14" dur="1" fill="hold">
+                                          <p:stCondLst>
+                                            <p:cond delay="0"/>
+                                          </p:stCondLst>
+                                        </p:cTn>
+                                        <p:tgtEl>
+                                          <p:spTgt spid="3">
+                                            <p:txEl>
+                                              <p:pRg st="2" end="2"/>
+                                            </p:txEl>
+                                          </p:spTgt>
+                                        </p:tgtEl>
+                                        <p:attrNameLst>
+                                          <p:attrName>style.visibility</p:attrName>
+                                        </p:attrNameLst>
+                                      </p:cBhvr>
+                                      <p:to>
+                                        <p:strVal val="visible"/>
+                                      </p:to>
+                                    </p:set>
+                                  </p:childTnLst>
+                                </p:cTn>
+                              </p:par>
+                            </p:childTnLst>
+                          </p:cTn>
+                        </p:par>
+                      </p:childTnLst>
+                    </p:cTn>
+                  </p:par>
+                  <p:par>
+                    <p:cTn id="15" fill="hold">
+                      <p:stCondLst>
+                        <p:cond delay="indefinite"/>
+                      </p:stCondLst>
+                      <p:childTnLst>
+                        <p:par>
+                          <p:cTn id="16" fill="hold">
+                            <p:stCondLst>
+                              <p:cond delay="0"/>
+                            </p:stCondLst>
+                            <p:childTnLst>
+                              <p:par>
+                                <p:cTn id="17" presetID="1" presetClass="entr" presetSubtype="0" fill="hold" grpId="0" nodeType="clickEffect">
+                                  <p:stCondLst>
+                                    <p:cond delay="0"/>
+                                  </p:stCondLst>
+                                  <p:childTnLst>
+                                    <p:set>
+                                      <p:cBhvr>
+                                        <p:cTn id="18" dur="1" fill="hold">
+                                          <p:stCondLst>
+                                            <p:cond delay="0"/>
+                                          </p:stCondLst>
+                                        </p:cTn>
+                                        <p:tgtEl>
+                                          <p:spTgt spid="3">
+                                            <p:txEl>
+                                              <p:pRg st="3" end="3"/>
+                                            </p:txEl>
+                                          </p:spTgt>
+                                        </p:tgtEl>
+                                        <p:attrNameLst>
+                                          <p:attrName>style.visibility</p:attrName>
+                                        </p:attrNameLst>
+                                      </p:cBhvr>
+                                      <p:to>
+                                        <p:strVal val="visible"/>
+                                      </p:to>
+                                    </p:set>
+                                  </p:childTnLst>
+                                </p:cTn>
+                              </p:par>
+                            </p:childTnLst>
+                          </p:cTn>
+                        </p:par>
+                      </p:childTnLst>
+                    </p:cTn>
+                  </p:par>
+                  <p:par>
+                    <p:cTn id="19" fill="hold">
+                      <p:stCondLst>
+                        <p:cond delay="indefinite"/>
+                      </p:stCondLst>
+                      <p:childTnLst>
+                        <p:par>
+                          <p:cTn id="20" fill="hold">
+                            <p:stCondLst>
+                              <p:cond delay="0"/>
+                            </p:stCondLst>
+                            <p:childTnLst>
+                              <p:par>
+                                <p:cTn id="21" presetID="1" presetClass="entr" presetSubtype="0" fill="hold" grpId="0" nodeType="clickEffect">
+                                  <p:stCondLst>
+                                    <p:cond delay="0"/>
+                                  </p:stCondLst>
+                                  <p:childTnLst>
+                                    <p:set>
+                                      <p:cBhvr>
+                                        <p:cTn id="22" dur="1" fill="hold">
+                                          <p:stCondLst>
+                                            <p:cond delay="0"/>
+                                          </p:stCondLst>
+                                        </p:cTn>
+                                        <p:tgtEl>
+                                          <p:spTgt spid="3">
+                                            <p:txEl>
+                                              <p:pRg st="4" end="4"/>
+                                            </p:txEl>
+                                          </p:spTgt>
+                                        </p:tgtEl>
+                                        <p:attrNameLst>
+                                          <p:attrName>style.visibility</p:attrName>
+                                        </p:attrNameLst>
+                                      </p:cBhvr>
+                                      <p:to>
+                                        <p:strVal val="visible"/>
+                                      </p:to>
+                                    </p:set>
+                                  </p:childTnLst>
+                                </p:cTn>
+                              </p:par>
+                            </p:childTnLst>
+                          </p:cTn>
+                        </p:par>
+                      </p:childTnLst>
+                    </p:cTn>
+                  </p:par>
+                  <p:par>
+                    <p:cTn id="23" fill="hold">
+                      <p:stCondLst>
+                        <p:cond delay="indefinite"/>
+                      </p:stCondLst>
+                      <p:childTnLst>
+                        <p:par>
+                          <p:cTn id="24" fill="hold">
+                            <p:stCondLst>
+                              <p:cond delay="0"/>
+                            </p:stCondLst>
+                            <p:childTnLst>
+                              <p:par>
+                                <p:cTn id="25" presetID="1" presetClass="entr" presetSubtype="0" fill="hold" grpId="0" nodeType="clickEffect">
+                                  <p:stCondLst>
+                                    <p:cond delay="0"/>
+                                  </p:stCondLst>
+                                  <p:childTnLst>
+                                    <p:set>
+                                      <p:cBhvr>
+                                        <p:cTn id="26" dur="1" fill="hold">
+                                          <p:stCondLst>
+                                            <p:cond delay="0"/>
+                                          </p:stCondLst>
+                                        </p:cTn>
+                                        <p:tgtEl>
+                                          <p:spTgt spid="3">
+                                            <p:txEl>
+                                              <p:pRg st="5" end="5"/>
+                                            </p:txEl>
+                                          </p:spTgt>
+                                        </p:tgtEl>
+                                        <p:attrNameLst>
+                                          <p:attrName>style.visibility</p:attrName>
+                                        </p:attrNameLst>
+                                      </p:cBhvr>
+                                      <p:to>
+                                        <p:strVal val="visible"/>
+                                      </p:to>
+                                    </p:set>
+                                  </p:childTnLst>
+                                </p:cTn>
+                              </p:par>
+                            </p:childTnLst>
+                          </p:cTn>
+                        </p:par>
+                      </p:childTnLst>
+                    </p:cTn>
+                  </p:par>
+                  <p:par>
+                    <p:cTn id="27" fill="hold">
+                      <p:stCondLst>
+                        <p:cond delay="indefinite"/>
+                      </p:stCondLst>
+                      <p:childTnLst>
+                        <p:par>
+                          <p:cTn id="28" fill="hold">
+                            <p:stCondLst>
+                              <p:cond delay="0"/>
+                            </p:stCondLst>
+                            <p:childTnLst>
+                              <p:par>
+                                <p:cTn id="29" presetID="1" presetClass="entr" presetSubtype="0" fill="hold" grpId="0" nodeType="clickEffect">
+                                  <p:stCondLst>
+                                    <p:cond delay="0"/>
+                                  </p:stCondLst>
+                                  <p:childTnLst>
+                                    <p:set>
+                                      <p:cBhvr>
+                                        <p:cTn id="30" dur="1" fill="hold">
+                                          <p:stCondLst>
+                                            <p:cond delay="0"/>
+                                          </p:stCondLst>
+                                        </p:cTn>
+                                        <p:tgtEl>
+                                          <p:spTgt spid="3">
+                                            <p:txEl>
+                                              <p:pRg st="6" end="6"/>
+                                            </p:txEl>
+                                          </p:spTgt>
+                                        </p:tgtEl>
+                                        <p:attrNameLst>
+                                          <p:attrName>style.visibility</p:attrName>
+                                        </p:attrNameLst>
+                                      </p:cBhvr>
+                                      <p:to>
+                                        <p:strVal val="visible"/>
+                                      </p:to>
+                                    </p:set>
+                                  </p:childTnLst>
+                                </p:cTn>
+                              </p:par>
+                            </p:childTnLst>
+                          </p:cTn>
+                        </p:par>
+                      </p:childTnLst>
+                    </p:cTn>
+                  </p:par>
+                  <p:par>
+                    <p:cTn id="31" fill="hold">
+                      <p:stCondLst>
+                        <p:cond delay="indefinite"/>
+                      </p:stCondLst>
+                      <p:childTnLst>
+                        <p:par>
+                          <p:cTn id="32" fill="hold">
+                            <p:stCondLst>
+                              <p:cond delay="0"/>
+                            </p:stCondLst>
+                            <p:childTnLst>
+                              <p:par>
+                                <p:cTn id="33" presetID="1" presetClass="entr" presetSubtype="0" fill="hold" grpId="0" nodeType="clickEffect">
+                                  <p:stCondLst>
+                                    <p:cond delay="0"/>
+                                  </p:stCondLst>
+                                  <p:childTnLst>
+                                    <p:set>
+                                      <p:cBhvr>
+                                        <p:cTn id="34" dur="1" fill="hold">
+                                          <p:stCondLst>
+                                            <p:cond delay="0"/>
+                                          </p:stCondLst>
+                                        </p:cTn>
+                                        <p:tgtEl>
+                                          <p:spTgt spid="3">
+                                            <p:txEl>
+                                              <p:pRg st="7" end="7"/>
+                                            </p:txEl>
+                                          </p:spTgt>
+                                        </p:tgtEl>
+                                        <p:attrNameLst>
+                                          <p:attrName>style.visibility</p:attrName>
+                                        </p:attrNameLst>
+                                      </p:cBhvr>
+                                      <p:to>
+                                        <p:strVal val="visible"/>
+                                      </p:to>
+                                    </p:set>
+                                  </p:childTnLst>
+                                </p:cTn>
+                              </p:par>
+                            </p:childTnLst>
+                          </p:cTn>
+                        </p:par>
+                      </p:childTnLst>
+                    </p:cTn>
+                  </p:par>
+                  <p:par>
+                    <p:cTn id="35" fill="hold">
+                      <p:stCondLst>
+                        <p:cond delay="indefinite"/>
+                      </p:stCondLst>
+                      <p:childTnLst>
+                        <p:par>
+                          <p:cTn id="36" fill="hold">
+                            <p:stCondLst>
+                              <p:cond delay="0"/>
+                            </p:stCondLst>
+                            <p:childTnLst>
+                              <p:par>
+                                <p:cTn id="37" presetID="1" presetClass="entr" presetSubtype="0" fill="hold" grpId="0" nodeType="clickEffect">
+                                  <p:stCondLst>
+                                    <p:cond delay="0"/>
+                                  </p:stCondLst>
+                                  <p:childTnLst>
+                                    <p:set>
+                                      <p:cBhvr>
+                                        <p:cTn id="38" dur="1" fill="hold">
+                                          <p:stCondLst>
+                                            <p:cond delay="0"/>
+                                          </p:stCondLst>
+                                        </p:cTn>
+                                        <p:tgtEl>
+                                          <p:spTgt spid="3">
+                                            <p:txEl>
+                                              <p:pRg st="8" end="8"/>
                                             </p:txEl>
                                           </p:spTgt>
                                         </p:tgtEl>
@@ -11956,7 +13587,47 @@
             <a:pPr lvl="0"/>
             <a:r>
               <a:rPr/>
-              <a:t>각 CREATE, READ, UPDATE, DELETE의 약자로 데이터베이스를 다루는 기본 조작의 일람</a:t>
+              <a:t>각 </a:t>
+            </a:r>
+            <a:r>
+              <a:rPr>
+                <a:latin typeface="Courier"/>
+              </a:rPr>
+              <a:t>CREATE</a:t>
+            </a:r>
+            <a:r>
+              <a:rPr/>
+              <a:t>, </a:t>
+            </a:r>
+            <a:r>
+              <a:rPr>
+                <a:latin typeface="Courier"/>
+              </a:rPr>
+              <a:t>READ</a:t>
+            </a:r>
+            <a:r>
+              <a:rPr/>
+              <a:t>, </a:t>
+            </a:r>
+            <a:r>
+              <a:rPr>
+                <a:latin typeface="Courier"/>
+              </a:rPr>
+              <a:t>UPDATE</a:t>
+            </a:r>
+            <a:r>
+              <a:rPr/>
+              <a:t>, </a:t>
+            </a:r>
+            <a:r>
+              <a:rPr>
+                <a:latin typeface="Courier"/>
+              </a:rPr>
+              <a:t>DELETE</a:t>
+            </a:r>
+            <a:r>
+              <a:rPr/>
+              <a:t>의 약자로 데이터베이스를 다루는 기본 조작의 일람</a:t>
             </a:r>
           </a:p>
           <a:p>
@@ -12393,7 +14064,7 @@
             </a:pPr>
             <a:r>
               <a:rPr/>
-              <a:t>기본 타입(Basic Types)</a:t>
+              <a:t>기본 타입 (Basic Types)</a:t>
             </a:r>
           </a:p>
         </p:txBody>

</xml_diff>